<commit_message>
time on and off chart ready
</commit_message>
<xml_diff>
--- a/excel_reports/IPApresentacion.pptx
+++ b/excel_reports/IPApresentacion.pptx
@@ -11,6 +11,8 @@
     <p:sldId id="259" r:id="rId5"/>
     <p:sldId id="260" r:id="rId6"/>
     <p:sldId id="261" r:id="rId7"/>
+    <p:sldId id="262" r:id="rId8"/>
+    <p:sldId id="263" r:id="rId9"/>
   </p:sldIdLst>
   <p:sldSz cx="12192000" cy="6858000"/>
   <p:notesSz cx="6858000" cy="9144000"/>
@@ -8427,8 +8429,8 @@
     </mc:Fallback>
   </mc:AlternateContent>
   <c:pivotSource>
-    <c:name>[time_in_and_out_home.xlsx]Sheet1!PivotTable1</c:name>
-    <c:fmtId val="3"/>
+    <c:name>[time_on_off.xlsx]Sheet1!PivotTable1</c:name>
+    <c:fmtId val="25"/>
   </c:pivotSource>
   <c:chart>
     <c:autoTitleDeleted val="0"/>
@@ -9009,35 +9011,6 @@
         </c:marker>
         <c:dLbl>
           <c:idx val="0"/>
-          <c:spPr>
-            <a:noFill/>
-            <a:ln>
-              <a:noFill/>
-            </a:ln>
-            <a:effectLst/>
-          </c:spPr>
-          <c:txPr>
-            <a:bodyPr rot="0" spcFirstLastPara="1" vertOverflow="ellipsis" vert="horz" wrap="square" lIns="38100" tIns="19050" rIns="38100" bIns="19050" anchor="ctr" anchorCtr="1">
-              <a:spAutoFit/>
-            </a:bodyPr>
-            <a:lstStyle/>
-            <a:p>
-              <a:pPr>
-                <a:defRPr sz="900" b="0" i="0" u="none" strike="noStrike" kern="1200" baseline="0">
-                  <a:solidFill>
-                    <a:schemeClr val="tx1">
-                      <a:lumMod val="75000"/>
-                      <a:lumOff val="25000"/>
-                    </a:schemeClr>
-                  </a:solidFill>
-                  <a:latin typeface="+mn-lt"/>
-                  <a:ea typeface="+mn-ea"/>
-                  <a:cs typeface="+mn-cs"/>
-                </a:defRPr>
-              </a:pPr>
-              <a:endParaRPr lang="es-EC"/>
-            </a:p>
-          </c:txPr>
           <c:showLegendKey val="0"/>
           <c:showVal val="0"/>
           <c:showCatName val="0"/>
@@ -9723,6 +9696,174 @@
       </c:pivotFmt>
       <c:pivotFmt>
         <c:idx val="23"/>
+        <c:spPr>
+          <a:solidFill>
+            <a:schemeClr val="accent1"/>
+          </a:solidFill>
+          <a:ln>
+            <a:noFill/>
+          </a:ln>
+          <a:effectLst/>
+        </c:spPr>
+        <c:marker>
+          <c:symbol val="none"/>
+        </c:marker>
+        <c:dLbl>
+          <c:idx val="0"/>
+          <c:spPr>
+            <a:noFill/>
+            <a:ln>
+              <a:noFill/>
+            </a:ln>
+            <a:effectLst/>
+          </c:spPr>
+          <c:txPr>
+            <a:bodyPr rot="0" spcFirstLastPara="1" vertOverflow="ellipsis" vert="horz" wrap="square" lIns="38100" tIns="19050" rIns="38100" bIns="19050" anchor="ctr" anchorCtr="1">
+              <a:spAutoFit/>
+            </a:bodyPr>
+            <a:lstStyle/>
+            <a:p>
+              <a:pPr>
+                <a:defRPr sz="900" b="0" i="0" u="none" strike="noStrike" kern="1200" baseline="0">
+                  <a:solidFill>
+                    <a:schemeClr val="tx1">
+                      <a:lumMod val="75000"/>
+                      <a:lumOff val="25000"/>
+                    </a:schemeClr>
+                  </a:solidFill>
+                  <a:latin typeface="+mn-lt"/>
+                  <a:ea typeface="+mn-ea"/>
+                  <a:cs typeface="+mn-cs"/>
+                </a:defRPr>
+              </a:pPr>
+              <a:endParaRPr lang="es-EC"/>
+            </a:p>
+          </c:txPr>
+          <c:showLegendKey val="0"/>
+          <c:showVal val="0"/>
+          <c:showCatName val="0"/>
+          <c:showSerName val="0"/>
+          <c:showPercent val="0"/>
+          <c:showBubbleSize val="0"/>
+          <c:extLst>
+            <c:ext xmlns:c15="http://schemas.microsoft.com/office/drawing/2012/chart" uri="{CE6537A1-D6FC-4f65-9D91-7224C49458BB}"/>
+          </c:extLst>
+        </c:dLbl>
+      </c:pivotFmt>
+      <c:pivotFmt>
+        <c:idx val="24"/>
+        <c:spPr>
+          <a:solidFill>
+            <a:schemeClr val="accent1"/>
+          </a:solidFill>
+          <a:ln>
+            <a:noFill/>
+          </a:ln>
+          <a:effectLst/>
+        </c:spPr>
+        <c:marker>
+          <c:symbol val="none"/>
+        </c:marker>
+        <c:dLbl>
+          <c:idx val="0"/>
+          <c:spPr>
+            <a:noFill/>
+            <a:ln>
+              <a:noFill/>
+            </a:ln>
+            <a:effectLst/>
+          </c:spPr>
+          <c:txPr>
+            <a:bodyPr rot="0" spcFirstLastPara="1" vertOverflow="ellipsis" vert="horz" wrap="square" lIns="38100" tIns="19050" rIns="38100" bIns="19050" anchor="ctr" anchorCtr="1">
+              <a:spAutoFit/>
+            </a:bodyPr>
+            <a:lstStyle/>
+            <a:p>
+              <a:pPr>
+                <a:defRPr sz="900" b="0" i="0" u="none" strike="noStrike" kern="1200" baseline="0">
+                  <a:solidFill>
+                    <a:schemeClr val="tx1">
+                      <a:lumMod val="75000"/>
+                      <a:lumOff val="25000"/>
+                    </a:schemeClr>
+                  </a:solidFill>
+                  <a:latin typeface="+mn-lt"/>
+                  <a:ea typeface="+mn-ea"/>
+                  <a:cs typeface="+mn-cs"/>
+                </a:defRPr>
+              </a:pPr>
+              <a:endParaRPr lang="es-EC"/>
+            </a:p>
+          </c:txPr>
+          <c:showLegendKey val="0"/>
+          <c:showVal val="0"/>
+          <c:showCatName val="0"/>
+          <c:showSerName val="0"/>
+          <c:showPercent val="0"/>
+          <c:showBubbleSize val="0"/>
+          <c:extLst>
+            <c:ext xmlns:c15="http://schemas.microsoft.com/office/drawing/2012/chart" uri="{CE6537A1-D6FC-4f65-9D91-7224C49458BB}"/>
+          </c:extLst>
+        </c:dLbl>
+      </c:pivotFmt>
+      <c:pivotFmt>
+        <c:idx val="25"/>
+        <c:spPr>
+          <a:solidFill>
+            <a:schemeClr val="accent1"/>
+          </a:solidFill>
+          <a:ln>
+            <a:noFill/>
+          </a:ln>
+          <a:effectLst/>
+        </c:spPr>
+        <c:marker>
+          <c:symbol val="none"/>
+        </c:marker>
+        <c:dLbl>
+          <c:idx val="0"/>
+          <c:spPr>
+            <a:noFill/>
+            <a:ln>
+              <a:noFill/>
+            </a:ln>
+            <a:effectLst/>
+          </c:spPr>
+          <c:txPr>
+            <a:bodyPr rot="0" spcFirstLastPara="1" vertOverflow="ellipsis" vert="horz" wrap="square" lIns="38100" tIns="19050" rIns="38100" bIns="19050" anchor="ctr" anchorCtr="1">
+              <a:spAutoFit/>
+            </a:bodyPr>
+            <a:lstStyle/>
+            <a:p>
+              <a:pPr>
+                <a:defRPr sz="900" b="0" i="0" u="none" strike="noStrike" kern="1200" baseline="0">
+                  <a:solidFill>
+                    <a:schemeClr val="tx1">
+                      <a:lumMod val="75000"/>
+                      <a:lumOff val="25000"/>
+                    </a:schemeClr>
+                  </a:solidFill>
+                  <a:latin typeface="+mn-lt"/>
+                  <a:ea typeface="+mn-ea"/>
+                  <a:cs typeface="+mn-cs"/>
+                </a:defRPr>
+              </a:pPr>
+              <a:endParaRPr lang="es-EC"/>
+            </a:p>
+          </c:txPr>
+          <c:showLegendKey val="0"/>
+          <c:showVal val="0"/>
+          <c:showCatName val="0"/>
+          <c:showSerName val="0"/>
+          <c:showPercent val="0"/>
+          <c:showBubbleSize val="0"/>
+          <c:extLst>
+            <c:ext xmlns:c15="http://schemas.microsoft.com/office/drawing/2012/chart" uri="{CE6537A1-D6FC-4f65-9D91-7224C49458BB}"/>
+          </c:extLst>
+        </c:dLbl>
+      </c:pivotFmt>
+      <c:pivotFmt>
+        <c:idx val="26"/>
         <c:spPr>
           <a:solidFill>
             <a:schemeClr val="accent1"/>
@@ -9789,18 +9930,18 @@
           <c:order val="0"/>
           <c:tx>
             <c:strRef>
-              <c:f>Sheet1!$G$1</c:f>
+              <c:f>Sheet1!$I$16</c:f>
               <c:strCache>
                 <c:ptCount val="1"/>
                 <c:pt idx="0">
-                  <c:v>Horas en casa</c:v>
+                  <c:v>Horas encendido</c:v>
                 </c:pt>
               </c:strCache>
             </c:strRef>
           </c:tx>
           <c:spPr>
             <a:solidFill>
-              <a:schemeClr val="accent1"/>
+              <a:srgbClr val="00FF00"/>
             </a:solidFill>
             <a:ln>
               <a:noFill/>
@@ -9810,7 +9951,7 @@
           <c:invertIfNegative val="0"/>
           <c:cat>
             <c:strRef>
-              <c:f>Sheet1!$F$2:$F$12</c:f>
+              <c:f>Sheet1!$H$17:$H$27</c:f>
               <c:strCache>
                 <c:ptCount val="10"/>
                 <c:pt idx="0">
@@ -9848,46 +9989,46 @@
           </c:cat>
           <c:val>
             <c:numRef>
-              <c:f>Sheet1!$G$2:$G$12</c:f>
+              <c:f>Sheet1!$I$17:$I$27</c:f>
               <c:numCache>
                 <c:formatCode>General</c:formatCode>
                 <c:ptCount val="10"/>
                 <c:pt idx="0">
-                  <c:v>240</c:v>
+                  <c:v>123</c:v>
                 </c:pt>
                 <c:pt idx="1">
-                  <c:v>195</c:v>
+                  <c:v>176</c:v>
                 </c:pt>
                 <c:pt idx="2">
-                  <c:v>130</c:v>
+                  <c:v>194</c:v>
                 </c:pt>
                 <c:pt idx="3">
-                  <c:v>223</c:v>
+                  <c:v>224</c:v>
                 </c:pt>
                 <c:pt idx="4">
-                  <c:v>206</c:v>
+                  <c:v>189</c:v>
                 </c:pt>
                 <c:pt idx="5">
-                  <c:v>132</c:v>
+                  <c:v>143</c:v>
                 </c:pt>
                 <c:pt idx="6">
-                  <c:v>189</c:v>
+                  <c:v>85</c:v>
                 </c:pt>
                 <c:pt idx="7">
-                  <c:v>279</c:v>
+                  <c:v>274</c:v>
                 </c:pt>
                 <c:pt idx="8">
-                  <c:v>282</c:v>
+                  <c:v>166</c:v>
                 </c:pt>
                 <c:pt idx="9">
-                  <c:v>144</c:v>
+                  <c:v>194</c:v>
                 </c:pt>
               </c:numCache>
             </c:numRef>
           </c:val>
           <c:extLst>
             <c:ext xmlns:c16="http://schemas.microsoft.com/office/drawing/2014/chart" uri="{C3380CC4-5D6E-409C-BE32-E72D297353CC}">
-              <c16:uniqueId val="{00000000-7091-48A8-8EFE-0BBA73E1E4CA}"/>
+              <c16:uniqueId val="{00000000-452C-4F76-BDC9-186AA53F33DC}"/>
             </c:ext>
           </c:extLst>
         </c:ser>
@@ -9896,11 +10037,11 @@
           <c:order val="1"/>
           <c:tx>
             <c:strRef>
-              <c:f>Sheet1!$H$1</c:f>
+              <c:f>Sheet1!$J$16</c:f>
               <c:strCache>
                 <c:ptCount val="1"/>
                 <c:pt idx="0">
-                  <c:v>Horas afuera</c:v>
+                  <c:v>Horas apagado</c:v>
                 </c:pt>
               </c:strCache>
             </c:strRef>
@@ -9917,7 +10058,7 @@
           <c:invertIfNegative val="0"/>
           <c:cat>
             <c:strRef>
-              <c:f>Sheet1!$F$2:$F$12</c:f>
+              <c:f>Sheet1!$H$17:$H$27</c:f>
               <c:strCache>
                 <c:ptCount val="10"/>
                 <c:pt idx="0">
@@ -9955,46 +10096,46 @@
           </c:cat>
           <c:val>
             <c:numRef>
-              <c:f>Sheet1!$H$2:$H$12</c:f>
+              <c:f>Sheet1!$J$17:$J$27</c:f>
               <c:numCache>
                 <c:formatCode>General</c:formatCode>
                 <c:ptCount val="10"/>
                 <c:pt idx="0">
-                  <c:v>0</c:v>
+                  <c:v>117</c:v>
                 </c:pt>
                 <c:pt idx="1">
-                  <c:v>1</c:v>
+                  <c:v>20</c:v>
                 </c:pt>
                 <c:pt idx="2">
-                  <c:v>158</c:v>
+                  <c:v>94</c:v>
                 </c:pt>
                 <c:pt idx="3">
                   <c:v>0</c:v>
                 </c:pt>
                 <c:pt idx="4">
-                  <c:v>2</c:v>
+                  <c:v>18</c:v>
                 </c:pt>
                 <c:pt idx="5">
-                  <c:v>5</c:v>
+                  <c:v>0</c:v>
                 </c:pt>
                 <c:pt idx="6">
-                  <c:v>19</c:v>
+                  <c:v>124</c:v>
                 </c:pt>
                 <c:pt idx="7">
-                  <c:v>4</c:v>
+                  <c:v>9</c:v>
                 </c:pt>
                 <c:pt idx="8">
-                  <c:v>0</c:v>
+                  <c:v>116</c:v>
                 </c:pt>
                 <c:pt idx="9">
-                  <c:v>140</c:v>
+                  <c:v>89</c:v>
                 </c:pt>
               </c:numCache>
             </c:numRef>
           </c:val>
           <c:extLst>
             <c:ext xmlns:c16="http://schemas.microsoft.com/office/drawing/2014/chart" uri="{C3380CC4-5D6E-409C-BE32-E72D297353CC}">
-              <c16:uniqueId val="{00000001-7091-48A8-8EFE-0BBA73E1E4CA}"/>
+              <c16:uniqueId val="{00000001-452C-4F76-BDC9-186AA53F33DC}"/>
             </c:ext>
           </c:extLst>
         </c:ser>
@@ -10008,11 +10149,11 @@
         </c:dLbls>
         <c:gapWidth val="219"/>
         <c:overlap val="-27"/>
-        <c:axId val="931096159"/>
-        <c:axId val="925453023"/>
+        <c:axId val="2076362687"/>
+        <c:axId val="1960157855"/>
       </c:barChart>
       <c:catAx>
-        <c:axId val="931096159"/>
+        <c:axId val="2076362687"/>
         <c:scaling>
           <c:orientation val="minMax"/>
         </c:scaling>
@@ -10040,7 +10181,7 @@
           <a:lstStyle/>
           <a:p>
             <a:pPr>
-              <a:defRPr sz="900" b="0" i="0" u="none" strike="noStrike" kern="1200" baseline="0">
+              <a:defRPr sz="1100" b="0" i="0" u="none" strike="noStrike" kern="1200" baseline="0">
                 <a:solidFill>
                   <a:schemeClr val="tx1">
                     <a:lumMod val="65000"/>
@@ -10055,7 +10196,7 @@
             <a:endParaRPr lang="es-EC"/>
           </a:p>
         </c:txPr>
-        <c:crossAx val="925453023"/>
+        <c:crossAx val="1960157855"/>
         <c:crosses val="autoZero"/>
         <c:auto val="1"/>
         <c:lblAlgn val="ctr"/>
@@ -10063,7 +10204,7 @@
         <c:noMultiLvlLbl val="0"/>
       </c:catAx>
       <c:valAx>
-        <c:axId val="925453023"/>
+        <c:axId val="1960157855"/>
         <c:scaling>
           <c:orientation val="minMax"/>
         </c:scaling>
@@ -10114,7 +10255,7 @@
             <a:endParaRPr lang="es-EC"/>
           </a:p>
         </c:txPr>
-        <c:crossAx val="931096159"/>
+        <c:crossAx val="2076362687"/>
         <c:crosses val="autoZero"/>
         <c:crossBetween val="between"/>
       </c:valAx>
@@ -17083,7 +17224,101 @@
           <a:p>
             <a:r>
               <a:rPr lang="es-MX" dirty="0"/>
-              <a:t>Promedio duración de batería por dispositivo</a:t>
+              <a:t>Promedio tiempo encendido/apagado de todos los dispositivos</a:t>
+            </a:r>
+            <a:endParaRPr lang="es-EC" dirty="0"/>
+          </a:p>
+        </p:txBody>
+      </p:sp>
+      <p:pic>
+        <p:nvPicPr>
+          <p:cNvPr id="8" name="Picture 7">
+            <a:extLst>
+              <a:ext uri="{FF2B5EF4-FFF2-40B4-BE49-F238E27FC236}">
+                <a16:creationId xmlns:a16="http://schemas.microsoft.com/office/drawing/2014/main" id="{A153A8CA-E785-7B59-5D31-575D18378DC9}"/>
+              </a:ext>
+            </a:extLst>
+          </p:cNvPr>
+          <p:cNvPicPr>
+            <a:picLocks noChangeAspect="1"/>
+          </p:cNvPicPr>
+          <p:nvPr/>
+        </p:nvPicPr>
+        <p:blipFill>
+          <a:blip r:embed="rId2"/>
+          <a:stretch>
+            <a:fillRect/>
+          </a:stretch>
+        </p:blipFill>
+        <p:spPr>
+          <a:xfrm>
+            <a:off x="2053765" y="1775238"/>
+            <a:ext cx="8482019" cy="3870188"/>
+          </a:xfrm>
+          <a:prstGeom prst="rect">
+            <a:avLst/>
+          </a:prstGeom>
+        </p:spPr>
+      </p:pic>
+    </p:spTree>
+    <p:extLst>
+      <p:ext uri="{BB962C8B-B14F-4D97-AF65-F5344CB8AC3E}">
+        <p14:creationId xmlns:p14="http://schemas.microsoft.com/office/powerpoint/2010/main" val="3809897244"/>
+      </p:ext>
+    </p:extLst>
+  </p:cSld>
+  <p:clrMapOvr>
+    <a:masterClrMapping/>
+  </p:clrMapOvr>
+</p:sld>
+</file>
+
+<file path=ppt/slides/slide7.xml><?xml version="1.0" encoding="utf-8"?>
+<p:sld xmlns:a="http://schemas.openxmlformats.org/drawingml/2006/main" xmlns:r="http://schemas.openxmlformats.org/officeDocument/2006/relationships" xmlns:p="http://schemas.openxmlformats.org/presentationml/2006/main">
+  <p:cSld>
+    <p:spTree>
+      <p:nvGrpSpPr>
+        <p:cNvPr id="1" name=""/>
+        <p:cNvGrpSpPr/>
+        <p:nvPr/>
+      </p:nvGrpSpPr>
+      <p:grpSpPr>
+        <a:xfrm>
+          <a:off x="0" y="0"/>
+          <a:ext cx="0" cy="0"/>
+          <a:chOff x="0" y="0"/>
+          <a:chExt cx="0" cy="0"/>
+        </a:xfrm>
+      </p:grpSpPr>
+      <p:sp useBgFill="1">
+        <p:nvSpPr>
+          <p:cNvPr id="2" name="Title 1">
+            <a:extLst>
+              <a:ext uri="{FF2B5EF4-FFF2-40B4-BE49-F238E27FC236}">
+                <a16:creationId xmlns:a16="http://schemas.microsoft.com/office/drawing/2014/main" id="{DCFD4099-6CAA-382F-302C-E5C977DA00FA}"/>
+              </a:ext>
+            </a:extLst>
+          </p:cNvPr>
+          <p:cNvSpPr>
+            <a:spLocks noGrp="1"/>
+          </p:cNvSpPr>
+          <p:nvPr>
+            <p:ph type="title"/>
+          </p:nvPr>
+        </p:nvSpPr>
+        <p:spPr>
+          <a:xfrm>
+            <a:off x="1534696" y="545445"/>
+            <a:ext cx="9520158" cy="1049235"/>
+          </a:xfrm>
+        </p:spPr>
+        <p:txBody>
+          <a:bodyPr/>
+          <a:lstStyle/>
+          <a:p>
+            <a:r>
+              <a:rPr lang="es-MX" dirty="0"/>
+              <a:t>Total tiempo encendido/apagado de cada dispositivo</a:t>
             </a:r>
             <a:endParaRPr lang="es-EC" dirty="0"/>
           </a:p>
@@ -17091,21 +17326,27 @@
       </p:sp>
       <p:graphicFrame>
         <p:nvGraphicFramePr>
-          <p:cNvPr id="5" name="Chart 4">
+          <p:cNvPr id="6" name="Chart 5">
             <a:extLst>
               <a:ext uri="{FF2B5EF4-FFF2-40B4-BE49-F238E27FC236}">
-                <a16:creationId xmlns:a16="http://schemas.microsoft.com/office/drawing/2014/main" id="{CB0D670D-1950-4276-8D95-482E2F14FF17}"/>
+                <a16:creationId xmlns:a16="http://schemas.microsoft.com/office/drawing/2014/main" id="{571E42BA-0BB4-BF29-FDC7-D2ABCCA0C132}"/>
               </a:ext>
             </a:extLst>
           </p:cNvPr>
           <p:cNvGraphicFramePr>
             <a:graphicFrameLocks/>
           </p:cNvGraphicFramePr>
-          <p:nvPr/>
+          <p:nvPr>
+            <p:extLst>
+              <p:ext uri="{D42A27DB-BD31-4B8C-83A1-F6EECF244321}">
+                <p14:modId xmlns:p14="http://schemas.microsoft.com/office/powerpoint/2010/main" val="1381512633"/>
+              </p:ext>
+            </p:extLst>
+          </p:nvPr>
         </p:nvGraphicFramePr>
         <p:xfrm>
-          <a:off x="1534696" y="1594680"/>
-          <a:ext cx="8840673" cy="3999296"/>
+          <a:off x="1534696" y="2057399"/>
+          <a:ext cx="9226069" cy="3614531"/>
         </p:xfrm>
         <a:graphic>
           <a:graphicData uri="http://schemas.openxmlformats.org/drawingml/2006/chart">
@@ -17116,7 +17357,71 @@
     </p:spTree>
     <p:extLst>
       <p:ext uri="{BB962C8B-B14F-4D97-AF65-F5344CB8AC3E}">
-        <p14:creationId xmlns:p14="http://schemas.microsoft.com/office/powerpoint/2010/main" val="3809897244"/>
+        <p14:creationId xmlns:p14="http://schemas.microsoft.com/office/powerpoint/2010/main" val="1535807878"/>
+      </p:ext>
+    </p:extLst>
+  </p:cSld>
+  <p:clrMapOvr>
+    <a:masterClrMapping/>
+  </p:clrMapOvr>
+</p:sld>
+</file>
+
+<file path=ppt/slides/slide8.xml><?xml version="1.0" encoding="utf-8"?>
+<p:sld xmlns:a="http://schemas.openxmlformats.org/drawingml/2006/main" xmlns:r="http://schemas.openxmlformats.org/officeDocument/2006/relationships" xmlns:p="http://schemas.openxmlformats.org/presentationml/2006/main">
+  <p:cSld>
+    <p:spTree>
+      <p:nvGrpSpPr>
+        <p:cNvPr id="1" name=""/>
+        <p:cNvGrpSpPr/>
+        <p:nvPr/>
+      </p:nvGrpSpPr>
+      <p:grpSpPr>
+        <a:xfrm>
+          <a:off x="0" y="0"/>
+          <a:ext cx="0" cy="0"/>
+          <a:chOff x="0" y="0"/>
+          <a:chExt cx="0" cy="0"/>
+        </a:xfrm>
+      </p:grpSpPr>
+      <p:sp useBgFill="1">
+        <p:nvSpPr>
+          <p:cNvPr id="2" name="Title 1">
+            <a:extLst>
+              <a:ext uri="{FF2B5EF4-FFF2-40B4-BE49-F238E27FC236}">
+                <a16:creationId xmlns:a16="http://schemas.microsoft.com/office/drawing/2014/main" id="{DCFD4099-6CAA-382F-302C-E5C977DA00FA}"/>
+              </a:ext>
+            </a:extLst>
+          </p:cNvPr>
+          <p:cNvSpPr>
+            <a:spLocks noGrp="1"/>
+          </p:cNvSpPr>
+          <p:nvPr>
+            <p:ph type="title"/>
+          </p:nvPr>
+        </p:nvSpPr>
+        <p:spPr>
+          <a:xfrm>
+            <a:off x="1534696" y="545445"/>
+            <a:ext cx="9520158" cy="1049235"/>
+          </a:xfrm>
+        </p:spPr>
+        <p:txBody>
+          <a:bodyPr/>
+          <a:lstStyle/>
+          <a:p>
+            <a:r>
+              <a:rPr lang="es-MX" dirty="0"/>
+              <a:t>Total tiempo encendido/apagado de cada dispositivo</a:t>
+            </a:r>
+            <a:endParaRPr lang="es-EC" dirty="0"/>
+          </a:p>
+        </p:txBody>
+      </p:sp>
+    </p:spTree>
+    <p:extLst>
+      <p:ext uri="{BB962C8B-B14F-4D97-AF65-F5344CB8AC3E}">
+        <p14:creationId xmlns:p14="http://schemas.microsoft.com/office/powerpoint/2010/main" val="4116196619"/>
       </p:ext>
     </p:extLst>
   </p:cSld>

</xml_diff>

<commit_message>
average distance chart ready
</commit_message>
<xml_diff>
--- a/excel_reports/IPApresentacion.pptx
+++ b/excel_reports/IPApresentacion.pptx
@@ -15,6 +15,7 @@
     <p:sldId id="263" r:id="rId9"/>
     <p:sldId id="264" r:id="rId10"/>
     <p:sldId id="265" r:id="rId11"/>
+    <p:sldId id="266" r:id="rId12"/>
   </p:sldIdLst>
   <p:sldSz cx="12192000" cy="6858000"/>
   <p:notesSz cx="6858000" cy="9144000"/>
@@ -16014,6 +16015,911 @@
 </c:chartSpace>
 </file>
 
+<file path=ppt/charts/chart7.xml><?xml version="1.0" encoding="utf-8"?>
+<c:chartSpace xmlns:c="http://schemas.openxmlformats.org/drawingml/2006/chart" xmlns:a="http://schemas.openxmlformats.org/drawingml/2006/main" xmlns:r="http://schemas.openxmlformats.org/officeDocument/2006/relationships" xmlns:c16r2="http://schemas.microsoft.com/office/drawing/2015/06/chart">
+  <c:date1904 val="0"/>
+  <c:lang val="en-US"/>
+  <c:roundedCorners val="0"/>
+  <mc:AlternateContent xmlns:mc="http://schemas.openxmlformats.org/markup-compatibility/2006">
+    <mc:Choice xmlns:c14="http://schemas.microsoft.com/office/drawing/2007/8/2/chart" Requires="c14">
+      <c14:style val="102"/>
+    </mc:Choice>
+    <mc:Fallback>
+      <c:style val="2"/>
+    </mc:Fallback>
+  </mc:AlternateContent>
+  <c:pivotSource>
+    <c:name>[averageDistancesTraveled.xlsx]Sheet1!PivotTable1</c:name>
+    <c:fmtId val="3"/>
+  </c:pivotSource>
+  <c:chart>
+    <c:autoTitleDeleted val="0"/>
+    <c:pivotFmts>
+      <c:pivotFmt>
+        <c:idx val="0"/>
+        <c:spPr>
+          <a:solidFill>
+            <a:srgbClr val="00B050"/>
+          </a:solidFill>
+          <a:ln>
+            <a:noFill/>
+          </a:ln>
+          <a:effectLst/>
+        </c:spPr>
+        <c:marker>
+          <c:symbol val="none"/>
+        </c:marker>
+        <c:dLbl>
+          <c:idx val="0"/>
+          <c:spPr>
+            <a:noFill/>
+            <a:ln>
+              <a:noFill/>
+            </a:ln>
+            <a:effectLst/>
+          </c:spPr>
+          <c:txPr>
+            <a:bodyPr rot="0" spcFirstLastPara="1" vertOverflow="ellipsis" vert="horz" wrap="square" lIns="38100" tIns="19050" rIns="38100" bIns="19050" anchor="ctr" anchorCtr="1">
+              <a:spAutoFit/>
+            </a:bodyPr>
+            <a:lstStyle/>
+            <a:p>
+              <a:pPr>
+                <a:defRPr sz="900" b="0" i="0" u="none" strike="noStrike" kern="1200" baseline="0">
+                  <a:solidFill>
+                    <a:schemeClr val="tx1">
+                      <a:lumMod val="75000"/>
+                      <a:lumOff val="25000"/>
+                    </a:schemeClr>
+                  </a:solidFill>
+                  <a:latin typeface="+mn-lt"/>
+                  <a:ea typeface="+mn-ea"/>
+                  <a:cs typeface="+mn-cs"/>
+                </a:defRPr>
+              </a:pPr>
+              <a:endParaRPr lang="es-EC"/>
+            </a:p>
+          </c:txPr>
+          <c:showLegendKey val="0"/>
+          <c:showVal val="0"/>
+          <c:showCatName val="0"/>
+          <c:showSerName val="0"/>
+          <c:showPercent val="0"/>
+          <c:showBubbleSize val="0"/>
+          <c:extLst>
+            <c:ext xmlns:c15="http://schemas.microsoft.com/office/drawing/2012/chart" uri="{CE6537A1-D6FC-4f65-9D91-7224C49458BB}"/>
+          </c:extLst>
+        </c:dLbl>
+      </c:pivotFmt>
+      <c:pivotFmt>
+        <c:idx val="1"/>
+        <c:spPr>
+          <a:solidFill>
+            <a:schemeClr val="accent1"/>
+          </a:solidFill>
+          <a:ln>
+            <a:noFill/>
+          </a:ln>
+          <a:effectLst/>
+        </c:spPr>
+        <c:marker>
+          <c:symbol val="none"/>
+        </c:marker>
+        <c:dLbl>
+          <c:idx val="0"/>
+          <c:spPr>
+            <a:noFill/>
+            <a:ln>
+              <a:noFill/>
+            </a:ln>
+            <a:effectLst/>
+          </c:spPr>
+          <c:txPr>
+            <a:bodyPr rot="0" spcFirstLastPara="1" vertOverflow="ellipsis" vert="horz" wrap="square" lIns="38100" tIns="19050" rIns="38100" bIns="19050" anchor="ctr" anchorCtr="1">
+              <a:spAutoFit/>
+            </a:bodyPr>
+            <a:lstStyle/>
+            <a:p>
+              <a:pPr>
+                <a:defRPr sz="900" b="0" i="0" u="none" strike="noStrike" kern="1200" baseline="0">
+                  <a:solidFill>
+                    <a:schemeClr val="tx1">
+                      <a:lumMod val="75000"/>
+                      <a:lumOff val="25000"/>
+                    </a:schemeClr>
+                  </a:solidFill>
+                  <a:latin typeface="+mn-lt"/>
+                  <a:ea typeface="+mn-ea"/>
+                  <a:cs typeface="+mn-cs"/>
+                </a:defRPr>
+              </a:pPr>
+              <a:endParaRPr lang="es-EC"/>
+            </a:p>
+          </c:txPr>
+          <c:showLegendKey val="0"/>
+          <c:showVal val="0"/>
+          <c:showCatName val="0"/>
+          <c:showSerName val="0"/>
+          <c:showPercent val="0"/>
+          <c:showBubbleSize val="0"/>
+          <c:extLst>
+            <c:ext xmlns:c15="http://schemas.microsoft.com/office/drawing/2012/chart" uri="{CE6537A1-D6FC-4f65-9D91-7224C49458BB}"/>
+          </c:extLst>
+        </c:dLbl>
+      </c:pivotFmt>
+      <c:pivotFmt>
+        <c:idx val="2"/>
+        <c:spPr>
+          <a:solidFill>
+            <a:schemeClr val="accent1"/>
+          </a:solidFill>
+          <a:ln>
+            <a:noFill/>
+          </a:ln>
+          <a:effectLst/>
+        </c:spPr>
+        <c:marker>
+          <c:symbol val="none"/>
+        </c:marker>
+        <c:dLbl>
+          <c:idx val="0"/>
+          <c:spPr>
+            <a:noFill/>
+            <a:ln>
+              <a:noFill/>
+            </a:ln>
+            <a:effectLst/>
+          </c:spPr>
+          <c:txPr>
+            <a:bodyPr rot="0" spcFirstLastPara="1" vertOverflow="ellipsis" vert="horz" wrap="square" lIns="38100" tIns="19050" rIns="38100" bIns="19050" anchor="ctr" anchorCtr="1">
+              <a:spAutoFit/>
+            </a:bodyPr>
+            <a:lstStyle/>
+            <a:p>
+              <a:pPr>
+                <a:defRPr sz="900" b="0" i="0" u="none" strike="noStrike" kern="1200" baseline="0">
+                  <a:solidFill>
+                    <a:schemeClr val="tx1">
+                      <a:lumMod val="75000"/>
+                      <a:lumOff val="25000"/>
+                    </a:schemeClr>
+                  </a:solidFill>
+                  <a:latin typeface="+mn-lt"/>
+                  <a:ea typeface="+mn-ea"/>
+                  <a:cs typeface="+mn-cs"/>
+                </a:defRPr>
+              </a:pPr>
+              <a:endParaRPr lang="es-EC"/>
+            </a:p>
+          </c:txPr>
+          <c:showLegendKey val="0"/>
+          <c:showVal val="0"/>
+          <c:showCatName val="0"/>
+          <c:showSerName val="0"/>
+          <c:showPercent val="0"/>
+          <c:showBubbleSize val="0"/>
+          <c:extLst>
+            <c:ext xmlns:c15="http://schemas.microsoft.com/office/drawing/2012/chart" uri="{CE6537A1-D6FC-4f65-9D91-7224C49458BB}"/>
+          </c:extLst>
+        </c:dLbl>
+      </c:pivotFmt>
+      <c:pivotFmt>
+        <c:idx val="3"/>
+        <c:spPr>
+          <a:solidFill>
+            <a:schemeClr val="accent1">
+              <a:lumMod val="75000"/>
+            </a:schemeClr>
+          </a:solidFill>
+          <a:ln>
+            <a:noFill/>
+          </a:ln>
+          <a:effectLst/>
+        </c:spPr>
+        <c:marker>
+          <c:symbol val="none"/>
+        </c:marker>
+        <c:dLbl>
+          <c:idx val="0"/>
+          <c:spPr>
+            <a:noFill/>
+            <a:ln>
+              <a:noFill/>
+            </a:ln>
+            <a:effectLst/>
+          </c:spPr>
+          <c:txPr>
+            <a:bodyPr rot="0" spcFirstLastPara="1" vertOverflow="ellipsis" vert="horz" wrap="square" lIns="38100" tIns="19050" rIns="38100" bIns="19050" anchor="ctr" anchorCtr="1">
+              <a:spAutoFit/>
+            </a:bodyPr>
+            <a:lstStyle/>
+            <a:p>
+              <a:pPr>
+                <a:defRPr sz="900" b="0" i="0" u="none" strike="noStrike" kern="1200" baseline="0">
+                  <a:solidFill>
+                    <a:schemeClr val="tx1">
+                      <a:lumMod val="75000"/>
+                      <a:lumOff val="25000"/>
+                    </a:schemeClr>
+                  </a:solidFill>
+                  <a:latin typeface="+mn-lt"/>
+                  <a:ea typeface="+mn-ea"/>
+                  <a:cs typeface="+mn-cs"/>
+                </a:defRPr>
+              </a:pPr>
+              <a:endParaRPr lang="es-EC"/>
+            </a:p>
+          </c:txPr>
+          <c:showLegendKey val="0"/>
+          <c:showVal val="0"/>
+          <c:showCatName val="0"/>
+          <c:showSerName val="0"/>
+          <c:showPercent val="0"/>
+          <c:showBubbleSize val="0"/>
+          <c:extLst>
+            <c:ext xmlns:c15="http://schemas.microsoft.com/office/drawing/2012/chart" uri="{CE6537A1-D6FC-4f65-9D91-7224C49458BB}"/>
+          </c:extLst>
+        </c:dLbl>
+      </c:pivotFmt>
+      <c:pivotFmt>
+        <c:idx val="4"/>
+        <c:spPr>
+          <a:solidFill>
+            <a:srgbClr val="00B050"/>
+          </a:solidFill>
+          <a:ln>
+            <a:noFill/>
+          </a:ln>
+          <a:effectLst/>
+        </c:spPr>
+        <c:marker>
+          <c:symbol val="none"/>
+        </c:marker>
+        <c:dLbl>
+          <c:idx val="0"/>
+          <c:spPr>
+            <a:noFill/>
+            <a:ln>
+              <a:noFill/>
+            </a:ln>
+            <a:effectLst/>
+          </c:spPr>
+          <c:txPr>
+            <a:bodyPr rot="0" spcFirstLastPara="1" vertOverflow="ellipsis" vert="horz" wrap="square" lIns="38100" tIns="19050" rIns="38100" bIns="19050" anchor="ctr" anchorCtr="1">
+              <a:spAutoFit/>
+            </a:bodyPr>
+            <a:lstStyle/>
+            <a:p>
+              <a:pPr>
+                <a:defRPr sz="900" b="0" i="0" u="none" strike="noStrike" kern="1200" baseline="0">
+                  <a:solidFill>
+                    <a:schemeClr val="tx1">
+                      <a:lumMod val="75000"/>
+                      <a:lumOff val="25000"/>
+                    </a:schemeClr>
+                  </a:solidFill>
+                  <a:latin typeface="+mn-lt"/>
+                  <a:ea typeface="+mn-ea"/>
+                  <a:cs typeface="+mn-cs"/>
+                </a:defRPr>
+              </a:pPr>
+              <a:endParaRPr lang="es-EC"/>
+            </a:p>
+          </c:txPr>
+          <c:showLegendKey val="0"/>
+          <c:showVal val="0"/>
+          <c:showCatName val="0"/>
+          <c:showSerName val="0"/>
+          <c:showPercent val="0"/>
+          <c:showBubbleSize val="0"/>
+          <c:extLst>
+            <c:ext xmlns:c15="http://schemas.microsoft.com/office/drawing/2012/chart" uri="{CE6537A1-D6FC-4f65-9D91-7224C49458BB}"/>
+          </c:extLst>
+        </c:dLbl>
+      </c:pivotFmt>
+      <c:pivotFmt>
+        <c:idx val="5"/>
+        <c:spPr>
+          <a:solidFill>
+            <a:schemeClr val="accent1">
+              <a:lumMod val="75000"/>
+            </a:schemeClr>
+          </a:solidFill>
+          <a:ln>
+            <a:noFill/>
+          </a:ln>
+          <a:effectLst/>
+        </c:spPr>
+        <c:marker>
+          <c:symbol val="none"/>
+        </c:marker>
+        <c:dLbl>
+          <c:idx val="0"/>
+          <c:spPr>
+            <a:noFill/>
+            <a:ln>
+              <a:noFill/>
+            </a:ln>
+            <a:effectLst/>
+          </c:spPr>
+          <c:txPr>
+            <a:bodyPr rot="0" spcFirstLastPara="1" vertOverflow="ellipsis" vert="horz" wrap="square" lIns="38100" tIns="19050" rIns="38100" bIns="19050" anchor="ctr" anchorCtr="1">
+              <a:spAutoFit/>
+            </a:bodyPr>
+            <a:lstStyle/>
+            <a:p>
+              <a:pPr>
+                <a:defRPr sz="900" b="0" i="0" u="none" strike="noStrike" kern="1200" baseline="0">
+                  <a:solidFill>
+                    <a:schemeClr val="tx1">
+                      <a:lumMod val="75000"/>
+                      <a:lumOff val="25000"/>
+                    </a:schemeClr>
+                  </a:solidFill>
+                  <a:latin typeface="+mn-lt"/>
+                  <a:ea typeface="+mn-ea"/>
+                  <a:cs typeface="+mn-cs"/>
+                </a:defRPr>
+              </a:pPr>
+              <a:endParaRPr lang="es-EC"/>
+            </a:p>
+          </c:txPr>
+          <c:showLegendKey val="0"/>
+          <c:showVal val="0"/>
+          <c:showCatName val="0"/>
+          <c:showSerName val="0"/>
+          <c:showPercent val="0"/>
+          <c:showBubbleSize val="0"/>
+          <c:extLst>
+            <c:ext xmlns:c15="http://schemas.microsoft.com/office/drawing/2012/chart" uri="{CE6537A1-D6FC-4f65-9D91-7224C49458BB}"/>
+          </c:extLst>
+        </c:dLbl>
+      </c:pivotFmt>
+      <c:pivotFmt>
+        <c:idx val="6"/>
+        <c:spPr>
+          <a:solidFill>
+            <a:srgbClr val="00B050"/>
+          </a:solidFill>
+          <a:ln>
+            <a:noFill/>
+          </a:ln>
+          <a:effectLst/>
+        </c:spPr>
+        <c:marker>
+          <c:symbol val="none"/>
+        </c:marker>
+        <c:dLbl>
+          <c:idx val="0"/>
+          <c:spPr>
+            <a:noFill/>
+            <a:ln>
+              <a:noFill/>
+            </a:ln>
+            <a:effectLst/>
+          </c:spPr>
+          <c:txPr>
+            <a:bodyPr rot="0" spcFirstLastPara="1" vertOverflow="ellipsis" vert="horz" wrap="square" lIns="38100" tIns="19050" rIns="38100" bIns="19050" anchor="ctr" anchorCtr="1">
+              <a:spAutoFit/>
+            </a:bodyPr>
+            <a:lstStyle/>
+            <a:p>
+              <a:pPr>
+                <a:defRPr sz="900" b="0" i="0" u="none" strike="noStrike" kern="1200" baseline="0">
+                  <a:solidFill>
+                    <a:schemeClr val="tx1">
+                      <a:lumMod val="75000"/>
+                      <a:lumOff val="25000"/>
+                    </a:schemeClr>
+                  </a:solidFill>
+                  <a:latin typeface="+mn-lt"/>
+                  <a:ea typeface="+mn-ea"/>
+                  <a:cs typeface="+mn-cs"/>
+                </a:defRPr>
+              </a:pPr>
+              <a:endParaRPr lang="es-EC"/>
+            </a:p>
+          </c:txPr>
+          <c:showLegendKey val="0"/>
+          <c:showVal val="0"/>
+          <c:showCatName val="0"/>
+          <c:showSerName val="0"/>
+          <c:showPercent val="0"/>
+          <c:showBubbleSize val="0"/>
+          <c:extLst>
+            <c:ext xmlns:c15="http://schemas.microsoft.com/office/drawing/2012/chart" uri="{CE6537A1-D6FC-4f65-9D91-7224C49458BB}"/>
+          </c:extLst>
+        </c:dLbl>
+      </c:pivotFmt>
+      <c:pivotFmt>
+        <c:idx val="7"/>
+        <c:spPr>
+          <a:solidFill>
+            <a:schemeClr val="accent1">
+              <a:lumMod val="75000"/>
+            </a:schemeClr>
+          </a:solidFill>
+          <a:ln>
+            <a:noFill/>
+          </a:ln>
+          <a:effectLst/>
+        </c:spPr>
+        <c:marker>
+          <c:symbol val="none"/>
+        </c:marker>
+        <c:dLbl>
+          <c:idx val="0"/>
+          <c:spPr>
+            <a:noFill/>
+            <a:ln>
+              <a:noFill/>
+            </a:ln>
+            <a:effectLst/>
+          </c:spPr>
+          <c:txPr>
+            <a:bodyPr rot="0" spcFirstLastPara="1" vertOverflow="ellipsis" vert="horz" wrap="square" lIns="38100" tIns="19050" rIns="38100" bIns="19050" anchor="ctr" anchorCtr="1">
+              <a:spAutoFit/>
+            </a:bodyPr>
+            <a:lstStyle/>
+            <a:p>
+              <a:pPr>
+                <a:defRPr sz="900" b="0" i="0" u="none" strike="noStrike" kern="1200" baseline="0">
+                  <a:solidFill>
+                    <a:schemeClr val="tx1">
+                      <a:lumMod val="75000"/>
+                      <a:lumOff val="25000"/>
+                    </a:schemeClr>
+                  </a:solidFill>
+                  <a:latin typeface="+mn-lt"/>
+                  <a:ea typeface="+mn-ea"/>
+                  <a:cs typeface="+mn-cs"/>
+                </a:defRPr>
+              </a:pPr>
+              <a:endParaRPr lang="es-EC"/>
+            </a:p>
+          </c:txPr>
+          <c:showLegendKey val="0"/>
+          <c:showVal val="0"/>
+          <c:showCatName val="0"/>
+          <c:showSerName val="0"/>
+          <c:showPercent val="0"/>
+          <c:showBubbleSize val="0"/>
+          <c:extLst>
+            <c:ext xmlns:c15="http://schemas.microsoft.com/office/drawing/2012/chart" uri="{CE6537A1-D6FC-4f65-9D91-7224C49458BB}"/>
+          </c:extLst>
+        </c:dLbl>
+      </c:pivotFmt>
+    </c:pivotFmts>
+    <c:plotArea>
+      <c:layout/>
+      <c:barChart>
+        <c:barDir val="col"/>
+        <c:grouping val="clustered"/>
+        <c:varyColors val="0"/>
+        <c:ser>
+          <c:idx val="0"/>
+          <c:order val="0"/>
+          <c:tx>
+            <c:strRef>
+              <c:f>Sheet1!$K$1</c:f>
+              <c:strCache>
+                <c:ptCount val="1"/>
+                <c:pt idx="0">
+                  <c:v>Recorrido Total (Kilometros)</c:v>
+                </c:pt>
+              </c:strCache>
+            </c:strRef>
+          </c:tx>
+          <c:spPr>
+            <a:solidFill>
+              <a:srgbClr val="00B050"/>
+            </a:solidFill>
+            <a:ln>
+              <a:noFill/>
+            </a:ln>
+            <a:effectLst/>
+          </c:spPr>
+          <c:invertIfNegative val="0"/>
+          <c:cat>
+            <c:strRef>
+              <c:f>Sheet1!$J$2:$J$12</c:f>
+              <c:strCache>
+                <c:ptCount val="10"/>
+                <c:pt idx="0">
+                  <c:v>Amigo</c:v>
+                </c:pt>
+                <c:pt idx="1">
+                  <c:v>Chimu</c:v>
+                </c:pt>
+                <c:pt idx="2">
+                  <c:v>Lara</c:v>
+                </c:pt>
+                <c:pt idx="3">
+                  <c:v>Maddy</c:v>
+                </c:pt>
+                <c:pt idx="4">
+                  <c:v>Mora</c:v>
+                </c:pt>
+                <c:pt idx="5">
+                  <c:v>Neutron</c:v>
+                </c:pt>
+                <c:pt idx="6">
+                  <c:v>René</c:v>
+                </c:pt>
+                <c:pt idx="7">
+                  <c:v>Sambayón</c:v>
+                </c:pt>
+                <c:pt idx="8">
+                  <c:v>Sari</c:v>
+                </c:pt>
+                <c:pt idx="9">
+                  <c:v>Tiana</c:v>
+                </c:pt>
+              </c:strCache>
+            </c:strRef>
+          </c:cat>
+          <c:val>
+            <c:numRef>
+              <c:f>Sheet1!$K$2:$K$12</c:f>
+              <c:numCache>
+                <c:formatCode>General</c:formatCode>
+                <c:ptCount val="10"/>
+                <c:pt idx="0">
+                  <c:v>25.47</c:v>
+                </c:pt>
+                <c:pt idx="1">
+                  <c:v>20.87</c:v>
+                </c:pt>
+                <c:pt idx="2">
+                  <c:v>22.3</c:v>
+                </c:pt>
+                <c:pt idx="3">
+                  <c:v>59.74</c:v>
+                </c:pt>
+                <c:pt idx="4">
+                  <c:v>14.89</c:v>
+                </c:pt>
+                <c:pt idx="5">
+                  <c:v>11.1</c:v>
+                </c:pt>
+                <c:pt idx="6">
+                  <c:v>14.82</c:v>
+                </c:pt>
+                <c:pt idx="7">
+                  <c:v>21.15</c:v>
+                </c:pt>
+                <c:pt idx="8">
+                  <c:v>31.6</c:v>
+                </c:pt>
+                <c:pt idx="9">
+                  <c:v>52.87</c:v>
+                </c:pt>
+              </c:numCache>
+            </c:numRef>
+          </c:val>
+          <c:extLst>
+            <c:ext xmlns:c16="http://schemas.microsoft.com/office/drawing/2014/chart" uri="{C3380CC4-5D6E-409C-BE32-E72D297353CC}">
+              <c16:uniqueId val="{00000000-C1A6-4516-B0AF-8253526DBD45}"/>
+            </c:ext>
+          </c:extLst>
+        </c:ser>
+        <c:ser>
+          <c:idx val="1"/>
+          <c:order val="1"/>
+          <c:tx>
+            <c:strRef>
+              <c:f>Sheet1!$L$1</c:f>
+              <c:strCache>
+                <c:ptCount val="1"/>
+                <c:pt idx="0">
+                  <c:v>Promedio de la mascota (Kilometros)</c:v>
+                </c:pt>
+              </c:strCache>
+            </c:strRef>
+          </c:tx>
+          <c:spPr>
+            <a:solidFill>
+              <a:schemeClr val="accent1">
+                <a:lumMod val="75000"/>
+              </a:schemeClr>
+            </a:solidFill>
+            <a:ln>
+              <a:noFill/>
+            </a:ln>
+            <a:effectLst/>
+          </c:spPr>
+          <c:invertIfNegative val="0"/>
+          <c:cat>
+            <c:strRef>
+              <c:f>Sheet1!$J$2:$J$12</c:f>
+              <c:strCache>
+                <c:ptCount val="10"/>
+                <c:pt idx="0">
+                  <c:v>Amigo</c:v>
+                </c:pt>
+                <c:pt idx="1">
+                  <c:v>Chimu</c:v>
+                </c:pt>
+                <c:pt idx="2">
+                  <c:v>Lara</c:v>
+                </c:pt>
+                <c:pt idx="3">
+                  <c:v>Maddy</c:v>
+                </c:pt>
+                <c:pt idx="4">
+                  <c:v>Mora</c:v>
+                </c:pt>
+                <c:pt idx="5">
+                  <c:v>Neutron</c:v>
+                </c:pt>
+                <c:pt idx="6">
+                  <c:v>René</c:v>
+                </c:pt>
+                <c:pt idx="7">
+                  <c:v>Sambayón</c:v>
+                </c:pt>
+                <c:pt idx="8">
+                  <c:v>Sari</c:v>
+                </c:pt>
+                <c:pt idx="9">
+                  <c:v>Tiana</c:v>
+                </c:pt>
+              </c:strCache>
+            </c:strRef>
+          </c:cat>
+          <c:val>
+            <c:numRef>
+              <c:f>Sheet1!$L$2:$L$12</c:f>
+              <c:numCache>
+                <c:formatCode>General</c:formatCode>
+                <c:ptCount val="10"/>
+                <c:pt idx="0">
+                  <c:v>5.0939999999999994</c:v>
+                </c:pt>
+                <c:pt idx="1">
+                  <c:v>5.2175000000000002</c:v>
+                </c:pt>
+                <c:pt idx="2">
+                  <c:v>2.7875000000000001</c:v>
+                </c:pt>
+                <c:pt idx="3">
+                  <c:v>11.948</c:v>
+                </c:pt>
+                <c:pt idx="4">
+                  <c:v>3.7225000000000001</c:v>
+                </c:pt>
+                <c:pt idx="5">
+                  <c:v>1.5857142857142861</c:v>
+                </c:pt>
+                <c:pt idx="6">
+                  <c:v>3.7050000000000001</c:v>
+                </c:pt>
+                <c:pt idx="7">
+                  <c:v>2.6437499999999998</c:v>
+                </c:pt>
+                <c:pt idx="8">
+                  <c:v>3.16</c:v>
+                </c:pt>
+                <c:pt idx="9">
+                  <c:v>10.574</c:v>
+                </c:pt>
+              </c:numCache>
+            </c:numRef>
+          </c:val>
+          <c:extLst>
+            <c:ext xmlns:c16="http://schemas.microsoft.com/office/drawing/2014/chart" uri="{C3380CC4-5D6E-409C-BE32-E72D297353CC}">
+              <c16:uniqueId val="{00000001-C1A6-4516-B0AF-8253526DBD45}"/>
+            </c:ext>
+          </c:extLst>
+        </c:ser>
+        <c:dLbls>
+          <c:showLegendKey val="0"/>
+          <c:showVal val="0"/>
+          <c:showCatName val="0"/>
+          <c:showSerName val="0"/>
+          <c:showPercent val="0"/>
+          <c:showBubbleSize val="0"/>
+        </c:dLbls>
+        <c:gapWidth val="219"/>
+        <c:overlap val="-27"/>
+        <c:axId val="1957422255"/>
+        <c:axId val="1953309487"/>
+      </c:barChart>
+      <c:catAx>
+        <c:axId val="1957422255"/>
+        <c:scaling>
+          <c:orientation val="minMax"/>
+        </c:scaling>
+        <c:delete val="0"/>
+        <c:axPos val="b"/>
+        <c:numFmt formatCode="General" sourceLinked="1"/>
+        <c:majorTickMark val="none"/>
+        <c:minorTickMark val="none"/>
+        <c:tickLblPos val="nextTo"/>
+        <c:spPr>
+          <a:noFill/>
+          <a:ln w="9525" cap="flat" cmpd="sng" algn="ctr">
+            <a:solidFill>
+              <a:schemeClr val="tx1">
+                <a:lumMod val="15000"/>
+                <a:lumOff val="85000"/>
+              </a:schemeClr>
+            </a:solidFill>
+            <a:round/>
+          </a:ln>
+          <a:effectLst/>
+        </c:spPr>
+        <c:txPr>
+          <a:bodyPr rot="-60000000" spcFirstLastPara="1" vertOverflow="ellipsis" vert="horz" wrap="square" anchor="ctr" anchorCtr="1"/>
+          <a:lstStyle/>
+          <a:p>
+            <a:pPr>
+              <a:defRPr sz="1100" b="0" i="0" u="none" strike="noStrike" kern="1200" baseline="0">
+                <a:solidFill>
+                  <a:schemeClr val="tx1">
+                    <a:lumMod val="65000"/>
+                    <a:lumOff val="35000"/>
+                  </a:schemeClr>
+                </a:solidFill>
+                <a:latin typeface="+mn-lt"/>
+                <a:ea typeface="+mn-ea"/>
+                <a:cs typeface="+mn-cs"/>
+              </a:defRPr>
+            </a:pPr>
+            <a:endParaRPr lang="es-EC"/>
+          </a:p>
+        </c:txPr>
+        <c:crossAx val="1953309487"/>
+        <c:crosses val="autoZero"/>
+        <c:auto val="1"/>
+        <c:lblAlgn val="ctr"/>
+        <c:lblOffset val="100"/>
+        <c:noMultiLvlLbl val="0"/>
+      </c:catAx>
+      <c:valAx>
+        <c:axId val="1953309487"/>
+        <c:scaling>
+          <c:orientation val="minMax"/>
+        </c:scaling>
+        <c:delete val="0"/>
+        <c:axPos val="l"/>
+        <c:majorGridlines>
+          <c:spPr>
+            <a:ln w="9525" cap="flat" cmpd="sng" algn="ctr">
+              <a:solidFill>
+                <a:schemeClr val="tx1">
+                  <a:lumMod val="15000"/>
+                  <a:lumOff val="85000"/>
+                </a:schemeClr>
+              </a:solidFill>
+              <a:round/>
+            </a:ln>
+            <a:effectLst/>
+          </c:spPr>
+        </c:majorGridlines>
+        <c:numFmt formatCode="General" sourceLinked="1"/>
+        <c:majorTickMark val="none"/>
+        <c:minorTickMark val="none"/>
+        <c:tickLblPos val="nextTo"/>
+        <c:spPr>
+          <a:noFill/>
+          <a:ln>
+            <a:noFill/>
+          </a:ln>
+          <a:effectLst/>
+        </c:spPr>
+        <c:txPr>
+          <a:bodyPr rot="-60000000" spcFirstLastPara="1" vertOverflow="ellipsis" vert="horz" wrap="square" anchor="ctr" anchorCtr="1"/>
+          <a:lstStyle/>
+          <a:p>
+            <a:pPr>
+              <a:defRPr sz="900" b="0" i="0" u="none" strike="noStrike" kern="1200" baseline="0">
+                <a:solidFill>
+                  <a:schemeClr val="tx1">
+                    <a:lumMod val="65000"/>
+                    <a:lumOff val="35000"/>
+                  </a:schemeClr>
+                </a:solidFill>
+                <a:latin typeface="+mn-lt"/>
+                <a:ea typeface="+mn-ea"/>
+                <a:cs typeface="+mn-cs"/>
+              </a:defRPr>
+            </a:pPr>
+            <a:endParaRPr lang="es-EC"/>
+          </a:p>
+        </c:txPr>
+        <c:crossAx val="1957422255"/>
+        <c:crosses val="autoZero"/>
+        <c:crossBetween val="between"/>
+      </c:valAx>
+      <c:spPr>
+        <a:noFill/>
+        <a:ln>
+          <a:noFill/>
+        </a:ln>
+        <a:effectLst/>
+      </c:spPr>
+    </c:plotArea>
+    <c:legend>
+      <c:legendPos val="r"/>
+      <c:overlay val="0"/>
+      <c:spPr>
+        <a:noFill/>
+        <a:ln>
+          <a:noFill/>
+        </a:ln>
+        <a:effectLst/>
+      </c:spPr>
+      <c:txPr>
+        <a:bodyPr rot="0" spcFirstLastPara="1" vertOverflow="ellipsis" vert="horz" wrap="square" anchor="ctr" anchorCtr="1"/>
+        <a:lstStyle/>
+        <a:p>
+          <a:pPr>
+            <a:defRPr sz="1000" b="0" i="0" u="none" strike="noStrike" kern="1200" baseline="0">
+              <a:solidFill>
+                <a:schemeClr val="tx1">
+                  <a:lumMod val="65000"/>
+                  <a:lumOff val="35000"/>
+                </a:schemeClr>
+              </a:solidFill>
+              <a:latin typeface="+mn-lt"/>
+              <a:ea typeface="+mn-ea"/>
+              <a:cs typeface="+mn-cs"/>
+            </a:defRPr>
+          </a:pPr>
+          <a:endParaRPr lang="es-EC"/>
+        </a:p>
+      </c:txPr>
+    </c:legend>
+    <c:plotVisOnly val="1"/>
+    <c:dispBlanksAs val="gap"/>
+    <c:extLst>
+      <c:ext xmlns:c16r3="http://schemas.microsoft.com/office/drawing/2017/03/chart" uri="{56B9EC1D-385E-4148-901F-78D8002777C0}">
+        <c16r3:dataDisplayOptions16>
+          <c16r3:dispNaAsBlank val="1"/>
+        </c16r3:dataDisplayOptions16>
+      </c:ext>
+    </c:extLst>
+    <c:showDLblsOverMax val="0"/>
+  </c:chart>
+  <c:spPr>
+    <a:noFill/>
+    <a:ln>
+      <a:noFill/>
+    </a:ln>
+    <a:effectLst/>
+  </c:spPr>
+  <c:txPr>
+    <a:bodyPr/>
+    <a:lstStyle/>
+    <a:p>
+      <a:pPr>
+        <a:defRPr/>
+      </a:pPr>
+      <a:endParaRPr lang="es-EC"/>
+    </a:p>
+  </c:txPr>
+  <c:externalData r:id="rId3">
+    <c:autoUpdate val="0"/>
+  </c:externalData>
+  <c:extLst>
+    <c:ext xmlns:c14="http://schemas.microsoft.com/office/drawing/2007/8/2/chart" uri="{781A3756-C4B2-4CAC-9D66-4F8BD8637D16}">
+      <c14:pivotOptions>
+        <c14:dropZoneFilter val="1"/>
+        <c14:dropZoneCategories val="1"/>
+        <c14:dropZoneData val="1"/>
+        <c14:dropZoneSeries val="1"/>
+      </c14:pivotOptions>
+    </c:ext>
+    <c:ext xmlns:c16="http://schemas.microsoft.com/office/drawing/2014/chart" uri="{E28EC0CA-F0BB-4C9C-879D-F8772B89E7AC}">
+      <c16:pivotOptions16>
+        <c16:showExpandCollapseFieldButtons val="1"/>
+      </c16:pivotOptions16>
+    </c:ext>
+  </c:extLst>
+</c:chartSpace>
+</file>
+
 <file path=ppt/charts/colors1.xml><?xml version="1.0" encoding="utf-8"?>
 <cs:colorStyle xmlns:cs="http://schemas.microsoft.com/office/drawing/2012/chartStyle" xmlns:a="http://schemas.openxmlformats.org/drawingml/2006/main" meth="cycle" id="10">
   <a:schemeClr val="accent1"/>
@@ -16215,6 +17121,46 @@
 </file>
 
 <file path=ppt/charts/colors6.xml><?xml version="1.0" encoding="utf-8"?>
+<cs:colorStyle xmlns:cs="http://schemas.microsoft.com/office/drawing/2012/chartStyle" xmlns:a="http://schemas.openxmlformats.org/drawingml/2006/main" meth="cycle" id="10">
+  <a:schemeClr val="accent1"/>
+  <a:schemeClr val="accent2"/>
+  <a:schemeClr val="accent3"/>
+  <a:schemeClr val="accent4"/>
+  <a:schemeClr val="accent5"/>
+  <a:schemeClr val="accent6"/>
+  <cs:variation/>
+  <cs:variation>
+    <a:lumMod val="60000"/>
+  </cs:variation>
+  <cs:variation>
+    <a:lumMod val="80000"/>
+    <a:lumOff val="20000"/>
+  </cs:variation>
+  <cs:variation>
+    <a:lumMod val="80000"/>
+  </cs:variation>
+  <cs:variation>
+    <a:lumMod val="60000"/>
+    <a:lumOff val="40000"/>
+  </cs:variation>
+  <cs:variation>
+    <a:lumMod val="50000"/>
+  </cs:variation>
+  <cs:variation>
+    <a:lumMod val="70000"/>
+    <a:lumOff val="30000"/>
+  </cs:variation>
+  <cs:variation>
+    <a:lumMod val="70000"/>
+  </cs:variation>
+  <cs:variation>
+    <a:lumMod val="50000"/>
+    <a:lumOff val="50000"/>
+  </cs:variation>
+</cs:colorStyle>
+</file>
+
+<file path=ppt/charts/colors7.xml><?xml version="1.0" encoding="utf-8"?>
 <cs:colorStyle xmlns:cs="http://schemas.microsoft.com/office/drawing/2012/chartStyle" xmlns:a="http://schemas.openxmlformats.org/drawingml/2006/main" meth="cycle" id="10">
   <a:schemeClr val="accent1"/>
   <a:schemeClr val="accent2"/>
@@ -19289,6 +20235,509 @@
 </cs:chartStyle>
 </file>
 
+<file path=ppt/charts/style7.xml><?xml version="1.0" encoding="utf-8"?>
+<cs:chartStyle xmlns:cs="http://schemas.microsoft.com/office/drawing/2012/chartStyle" xmlns:a="http://schemas.openxmlformats.org/drawingml/2006/main" id="201">
+  <cs:axisTitle>
+    <cs:lnRef idx="0"/>
+    <cs:fillRef idx="0"/>
+    <cs:effectRef idx="0"/>
+    <cs:fontRef idx="minor">
+      <a:schemeClr val="tx1">
+        <a:lumMod val="65000"/>
+        <a:lumOff val="35000"/>
+      </a:schemeClr>
+    </cs:fontRef>
+    <cs:defRPr sz="1000" kern="1200"/>
+  </cs:axisTitle>
+  <cs:categoryAxis>
+    <cs:lnRef idx="0"/>
+    <cs:fillRef idx="0"/>
+    <cs:effectRef idx="0"/>
+    <cs:fontRef idx="minor">
+      <a:schemeClr val="tx1">
+        <a:lumMod val="65000"/>
+        <a:lumOff val="35000"/>
+      </a:schemeClr>
+    </cs:fontRef>
+    <cs:spPr>
+      <a:ln w="9525" cap="flat" cmpd="sng" algn="ctr">
+        <a:solidFill>
+          <a:schemeClr val="tx1">
+            <a:lumMod val="15000"/>
+            <a:lumOff val="85000"/>
+          </a:schemeClr>
+        </a:solidFill>
+        <a:round/>
+      </a:ln>
+    </cs:spPr>
+    <cs:defRPr sz="900" kern="1200"/>
+  </cs:categoryAxis>
+  <cs:chartArea mods="allowNoFillOverride allowNoLineOverride">
+    <cs:lnRef idx="0"/>
+    <cs:fillRef idx="0"/>
+    <cs:effectRef idx="0"/>
+    <cs:fontRef idx="minor">
+      <a:schemeClr val="tx1"/>
+    </cs:fontRef>
+    <cs:spPr>
+      <a:solidFill>
+        <a:schemeClr val="bg1"/>
+      </a:solidFill>
+      <a:ln w="9525" cap="flat" cmpd="sng" algn="ctr">
+        <a:solidFill>
+          <a:schemeClr val="tx1">
+            <a:lumMod val="15000"/>
+            <a:lumOff val="85000"/>
+          </a:schemeClr>
+        </a:solidFill>
+        <a:round/>
+      </a:ln>
+    </cs:spPr>
+    <cs:defRPr sz="1000" kern="1200"/>
+  </cs:chartArea>
+  <cs:dataLabel>
+    <cs:lnRef idx="0"/>
+    <cs:fillRef idx="0"/>
+    <cs:effectRef idx="0"/>
+    <cs:fontRef idx="minor">
+      <a:schemeClr val="tx1">
+        <a:lumMod val="75000"/>
+        <a:lumOff val="25000"/>
+      </a:schemeClr>
+    </cs:fontRef>
+    <cs:defRPr sz="900" kern="1200"/>
+  </cs:dataLabel>
+  <cs:dataLabelCallout>
+    <cs:lnRef idx="0"/>
+    <cs:fillRef idx="0"/>
+    <cs:effectRef idx="0"/>
+    <cs:fontRef idx="minor">
+      <a:schemeClr val="dk1">
+        <a:lumMod val="65000"/>
+        <a:lumOff val="35000"/>
+      </a:schemeClr>
+    </cs:fontRef>
+    <cs:spPr>
+      <a:solidFill>
+        <a:schemeClr val="lt1"/>
+      </a:solidFill>
+      <a:ln>
+        <a:solidFill>
+          <a:schemeClr val="dk1">
+            <a:lumMod val="25000"/>
+            <a:lumOff val="75000"/>
+          </a:schemeClr>
+        </a:solidFill>
+      </a:ln>
+    </cs:spPr>
+    <cs:defRPr sz="900" kern="1200"/>
+    <cs:bodyPr rot="0" spcFirstLastPara="1" vertOverflow="clip" horzOverflow="clip" vert="horz" wrap="square" lIns="36576" tIns="18288" rIns="36576" bIns="18288" anchor="ctr" anchorCtr="1">
+      <a:spAutoFit/>
+    </cs:bodyPr>
+  </cs:dataLabelCallout>
+  <cs:dataPoint>
+    <cs:lnRef idx="0"/>
+    <cs:fillRef idx="1">
+      <cs:styleClr val="auto"/>
+    </cs:fillRef>
+    <cs:effectRef idx="0"/>
+    <cs:fontRef idx="minor">
+      <a:schemeClr val="tx1"/>
+    </cs:fontRef>
+  </cs:dataPoint>
+  <cs:dataPoint3D>
+    <cs:lnRef idx="0"/>
+    <cs:fillRef idx="1">
+      <cs:styleClr val="auto"/>
+    </cs:fillRef>
+    <cs:effectRef idx="0"/>
+    <cs:fontRef idx="minor">
+      <a:schemeClr val="tx1"/>
+    </cs:fontRef>
+  </cs:dataPoint3D>
+  <cs:dataPointLine>
+    <cs:lnRef idx="0">
+      <cs:styleClr val="auto"/>
+    </cs:lnRef>
+    <cs:fillRef idx="1"/>
+    <cs:effectRef idx="0"/>
+    <cs:fontRef idx="minor">
+      <a:schemeClr val="tx1"/>
+    </cs:fontRef>
+    <cs:spPr>
+      <a:ln w="28575" cap="rnd">
+        <a:solidFill>
+          <a:schemeClr val="phClr"/>
+        </a:solidFill>
+        <a:round/>
+      </a:ln>
+    </cs:spPr>
+  </cs:dataPointLine>
+  <cs:dataPointMarker>
+    <cs:lnRef idx="0">
+      <cs:styleClr val="auto"/>
+    </cs:lnRef>
+    <cs:fillRef idx="1">
+      <cs:styleClr val="auto"/>
+    </cs:fillRef>
+    <cs:effectRef idx="0"/>
+    <cs:fontRef idx="minor">
+      <a:schemeClr val="tx1"/>
+    </cs:fontRef>
+    <cs:spPr>
+      <a:ln w="9525">
+        <a:solidFill>
+          <a:schemeClr val="phClr"/>
+        </a:solidFill>
+      </a:ln>
+    </cs:spPr>
+  </cs:dataPointMarker>
+  <cs:dataPointMarkerLayout symbol="circle" size="5"/>
+  <cs:dataPointWireframe>
+    <cs:lnRef idx="0">
+      <cs:styleClr val="auto"/>
+    </cs:lnRef>
+    <cs:fillRef idx="1"/>
+    <cs:effectRef idx="0"/>
+    <cs:fontRef idx="minor">
+      <a:schemeClr val="tx1"/>
+    </cs:fontRef>
+    <cs:spPr>
+      <a:ln w="9525" cap="rnd">
+        <a:solidFill>
+          <a:schemeClr val="phClr"/>
+        </a:solidFill>
+        <a:round/>
+      </a:ln>
+    </cs:spPr>
+  </cs:dataPointWireframe>
+  <cs:dataTable>
+    <cs:lnRef idx="0"/>
+    <cs:fillRef idx="0"/>
+    <cs:effectRef idx="0"/>
+    <cs:fontRef idx="minor">
+      <a:schemeClr val="tx1">
+        <a:lumMod val="65000"/>
+        <a:lumOff val="35000"/>
+      </a:schemeClr>
+    </cs:fontRef>
+    <cs:spPr>
+      <a:noFill/>
+      <a:ln w="9525" cap="flat" cmpd="sng" algn="ctr">
+        <a:solidFill>
+          <a:schemeClr val="tx1">
+            <a:lumMod val="15000"/>
+            <a:lumOff val="85000"/>
+          </a:schemeClr>
+        </a:solidFill>
+        <a:round/>
+      </a:ln>
+    </cs:spPr>
+    <cs:defRPr sz="900" kern="1200"/>
+  </cs:dataTable>
+  <cs:downBar>
+    <cs:lnRef idx="0"/>
+    <cs:fillRef idx="0"/>
+    <cs:effectRef idx="0"/>
+    <cs:fontRef idx="minor">
+      <a:schemeClr val="dk1"/>
+    </cs:fontRef>
+    <cs:spPr>
+      <a:solidFill>
+        <a:schemeClr val="dk1">
+          <a:lumMod val="65000"/>
+          <a:lumOff val="35000"/>
+        </a:schemeClr>
+      </a:solidFill>
+      <a:ln w="9525">
+        <a:solidFill>
+          <a:schemeClr val="tx1">
+            <a:lumMod val="65000"/>
+            <a:lumOff val="35000"/>
+          </a:schemeClr>
+        </a:solidFill>
+      </a:ln>
+    </cs:spPr>
+  </cs:downBar>
+  <cs:dropLine>
+    <cs:lnRef idx="0"/>
+    <cs:fillRef idx="0"/>
+    <cs:effectRef idx="0"/>
+    <cs:fontRef idx="minor">
+      <a:schemeClr val="tx1"/>
+    </cs:fontRef>
+    <cs:spPr>
+      <a:ln w="9525" cap="flat" cmpd="sng" algn="ctr">
+        <a:solidFill>
+          <a:schemeClr val="tx1">
+            <a:lumMod val="35000"/>
+            <a:lumOff val="65000"/>
+          </a:schemeClr>
+        </a:solidFill>
+        <a:round/>
+      </a:ln>
+    </cs:spPr>
+  </cs:dropLine>
+  <cs:errorBar>
+    <cs:lnRef idx="0"/>
+    <cs:fillRef idx="0"/>
+    <cs:effectRef idx="0"/>
+    <cs:fontRef idx="minor">
+      <a:schemeClr val="tx1"/>
+    </cs:fontRef>
+    <cs:spPr>
+      <a:ln w="9525" cap="flat" cmpd="sng" algn="ctr">
+        <a:solidFill>
+          <a:schemeClr val="tx1">
+            <a:lumMod val="65000"/>
+            <a:lumOff val="35000"/>
+          </a:schemeClr>
+        </a:solidFill>
+        <a:round/>
+      </a:ln>
+    </cs:spPr>
+  </cs:errorBar>
+  <cs:floor>
+    <cs:lnRef idx="0"/>
+    <cs:fillRef idx="0"/>
+    <cs:effectRef idx="0"/>
+    <cs:fontRef idx="minor">
+      <a:schemeClr val="tx1"/>
+    </cs:fontRef>
+    <cs:spPr>
+      <a:noFill/>
+      <a:ln>
+        <a:noFill/>
+      </a:ln>
+    </cs:spPr>
+  </cs:floor>
+  <cs:gridlineMajor>
+    <cs:lnRef idx="0"/>
+    <cs:fillRef idx="0"/>
+    <cs:effectRef idx="0"/>
+    <cs:fontRef idx="minor">
+      <a:schemeClr val="tx1"/>
+    </cs:fontRef>
+    <cs:spPr>
+      <a:ln w="9525" cap="flat" cmpd="sng" algn="ctr">
+        <a:solidFill>
+          <a:schemeClr val="tx1">
+            <a:lumMod val="15000"/>
+            <a:lumOff val="85000"/>
+          </a:schemeClr>
+        </a:solidFill>
+        <a:round/>
+      </a:ln>
+    </cs:spPr>
+  </cs:gridlineMajor>
+  <cs:gridlineMinor>
+    <cs:lnRef idx="0"/>
+    <cs:fillRef idx="0"/>
+    <cs:effectRef idx="0"/>
+    <cs:fontRef idx="minor">
+      <a:schemeClr val="tx1"/>
+    </cs:fontRef>
+    <cs:spPr>
+      <a:ln w="9525" cap="flat" cmpd="sng" algn="ctr">
+        <a:solidFill>
+          <a:schemeClr val="tx1">
+            <a:lumMod val="5000"/>
+            <a:lumOff val="95000"/>
+          </a:schemeClr>
+        </a:solidFill>
+        <a:round/>
+      </a:ln>
+    </cs:spPr>
+  </cs:gridlineMinor>
+  <cs:hiLoLine>
+    <cs:lnRef idx="0"/>
+    <cs:fillRef idx="0"/>
+    <cs:effectRef idx="0"/>
+    <cs:fontRef idx="minor">
+      <a:schemeClr val="tx1"/>
+    </cs:fontRef>
+    <cs:spPr>
+      <a:ln w="9525" cap="flat" cmpd="sng" algn="ctr">
+        <a:solidFill>
+          <a:schemeClr val="tx1">
+            <a:lumMod val="75000"/>
+            <a:lumOff val="25000"/>
+          </a:schemeClr>
+        </a:solidFill>
+        <a:round/>
+      </a:ln>
+    </cs:spPr>
+  </cs:hiLoLine>
+  <cs:leaderLine>
+    <cs:lnRef idx="0"/>
+    <cs:fillRef idx="0"/>
+    <cs:effectRef idx="0"/>
+    <cs:fontRef idx="minor">
+      <a:schemeClr val="tx1"/>
+    </cs:fontRef>
+    <cs:spPr>
+      <a:ln w="9525" cap="flat" cmpd="sng" algn="ctr">
+        <a:solidFill>
+          <a:schemeClr val="tx1">
+            <a:lumMod val="35000"/>
+            <a:lumOff val="65000"/>
+          </a:schemeClr>
+        </a:solidFill>
+        <a:round/>
+      </a:ln>
+    </cs:spPr>
+  </cs:leaderLine>
+  <cs:legend>
+    <cs:lnRef idx="0"/>
+    <cs:fillRef idx="0"/>
+    <cs:effectRef idx="0"/>
+    <cs:fontRef idx="minor">
+      <a:schemeClr val="tx1">
+        <a:lumMod val="65000"/>
+        <a:lumOff val="35000"/>
+      </a:schemeClr>
+    </cs:fontRef>
+    <cs:defRPr sz="900" kern="1200"/>
+  </cs:legend>
+  <cs:plotArea mods="allowNoFillOverride allowNoLineOverride">
+    <cs:lnRef idx="0"/>
+    <cs:fillRef idx="0"/>
+    <cs:effectRef idx="0"/>
+    <cs:fontRef idx="minor">
+      <a:schemeClr val="tx1"/>
+    </cs:fontRef>
+  </cs:plotArea>
+  <cs:plotArea3D mods="allowNoFillOverride allowNoLineOverride">
+    <cs:lnRef idx="0"/>
+    <cs:fillRef idx="0"/>
+    <cs:effectRef idx="0"/>
+    <cs:fontRef idx="minor">
+      <a:schemeClr val="tx1"/>
+    </cs:fontRef>
+  </cs:plotArea3D>
+  <cs:seriesAxis>
+    <cs:lnRef idx="0"/>
+    <cs:fillRef idx="0"/>
+    <cs:effectRef idx="0"/>
+    <cs:fontRef idx="minor">
+      <a:schemeClr val="tx1">
+        <a:lumMod val="65000"/>
+        <a:lumOff val="35000"/>
+      </a:schemeClr>
+    </cs:fontRef>
+    <cs:defRPr sz="900" kern="1200"/>
+  </cs:seriesAxis>
+  <cs:seriesLine>
+    <cs:lnRef idx="0"/>
+    <cs:fillRef idx="0"/>
+    <cs:effectRef idx="0"/>
+    <cs:fontRef idx="minor">
+      <a:schemeClr val="tx1"/>
+    </cs:fontRef>
+    <cs:spPr>
+      <a:ln w="9525" cap="flat" cmpd="sng" algn="ctr">
+        <a:solidFill>
+          <a:schemeClr val="tx1">
+            <a:lumMod val="35000"/>
+            <a:lumOff val="65000"/>
+          </a:schemeClr>
+        </a:solidFill>
+        <a:round/>
+      </a:ln>
+    </cs:spPr>
+  </cs:seriesLine>
+  <cs:title>
+    <cs:lnRef idx="0"/>
+    <cs:fillRef idx="0"/>
+    <cs:effectRef idx="0"/>
+    <cs:fontRef idx="minor">
+      <a:schemeClr val="tx1">
+        <a:lumMod val="65000"/>
+        <a:lumOff val="35000"/>
+      </a:schemeClr>
+    </cs:fontRef>
+    <cs:defRPr sz="1400" b="0" kern="1200" spc="0" baseline="0"/>
+  </cs:title>
+  <cs:trendline>
+    <cs:lnRef idx="0">
+      <cs:styleClr val="auto"/>
+    </cs:lnRef>
+    <cs:fillRef idx="0"/>
+    <cs:effectRef idx="0"/>
+    <cs:fontRef idx="minor">
+      <a:schemeClr val="tx1"/>
+    </cs:fontRef>
+    <cs:spPr>
+      <a:ln w="19050" cap="rnd">
+        <a:solidFill>
+          <a:schemeClr val="phClr"/>
+        </a:solidFill>
+        <a:prstDash val="sysDot"/>
+      </a:ln>
+    </cs:spPr>
+  </cs:trendline>
+  <cs:trendlineLabel>
+    <cs:lnRef idx="0"/>
+    <cs:fillRef idx="0"/>
+    <cs:effectRef idx="0"/>
+    <cs:fontRef idx="minor">
+      <a:schemeClr val="tx1">
+        <a:lumMod val="65000"/>
+        <a:lumOff val="35000"/>
+      </a:schemeClr>
+    </cs:fontRef>
+    <cs:defRPr sz="900" kern="1200"/>
+  </cs:trendlineLabel>
+  <cs:upBar>
+    <cs:lnRef idx="0"/>
+    <cs:fillRef idx="0"/>
+    <cs:effectRef idx="0"/>
+    <cs:fontRef idx="minor">
+      <a:schemeClr val="dk1"/>
+    </cs:fontRef>
+    <cs:spPr>
+      <a:solidFill>
+        <a:schemeClr val="lt1"/>
+      </a:solidFill>
+      <a:ln w="9525">
+        <a:solidFill>
+          <a:schemeClr val="tx1">
+            <a:lumMod val="15000"/>
+            <a:lumOff val="85000"/>
+          </a:schemeClr>
+        </a:solidFill>
+      </a:ln>
+    </cs:spPr>
+  </cs:upBar>
+  <cs:valueAxis>
+    <cs:lnRef idx="0"/>
+    <cs:fillRef idx="0"/>
+    <cs:effectRef idx="0"/>
+    <cs:fontRef idx="minor">
+      <a:schemeClr val="tx1">
+        <a:lumMod val="65000"/>
+        <a:lumOff val="35000"/>
+      </a:schemeClr>
+    </cs:fontRef>
+    <cs:defRPr sz="900" kern="1200"/>
+  </cs:valueAxis>
+  <cs:wall>
+    <cs:lnRef idx="0"/>
+    <cs:fillRef idx="0"/>
+    <cs:effectRef idx="0"/>
+    <cs:fontRef idx="minor">
+      <a:schemeClr val="tx1"/>
+    </cs:fontRef>
+    <cs:spPr>
+      <a:noFill/>
+      <a:ln>
+        <a:noFill/>
+      </a:ln>
+    </cs:spPr>
+  </cs:wall>
+</cs:chartStyle>
+</file>
+
 <file path=ppt/slideLayouts/slideLayout1.xml><?xml version="1.0" encoding="utf-8"?>
 <p:sldLayout xmlns:a="http://schemas.openxmlformats.org/drawingml/2006/main" xmlns:r="http://schemas.openxmlformats.org/officeDocument/2006/relationships" xmlns:p="http://schemas.openxmlformats.org/presentationml/2006/main" type="title" preserve="1">
   <p:cSld name="Title Slide">
@@ -23024,6 +24473,100 @@
 </p:sld>
 </file>
 
+<file path=ppt/slides/slide11.xml><?xml version="1.0" encoding="utf-8"?>
+<p:sld xmlns:a="http://schemas.openxmlformats.org/drawingml/2006/main" xmlns:r="http://schemas.openxmlformats.org/officeDocument/2006/relationships" xmlns:p="http://schemas.openxmlformats.org/presentationml/2006/main">
+  <p:cSld>
+    <p:spTree>
+      <p:nvGrpSpPr>
+        <p:cNvPr id="1" name=""/>
+        <p:cNvGrpSpPr/>
+        <p:nvPr/>
+      </p:nvGrpSpPr>
+      <p:grpSpPr>
+        <a:xfrm>
+          <a:off x="0" y="0"/>
+          <a:ext cx="0" cy="0"/>
+          <a:chOff x="0" y="0"/>
+          <a:chExt cx="0" cy="0"/>
+        </a:xfrm>
+      </p:grpSpPr>
+      <p:sp useBgFill="1">
+        <p:nvSpPr>
+          <p:cNvPr id="2" name="Title 1">
+            <a:extLst>
+              <a:ext uri="{FF2B5EF4-FFF2-40B4-BE49-F238E27FC236}">
+                <a16:creationId xmlns:a16="http://schemas.microsoft.com/office/drawing/2014/main" id="{DCFD4099-6CAA-382F-302C-E5C977DA00FA}"/>
+              </a:ext>
+            </a:extLst>
+          </p:cNvPr>
+          <p:cNvSpPr>
+            <a:spLocks noGrp="1"/>
+          </p:cNvSpPr>
+          <p:nvPr>
+            <p:ph type="title"/>
+          </p:nvPr>
+        </p:nvSpPr>
+        <p:spPr>
+          <a:xfrm>
+            <a:off x="1430767" y="0"/>
+            <a:ext cx="9520158" cy="1049235"/>
+          </a:xfrm>
+        </p:spPr>
+        <p:txBody>
+          <a:bodyPr/>
+          <a:lstStyle/>
+          <a:p>
+            <a:r>
+              <a:rPr lang="es-MX" dirty="0"/>
+              <a:t>Distancias recorridas por mascota</a:t>
+            </a:r>
+            <a:endParaRPr lang="es-EC" dirty="0"/>
+          </a:p>
+        </p:txBody>
+      </p:sp>
+      <p:graphicFrame>
+        <p:nvGraphicFramePr>
+          <p:cNvPr id="3" name="Chart 2">
+            <a:extLst>
+              <a:ext uri="{FF2B5EF4-FFF2-40B4-BE49-F238E27FC236}">
+                <a16:creationId xmlns:a16="http://schemas.microsoft.com/office/drawing/2014/main" id="{CCA8E225-8BC7-5BEE-20F1-38681CE5BF81}"/>
+              </a:ext>
+            </a:extLst>
+          </p:cNvPr>
+          <p:cNvGraphicFramePr>
+            <a:graphicFrameLocks/>
+          </p:cNvGraphicFramePr>
+          <p:nvPr>
+            <p:extLst>
+              <p:ext uri="{D42A27DB-BD31-4B8C-83A1-F6EECF244321}">
+                <p14:modId xmlns:p14="http://schemas.microsoft.com/office/powerpoint/2010/main" val="2554499425"/>
+              </p:ext>
+            </p:extLst>
+          </p:nvPr>
+        </p:nvGraphicFramePr>
+        <p:xfrm>
+          <a:off x="1589554" y="1049235"/>
+          <a:ext cx="9082032" cy="4652318"/>
+        </p:xfrm>
+        <a:graphic>
+          <a:graphicData uri="http://schemas.openxmlformats.org/drawingml/2006/chart">
+            <c:chart xmlns:c="http://schemas.openxmlformats.org/drawingml/2006/chart" xmlns:r="http://schemas.openxmlformats.org/officeDocument/2006/relationships" r:id="rId2"/>
+          </a:graphicData>
+        </a:graphic>
+      </p:graphicFrame>
+    </p:spTree>
+    <p:extLst>
+      <p:ext uri="{BB962C8B-B14F-4D97-AF65-F5344CB8AC3E}">
+        <p14:creationId xmlns:p14="http://schemas.microsoft.com/office/powerpoint/2010/main" val="51784365"/>
+      </p:ext>
+    </p:extLst>
+  </p:cSld>
+  <p:clrMapOvr>
+    <a:masterClrMapping/>
+  </p:clrMapOvr>
+</p:sld>
+</file>
+
 <file path=ppt/slides/slide2.xml><?xml version="1.0" encoding="utf-8"?>
 <p:sld xmlns:a="http://schemas.openxmlformats.org/drawingml/2006/main" xmlns:r="http://schemas.openxmlformats.org/officeDocument/2006/relationships" xmlns:p="http://schemas.openxmlformats.org/presentationml/2006/main">
   <p:cSld>

</xml_diff>

<commit_message>
average battery chart ready
</commit_message>
<xml_diff>
--- a/excel_reports/IPApresentacion.pptx
+++ b/excel_reports/IPApresentacion.pptx
@@ -5556,11 +5556,11 @@
     </mc:Fallback>
   </mc:AlternateContent>
   <c:pivotSource>
-    <c:name>[promedio_por_dispositivo.xlsx]Sheet1!PivotTable1</c:name>
-    <c:fmtId val="3"/>
+    <c:name>[promedio_bateria.xlsx]Sheet1!PivotTable1</c:name>
+    <c:fmtId val="6"/>
   </c:pivotSource>
   <c:chart>
-    <c:autoTitleDeleted val="0"/>
+    <c:autoTitleDeleted val="1"/>
     <c:pivotFmts>
       <c:pivotFmt>
         <c:idx val="0"/>
@@ -6124,1686 +6124,6 @@
       </c:pivotFmt>
       <c:pivotFmt>
         <c:idx val="10"/>
-        <c:spPr>
-          <a:solidFill>
-            <a:schemeClr val="accent1"/>
-          </a:solidFill>
-          <a:ln>
-            <a:noFill/>
-          </a:ln>
-          <a:effectLst/>
-        </c:spPr>
-        <c:marker>
-          <c:symbol val="none"/>
-        </c:marker>
-        <c:dLbl>
-          <c:idx val="0"/>
-          <c:spPr>
-            <a:noFill/>
-            <a:ln>
-              <a:noFill/>
-            </a:ln>
-            <a:effectLst/>
-          </c:spPr>
-          <c:txPr>
-            <a:bodyPr rot="0" spcFirstLastPara="1" vertOverflow="ellipsis" vert="horz" wrap="square" lIns="38100" tIns="19050" rIns="38100" bIns="19050" anchor="ctr" anchorCtr="1">
-              <a:spAutoFit/>
-            </a:bodyPr>
-            <a:lstStyle/>
-            <a:p>
-              <a:pPr>
-                <a:defRPr sz="900" b="0" i="0" u="none" strike="noStrike" kern="1200" baseline="0">
-                  <a:solidFill>
-                    <a:schemeClr val="tx1">
-                      <a:lumMod val="75000"/>
-                      <a:lumOff val="25000"/>
-                    </a:schemeClr>
-                  </a:solidFill>
-                  <a:latin typeface="+mn-lt"/>
-                  <a:ea typeface="+mn-ea"/>
-                  <a:cs typeface="+mn-cs"/>
-                </a:defRPr>
-              </a:pPr>
-              <a:endParaRPr lang="es-EC"/>
-            </a:p>
-          </c:txPr>
-          <c:showLegendKey val="0"/>
-          <c:showVal val="0"/>
-          <c:showCatName val="0"/>
-          <c:showSerName val="0"/>
-          <c:showPercent val="0"/>
-          <c:showBubbleSize val="0"/>
-          <c:extLst>
-            <c:ext xmlns:c15="http://schemas.microsoft.com/office/drawing/2012/chart" uri="{CE6537A1-D6FC-4f65-9D91-7224C49458BB}"/>
-          </c:extLst>
-        </c:dLbl>
-      </c:pivotFmt>
-      <c:pivotFmt>
-        <c:idx val="11"/>
-        <c:spPr>
-          <a:solidFill>
-            <a:schemeClr val="accent1"/>
-          </a:solidFill>
-          <a:ln>
-            <a:noFill/>
-          </a:ln>
-          <a:effectLst/>
-        </c:spPr>
-        <c:marker>
-          <c:symbol val="none"/>
-        </c:marker>
-        <c:dLbl>
-          <c:idx val="0"/>
-          <c:spPr>
-            <a:noFill/>
-            <a:ln>
-              <a:noFill/>
-            </a:ln>
-            <a:effectLst/>
-          </c:spPr>
-          <c:txPr>
-            <a:bodyPr rot="0" spcFirstLastPara="1" vertOverflow="ellipsis" vert="horz" wrap="square" lIns="38100" tIns="19050" rIns="38100" bIns="19050" anchor="ctr" anchorCtr="1">
-              <a:spAutoFit/>
-            </a:bodyPr>
-            <a:lstStyle/>
-            <a:p>
-              <a:pPr>
-                <a:defRPr sz="900" b="0" i="0" u="none" strike="noStrike" kern="1200" baseline="0">
-                  <a:solidFill>
-                    <a:schemeClr val="tx1">
-                      <a:lumMod val="75000"/>
-                      <a:lumOff val="25000"/>
-                    </a:schemeClr>
-                  </a:solidFill>
-                  <a:latin typeface="+mn-lt"/>
-                  <a:ea typeface="+mn-ea"/>
-                  <a:cs typeface="+mn-cs"/>
-                </a:defRPr>
-              </a:pPr>
-              <a:endParaRPr lang="es-EC"/>
-            </a:p>
-          </c:txPr>
-          <c:showLegendKey val="0"/>
-          <c:showVal val="0"/>
-          <c:showCatName val="0"/>
-          <c:showSerName val="0"/>
-          <c:showPercent val="0"/>
-          <c:showBubbleSize val="0"/>
-          <c:extLst>
-            <c:ext xmlns:c15="http://schemas.microsoft.com/office/drawing/2012/chart" uri="{CE6537A1-D6FC-4f65-9D91-7224C49458BB}"/>
-          </c:extLst>
-        </c:dLbl>
-      </c:pivotFmt>
-      <c:pivotFmt>
-        <c:idx val="12"/>
-        <c:spPr>
-          <a:solidFill>
-            <a:schemeClr val="accent1"/>
-          </a:solidFill>
-          <a:ln>
-            <a:noFill/>
-          </a:ln>
-          <a:effectLst/>
-        </c:spPr>
-        <c:marker>
-          <c:symbol val="none"/>
-        </c:marker>
-        <c:dLbl>
-          <c:idx val="0"/>
-          <c:spPr>
-            <a:noFill/>
-            <a:ln>
-              <a:noFill/>
-            </a:ln>
-            <a:effectLst/>
-          </c:spPr>
-          <c:txPr>
-            <a:bodyPr rot="0" spcFirstLastPara="1" vertOverflow="ellipsis" vert="horz" wrap="square" lIns="38100" tIns="19050" rIns="38100" bIns="19050" anchor="ctr" anchorCtr="1">
-              <a:spAutoFit/>
-            </a:bodyPr>
-            <a:lstStyle/>
-            <a:p>
-              <a:pPr>
-                <a:defRPr sz="900" b="0" i="0" u="none" strike="noStrike" kern="1200" baseline="0">
-                  <a:solidFill>
-                    <a:schemeClr val="tx1">
-                      <a:lumMod val="75000"/>
-                      <a:lumOff val="25000"/>
-                    </a:schemeClr>
-                  </a:solidFill>
-                  <a:latin typeface="+mn-lt"/>
-                  <a:ea typeface="+mn-ea"/>
-                  <a:cs typeface="+mn-cs"/>
-                </a:defRPr>
-              </a:pPr>
-              <a:endParaRPr lang="es-EC"/>
-            </a:p>
-          </c:txPr>
-          <c:showLegendKey val="0"/>
-          <c:showVal val="0"/>
-          <c:showCatName val="0"/>
-          <c:showSerName val="0"/>
-          <c:showPercent val="0"/>
-          <c:showBubbleSize val="0"/>
-          <c:extLst>
-            <c:ext xmlns:c15="http://schemas.microsoft.com/office/drawing/2012/chart" uri="{CE6537A1-D6FC-4f65-9D91-7224C49458BB}"/>
-          </c:extLst>
-        </c:dLbl>
-      </c:pivotFmt>
-      <c:pivotFmt>
-        <c:idx val="13"/>
-        <c:spPr>
-          <a:solidFill>
-            <a:schemeClr val="accent1"/>
-          </a:solidFill>
-          <a:ln>
-            <a:noFill/>
-          </a:ln>
-          <a:effectLst/>
-        </c:spPr>
-        <c:marker>
-          <c:symbol val="none"/>
-        </c:marker>
-        <c:dLbl>
-          <c:idx val="0"/>
-          <c:spPr>
-            <a:noFill/>
-            <a:ln>
-              <a:noFill/>
-            </a:ln>
-            <a:effectLst/>
-          </c:spPr>
-          <c:txPr>
-            <a:bodyPr rot="0" spcFirstLastPara="1" vertOverflow="ellipsis" vert="horz" wrap="square" lIns="38100" tIns="19050" rIns="38100" bIns="19050" anchor="ctr" anchorCtr="1">
-              <a:spAutoFit/>
-            </a:bodyPr>
-            <a:lstStyle/>
-            <a:p>
-              <a:pPr>
-                <a:defRPr sz="900" b="0" i="0" u="none" strike="noStrike" kern="1200" baseline="0">
-                  <a:solidFill>
-                    <a:schemeClr val="tx1">
-                      <a:lumMod val="75000"/>
-                      <a:lumOff val="25000"/>
-                    </a:schemeClr>
-                  </a:solidFill>
-                  <a:latin typeface="+mn-lt"/>
-                  <a:ea typeface="+mn-ea"/>
-                  <a:cs typeface="+mn-cs"/>
-                </a:defRPr>
-              </a:pPr>
-              <a:endParaRPr lang="es-EC"/>
-            </a:p>
-          </c:txPr>
-          <c:showLegendKey val="0"/>
-          <c:showVal val="0"/>
-          <c:showCatName val="0"/>
-          <c:showSerName val="0"/>
-          <c:showPercent val="0"/>
-          <c:showBubbleSize val="0"/>
-          <c:extLst>
-            <c:ext xmlns:c15="http://schemas.microsoft.com/office/drawing/2012/chart" uri="{CE6537A1-D6FC-4f65-9D91-7224C49458BB}"/>
-          </c:extLst>
-        </c:dLbl>
-      </c:pivotFmt>
-      <c:pivotFmt>
-        <c:idx val="14"/>
-        <c:spPr>
-          <a:solidFill>
-            <a:schemeClr val="accent1"/>
-          </a:solidFill>
-          <a:ln>
-            <a:noFill/>
-          </a:ln>
-          <a:effectLst/>
-        </c:spPr>
-        <c:marker>
-          <c:symbol val="none"/>
-        </c:marker>
-        <c:dLbl>
-          <c:idx val="0"/>
-          <c:spPr>
-            <a:noFill/>
-            <a:ln>
-              <a:noFill/>
-            </a:ln>
-            <a:effectLst/>
-          </c:spPr>
-          <c:txPr>
-            <a:bodyPr rot="0" spcFirstLastPara="1" vertOverflow="ellipsis" vert="horz" wrap="square" lIns="38100" tIns="19050" rIns="38100" bIns="19050" anchor="ctr" anchorCtr="1">
-              <a:spAutoFit/>
-            </a:bodyPr>
-            <a:lstStyle/>
-            <a:p>
-              <a:pPr>
-                <a:defRPr sz="900" b="0" i="0" u="none" strike="noStrike" kern="1200" baseline="0">
-                  <a:solidFill>
-                    <a:schemeClr val="tx1">
-                      <a:lumMod val="75000"/>
-                      <a:lumOff val="25000"/>
-                    </a:schemeClr>
-                  </a:solidFill>
-                  <a:latin typeface="+mn-lt"/>
-                  <a:ea typeface="+mn-ea"/>
-                  <a:cs typeface="+mn-cs"/>
-                </a:defRPr>
-              </a:pPr>
-              <a:endParaRPr lang="es-EC"/>
-            </a:p>
-          </c:txPr>
-          <c:showLegendKey val="0"/>
-          <c:showVal val="0"/>
-          <c:showCatName val="0"/>
-          <c:showSerName val="0"/>
-          <c:showPercent val="0"/>
-          <c:showBubbleSize val="0"/>
-          <c:extLst>
-            <c:ext xmlns:c15="http://schemas.microsoft.com/office/drawing/2012/chart" uri="{CE6537A1-D6FC-4f65-9D91-7224C49458BB}"/>
-          </c:extLst>
-        </c:dLbl>
-      </c:pivotFmt>
-      <c:pivotFmt>
-        <c:idx val="15"/>
-        <c:spPr>
-          <a:solidFill>
-            <a:schemeClr val="accent1"/>
-          </a:solidFill>
-          <a:ln>
-            <a:noFill/>
-          </a:ln>
-          <a:effectLst/>
-        </c:spPr>
-        <c:marker>
-          <c:symbol val="none"/>
-        </c:marker>
-        <c:dLbl>
-          <c:idx val="0"/>
-          <c:spPr>
-            <a:noFill/>
-            <a:ln>
-              <a:noFill/>
-            </a:ln>
-            <a:effectLst/>
-          </c:spPr>
-          <c:txPr>
-            <a:bodyPr rot="0" spcFirstLastPara="1" vertOverflow="ellipsis" vert="horz" wrap="square" lIns="38100" tIns="19050" rIns="38100" bIns="19050" anchor="ctr" anchorCtr="1">
-              <a:spAutoFit/>
-            </a:bodyPr>
-            <a:lstStyle/>
-            <a:p>
-              <a:pPr>
-                <a:defRPr sz="900" b="0" i="0" u="none" strike="noStrike" kern="1200" baseline="0">
-                  <a:solidFill>
-                    <a:schemeClr val="tx1">
-                      <a:lumMod val="75000"/>
-                      <a:lumOff val="25000"/>
-                    </a:schemeClr>
-                  </a:solidFill>
-                  <a:latin typeface="+mn-lt"/>
-                  <a:ea typeface="+mn-ea"/>
-                  <a:cs typeface="+mn-cs"/>
-                </a:defRPr>
-              </a:pPr>
-              <a:endParaRPr lang="es-EC"/>
-            </a:p>
-          </c:txPr>
-          <c:showLegendKey val="0"/>
-          <c:showVal val="0"/>
-          <c:showCatName val="0"/>
-          <c:showSerName val="0"/>
-          <c:showPercent val="0"/>
-          <c:showBubbleSize val="0"/>
-          <c:extLst>
-            <c:ext xmlns:c15="http://schemas.microsoft.com/office/drawing/2012/chart" uri="{CE6537A1-D6FC-4f65-9D91-7224C49458BB}"/>
-          </c:extLst>
-        </c:dLbl>
-      </c:pivotFmt>
-      <c:pivotFmt>
-        <c:idx val="16"/>
-        <c:spPr>
-          <a:solidFill>
-            <a:schemeClr val="accent1"/>
-          </a:solidFill>
-          <a:ln>
-            <a:noFill/>
-          </a:ln>
-          <a:effectLst/>
-        </c:spPr>
-        <c:marker>
-          <c:symbol val="none"/>
-        </c:marker>
-        <c:dLbl>
-          <c:idx val="0"/>
-          <c:spPr>
-            <a:noFill/>
-            <a:ln>
-              <a:noFill/>
-            </a:ln>
-            <a:effectLst/>
-          </c:spPr>
-          <c:txPr>
-            <a:bodyPr rot="0" spcFirstLastPara="1" vertOverflow="ellipsis" vert="horz" wrap="square" lIns="38100" tIns="19050" rIns="38100" bIns="19050" anchor="ctr" anchorCtr="1">
-              <a:spAutoFit/>
-            </a:bodyPr>
-            <a:lstStyle/>
-            <a:p>
-              <a:pPr>
-                <a:defRPr sz="900" b="0" i="0" u="none" strike="noStrike" kern="1200" baseline="0">
-                  <a:solidFill>
-                    <a:schemeClr val="tx1">
-                      <a:lumMod val="75000"/>
-                      <a:lumOff val="25000"/>
-                    </a:schemeClr>
-                  </a:solidFill>
-                  <a:latin typeface="+mn-lt"/>
-                  <a:ea typeface="+mn-ea"/>
-                  <a:cs typeface="+mn-cs"/>
-                </a:defRPr>
-              </a:pPr>
-              <a:endParaRPr lang="es-EC"/>
-            </a:p>
-          </c:txPr>
-          <c:showLegendKey val="0"/>
-          <c:showVal val="0"/>
-          <c:showCatName val="0"/>
-          <c:showSerName val="0"/>
-          <c:showPercent val="0"/>
-          <c:showBubbleSize val="0"/>
-          <c:extLst>
-            <c:ext xmlns:c15="http://schemas.microsoft.com/office/drawing/2012/chart" uri="{CE6537A1-D6FC-4f65-9D91-7224C49458BB}"/>
-          </c:extLst>
-        </c:dLbl>
-      </c:pivotFmt>
-      <c:pivotFmt>
-        <c:idx val="17"/>
-        <c:spPr>
-          <a:solidFill>
-            <a:schemeClr val="accent1"/>
-          </a:solidFill>
-          <a:ln>
-            <a:noFill/>
-          </a:ln>
-          <a:effectLst/>
-        </c:spPr>
-        <c:marker>
-          <c:symbol val="none"/>
-        </c:marker>
-        <c:dLbl>
-          <c:idx val="0"/>
-          <c:spPr>
-            <a:noFill/>
-            <a:ln>
-              <a:noFill/>
-            </a:ln>
-            <a:effectLst/>
-          </c:spPr>
-          <c:txPr>
-            <a:bodyPr rot="0" spcFirstLastPara="1" vertOverflow="ellipsis" vert="horz" wrap="square" lIns="38100" tIns="19050" rIns="38100" bIns="19050" anchor="ctr" anchorCtr="1">
-              <a:spAutoFit/>
-            </a:bodyPr>
-            <a:lstStyle/>
-            <a:p>
-              <a:pPr>
-                <a:defRPr sz="900" b="0" i="0" u="none" strike="noStrike" kern="1200" baseline="0">
-                  <a:solidFill>
-                    <a:schemeClr val="tx1">
-                      <a:lumMod val="75000"/>
-                      <a:lumOff val="25000"/>
-                    </a:schemeClr>
-                  </a:solidFill>
-                  <a:latin typeface="+mn-lt"/>
-                  <a:ea typeface="+mn-ea"/>
-                  <a:cs typeface="+mn-cs"/>
-                </a:defRPr>
-              </a:pPr>
-              <a:endParaRPr lang="es-EC"/>
-            </a:p>
-          </c:txPr>
-          <c:showLegendKey val="0"/>
-          <c:showVal val="0"/>
-          <c:showCatName val="0"/>
-          <c:showSerName val="0"/>
-          <c:showPercent val="0"/>
-          <c:showBubbleSize val="0"/>
-          <c:extLst>
-            <c:ext xmlns:c15="http://schemas.microsoft.com/office/drawing/2012/chart" uri="{CE6537A1-D6FC-4f65-9D91-7224C49458BB}"/>
-          </c:extLst>
-        </c:dLbl>
-      </c:pivotFmt>
-      <c:pivotFmt>
-        <c:idx val="18"/>
-        <c:spPr>
-          <a:solidFill>
-            <a:schemeClr val="accent1"/>
-          </a:solidFill>
-          <a:ln>
-            <a:noFill/>
-          </a:ln>
-          <a:effectLst/>
-        </c:spPr>
-        <c:marker>
-          <c:symbol val="none"/>
-        </c:marker>
-        <c:dLbl>
-          <c:idx val="0"/>
-          <c:spPr>
-            <a:noFill/>
-            <a:ln>
-              <a:noFill/>
-            </a:ln>
-            <a:effectLst/>
-          </c:spPr>
-          <c:txPr>
-            <a:bodyPr rot="0" spcFirstLastPara="1" vertOverflow="ellipsis" vert="horz" wrap="square" lIns="38100" tIns="19050" rIns="38100" bIns="19050" anchor="ctr" anchorCtr="1">
-              <a:spAutoFit/>
-            </a:bodyPr>
-            <a:lstStyle/>
-            <a:p>
-              <a:pPr>
-                <a:defRPr sz="900" b="0" i="0" u="none" strike="noStrike" kern="1200" baseline="0">
-                  <a:solidFill>
-                    <a:schemeClr val="tx1">
-                      <a:lumMod val="75000"/>
-                      <a:lumOff val="25000"/>
-                    </a:schemeClr>
-                  </a:solidFill>
-                  <a:latin typeface="+mn-lt"/>
-                  <a:ea typeface="+mn-ea"/>
-                  <a:cs typeface="+mn-cs"/>
-                </a:defRPr>
-              </a:pPr>
-              <a:endParaRPr lang="es-EC"/>
-            </a:p>
-          </c:txPr>
-          <c:showLegendKey val="0"/>
-          <c:showVal val="0"/>
-          <c:showCatName val="0"/>
-          <c:showSerName val="0"/>
-          <c:showPercent val="0"/>
-          <c:showBubbleSize val="0"/>
-          <c:extLst>
-            <c:ext xmlns:c15="http://schemas.microsoft.com/office/drawing/2012/chart" uri="{CE6537A1-D6FC-4f65-9D91-7224C49458BB}"/>
-          </c:extLst>
-        </c:dLbl>
-      </c:pivotFmt>
-      <c:pivotFmt>
-        <c:idx val="19"/>
-        <c:spPr>
-          <a:solidFill>
-            <a:schemeClr val="accent1"/>
-          </a:solidFill>
-          <a:ln>
-            <a:noFill/>
-          </a:ln>
-          <a:effectLst/>
-        </c:spPr>
-        <c:marker>
-          <c:symbol val="none"/>
-        </c:marker>
-        <c:dLbl>
-          <c:idx val="0"/>
-          <c:spPr>
-            <a:noFill/>
-            <a:ln>
-              <a:noFill/>
-            </a:ln>
-            <a:effectLst/>
-          </c:spPr>
-          <c:txPr>
-            <a:bodyPr rot="0" spcFirstLastPara="1" vertOverflow="ellipsis" vert="horz" wrap="square" lIns="38100" tIns="19050" rIns="38100" bIns="19050" anchor="ctr" anchorCtr="1">
-              <a:spAutoFit/>
-            </a:bodyPr>
-            <a:lstStyle/>
-            <a:p>
-              <a:pPr>
-                <a:defRPr sz="900" b="0" i="0" u="none" strike="noStrike" kern="1200" baseline="0">
-                  <a:solidFill>
-                    <a:schemeClr val="tx1">
-                      <a:lumMod val="75000"/>
-                      <a:lumOff val="25000"/>
-                    </a:schemeClr>
-                  </a:solidFill>
-                  <a:latin typeface="+mn-lt"/>
-                  <a:ea typeface="+mn-ea"/>
-                  <a:cs typeface="+mn-cs"/>
-                </a:defRPr>
-              </a:pPr>
-              <a:endParaRPr lang="es-EC"/>
-            </a:p>
-          </c:txPr>
-          <c:showLegendKey val="0"/>
-          <c:showVal val="0"/>
-          <c:showCatName val="0"/>
-          <c:showSerName val="0"/>
-          <c:showPercent val="0"/>
-          <c:showBubbleSize val="0"/>
-          <c:extLst>
-            <c:ext xmlns:c15="http://schemas.microsoft.com/office/drawing/2012/chart" uri="{CE6537A1-D6FC-4f65-9D91-7224C49458BB}"/>
-          </c:extLst>
-        </c:dLbl>
-      </c:pivotFmt>
-      <c:pivotFmt>
-        <c:idx val="20"/>
-        <c:spPr>
-          <a:solidFill>
-            <a:schemeClr val="accent1"/>
-          </a:solidFill>
-          <a:ln>
-            <a:noFill/>
-          </a:ln>
-          <a:effectLst/>
-        </c:spPr>
-        <c:marker>
-          <c:symbol val="none"/>
-        </c:marker>
-        <c:dLbl>
-          <c:idx val="0"/>
-          <c:spPr>
-            <a:noFill/>
-            <a:ln>
-              <a:noFill/>
-            </a:ln>
-            <a:effectLst/>
-          </c:spPr>
-          <c:txPr>
-            <a:bodyPr rot="0" spcFirstLastPara="1" vertOverflow="ellipsis" vert="horz" wrap="square" lIns="38100" tIns="19050" rIns="38100" bIns="19050" anchor="ctr" anchorCtr="1">
-              <a:spAutoFit/>
-            </a:bodyPr>
-            <a:lstStyle/>
-            <a:p>
-              <a:pPr>
-                <a:defRPr sz="900" b="0" i="0" u="none" strike="noStrike" kern="1200" baseline="0">
-                  <a:solidFill>
-                    <a:schemeClr val="tx1">
-                      <a:lumMod val="75000"/>
-                      <a:lumOff val="25000"/>
-                    </a:schemeClr>
-                  </a:solidFill>
-                  <a:latin typeface="+mn-lt"/>
-                  <a:ea typeface="+mn-ea"/>
-                  <a:cs typeface="+mn-cs"/>
-                </a:defRPr>
-              </a:pPr>
-              <a:endParaRPr lang="es-EC"/>
-            </a:p>
-          </c:txPr>
-          <c:showLegendKey val="0"/>
-          <c:showVal val="0"/>
-          <c:showCatName val="0"/>
-          <c:showSerName val="0"/>
-          <c:showPercent val="0"/>
-          <c:showBubbleSize val="0"/>
-          <c:extLst>
-            <c:ext xmlns:c15="http://schemas.microsoft.com/office/drawing/2012/chart" uri="{CE6537A1-D6FC-4f65-9D91-7224C49458BB}"/>
-          </c:extLst>
-        </c:dLbl>
-      </c:pivotFmt>
-      <c:pivotFmt>
-        <c:idx val="21"/>
-        <c:spPr>
-          <a:solidFill>
-            <a:schemeClr val="accent1"/>
-          </a:solidFill>
-          <a:ln>
-            <a:noFill/>
-          </a:ln>
-          <a:effectLst/>
-        </c:spPr>
-        <c:marker>
-          <c:symbol val="none"/>
-        </c:marker>
-        <c:dLbl>
-          <c:idx val="0"/>
-          <c:spPr>
-            <a:noFill/>
-            <a:ln>
-              <a:noFill/>
-            </a:ln>
-            <a:effectLst/>
-          </c:spPr>
-          <c:txPr>
-            <a:bodyPr rot="0" spcFirstLastPara="1" vertOverflow="ellipsis" vert="horz" wrap="square" lIns="38100" tIns="19050" rIns="38100" bIns="19050" anchor="ctr" anchorCtr="1">
-              <a:spAutoFit/>
-            </a:bodyPr>
-            <a:lstStyle/>
-            <a:p>
-              <a:pPr>
-                <a:defRPr sz="900" b="0" i="0" u="none" strike="noStrike" kern="1200" baseline="0">
-                  <a:solidFill>
-                    <a:schemeClr val="tx1">
-                      <a:lumMod val="75000"/>
-                      <a:lumOff val="25000"/>
-                    </a:schemeClr>
-                  </a:solidFill>
-                  <a:latin typeface="+mn-lt"/>
-                  <a:ea typeface="+mn-ea"/>
-                  <a:cs typeface="+mn-cs"/>
-                </a:defRPr>
-              </a:pPr>
-              <a:endParaRPr lang="es-EC"/>
-            </a:p>
-          </c:txPr>
-          <c:showLegendKey val="0"/>
-          <c:showVal val="0"/>
-          <c:showCatName val="0"/>
-          <c:showSerName val="0"/>
-          <c:showPercent val="0"/>
-          <c:showBubbleSize val="0"/>
-          <c:extLst>
-            <c:ext xmlns:c15="http://schemas.microsoft.com/office/drawing/2012/chart" uri="{CE6537A1-D6FC-4f65-9D91-7224C49458BB}"/>
-          </c:extLst>
-        </c:dLbl>
-      </c:pivotFmt>
-      <c:pivotFmt>
-        <c:idx val="22"/>
-        <c:spPr>
-          <a:solidFill>
-            <a:schemeClr val="accent1"/>
-          </a:solidFill>
-          <a:ln>
-            <a:noFill/>
-          </a:ln>
-          <a:effectLst/>
-        </c:spPr>
-        <c:marker>
-          <c:symbol val="none"/>
-        </c:marker>
-        <c:dLbl>
-          <c:idx val="0"/>
-          <c:spPr>
-            <a:noFill/>
-            <a:ln>
-              <a:noFill/>
-            </a:ln>
-            <a:effectLst/>
-          </c:spPr>
-          <c:txPr>
-            <a:bodyPr rot="0" spcFirstLastPara="1" vertOverflow="ellipsis" vert="horz" wrap="square" lIns="38100" tIns="19050" rIns="38100" bIns="19050" anchor="ctr" anchorCtr="1">
-              <a:spAutoFit/>
-            </a:bodyPr>
-            <a:lstStyle/>
-            <a:p>
-              <a:pPr>
-                <a:defRPr sz="900" b="0" i="0" u="none" strike="noStrike" kern="1200" baseline="0">
-                  <a:solidFill>
-                    <a:schemeClr val="tx1">
-                      <a:lumMod val="75000"/>
-                      <a:lumOff val="25000"/>
-                    </a:schemeClr>
-                  </a:solidFill>
-                  <a:latin typeface="+mn-lt"/>
-                  <a:ea typeface="+mn-ea"/>
-                  <a:cs typeface="+mn-cs"/>
-                </a:defRPr>
-              </a:pPr>
-              <a:endParaRPr lang="es-EC"/>
-            </a:p>
-          </c:txPr>
-          <c:showLegendKey val="0"/>
-          <c:showVal val="0"/>
-          <c:showCatName val="0"/>
-          <c:showSerName val="0"/>
-          <c:showPercent val="0"/>
-          <c:showBubbleSize val="0"/>
-          <c:extLst>
-            <c:ext xmlns:c15="http://schemas.microsoft.com/office/drawing/2012/chart" uri="{CE6537A1-D6FC-4f65-9D91-7224C49458BB}"/>
-          </c:extLst>
-        </c:dLbl>
-      </c:pivotFmt>
-      <c:pivotFmt>
-        <c:idx val="23"/>
-        <c:spPr>
-          <a:solidFill>
-            <a:schemeClr val="accent1"/>
-          </a:solidFill>
-          <a:ln>
-            <a:noFill/>
-          </a:ln>
-          <a:effectLst/>
-        </c:spPr>
-        <c:marker>
-          <c:symbol val="none"/>
-        </c:marker>
-        <c:dLbl>
-          <c:idx val="0"/>
-          <c:spPr>
-            <a:noFill/>
-            <a:ln>
-              <a:noFill/>
-            </a:ln>
-            <a:effectLst/>
-          </c:spPr>
-          <c:txPr>
-            <a:bodyPr rot="0" spcFirstLastPara="1" vertOverflow="ellipsis" vert="horz" wrap="square" lIns="38100" tIns="19050" rIns="38100" bIns="19050" anchor="ctr" anchorCtr="1">
-              <a:spAutoFit/>
-            </a:bodyPr>
-            <a:lstStyle/>
-            <a:p>
-              <a:pPr>
-                <a:defRPr sz="900" b="0" i="0" u="none" strike="noStrike" kern="1200" baseline="0">
-                  <a:solidFill>
-                    <a:schemeClr val="tx1">
-                      <a:lumMod val="75000"/>
-                      <a:lumOff val="25000"/>
-                    </a:schemeClr>
-                  </a:solidFill>
-                  <a:latin typeface="+mn-lt"/>
-                  <a:ea typeface="+mn-ea"/>
-                  <a:cs typeface="+mn-cs"/>
-                </a:defRPr>
-              </a:pPr>
-              <a:endParaRPr lang="es-EC"/>
-            </a:p>
-          </c:txPr>
-          <c:showLegendKey val="0"/>
-          <c:showVal val="0"/>
-          <c:showCatName val="0"/>
-          <c:showSerName val="0"/>
-          <c:showPercent val="0"/>
-          <c:showBubbleSize val="0"/>
-          <c:extLst>
-            <c:ext xmlns:c15="http://schemas.microsoft.com/office/drawing/2012/chart" uri="{CE6537A1-D6FC-4f65-9D91-7224C49458BB}"/>
-          </c:extLst>
-        </c:dLbl>
-      </c:pivotFmt>
-      <c:pivotFmt>
-        <c:idx val="24"/>
-        <c:spPr>
-          <a:solidFill>
-            <a:schemeClr val="accent1"/>
-          </a:solidFill>
-          <a:ln>
-            <a:noFill/>
-          </a:ln>
-          <a:effectLst/>
-        </c:spPr>
-        <c:marker>
-          <c:symbol val="none"/>
-        </c:marker>
-        <c:dLbl>
-          <c:idx val="0"/>
-          <c:spPr>
-            <a:noFill/>
-            <a:ln>
-              <a:noFill/>
-            </a:ln>
-            <a:effectLst/>
-          </c:spPr>
-          <c:txPr>
-            <a:bodyPr rot="0" spcFirstLastPara="1" vertOverflow="ellipsis" vert="horz" wrap="square" lIns="38100" tIns="19050" rIns="38100" bIns="19050" anchor="ctr" anchorCtr="1">
-              <a:spAutoFit/>
-            </a:bodyPr>
-            <a:lstStyle/>
-            <a:p>
-              <a:pPr>
-                <a:defRPr sz="900" b="0" i="0" u="none" strike="noStrike" kern="1200" baseline="0">
-                  <a:solidFill>
-                    <a:schemeClr val="tx1">
-                      <a:lumMod val="75000"/>
-                      <a:lumOff val="25000"/>
-                    </a:schemeClr>
-                  </a:solidFill>
-                  <a:latin typeface="+mn-lt"/>
-                  <a:ea typeface="+mn-ea"/>
-                  <a:cs typeface="+mn-cs"/>
-                </a:defRPr>
-              </a:pPr>
-              <a:endParaRPr lang="es-EC"/>
-            </a:p>
-          </c:txPr>
-          <c:showLegendKey val="0"/>
-          <c:showVal val="0"/>
-          <c:showCatName val="0"/>
-          <c:showSerName val="0"/>
-          <c:showPercent val="0"/>
-          <c:showBubbleSize val="0"/>
-          <c:extLst>
-            <c:ext xmlns:c15="http://schemas.microsoft.com/office/drawing/2012/chart" uri="{CE6537A1-D6FC-4f65-9D91-7224C49458BB}"/>
-          </c:extLst>
-        </c:dLbl>
-      </c:pivotFmt>
-      <c:pivotFmt>
-        <c:idx val="25"/>
-        <c:spPr>
-          <a:solidFill>
-            <a:schemeClr val="accent1"/>
-          </a:solidFill>
-          <a:ln>
-            <a:noFill/>
-          </a:ln>
-          <a:effectLst/>
-        </c:spPr>
-        <c:marker>
-          <c:symbol val="none"/>
-        </c:marker>
-        <c:dLbl>
-          <c:idx val="0"/>
-          <c:spPr>
-            <a:noFill/>
-            <a:ln>
-              <a:noFill/>
-            </a:ln>
-            <a:effectLst/>
-          </c:spPr>
-          <c:txPr>
-            <a:bodyPr rot="0" spcFirstLastPara="1" vertOverflow="ellipsis" vert="horz" wrap="square" lIns="38100" tIns="19050" rIns="38100" bIns="19050" anchor="ctr" anchorCtr="1">
-              <a:spAutoFit/>
-            </a:bodyPr>
-            <a:lstStyle/>
-            <a:p>
-              <a:pPr>
-                <a:defRPr sz="900" b="0" i="0" u="none" strike="noStrike" kern="1200" baseline="0">
-                  <a:solidFill>
-                    <a:schemeClr val="tx1">
-                      <a:lumMod val="75000"/>
-                      <a:lumOff val="25000"/>
-                    </a:schemeClr>
-                  </a:solidFill>
-                  <a:latin typeface="+mn-lt"/>
-                  <a:ea typeface="+mn-ea"/>
-                  <a:cs typeface="+mn-cs"/>
-                </a:defRPr>
-              </a:pPr>
-              <a:endParaRPr lang="es-EC"/>
-            </a:p>
-          </c:txPr>
-          <c:showLegendKey val="0"/>
-          <c:showVal val="0"/>
-          <c:showCatName val="0"/>
-          <c:showSerName val="0"/>
-          <c:showPercent val="0"/>
-          <c:showBubbleSize val="0"/>
-          <c:extLst>
-            <c:ext xmlns:c15="http://schemas.microsoft.com/office/drawing/2012/chart" uri="{CE6537A1-D6FC-4f65-9D91-7224C49458BB}"/>
-          </c:extLst>
-        </c:dLbl>
-      </c:pivotFmt>
-      <c:pivotFmt>
-        <c:idx val="26"/>
-        <c:spPr>
-          <a:solidFill>
-            <a:schemeClr val="accent1"/>
-          </a:solidFill>
-          <a:ln>
-            <a:noFill/>
-          </a:ln>
-          <a:effectLst/>
-        </c:spPr>
-        <c:marker>
-          <c:symbol val="none"/>
-        </c:marker>
-        <c:dLbl>
-          <c:idx val="0"/>
-          <c:spPr>
-            <a:noFill/>
-            <a:ln>
-              <a:noFill/>
-            </a:ln>
-            <a:effectLst/>
-          </c:spPr>
-          <c:txPr>
-            <a:bodyPr rot="0" spcFirstLastPara="1" vertOverflow="ellipsis" vert="horz" wrap="square" lIns="38100" tIns="19050" rIns="38100" bIns="19050" anchor="ctr" anchorCtr="1">
-              <a:spAutoFit/>
-            </a:bodyPr>
-            <a:lstStyle/>
-            <a:p>
-              <a:pPr>
-                <a:defRPr sz="900" b="0" i="0" u="none" strike="noStrike" kern="1200" baseline="0">
-                  <a:solidFill>
-                    <a:schemeClr val="tx1">
-                      <a:lumMod val="75000"/>
-                      <a:lumOff val="25000"/>
-                    </a:schemeClr>
-                  </a:solidFill>
-                  <a:latin typeface="+mn-lt"/>
-                  <a:ea typeface="+mn-ea"/>
-                  <a:cs typeface="+mn-cs"/>
-                </a:defRPr>
-              </a:pPr>
-              <a:endParaRPr lang="es-EC"/>
-            </a:p>
-          </c:txPr>
-          <c:showLegendKey val="0"/>
-          <c:showVal val="0"/>
-          <c:showCatName val="0"/>
-          <c:showSerName val="0"/>
-          <c:showPercent val="0"/>
-          <c:showBubbleSize val="0"/>
-          <c:extLst>
-            <c:ext xmlns:c15="http://schemas.microsoft.com/office/drawing/2012/chart" uri="{CE6537A1-D6FC-4f65-9D91-7224C49458BB}"/>
-          </c:extLst>
-        </c:dLbl>
-      </c:pivotFmt>
-      <c:pivotFmt>
-        <c:idx val="27"/>
-        <c:spPr>
-          <a:solidFill>
-            <a:schemeClr val="accent1"/>
-          </a:solidFill>
-          <a:ln>
-            <a:noFill/>
-          </a:ln>
-          <a:effectLst/>
-        </c:spPr>
-        <c:marker>
-          <c:symbol val="none"/>
-        </c:marker>
-        <c:dLbl>
-          <c:idx val="0"/>
-          <c:spPr>
-            <a:noFill/>
-            <a:ln>
-              <a:noFill/>
-            </a:ln>
-            <a:effectLst/>
-          </c:spPr>
-          <c:txPr>
-            <a:bodyPr rot="0" spcFirstLastPara="1" vertOverflow="ellipsis" vert="horz" wrap="square" lIns="38100" tIns="19050" rIns="38100" bIns="19050" anchor="ctr" anchorCtr="1">
-              <a:spAutoFit/>
-            </a:bodyPr>
-            <a:lstStyle/>
-            <a:p>
-              <a:pPr>
-                <a:defRPr sz="900" b="0" i="0" u="none" strike="noStrike" kern="1200" baseline="0">
-                  <a:solidFill>
-                    <a:schemeClr val="tx1">
-                      <a:lumMod val="75000"/>
-                      <a:lumOff val="25000"/>
-                    </a:schemeClr>
-                  </a:solidFill>
-                  <a:latin typeface="+mn-lt"/>
-                  <a:ea typeface="+mn-ea"/>
-                  <a:cs typeface="+mn-cs"/>
-                </a:defRPr>
-              </a:pPr>
-              <a:endParaRPr lang="es-EC"/>
-            </a:p>
-          </c:txPr>
-          <c:showLegendKey val="0"/>
-          <c:showVal val="0"/>
-          <c:showCatName val="0"/>
-          <c:showSerName val="0"/>
-          <c:showPercent val="0"/>
-          <c:showBubbleSize val="0"/>
-          <c:extLst>
-            <c:ext xmlns:c15="http://schemas.microsoft.com/office/drawing/2012/chart" uri="{CE6537A1-D6FC-4f65-9D91-7224C49458BB}"/>
-          </c:extLst>
-        </c:dLbl>
-      </c:pivotFmt>
-      <c:pivotFmt>
-        <c:idx val="28"/>
-        <c:spPr>
-          <a:solidFill>
-            <a:schemeClr val="accent1"/>
-          </a:solidFill>
-          <a:ln>
-            <a:noFill/>
-          </a:ln>
-          <a:effectLst/>
-        </c:spPr>
-        <c:marker>
-          <c:symbol val="none"/>
-        </c:marker>
-        <c:dLbl>
-          <c:idx val="0"/>
-          <c:spPr>
-            <a:noFill/>
-            <a:ln>
-              <a:noFill/>
-            </a:ln>
-            <a:effectLst/>
-          </c:spPr>
-          <c:txPr>
-            <a:bodyPr rot="0" spcFirstLastPara="1" vertOverflow="ellipsis" vert="horz" wrap="square" lIns="38100" tIns="19050" rIns="38100" bIns="19050" anchor="ctr" anchorCtr="1">
-              <a:spAutoFit/>
-            </a:bodyPr>
-            <a:lstStyle/>
-            <a:p>
-              <a:pPr>
-                <a:defRPr sz="900" b="0" i="0" u="none" strike="noStrike" kern="1200" baseline="0">
-                  <a:solidFill>
-                    <a:schemeClr val="tx1">
-                      <a:lumMod val="75000"/>
-                      <a:lumOff val="25000"/>
-                    </a:schemeClr>
-                  </a:solidFill>
-                  <a:latin typeface="+mn-lt"/>
-                  <a:ea typeface="+mn-ea"/>
-                  <a:cs typeface="+mn-cs"/>
-                </a:defRPr>
-              </a:pPr>
-              <a:endParaRPr lang="es-EC"/>
-            </a:p>
-          </c:txPr>
-          <c:showLegendKey val="0"/>
-          <c:showVal val="0"/>
-          <c:showCatName val="0"/>
-          <c:showSerName val="0"/>
-          <c:showPercent val="0"/>
-          <c:showBubbleSize val="0"/>
-          <c:extLst>
-            <c:ext xmlns:c15="http://schemas.microsoft.com/office/drawing/2012/chart" uri="{CE6537A1-D6FC-4f65-9D91-7224C49458BB}"/>
-          </c:extLst>
-        </c:dLbl>
-      </c:pivotFmt>
-      <c:pivotFmt>
-        <c:idx val="29"/>
-        <c:spPr>
-          <a:solidFill>
-            <a:schemeClr val="accent1"/>
-          </a:solidFill>
-          <a:ln>
-            <a:noFill/>
-          </a:ln>
-          <a:effectLst/>
-        </c:spPr>
-        <c:marker>
-          <c:symbol val="none"/>
-        </c:marker>
-        <c:dLbl>
-          <c:idx val="0"/>
-          <c:spPr>
-            <a:noFill/>
-            <a:ln>
-              <a:noFill/>
-            </a:ln>
-            <a:effectLst/>
-          </c:spPr>
-          <c:txPr>
-            <a:bodyPr rot="0" spcFirstLastPara="1" vertOverflow="ellipsis" vert="horz" wrap="square" lIns="38100" tIns="19050" rIns="38100" bIns="19050" anchor="ctr" anchorCtr="1">
-              <a:spAutoFit/>
-            </a:bodyPr>
-            <a:lstStyle/>
-            <a:p>
-              <a:pPr>
-                <a:defRPr sz="900" b="0" i="0" u="none" strike="noStrike" kern="1200" baseline="0">
-                  <a:solidFill>
-                    <a:schemeClr val="tx1">
-                      <a:lumMod val="75000"/>
-                      <a:lumOff val="25000"/>
-                    </a:schemeClr>
-                  </a:solidFill>
-                  <a:latin typeface="+mn-lt"/>
-                  <a:ea typeface="+mn-ea"/>
-                  <a:cs typeface="+mn-cs"/>
-                </a:defRPr>
-              </a:pPr>
-              <a:endParaRPr lang="es-EC"/>
-            </a:p>
-          </c:txPr>
-          <c:showLegendKey val="0"/>
-          <c:showVal val="0"/>
-          <c:showCatName val="0"/>
-          <c:showSerName val="0"/>
-          <c:showPercent val="0"/>
-          <c:showBubbleSize val="0"/>
-          <c:extLst>
-            <c:ext xmlns:c15="http://schemas.microsoft.com/office/drawing/2012/chart" uri="{CE6537A1-D6FC-4f65-9D91-7224C49458BB}"/>
-          </c:extLst>
-        </c:dLbl>
-      </c:pivotFmt>
-      <c:pivotFmt>
-        <c:idx val="30"/>
-        <c:spPr>
-          <a:solidFill>
-            <a:schemeClr val="accent1"/>
-          </a:solidFill>
-          <a:ln>
-            <a:noFill/>
-          </a:ln>
-          <a:effectLst/>
-        </c:spPr>
-        <c:marker>
-          <c:symbol val="none"/>
-        </c:marker>
-        <c:dLbl>
-          <c:idx val="0"/>
-          <c:spPr>
-            <a:noFill/>
-            <a:ln>
-              <a:noFill/>
-            </a:ln>
-            <a:effectLst/>
-          </c:spPr>
-          <c:txPr>
-            <a:bodyPr rot="0" spcFirstLastPara="1" vertOverflow="ellipsis" vert="horz" wrap="square" lIns="38100" tIns="19050" rIns="38100" bIns="19050" anchor="ctr" anchorCtr="1">
-              <a:spAutoFit/>
-            </a:bodyPr>
-            <a:lstStyle/>
-            <a:p>
-              <a:pPr>
-                <a:defRPr sz="900" b="0" i="0" u="none" strike="noStrike" kern="1200" baseline="0">
-                  <a:solidFill>
-                    <a:schemeClr val="tx1">
-                      <a:lumMod val="75000"/>
-                      <a:lumOff val="25000"/>
-                    </a:schemeClr>
-                  </a:solidFill>
-                  <a:latin typeface="+mn-lt"/>
-                  <a:ea typeface="+mn-ea"/>
-                  <a:cs typeface="+mn-cs"/>
-                </a:defRPr>
-              </a:pPr>
-              <a:endParaRPr lang="es-EC"/>
-            </a:p>
-          </c:txPr>
-          <c:showLegendKey val="0"/>
-          <c:showVal val="0"/>
-          <c:showCatName val="0"/>
-          <c:showSerName val="0"/>
-          <c:showPercent val="0"/>
-          <c:showBubbleSize val="0"/>
-          <c:extLst>
-            <c:ext xmlns:c15="http://schemas.microsoft.com/office/drawing/2012/chart" uri="{CE6537A1-D6FC-4f65-9D91-7224C49458BB}"/>
-          </c:extLst>
-        </c:dLbl>
-      </c:pivotFmt>
-      <c:pivotFmt>
-        <c:idx val="31"/>
-        <c:spPr>
-          <a:solidFill>
-            <a:schemeClr val="accent1"/>
-          </a:solidFill>
-          <a:ln>
-            <a:noFill/>
-          </a:ln>
-          <a:effectLst/>
-        </c:spPr>
-        <c:marker>
-          <c:symbol val="none"/>
-        </c:marker>
-        <c:dLbl>
-          <c:idx val="0"/>
-          <c:spPr>
-            <a:noFill/>
-            <a:ln>
-              <a:noFill/>
-            </a:ln>
-            <a:effectLst/>
-          </c:spPr>
-          <c:txPr>
-            <a:bodyPr rot="0" spcFirstLastPara="1" vertOverflow="ellipsis" vert="horz" wrap="square" lIns="38100" tIns="19050" rIns="38100" bIns="19050" anchor="ctr" anchorCtr="1">
-              <a:spAutoFit/>
-            </a:bodyPr>
-            <a:lstStyle/>
-            <a:p>
-              <a:pPr>
-                <a:defRPr sz="900" b="0" i="0" u="none" strike="noStrike" kern="1200" baseline="0">
-                  <a:solidFill>
-                    <a:schemeClr val="tx1">
-                      <a:lumMod val="75000"/>
-                      <a:lumOff val="25000"/>
-                    </a:schemeClr>
-                  </a:solidFill>
-                  <a:latin typeface="+mn-lt"/>
-                  <a:ea typeface="+mn-ea"/>
-                  <a:cs typeface="+mn-cs"/>
-                </a:defRPr>
-              </a:pPr>
-              <a:endParaRPr lang="es-EC"/>
-            </a:p>
-          </c:txPr>
-          <c:showLegendKey val="0"/>
-          <c:showVal val="0"/>
-          <c:showCatName val="0"/>
-          <c:showSerName val="0"/>
-          <c:showPercent val="0"/>
-          <c:showBubbleSize val="0"/>
-          <c:extLst>
-            <c:ext xmlns:c15="http://schemas.microsoft.com/office/drawing/2012/chart" uri="{CE6537A1-D6FC-4f65-9D91-7224C49458BB}"/>
-          </c:extLst>
-        </c:dLbl>
-      </c:pivotFmt>
-      <c:pivotFmt>
-        <c:idx val="32"/>
-        <c:spPr>
-          <a:solidFill>
-            <a:schemeClr val="accent1"/>
-          </a:solidFill>
-          <a:ln>
-            <a:noFill/>
-          </a:ln>
-          <a:effectLst/>
-        </c:spPr>
-        <c:marker>
-          <c:symbol val="none"/>
-        </c:marker>
-        <c:dLbl>
-          <c:idx val="0"/>
-          <c:spPr>
-            <a:noFill/>
-            <a:ln>
-              <a:noFill/>
-            </a:ln>
-            <a:effectLst/>
-          </c:spPr>
-          <c:txPr>
-            <a:bodyPr rot="0" spcFirstLastPara="1" vertOverflow="ellipsis" vert="horz" wrap="square" lIns="38100" tIns="19050" rIns="38100" bIns="19050" anchor="ctr" anchorCtr="1">
-              <a:spAutoFit/>
-            </a:bodyPr>
-            <a:lstStyle/>
-            <a:p>
-              <a:pPr>
-                <a:defRPr sz="900" b="0" i="0" u="none" strike="noStrike" kern="1200" baseline="0">
-                  <a:solidFill>
-                    <a:schemeClr val="tx1">
-                      <a:lumMod val="75000"/>
-                      <a:lumOff val="25000"/>
-                    </a:schemeClr>
-                  </a:solidFill>
-                  <a:latin typeface="+mn-lt"/>
-                  <a:ea typeface="+mn-ea"/>
-                  <a:cs typeface="+mn-cs"/>
-                </a:defRPr>
-              </a:pPr>
-              <a:endParaRPr lang="es-EC"/>
-            </a:p>
-          </c:txPr>
-          <c:showLegendKey val="0"/>
-          <c:showVal val="0"/>
-          <c:showCatName val="0"/>
-          <c:showSerName val="0"/>
-          <c:showPercent val="0"/>
-          <c:showBubbleSize val="0"/>
-          <c:extLst>
-            <c:ext xmlns:c15="http://schemas.microsoft.com/office/drawing/2012/chart" uri="{CE6537A1-D6FC-4f65-9D91-7224C49458BB}"/>
-          </c:extLst>
-        </c:dLbl>
-      </c:pivotFmt>
-      <c:pivotFmt>
-        <c:idx val="33"/>
-        <c:spPr>
-          <a:solidFill>
-            <a:schemeClr val="accent1"/>
-          </a:solidFill>
-          <a:ln>
-            <a:noFill/>
-          </a:ln>
-          <a:effectLst/>
-        </c:spPr>
-        <c:marker>
-          <c:symbol val="none"/>
-        </c:marker>
-        <c:dLbl>
-          <c:idx val="0"/>
-          <c:spPr>
-            <a:noFill/>
-            <a:ln>
-              <a:noFill/>
-            </a:ln>
-            <a:effectLst/>
-          </c:spPr>
-          <c:txPr>
-            <a:bodyPr rot="0" spcFirstLastPara="1" vertOverflow="ellipsis" vert="horz" wrap="square" lIns="38100" tIns="19050" rIns="38100" bIns="19050" anchor="ctr" anchorCtr="1">
-              <a:spAutoFit/>
-            </a:bodyPr>
-            <a:lstStyle/>
-            <a:p>
-              <a:pPr>
-                <a:defRPr sz="900" b="0" i="0" u="none" strike="noStrike" kern="1200" baseline="0">
-                  <a:solidFill>
-                    <a:schemeClr val="tx1">
-                      <a:lumMod val="75000"/>
-                      <a:lumOff val="25000"/>
-                    </a:schemeClr>
-                  </a:solidFill>
-                  <a:latin typeface="+mn-lt"/>
-                  <a:ea typeface="+mn-ea"/>
-                  <a:cs typeface="+mn-cs"/>
-                </a:defRPr>
-              </a:pPr>
-              <a:endParaRPr lang="es-EC"/>
-            </a:p>
-          </c:txPr>
-          <c:showLegendKey val="0"/>
-          <c:showVal val="0"/>
-          <c:showCatName val="0"/>
-          <c:showSerName val="0"/>
-          <c:showPercent val="0"/>
-          <c:showBubbleSize val="0"/>
-          <c:extLst>
-            <c:ext xmlns:c15="http://schemas.microsoft.com/office/drawing/2012/chart" uri="{CE6537A1-D6FC-4f65-9D91-7224C49458BB}"/>
-          </c:extLst>
-        </c:dLbl>
-      </c:pivotFmt>
-      <c:pivotFmt>
-        <c:idx val="34"/>
-        <c:spPr>
-          <a:solidFill>
-            <a:schemeClr val="accent1"/>
-          </a:solidFill>
-          <a:ln>
-            <a:noFill/>
-          </a:ln>
-          <a:effectLst/>
-        </c:spPr>
-        <c:marker>
-          <c:symbol val="none"/>
-        </c:marker>
-        <c:dLbl>
-          <c:idx val="0"/>
-          <c:spPr>
-            <a:noFill/>
-            <a:ln>
-              <a:noFill/>
-            </a:ln>
-            <a:effectLst/>
-          </c:spPr>
-          <c:txPr>
-            <a:bodyPr rot="0" spcFirstLastPara="1" vertOverflow="ellipsis" vert="horz" wrap="square" lIns="38100" tIns="19050" rIns="38100" bIns="19050" anchor="ctr" anchorCtr="1">
-              <a:spAutoFit/>
-            </a:bodyPr>
-            <a:lstStyle/>
-            <a:p>
-              <a:pPr>
-                <a:defRPr sz="900" b="0" i="0" u="none" strike="noStrike" kern="1200" baseline="0">
-                  <a:solidFill>
-                    <a:schemeClr val="tx1">
-                      <a:lumMod val="75000"/>
-                      <a:lumOff val="25000"/>
-                    </a:schemeClr>
-                  </a:solidFill>
-                  <a:latin typeface="+mn-lt"/>
-                  <a:ea typeface="+mn-ea"/>
-                  <a:cs typeface="+mn-cs"/>
-                </a:defRPr>
-              </a:pPr>
-              <a:endParaRPr lang="es-EC"/>
-            </a:p>
-          </c:txPr>
-          <c:showLegendKey val="0"/>
-          <c:showVal val="0"/>
-          <c:showCatName val="0"/>
-          <c:showSerName val="0"/>
-          <c:showPercent val="0"/>
-          <c:showBubbleSize val="0"/>
-          <c:extLst>
-            <c:ext xmlns:c15="http://schemas.microsoft.com/office/drawing/2012/chart" uri="{CE6537A1-D6FC-4f65-9D91-7224C49458BB}"/>
-          </c:extLst>
-        </c:dLbl>
-      </c:pivotFmt>
-      <c:pivotFmt>
-        <c:idx val="35"/>
-        <c:spPr>
-          <a:solidFill>
-            <a:schemeClr val="accent1"/>
-          </a:solidFill>
-          <a:ln>
-            <a:noFill/>
-          </a:ln>
-          <a:effectLst/>
-        </c:spPr>
-        <c:marker>
-          <c:symbol val="none"/>
-        </c:marker>
-        <c:dLbl>
-          <c:idx val="0"/>
-          <c:spPr>
-            <a:noFill/>
-            <a:ln>
-              <a:noFill/>
-            </a:ln>
-            <a:effectLst/>
-          </c:spPr>
-          <c:txPr>
-            <a:bodyPr rot="0" spcFirstLastPara="1" vertOverflow="ellipsis" vert="horz" wrap="square" lIns="38100" tIns="19050" rIns="38100" bIns="19050" anchor="ctr" anchorCtr="1">
-              <a:spAutoFit/>
-            </a:bodyPr>
-            <a:lstStyle/>
-            <a:p>
-              <a:pPr>
-                <a:defRPr sz="900" b="0" i="0" u="none" strike="noStrike" kern="1200" baseline="0">
-                  <a:solidFill>
-                    <a:schemeClr val="tx1">
-                      <a:lumMod val="75000"/>
-                      <a:lumOff val="25000"/>
-                    </a:schemeClr>
-                  </a:solidFill>
-                  <a:latin typeface="+mn-lt"/>
-                  <a:ea typeface="+mn-ea"/>
-                  <a:cs typeface="+mn-cs"/>
-                </a:defRPr>
-              </a:pPr>
-              <a:endParaRPr lang="es-EC"/>
-            </a:p>
-          </c:txPr>
-          <c:showLegendKey val="0"/>
-          <c:showVal val="0"/>
-          <c:showCatName val="0"/>
-          <c:showSerName val="0"/>
-          <c:showPercent val="0"/>
-          <c:showBubbleSize val="0"/>
-          <c:extLst>
-            <c:ext xmlns:c15="http://schemas.microsoft.com/office/drawing/2012/chart" uri="{CE6537A1-D6FC-4f65-9D91-7224C49458BB}"/>
-          </c:extLst>
-        </c:dLbl>
-      </c:pivotFmt>
-      <c:pivotFmt>
-        <c:idx val="36"/>
-        <c:spPr>
-          <a:solidFill>
-            <a:schemeClr val="accent1"/>
-          </a:solidFill>
-          <a:ln>
-            <a:noFill/>
-          </a:ln>
-          <a:effectLst/>
-        </c:spPr>
-        <c:marker>
-          <c:symbol val="none"/>
-        </c:marker>
-        <c:dLbl>
-          <c:idx val="0"/>
-          <c:spPr>
-            <a:noFill/>
-            <a:ln>
-              <a:noFill/>
-            </a:ln>
-            <a:effectLst/>
-          </c:spPr>
-          <c:txPr>
-            <a:bodyPr rot="0" spcFirstLastPara="1" vertOverflow="ellipsis" vert="horz" wrap="square" lIns="38100" tIns="19050" rIns="38100" bIns="19050" anchor="ctr" anchorCtr="1">
-              <a:spAutoFit/>
-            </a:bodyPr>
-            <a:lstStyle/>
-            <a:p>
-              <a:pPr>
-                <a:defRPr sz="900" b="0" i="0" u="none" strike="noStrike" kern="1200" baseline="0">
-                  <a:solidFill>
-                    <a:schemeClr val="tx1">
-                      <a:lumMod val="75000"/>
-                      <a:lumOff val="25000"/>
-                    </a:schemeClr>
-                  </a:solidFill>
-                  <a:latin typeface="+mn-lt"/>
-                  <a:ea typeface="+mn-ea"/>
-                  <a:cs typeface="+mn-cs"/>
-                </a:defRPr>
-              </a:pPr>
-              <a:endParaRPr lang="es-EC"/>
-            </a:p>
-          </c:txPr>
-          <c:showLegendKey val="0"/>
-          <c:showVal val="0"/>
-          <c:showCatName val="0"/>
-          <c:showSerName val="0"/>
-          <c:showPercent val="0"/>
-          <c:showBubbleSize val="0"/>
-          <c:extLst>
-            <c:ext xmlns:c15="http://schemas.microsoft.com/office/drawing/2012/chart" uri="{CE6537A1-D6FC-4f65-9D91-7224C49458BB}"/>
-          </c:extLst>
-        </c:dLbl>
-      </c:pivotFmt>
-      <c:pivotFmt>
-        <c:idx val="37"/>
-        <c:spPr>
-          <a:solidFill>
-            <a:schemeClr val="accent1"/>
-          </a:solidFill>
-          <a:ln>
-            <a:noFill/>
-          </a:ln>
-          <a:effectLst/>
-        </c:spPr>
-        <c:marker>
-          <c:symbol val="none"/>
-        </c:marker>
-        <c:dLbl>
-          <c:idx val="0"/>
-          <c:spPr>
-            <a:noFill/>
-            <a:ln>
-              <a:noFill/>
-            </a:ln>
-            <a:effectLst/>
-          </c:spPr>
-          <c:txPr>
-            <a:bodyPr rot="0" spcFirstLastPara="1" vertOverflow="ellipsis" vert="horz" wrap="square" lIns="38100" tIns="19050" rIns="38100" bIns="19050" anchor="ctr" anchorCtr="1">
-              <a:spAutoFit/>
-            </a:bodyPr>
-            <a:lstStyle/>
-            <a:p>
-              <a:pPr>
-                <a:defRPr sz="900" b="0" i="0" u="none" strike="noStrike" kern="1200" baseline="0">
-                  <a:solidFill>
-                    <a:schemeClr val="tx1">
-                      <a:lumMod val="75000"/>
-                      <a:lumOff val="25000"/>
-                    </a:schemeClr>
-                  </a:solidFill>
-                  <a:latin typeface="+mn-lt"/>
-                  <a:ea typeface="+mn-ea"/>
-                  <a:cs typeface="+mn-cs"/>
-                </a:defRPr>
-              </a:pPr>
-              <a:endParaRPr lang="es-EC"/>
-            </a:p>
-          </c:txPr>
-          <c:showLegendKey val="0"/>
-          <c:showVal val="0"/>
-          <c:showCatName val="0"/>
-          <c:showSerName val="0"/>
-          <c:showPercent val="0"/>
-          <c:showBubbleSize val="0"/>
-          <c:extLst>
-            <c:ext xmlns:c15="http://schemas.microsoft.com/office/drawing/2012/chart" uri="{CE6537A1-D6FC-4f65-9D91-7224C49458BB}"/>
-          </c:extLst>
-        </c:dLbl>
-      </c:pivotFmt>
-      <c:pivotFmt>
-        <c:idx val="38"/>
-        <c:spPr>
-          <a:solidFill>
-            <a:schemeClr val="accent1"/>
-          </a:solidFill>
-          <a:ln>
-            <a:noFill/>
-          </a:ln>
-          <a:effectLst/>
-        </c:spPr>
-        <c:marker>
-          <c:symbol val="none"/>
-        </c:marker>
-        <c:dLbl>
-          <c:idx val="0"/>
-          <c:spPr>
-            <a:noFill/>
-            <a:ln>
-              <a:noFill/>
-            </a:ln>
-            <a:effectLst/>
-          </c:spPr>
-          <c:txPr>
-            <a:bodyPr rot="0" spcFirstLastPara="1" vertOverflow="ellipsis" vert="horz" wrap="square" lIns="38100" tIns="19050" rIns="38100" bIns="19050" anchor="ctr" anchorCtr="1">
-              <a:spAutoFit/>
-            </a:bodyPr>
-            <a:lstStyle/>
-            <a:p>
-              <a:pPr>
-                <a:defRPr sz="900" b="0" i="0" u="none" strike="noStrike" kern="1200" baseline="0">
-                  <a:solidFill>
-                    <a:schemeClr val="tx1">
-                      <a:lumMod val="75000"/>
-                      <a:lumOff val="25000"/>
-                    </a:schemeClr>
-                  </a:solidFill>
-                  <a:latin typeface="+mn-lt"/>
-                  <a:ea typeface="+mn-ea"/>
-                  <a:cs typeface="+mn-cs"/>
-                </a:defRPr>
-              </a:pPr>
-              <a:endParaRPr lang="es-EC"/>
-            </a:p>
-          </c:txPr>
-          <c:showLegendKey val="0"/>
-          <c:showVal val="0"/>
-          <c:showCatName val="0"/>
-          <c:showSerName val="0"/>
-          <c:showPercent val="0"/>
-          <c:showBubbleSize val="0"/>
-          <c:extLst>
-            <c:ext xmlns:c15="http://schemas.microsoft.com/office/drawing/2012/chart" uri="{CE6537A1-D6FC-4f65-9D91-7224C49458BB}"/>
-          </c:extLst>
-        </c:dLbl>
-      </c:pivotFmt>
-      <c:pivotFmt>
-        <c:idx val="39"/>
-        <c:spPr>
-          <a:solidFill>
-            <a:schemeClr val="accent1"/>
-          </a:solidFill>
-          <a:ln>
-            <a:noFill/>
-          </a:ln>
-          <a:effectLst/>
-        </c:spPr>
-        <c:marker>
-          <c:symbol val="none"/>
-        </c:marker>
-        <c:dLbl>
-          <c:idx val="0"/>
-          <c:spPr>
-            <a:noFill/>
-            <a:ln>
-              <a:noFill/>
-            </a:ln>
-            <a:effectLst/>
-          </c:spPr>
-          <c:txPr>
-            <a:bodyPr rot="0" spcFirstLastPara="1" vertOverflow="ellipsis" vert="horz" wrap="square" lIns="38100" tIns="19050" rIns="38100" bIns="19050" anchor="ctr" anchorCtr="1">
-              <a:spAutoFit/>
-            </a:bodyPr>
-            <a:lstStyle/>
-            <a:p>
-              <a:pPr>
-                <a:defRPr sz="900" b="0" i="0" u="none" strike="noStrike" kern="1200" baseline="0">
-                  <a:solidFill>
-                    <a:schemeClr val="tx1">
-                      <a:lumMod val="75000"/>
-                      <a:lumOff val="25000"/>
-                    </a:schemeClr>
-                  </a:solidFill>
-                  <a:latin typeface="+mn-lt"/>
-                  <a:ea typeface="+mn-ea"/>
-                  <a:cs typeface="+mn-cs"/>
-                </a:defRPr>
-              </a:pPr>
-              <a:endParaRPr lang="es-EC"/>
-            </a:p>
-          </c:txPr>
-          <c:showLegendKey val="0"/>
-          <c:showVal val="0"/>
-          <c:showCatName val="0"/>
-          <c:showSerName val="0"/>
-          <c:showPercent val="0"/>
-          <c:showBubbleSize val="0"/>
-          <c:extLst>
-            <c:ext xmlns:c15="http://schemas.microsoft.com/office/drawing/2012/chart" uri="{CE6537A1-D6FC-4f65-9D91-7224C49458BB}"/>
-          </c:extLst>
-        </c:dLbl>
-      </c:pivotFmt>
-      <c:pivotFmt>
-        <c:idx val="40"/>
         <c:spPr>
           <a:solidFill>
             <a:schemeClr val="accent1"/>
@@ -7870,11 +6190,11 @@
           <c:order val="0"/>
           <c:tx>
             <c:strRef>
-              <c:f>Sheet1!$E$3:$E$4</c:f>
+              <c:f>Sheet1!$E$1</c:f>
               <c:strCache>
                 <c:ptCount val="1"/>
                 <c:pt idx="0">
-                  <c:v>Amigo</c:v>
+                  <c:v>Total</c:v>
                 </c:pt>
               </c:strCache>
             </c:strRef>
@@ -7891,515 +6211,84 @@
           <c:invertIfNegative val="0"/>
           <c:cat>
             <c:strRef>
-              <c:f>Sheet1!$D$5</c:f>
+              <c:f>Sheet1!$D$2:$D$12</c:f>
               <c:strCache>
-                <c:ptCount val="1"/>
+                <c:ptCount val="10"/>
                 <c:pt idx="0">
-                  <c:v>Total</c:v>
+                  <c:v>Amigo</c:v>
+                </c:pt>
+                <c:pt idx="1">
+                  <c:v>Chimu</c:v>
+                </c:pt>
+                <c:pt idx="2">
+                  <c:v>Lara</c:v>
+                </c:pt>
+                <c:pt idx="3">
+                  <c:v>Maddy</c:v>
+                </c:pt>
+                <c:pt idx="4">
+                  <c:v>Mora</c:v>
+                </c:pt>
+                <c:pt idx="5">
+                  <c:v>Neutron</c:v>
+                </c:pt>
+                <c:pt idx="6">
+                  <c:v>René</c:v>
+                </c:pt>
+                <c:pt idx="7">
+                  <c:v>Sambayón</c:v>
+                </c:pt>
+                <c:pt idx="8">
+                  <c:v>Sari</c:v>
+                </c:pt>
+                <c:pt idx="9">
+                  <c:v>Tiana</c:v>
                 </c:pt>
               </c:strCache>
             </c:strRef>
           </c:cat>
           <c:val>
             <c:numRef>
-              <c:f>Sheet1!$E$5</c:f>
+              <c:f>Sheet1!$E$2:$E$12</c:f>
               <c:numCache>
                 <c:formatCode>General</c:formatCode>
-                <c:ptCount val="1"/>
+                <c:ptCount val="10"/>
                 <c:pt idx="0">
-                  <c:v>30</c:v>
+                  <c:v>1.3</c:v>
+                </c:pt>
+                <c:pt idx="1">
+                  <c:v>2</c:v>
+                </c:pt>
+                <c:pt idx="2">
+                  <c:v>2.2000000000000002</c:v>
+                </c:pt>
+                <c:pt idx="3">
+                  <c:v>4.2</c:v>
+                </c:pt>
+                <c:pt idx="4">
+                  <c:v>2.1</c:v>
+                </c:pt>
+                <c:pt idx="5">
+                  <c:v>2</c:v>
+                </c:pt>
+                <c:pt idx="6">
+                  <c:v>2.1</c:v>
+                </c:pt>
+                <c:pt idx="7">
+                  <c:v>1.9</c:v>
+                </c:pt>
+                <c:pt idx="8">
+                  <c:v>2.2000000000000002</c:v>
+                </c:pt>
+                <c:pt idx="9">
+                  <c:v>2.6</c:v>
                 </c:pt>
               </c:numCache>
             </c:numRef>
           </c:val>
           <c:extLst>
             <c:ext xmlns:c16="http://schemas.microsoft.com/office/drawing/2014/chart" uri="{C3380CC4-5D6E-409C-BE32-E72D297353CC}">
-              <c16:uniqueId val="{00000000-FA90-41E1-81BD-5605301A03A7}"/>
-            </c:ext>
-          </c:extLst>
-        </c:ser>
-        <c:ser>
-          <c:idx val="1"/>
-          <c:order val="1"/>
-          <c:tx>
-            <c:strRef>
-              <c:f>Sheet1!$F$3:$F$4</c:f>
-              <c:strCache>
-                <c:ptCount val="1"/>
-                <c:pt idx="0">
-                  <c:v>Chimu</c:v>
-                </c:pt>
-              </c:strCache>
-            </c:strRef>
-          </c:tx>
-          <c:spPr>
-            <a:solidFill>
-              <a:schemeClr val="accent2"/>
-            </a:solidFill>
-            <a:ln>
-              <a:noFill/>
-            </a:ln>
-            <a:effectLst/>
-          </c:spPr>
-          <c:invertIfNegative val="0"/>
-          <c:cat>
-            <c:strRef>
-              <c:f>Sheet1!$D$5</c:f>
-              <c:strCache>
-                <c:ptCount val="1"/>
-                <c:pt idx="0">
-                  <c:v>Total</c:v>
-                </c:pt>
-              </c:strCache>
-            </c:strRef>
-          </c:cat>
-          <c:val>
-            <c:numRef>
-              <c:f>Sheet1!$F$5</c:f>
-              <c:numCache>
-                <c:formatCode>General</c:formatCode>
-                <c:ptCount val="1"/>
-                <c:pt idx="0">
-                  <c:v>24</c:v>
-                </c:pt>
-              </c:numCache>
-            </c:numRef>
-          </c:val>
-          <c:extLst>
-            <c:ext xmlns:c16="http://schemas.microsoft.com/office/drawing/2014/chart" uri="{C3380CC4-5D6E-409C-BE32-E72D297353CC}">
-              <c16:uniqueId val="{00000001-FA90-41E1-81BD-5605301A03A7}"/>
-            </c:ext>
-          </c:extLst>
-        </c:ser>
-        <c:ser>
-          <c:idx val="2"/>
-          <c:order val="2"/>
-          <c:tx>
-            <c:strRef>
-              <c:f>Sheet1!$G$3:$G$4</c:f>
-              <c:strCache>
-                <c:ptCount val="1"/>
-                <c:pt idx="0">
-                  <c:v>Lara</c:v>
-                </c:pt>
-              </c:strCache>
-            </c:strRef>
-          </c:tx>
-          <c:spPr>
-            <a:solidFill>
-              <a:schemeClr val="accent3"/>
-            </a:solidFill>
-            <a:ln>
-              <a:noFill/>
-            </a:ln>
-            <a:effectLst/>
-          </c:spPr>
-          <c:invertIfNegative val="0"/>
-          <c:cat>
-            <c:strRef>
-              <c:f>Sheet1!$D$5</c:f>
-              <c:strCache>
-                <c:ptCount val="1"/>
-                <c:pt idx="0">
-                  <c:v>Total</c:v>
-                </c:pt>
-              </c:strCache>
-            </c:strRef>
-          </c:cat>
-          <c:val>
-            <c:numRef>
-              <c:f>Sheet1!$G$5</c:f>
-              <c:numCache>
-                <c:formatCode>General</c:formatCode>
-                <c:ptCount val="1"/>
-                <c:pt idx="0">
-                  <c:v>19</c:v>
-                </c:pt>
-              </c:numCache>
-            </c:numRef>
-          </c:val>
-          <c:extLst>
-            <c:ext xmlns:c16="http://schemas.microsoft.com/office/drawing/2014/chart" uri="{C3380CC4-5D6E-409C-BE32-E72D297353CC}">
-              <c16:uniqueId val="{00000002-FA90-41E1-81BD-5605301A03A7}"/>
-            </c:ext>
-          </c:extLst>
-        </c:ser>
-        <c:ser>
-          <c:idx val="3"/>
-          <c:order val="3"/>
-          <c:tx>
-            <c:strRef>
-              <c:f>Sheet1!$H$3:$H$4</c:f>
-              <c:strCache>
-                <c:ptCount val="1"/>
-                <c:pt idx="0">
-                  <c:v>Maddy</c:v>
-                </c:pt>
-              </c:strCache>
-            </c:strRef>
-          </c:tx>
-          <c:spPr>
-            <a:solidFill>
-              <a:schemeClr val="accent4"/>
-            </a:solidFill>
-            <a:ln>
-              <a:noFill/>
-            </a:ln>
-            <a:effectLst/>
-          </c:spPr>
-          <c:invertIfNegative val="0"/>
-          <c:cat>
-            <c:strRef>
-              <c:f>Sheet1!$D$5</c:f>
-              <c:strCache>
-                <c:ptCount val="1"/>
-                <c:pt idx="0">
-                  <c:v>Total</c:v>
-                </c:pt>
-              </c:strCache>
-            </c:strRef>
-          </c:cat>
-          <c:val>
-            <c:numRef>
-              <c:f>Sheet1!$H$5</c:f>
-              <c:numCache>
-                <c:formatCode>General</c:formatCode>
-                <c:ptCount val="1"/>
-                <c:pt idx="0">
-                  <c:v>20</c:v>
-                </c:pt>
-              </c:numCache>
-            </c:numRef>
-          </c:val>
-          <c:extLst>
-            <c:ext xmlns:c16="http://schemas.microsoft.com/office/drawing/2014/chart" uri="{C3380CC4-5D6E-409C-BE32-E72D297353CC}">
-              <c16:uniqueId val="{00000003-FA90-41E1-81BD-5605301A03A7}"/>
-            </c:ext>
-          </c:extLst>
-        </c:ser>
-        <c:ser>
-          <c:idx val="4"/>
-          <c:order val="4"/>
-          <c:tx>
-            <c:strRef>
-              <c:f>Sheet1!$I$3:$I$4</c:f>
-              <c:strCache>
-                <c:ptCount val="1"/>
-                <c:pt idx="0">
-                  <c:v>Mora</c:v>
-                </c:pt>
-              </c:strCache>
-            </c:strRef>
-          </c:tx>
-          <c:spPr>
-            <a:solidFill>
-              <a:schemeClr val="accent5"/>
-            </a:solidFill>
-            <a:ln>
-              <a:noFill/>
-            </a:ln>
-            <a:effectLst/>
-          </c:spPr>
-          <c:invertIfNegative val="0"/>
-          <c:cat>
-            <c:strRef>
-              <c:f>Sheet1!$D$5</c:f>
-              <c:strCache>
-                <c:ptCount val="1"/>
-                <c:pt idx="0">
-                  <c:v>Total</c:v>
-                </c:pt>
-              </c:strCache>
-            </c:strRef>
-          </c:cat>
-          <c:val>
-            <c:numRef>
-              <c:f>Sheet1!$I$5</c:f>
-              <c:numCache>
-                <c:formatCode>General</c:formatCode>
-                <c:ptCount val="1"/>
-                <c:pt idx="0">
-                  <c:v>49</c:v>
-                </c:pt>
-              </c:numCache>
-            </c:numRef>
-          </c:val>
-          <c:extLst>
-            <c:ext xmlns:c16="http://schemas.microsoft.com/office/drawing/2014/chart" uri="{C3380CC4-5D6E-409C-BE32-E72D297353CC}">
-              <c16:uniqueId val="{00000004-FA90-41E1-81BD-5605301A03A7}"/>
-            </c:ext>
-          </c:extLst>
-        </c:ser>
-        <c:ser>
-          <c:idx val="5"/>
-          <c:order val="5"/>
-          <c:tx>
-            <c:strRef>
-              <c:f>Sheet1!$J$3:$J$4</c:f>
-              <c:strCache>
-                <c:ptCount val="1"/>
-                <c:pt idx="0">
-                  <c:v>Neutron</c:v>
-                </c:pt>
-              </c:strCache>
-            </c:strRef>
-          </c:tx>
-          <c:spPr>
-            <a:solidFill>
-              <a:schemeClr val="accent6"/>
-            </a:solidFill>
-            <a:ln>
-              <a:noFill/>
-            </a:ln>
-            <a:effectLst/>
-          </c:spPr>
-          <c:invertIfNegative val="0"/>
-          <c:cat>
-            <c:strRef>
-              <c:f>Sheet1!$D$5</c:f>
-              <c:strCache>
-                <c:ptCount val="1"/>
-                <c:pt idx="0">
-                  <c:v>Total</c:v>
-                </c:pt>
-              </c:strCache>
-            </c:strRef>
-          </c:cat>
-          <c:val>
-            <c:numRef>
-              <c:f>Sheet1!$J$5</c:f>
-              <c:numCache>
-                <c:formatCode>General</c:formatCode>
-                <c:ptCount val="1"/>
-                <c:pt idx="0">
-                  <c:v>25</c:v>
-                </c:pt>
-              </c:numCache>
-            </c:numRef>
-          </c:val>
-          <c:extLst>
-            <c:ext xmlns:c16="http://schemas.microsoft.com/office/drawing/2014/chart" uri="{C3380CC4-5D6E-409C-BE32-E72D297353CC}">
-              <c16:uniqueId val="{00000005-FA90-41E1-81BD-5605301A03A7}"/>
-            </c:ext>
-          </c:extLst>
-        </c:ser>
-        <c:ser>
-          <c:idx val="6"/>
-          <c:order val="6"/>
-          <c:tx>
-            <c:strRef>
-              <c:f>Sheet1!$K$3:$K$4</c:f>
-              <c:strCache>
-                <c:ptCount val="1"/>
-                <c:pt idx="0">
-                  <c:v>René</c:v>
-                </c:pt>
-              </c:strCache>
-            </c:strRef>
-          </c:tx>
-          <c:spPr>
-            <a:solidFill>
-              <a:schemeClr val="accent1">
-                <a:lumMod val="60000"/>
-              </a:schemeClr>
-            </a:solidFill>
-            <a:ln>
-              <a:noFill/>
-            </a:ln>
-            <a:effectLst/>
-          </c:spPr>
-          <c:invertIfNegative val="0"/>
-          <c:cat>
-            <c:strRef>
-              <c:f>Sheet1!$D$5</c:f>
-              <c:strCache>
-                <c:ptCount val="1"/>
-                <c:pt idx="0">
-                  <c:v>Total</c:v>
-                </c:pt>
-              </c:strCache>
-            </c:strRef>
-          </c:cat>
-          <c:val>
-            <c:numRef>
-              <c:f>Sheet1!$K$5</c:f>
-              <c:numCache>
-                <c:formatCode>General</c:formatCode>
-                <c:ptCount val="1"/>
-                <c:pt idx="0">
-                  <c:v>98</c:v>
-                </c:pt>
-              </c:numCache>
-            </c:numRef>
-          </c:val>
-          <c:extLst>
-            <c:ext xmlns:c16="http://schemas.microsoft.com/office/drawing/2014/chart" uri="{C3380CC4-5D6E-409C-BE32-E72D297353CC}">
-              <c16:uniqueId val="{00000006-FA90-41E1-81BD-5605301A03A7}"/>
-            </c:ext>
-          </c:extLst>
-        </c:ser>
-        <c:ser>
-          <c:idx val="7"/>
-          <c:order val="7"/>
-          <c:tx>
-            <c:strRef>
-              <c:f>Sheet1!$L$3:$L$4</c:f>
-              <c:strCache>
-                <c:ptCount val="1"/>
-                <c:pt idx="0">
-                  <c:v>Sambayón</c:v>
-                </c:pt>
-              </c:strCache>
-            </c:strRef>
-          </c:tx>
-          <c:spPr>
-            <a:solidFill>
-              <a:schemeClr val="accent2">
-                <a:lumMod val="60000"/>
-              </a:schemeClr>
-            </a:solidFill>
-            <a:ln>
-              <a:noFill/>
-            </a:ln>
-            <a:effectLst/>
-          </c:spPr>
-          <c:invertIfNegative val="0"/>
-          <c:cat>
-            <c:strRef>
-              <c:f>Sheet1!$D$5</c:f>
-              <c:strCache>
-                <c:ptCount val="1"/>
-                <c:pt idx="0">
-                  <c:v>Total</c:v>
-                </c:pt>
-              </c:strCache>
-            </c:strRef>
-          </c:cat>
-          <c:val>
-            <c:numRef>
-              <c:f>Sheet1!$L$5</c:f>
-              <c:numCache>
-                <c:formatCode>General</c:formatCode>
-                <c:ptCount val="1"/>
-                <c:pt idx="0">
-                  <c:v>35</c:v>
-                </c:pt>
-              </c:numCache>
-            </c:numRef>
-          </c:val>
-          <c:extLst>
-            <c:ext xmlns:c16="http://schemas.microsoft.com/office/drawing/2014/chart" uri="{C3380CC4-5D6E-409C-BE32-E72D297353CC}">
-              <c16:uniqueId val="{00000007-FA90-41E1-81BD-5605301A03A7}"/>
-            </c:ext>
-          </c:extLst>
-        </c:ser>
-        <c:ser>
-          <c:idx val="8"/>
-          <c:order val="8"/>
-          <c:tx>
-            <c:strRef>
-              <c:f>Sheet1!$M$3:$M$4</c:f>
-              <c:strCache>
-                <c:ptCount val="1"/>
-                <c:pt idx="0">
-                  <c:v>Sari</c:v>
-                </c:pt>
-              </c:strCache>
-            </c:strRef>
-          </c:tx>
-          <c:spPr>
-            <a:solidFill>
-              <a:schemeClr val="accent3">
-                <a:lumMod val="60000"/>
-              </a:schemeClr>
-            </a:solidFill>
-            <a:ln>
-              <a:noFill/>
-            </a:ln>
-            <a:effectLst/>
-          </c:spPr>
-          <c:invertIfNegative val="0"/>
-          <c:cat>
-            <c:strRef>
-              <c:f>Sheet1!$D$5</c:f>
-              <c:strCache>
-                <c:ptCount val="1"/>
-                <c:pt idx="0">
-                  <c:v>Total</c:v>
-                </c:pt>
-              </c:strCache>
-            </c:strRef>
-          </c:cat>
-          <c:val>
-            <c:numRef>
-              <c:f>Sheet1!$M$5</c:f>
-              <c:numCache>
-                <c:formatCode>General</c:formatCode>
-                <c:ptCount val="1"/>
-                <c:pt idx="0">
-                  <c:v>9</c:v>
-                </c:pt>
-              </c:numCache>
-            </c:numRef>
-          </c:val>
-          <c:extLst>
-            <c:ext xmlns:c16="http://schemas.microsoft.com/office/drawing/2014/chart" uri="{C3380CC4-5D6E-409C-BE32-E72D297353CC}">
-              <c16:uniqueId val="{00000008-FA90-41E1-81BD-5605301A03A7}"/>
-            </c:ext>
-          </c:extLst>
-        </c:ser>
-        <c:ser>
-          <c:idx val="9"/>
-          <c:order val="9"/>
-          <c:tx>
-            <c:strRef>
-              <c:f>Sheet1!$N$3:$N$4</c:f>
-              <c:strCache>
-                <c:ptCount val="1"/>
-                <c:pt idx="0">
-                  <c:v>Tiana</c:v>
-                </c:pt>
-              </c:strCache>
-            </c:strRef>
-          </c:tx>
-          <c:spPr>
-            <a:solidFill>
-              <a:schemeClr val="accent4">
-                <a:lumMod val="60000"/>
-              </a:schemeClr>
-            </a:solidFill>
-            <a:ln>
-              <a:noFill/>
-            </a:ln>
-            <a:effectLst/>
-          </c:spPr>
-          <c:invertIfNegative val="0"/>
-          <c:cat>
-            <c:strRef>
-              <c:f>Sheet1!$D$5</c:f>
-              <c:strCache>
-                <c:ptCount val="1"/>
-                <c:pt idx="0">
-                  <c:v>Total</c:v>
-                </c:pt>
-              </c:strCache>
-            </c:strRef>
-          </c:cat>
-          <c:val>
-            <c:numRef>
-              <c:f>Sheet1!$N$5</c:f>
-              <c:numCache>
-                <c:formatCode>General</c:formatCode>
-                <c:ptCount val="1"/>
-                <c:pt idx="0">
-                  <c:v>31</c:v>
-                </c:pt>
-              </c:numCache>
-            </c:numRef>
-          </c:val>
-          <c:extLst>
-            <c:ext xmlns:c16="http://schemas.microsoft.com/office/drawing/2014/chart" uri="{C3380CC4-5D6E-409C-BE32-E72D297353CC}">
-              <c16:uniqueId val="{00000009-FA90-41E1-81BD-5605301A03A7}"/>
+              <c16:uniqueId val="{00000000-A398-4CE2-97C1-3EB6AED67205}"/>
             </c:ext>
           </c:extLst>
         </c:ser>
@@ -8413,11 +6302,11 @@
         </c:dLbls>
         <c:gapWidth val="219"/>
         <c:overlap val="-27"/>
-        <c:axId val="220189679"/>
-        <c:axId val="215111391"/>
+        <c:axId val="1089768751"/>
+        <c:axId val="1086931887"/>
       </c:barChart>
       <c:catAx>
-        <c:axId val="220189679"/>
+        <c:axId val="1089768751"/>
         <c:scaling>
           <c:orientation val="minMax"/>
         </c:scaling>
@@ -8445,7 +6334,7 @@
           <a:lstStyle/>
           <a:p>
             <a:pPr>
-              <a:defRPr sz="900" b="0" i="0" u="none" strike="noStrike" kern="1200" baseline="0">
+              <a:defRPr sz="1600" b="0" i="0" u="none" strike="noStrike" kern="1200" baseline="0">
                 <a:solidFill>
                   <a:schemeClr val="tx1">
                     <a:lumMod val="65000"/>
@@ -8460,7 +6349,7 @@
             <a:endParaRPr lang="es-EC"/>
           </a:p>
         </c:txPr>
-        <c:crossAx val="215111391"/>
+        <c:crossAx val="1086931887"/>
         <c:crosses val="autoZero"/>
         <c:auto val="1"/>
         <c:lblAlgn val="ctr"/>
@@ -8468,7 +6357,7 @@
         <c:noMultiLvlLbl val="0"/>
       </c:catAx>
       <c:valAx>
-        <c:axId val="215111391"/>
+        <c:axId val="1086931887"/>
         <c:scaling>
           <c:orientation val="minMax"/>
         </c:scaling>
@@ -8519,7 +6408,7 @@
             <a:endParaRPr lang="es-EC"/>
           </a:p>
         </c:txPr>
-        <c:crossAx val="220189679"/>
+        <c:crossAx val="1089768751"/>
         <c:crosses val="autoZero"/>
         <c:crossBetween val="between"/>
       </c:valAx>
@@ -8531,37 +6420,6 @@
         <a:effectLst/>
       </c:spPr>
     </c:plotArea>
-    <c:legend>
-      <c:legendPos val="r"/>
-      <c:overlay val="0"/>
-      <c:spPr>
-        <a:noFill/>
-        <a:ln>
-          <a:noFill/>
-        </a:ln>
-        <a:effectLst/>
-      </c:spPr>
-      <c:txPr>
-        <a:bodyPr rot="0" spcFirstLastPara="1" vertOverflow="ellipsis" vert="horz" wrap="square" anchor="ctr" anchorCtr="1"/>
-        <a:lstStyle/>
-        <a:p>
-          <a:pPr>
-            <a:defRPr sz="1050" b="0" i="0" u="none" strike="noStrike" kern="1200" baseline="0">
-              <a:solidFill>
-                <a:schemeClr val="tx1">
-                  <a:lumMod val="65000"/>
-                  <a:lumOff val="35000"/>
-                </a:schemeClr>
-              </a:solidFill>
-              <a:latin typeface="+mn-lt"/>
-              <a:ea typeface="+mn-ea"/>
-              <a:cs typeface="+mn-cs"/>
-            </a:defRPr>
-          </a:pPr>
-          <a:endParaRPr lang="es-EC"/>
-        </a:p>
-      </c:txPr>
-    </c:legend>
     <c:plotVisOnly val="1"/>
     <c:dispBlanksAs val="gap"/>
     <c:extLst>
@@ -8599,7 +6457,6 @@
         <c14:dropZoneFilter val="1"/>
         <c14:dropZoneCategories val="1"/>
         <c14:dropZoneData val="1"/>
-        <c14:dropZoneSeries val="1"/>
       </c14:pivotOptions>
     </c:ext>
     <c:ext xmlns:c16="http://schemas.microsoft.com/office/drawing/2014/chart" uri="{E28EC0CA-F0BB-4C9C-879D-F8772B89E7AC}">
@@ -26737,7 +24594,12 @@
             <p:ph type="title"/>
           </p:nvPr>
         </p:nvSpPr>
-        <p:spPr/>
+        <p:spPr>
+          <a:xfrm>
+            <a:off x="1733478" y="608444"/>
+            <a:ext cx="9520158" cy="1049235"/>
+          </a:xfrm>
+        </p:spPr>
         <p:txBody>
           <a:bodyPr/>
           <a:lstStyle/>
@@ -26752,10 +24614,10 @@
       </p:sp>
       <p:graphicFrame>
         <p:nvGraphicFramePr>
-          <p:cNvPr id="3" name="Chart 2">
+          <p:cNvPr id="7" name="Chart 6">
             <a:extLst>
               <a:ext uri="{FF2B5EF4-FFF2-40B4-BE49-F238E27FC236}">
-                <a16:creationId xmlns:a16="http://schemas.microsoft.com/office/drawing/2014/main" id="{5E3E5EC7-FC3F-D76C-696F-1B595A6970E9}"/>
+                <a16:creationId xmlns:a16="http://schemas.microsoft.com/office/drawing/2014/main" id="{C233021B-AFB6-9B5A-7A69-CACFE412F13E}"/>
               </a:ext>
             </a:extLst>
           </p:cNvPr>
@@ -26765,14 +24627,14 @@
           <p:nvPr>
             <p:extLst>
               <p:ext uri="{D42A27DB-BD31-4B8C-83A1-F6EECF244321}">
-                <p14:modId xmlns:p14="http://schemas.microsoft.com/office/powerpoint/2010/main" val="3623068811"/>
+                <p14:modId xmlns:p14="http://schemas.microsoft.com/office/powerpoint/2010/main" val="2582276213"/>
               </p:ext>
             </p:extLst>
           </p:nvPr>
         </p:nvGraphicFramePr>
         <p:xfrm>
-          <a:off x="1290917" y="2205317"/>
-          <a:ext cx="10015369" cy="3504387"/>
+          <a:off x="1842052" y="1657679"/>
+          <a:ext cx="9024731" cy="3894981"/>
         </p:xfrm>
         <a:graphic>
           <a:graphicData uri="http://schemas.openxmlformats.org/drawingml/2006/chart">
@@ -26782,10 +24644,10 @@
       </p:graphicFrame>
       <p:sp>
         <p:nvSpPr>
-          <p:cNvPr id="4" name="TextBox 1">
+          <p:cNvPr id="8" name="TextBox 7">
             <a:extLst>
               <a:ext uri="{FF2B5EF4-FFF2-40B4-BE49-F238E27FC236}">
-                <a16:creationId xmlns:a16="http://schemas.microsoft.com/office/drawing/2014/main" id="{69B3AD3B-75B3-49F3-CF21-688B34495C09}"/>
+                <a16:creationId xmlns:a16="http://schemas.microsoft.com/office/drawing/2014/main" id="{35D3E51A-7358-C6B8-15DC-BF28C4C201C6}"/>
               </a:ext>
             </a:extLst>
           </p:cNvPr>
@@ -26793,87 +24655,26 @@
           <p:nvPr/>
         </p:nvSpPr>
         <p:spPr>
-          <a:xfrm>
-            <a:off x="5671474" y="1952856"/>
-            <a:ext cx="849052" cy="252461"/>
+          <a:xfrm rot="16200000">
+            <a:off x="1031224" y="3238578"/>
+            <a:ext cx="795130" cy="380843"/>
           </a:xfrm>
           <a:prstGeom prst="rect">
             <a:avLst/>
           </a:prstGeom>
+          <a:noFill/>
         </p:spPr>
         <p:txBody>
-          <a:bodyPr wrap="square" rtlCol="0"/>
-          <a:lstStyle>
-            <a:lvl1pPr marL="0" indent="0">
-              <a:defRPr sz="1100">
-                <a:latin typeface="+mn-lt"/>
-                <a:ea typeface="+mn-ea"/>
-                <a:cs typeface="+mn-cs"/>
-              </a:defRPr>
-            </a:lvl1pPr>
-            <a:lvl2pPr marL="457200" indent="0">
-              <a:defRPr sz="1100">
-                <a:latin typeface="+mn-lt"/>
-                <a:ea typeface="+mn-ea"/>
-                <a:cs typeface="+mn-cs"/>
-              </a:defRPr>
-            </a:lvl2pPr>
-            <a:lvl3pPr marL="914400" indent="0">
-              <a:defRPr sz="1100">
-                <a:latin typeface="+mn-lt"/>
-                <a:ea typeface="+mn-ea"/>
-                <a:cs typeface="+mn-cs"/>
-              </a:defRPr>
-            </a:lvl3pPr>
-            <a:lvl4pPr marL="1371600" indent="0">
-              <a:defRPr sz="1100">
-                <a:latin typeface="+mn-lt"/>
-                <a:ea typeface="+mn-ea"/>
-                <a:cs typeface="+mn-cs"/>
-              </a:defRPr>
-            </a:lvl4pPr>
-            <a:lvl5pPr marL="1828800" indent="0">
-              <a:defRPr sz="1100">
-                <a:latin typeface="+mn-lt"/>
-                <a:ea typeface="+mn-ea"/>
-                <a:cs typeface="+mn-cs"/>
-              </a:defRPr>
-            </a:lvl5pPr>
-            <a:lvl6pPr marL="2286000" indent="0">
-              <a:defRPr sz="1100">
-                <a:latin typeface="+mn-lt"/>
-                <a:ea typeface="+mn-ea"/>
-                <a:cs typeface="+mn-cs"/>
-              </a:defRPr>
-            </a:lvl6pPr>
-            <a:lvl7pPr marL="2743200" indent="0">
-              <a:defRPr sz="1100">
-                <a:latin typeface="+mn-lt"/>
-                <a:ea typeface="+mn-ea"/>
-                <a:cs typeface="+mn-cs"/>
-              </a:defRPr>
-            </a:lvl7pPr>
-            <a:lvl8pPr marL="3200400" indent="0">
-              <a:defRPr sz="1100">
-                <a:latin typeface="+mn-lt"/>
-                <a:ea typeface="+mn-ea"/>
-                <a:cs typeface="+mn-cs"/>
-              </a:defRPr>
-            </a:lvl8pPr>
-            <a:lvl9pPr marL="3657600" indent="0">
-              <a:defRPr sz="1100">
-                <a:latin typeface="+mn-lt"/>
-                <a:ea typeface="+mn-ea"/>
-                <a:cs typeface="+mn-cs"/>
-              </a:defRPr>
-            </a:lvl9pPr>
-          </a:lstStyle>
+          <a:bodyPr wrap="square" rtlCol="0">
+            <a:spAutoFit/>
+          </a:bodyPr>
+          <a:lstStyle/>
           <a:p>
             <a:r>
-              <a:rPr lang="es-MX" sz="1100" dirty="0"/>
-              <a:t>HORAS:</a:t>
+              <a:rPr lang="es-MX" dirty="0"/>
+              <a:t>DIAS</a:t>
             </a:r>
-            <a:endParaRPr lang="es-EC" sz="1100" dirty="0"/>
+            <a:endParaRPr lang="es-EC" dirty="0"/>
           </a:p>
         </p:txBody>
       </p:sp>

</xml_diff>

<commit_message>
before ana help with timeinandtimeout
</commit_message>
<xml_diff>
--- a/excel_reports/IPApresentacion.pptx
+++ b/excel_reports/IPApresentacion.pptx
@@ -5572,6 +5572,17 @@
             <a:noFill/>
           </a:ln>
           <a:effectLst/>
+          <a:scene3d>
+            <a:camera prst="orthographicFront">
+              <a:rot lat="0" lon="0" rev="0"/>
+            </a:camera>
+            <a:lightRig rig="balanced" dir="t">
+              <a:rot lat="0" lon="0" rev="1080000"/>
+            </a:lightRig>
+          </a:scene3d>
+          <a:sp3d>
+            <a:bevelT w="38100" h="12700" prst="softRound"/>
+          </a:sp3d>
         </c:spPr>
         <c:marker>
           <c:symbol val="none"/>
@@ -5628,6 +5639,17 @@
             <a:noFill/>
           </a:ln>
           <a:effectLst/>
+          <a:scene3d>
+            <a:camera prst="orthographicFront">
+              <a:rot lat="0" lon="0" rev="0"/>
+            </a:camera>
+            <a:lightRig rig="balanced" dir="t">
+              <a:rot lat="0" lon="0" rev="1080000"/>
+            </a:lightRig>
+          </a:scene3d>
+          <a:sp3d>
+            <a:bevelT w="38100" h="12700" prst="softRound"/>
+          </a:sp3d>
         </c:spPr>
         <c:marker>
           <c:symbol val="none"/>
@@ -5684,6 +5706,17 @@
             <a:noFill/>
           </a:ln>
           <a:effectLst/>
+          <a:scene3d>
+            <a:camera prst="orthographicFront">
+              <a:rot lat="0" lon="0" rev="0"/>
+            </a:camera>
+            <a:lightRig rig="balanced" dir="t">
+              <a:rot lat="0" lon="0" rev="1080000"/>
+            </a:lightRig>
+          </a:scene3d>
+          <a:sp3d>
+            <a:bevelT w="38100" h="12700" prst="softRound"/>
+          </a:sp3d>
         </c:spPr>
         <c:marker>
           <c:symbol val="none"/>
@@ -5740,6 +5773,17 @@
             <a:noFill/>
           </a:ln>
           <a:effectLst/>
+          <a:scene3d>
+            <a:camera prst="orthographicFront">
+              <a:rot lat="0" lon="0" rev="0"/>
+            </a:camera>
+            <a:lightRig rig="balanced" dir="t">
+              <a:rot lat="0" lon="0" rev="1080000"/>
+            </a:lightRig>
+          </a:scene3d>
+          <a:sp3d>
+            <a:bevelT w="38100" h="12700" prst="softRound"/>
+          </a:sp3d>
         </c:spPr>
         <c:marker>
           <c:symbol val="none"/>
@@ -5796,6 +5840,17 @@
             <a:noFill/>
           </a:ln>
           <a:effectLst/>
+          <a:scene3d>
+            <a:camera prst="orthographicFront">
+              <a:rot lat="0" lon="0" rev="0"/>
+            </a:camera>
+            <a:lightRig rig="balanced" dir="t">
+              <a:rot lat="0" lon="0" rev="1080000"/>
+            </a:lightRig>
+          </a:scene3d>
+          <a:sp3d>
+            <a:bevelT w="38100" h="12700" prst="softRound"/>
+          </a:sp3d>
         </c:spPr>
         <c:marker>
           <c:symbol val="none"/>
@@ -5852,6 +5907,17 @@
             <a:noFill/>
           </a:ln>
           <a:effectLst/>
+          <a:scene3d>
+            <a:camera prst="orthographicFront">
+              <a:rot lat="0" lon="0" rev="0"/>
+            </a:camera>
+            <a:lightRig rig="balanced" dir="t">
+              <a:rot lat="0" lon="0" rev="1080000"/>
+            </a:lightRig>
+          </a:scene3d>
+          <a:sp3d>
+            <a:bevelT w="38100" h="12700" prst="softRound"/>
+          </a:sp3d>
         </c:spPr>
         <c:marker>
           <c:symbol val="none"/>
@@ -5908,6 +5974,17 @@
             <a:noFill/>
           </a:ln>
           <a:effectLst/>
+          <a:scene3d>
+            <a:camera prst="orthographicFront">
+              <a:rot lat="0" lon="0" rev="0"/>
+            </a:camera>
+            <a:lightRig rig="balanced" dir="t">
+              <a:rot lat="0" lon="0" rev="1080000"/>
+            </a:lightRig>
+          </a:scene3d>
+          <a:sp3d>
+            <a:bevelT w="38100" h="12700" prst="softRound"/>
+          </a:sp3d>
         </c:spPr>
         <c:marker>
           <c:symbol val="none"/>
@@ -5964,6 +6041,17 @@
             <a:noFill/>
           </a:ln>
           <a:effectLst/>
+          <a:scene3d>
+            <a:camera prst="orthographicFront">
+              <a:rot lat="0" lon="0" rev="0"/>
+            </a:camera>
+            <a:lightRig rig="balanced" dir="t">
+              <a:rot lat="0" lon="0" rev="1080000"/>
+            </a:lightRig>
+          </a:scene3d>
+          <a:sp3d>
+            <a:bevelT w="38100" h="12700" prst="softRound"/>
+          </a:sp3d>
         </c:spPr>
         <c:marker>
           <c:symbol val="none"/>
@@ -6020,6 +6108,17 @@
             <a:noFill/>
           </a:ln>
           <a:effectLst/>
+          <a:scene3d>
+            <a:camera prst="orthographicFront">
+              <a:rot lat="0" lon="0" rev="0"/>
+            </a:camera>
+            <a:lightRig rig="balanced" dir="t">
+              <a:rot lat="0" lon="0" rev="1080000"/>
+            </a:lightRig>
+          </a:scene3d>
+          <a:sp3d>
+            <a:bevelT w="38100" h="12700" prst="softRound"/>
+          </a:sp3d>
         </c:spPr>
         <c:marker>
           <c:symbol val="none"/>
@@ -6076,6 +6175,17 @@
             <a:noFill/>
           </a:ln>
           <a:effectLst/>
+          <a:scene3d>
+            <a:camera prst="orthographicFront">
+              <a:rot lat="0" lon="0" rev="0"/>
+            </a:camera>
+            <a:lightRig rig="balanced" dir="t">
+              <a:rot lat="0" lon="0" rev="1080000"/>
+            </a:lightRig>
+          </a:scene3d>
+          <a:sp3d>
+            <a:bevelT w="38100" h="12700" prst="softRound"/>
+          </a:sp3d>
         </c:spPr>
         <c:marker>
           <c:symbol val="none"/>
@@ -6132,6 +6242,17 @@
             <a:noFill/>
           </a:ln>
           <a:effectLst/>
+          <a:scene3d>
+            <a:camera prst="orthographicFront">
+              <a:rot lat="0" lon="0" rev="0"/>
+            </a:camera>
+            <a:lightRig rig="balanced" dir="t">
+              <a:rot lat="0" lon="0" rev="1080000"/>
+            </a:lightRig>
+          </a:scene3d>
+          <a:sp3d>
+            <a:bevelT w="38100" h="12700" prst="softRound"/>
+          </a:sp3d>
         </c:spPr>
         <c:marker>
           <c:symbol val="none"/>
@@ -6200,13 +6321,53 @@
             </c:strRef>
           </c:tx>
           <c:spPr>
-            <a:solidFill>
-              <a:schemeClr val="accent1"/>
-            </a:solidFill>
+            <a:gradFill rotWithShape="1">
+              <a:gsLst>
+                <a:gs pos="0">
+                  <a:schemeClr val="accent1">
+                    <a:tint val="98000"/>
+                    <a:satMod val="110000"/>
+                    <a:lumMod val="104000"/>
+                  </a:schemeClr>
+                </a:gs>
+                <a:gs pos="69000">
+                  <a:schemeClr val="accent1">
+                    <a:shade val="88000"/>
+                    <a:satMod val="130000"/>
+                    <a:lumMod val="92000"/>
+                  </a:schemeClr>
+                </a:gs>
+                <a:gs pos="100000">
+                  <a:schemeClr val="accent1">
+                    <a:shade val="78000"/>
+                    <a:satMod val="130000"/>
+                    <a:lumMod val="92000"/>
+                  </a:schemeClr>
+                </a:gs>
+              </a:gsLst>
+              <a:lin ang="5400000" scaled="0"/>
+            </a:gradFill>
             <a:ln>
               <a:noFill/>
             </a:ln>
-            <a:effectLst/>
+            <a:effectLst>
+              <a:outerShdw blurRad="50800" dist="50800" dir="5400000" sx="96000" sy="96000" rotWithShape="0">
+                <a:srgbClr val="000000">
+                  <a:alpha val="48000"/>
+                </a:srgbClr>
+              </a:outerShdw>
+            </a:effectLst>
+            <a:scene3d>
+              <a:camera prst="orthographicFront">
+                <a:rot lat="0" lon="0" rev="0"/>
+              </a:camera>
+              <a:lightRig rig="balanced" dir="t">
+                <a:rot lat="0" lon="0" rev="1080000"/>
+              </a:lightRig>
+            </a:scene3d>
+            <a:sp3d>
+              <a:bevelT w="38100" h="12700" prst="softRound"/>
+            </a:sp3d>
           </c:spPr>
           <c:invertIfNegative val="0"/>
           <c:cat>
@@ -6300,8 +6461,8 @@
           <c:showPercent val="0"/>
           <c:showBubbleSize val="0"/>
         </c:dLbls>
-        <c:gapWidth val="219"/>
-        <c:overlap val="-27"/>
+        <c:gapWidth val="100"/>
+        <c:overlap val="-24"/>
         <c:axId val="1089768751"/>
         <c:axId val="1086931887"/>
       </c:barChart>
@@ -6318,11 +6479,11 @@
         <c:tickLblPos val="nextTo"/>
         <c:spPr>
           <a:noFill/>
-          <a:ln w="9525" cap="flat" cmpd="sng" algn="ctr">
+          <a:ln w="12700" cap="flat" cmpd="sng" algn="ctr">
             <a:solidFill>
-              <a:schemeClr val="tx1">
-                <a:lumMod val="15000"/>
-                <a:lumOff val="85000"/>
+              <a:schemeClr val="lt1">
+                <a:lumMod val="95000"/>
+                <a:alpha val="54000"/>
               </a:schemeClr>
             </a:solidFill>
             <a:round/>
@@ -6336,9 +6497,8 @@
             <a:pPr>
               <a:defRPr sz="1600" b="0" i="0" u="none" strike="noStrike" kern="1200" baseline="0">
                 <a:solidFill>
-                  <a:schemeClr val="tx1">
-                    <a:lumMod val="65000"/>
-                    <a:lumOff val="35000"/>
+                  <a:schemeClr val="lt1">
+                    <a:lumMod val="85000"/>
                   </a:schemeClr>
                 </a:solidFill>
                 <a:latin typeface="+mn-lt"/>
@@ -6367,9 +6527,9 @@
           <c:spPr>
             <a:ln w="9525" cap="flat" cmpd="sng" algn="ctr">
               <a:solidFill>
-                <a:schemeClr val="tx1">
-                  <a:lumMod val="15000"/>
-                  <a:lumOff val="85000"/>
+                <a:schemeClr val="lt1">
+                  <a:lumMod val="95000"/>
+                  <a:alpha val="10000"/>
                 </a:schemeClr>
               </a:solidFill>
               <a:round/>
@@ -6393,11 +6553,10 @@
           <a:lstStyle/>
           <a:p>
             <a:pPr>
-              <a:defRPr sz="900" b="0" i="0" u="none" strike="noStrike" kern="1200" baseline="0">
+              <a:defRPr sz="1197" b="0" i="0" u="none" strike="noStrike" kern="1200" baseline="0">
                 <a:solidFill>
-                  <a:schemeClr val="tx1">
-                    <a:lumMod val="65000"/>
-                    <a:lumOff val="35000"/>
+                  <a:schemeClr val="lt1">
+                    <a:lumMod val="85000"/>
                   </a:schemeClr>
                 </a:solidFill>
                 <a:latin typeface="+mn-lt"/>
@@ -6432,7 +6591,26 @@
     <c:showDLblsOverMax val="0"/>
   </c:chart>
   <c:spPr>
-    <a:noFill/>
+    <a:gradFill flip="none" rotWithShape="1">
+      <a:gsLst>
+        <a:gs pos="0">
+          <a:schemeClr val="dk1">
+            <a:lumMod val="65000"/>
+            <a:lumOff val="35000"/>
+          </a:schemeClr>
+        </a:gs>
+        <a:gs pos="100000">
+          <a:schemeClr val="dk1">
+            <a:lumMod val="85000"/>
+            <a:lumOff val="15000"/>
+          </a:schemeClr>
+        </a:gs>
+      </a:gsLst>
+      <a:path path="circle">
+        <a:fillToRect l="50000" t="50000" r="50000" b="50000"/>
+      </a:path>
+      <a:tileRect/>
+    </a:gradFill>
     <a:ln>
       <a:noFill/>
     </a:ln>
@@ -6498,6 +6676,17 @@
             <a:noFill/>
           </a:ln>
           <a:effectLst/>
+          <a:scene3d>
+            <a:camera prst="orthographicFront">
+              <a:rot lat="0" lon="0" rev="0"/>
+            </a:camera>
+            <a:lightRig rig="balanced" dir="t">
+              <a:rot lat="0" lon="0" rev="1080000"/>
+            </a:lightRig>
+          </a:scene3d>
+          <a:sp3d>
+            <a:bevelT w="38100" h="12700" prst="softRound"/>
+          </a:sp3d>
         </c:spPr>
         <c:marker>
           <c:symbol val="none"/>
@@ -6554,6 +6743,17 @@
             <a:noFill/>
           </a:ln>
           <a:effectLst/>
+          <a:scene3d>
+            <a:camera prst="orthographicFront">
+              <a:rot lat="0" lon="0" rev="0"/>
+            </a:camera>
+            <a:lightRig rig="balanced" dir="t">
+              <a:rot lat="0" lon="0" rev="1080000"/>
+            </a:lightRig>
+          </a:scene3d>
+          <a:sp3d>
+            <a:bevelT w="38100" h="12700" prst="softRound"/>
+          </a:sp3d>
         </c:spPr>
         <c:marker>
           <c:symbol val="none"/>
@@ -6610,6 +6810,17 @@
             <a:noFill/>
           </a:ln>
           <a:effectLst/>
+          <a:scene3d>
+            <a:camera prst="orthographicFront">
+              <a:rot lat="0" lon="0" rev="0"/>
+            </a:camera>
+            <a:lightRig rig="balanced" dir="t">
+              <a:rot lat="0" lon="0" rev="1080000"/>
+            </a:lightRig>
+          </a:scene3d>
+          <a:sp3d>
+            <a:bevelT w="38100" h="12700" prst="softRound"/>
+          </a:sp3d>
         </c:spPr>
         <c:marker>
           <c:symbol val="none"/>
@@ -6666,6 +6877,17 @@
             <a:noFill/>
           </a:ln>
           <a:effectLst/>
+          <a:scene3d>
+            <a:camera prst="orthographicFront">
+              <a:rot lat="0" lon="0" rev="0"/>
+            </a:camera>
+            <a:lightRig rig="balanced" dir="t">
+              <a:rot lat="0" lon="0" rev="1080000"/>
+            </a:lightRig>
+          </a:scene3d>
+          <a:sp3d>
+            <a:bevelT w="38100" h="12700" prst="softRound"/>
+          </a:sp3d>
         </c:spPr>
         <c:marker>
           <c:symbol val="none"/>
@@ -6722,6 +6944,17 @@
             <a:noFill/>
           </a:ln>
           <a:effectLst/>
+          <a:scene3d>
+            <a:camera prst="orthographicFront">
+              <a:rot lat="0" lon="0" rev="0"/>
+            </a:camera>
+            <a:lightRig rig="balanced" dir="t">
+              <a:rot lat="0" lon="0" rev="1080000"/>
+            </a:lightRig>
+          </a:scene3d>
+          <a:sp3d>
+            <a:bevelT w="38100" h="12700" prst="softRound"/>
+          </a:sp3d>
         </c:spPr>
         <c:marker>
           <c:symbol val="none"/>
@@ -6778,6 +7011,17 @@
             <a:noFill/>
           </a:ln>
           <a:effectLst/>
+          <a:scene3d>
+            <a:camera prst="orthographicFront">
+              <a:rot lat="0" lon="0" rev="0"/>
+            </a:camera>
+            <a:lightRig rig="balanced" dir="t">
+              <a:rot lat="0" lon="0" rev="1080000"/>
+            </a:lightRig>
+          </a:scene3d>
+          <a:sp3d>
+            <a:bevelT w="38100" h="12700" prst="softRound"/>
+          </a:sp3d>
         </c:spPr>
         <c:marker>
           <c:symbol val="none"/>
@@ -6834,6 +7078,17 @@
             <a:noFill/>
           </a:ln>
           <a:effectLst/>
+          <a:scene3d>
+            <a:camera prst="orthographicFront">
+              <a:rot lat="0" lon="0" rev="0"/>
+            </a:camera>
+            <a:lightRig rig="balanced" dir="t">
+              <a:rot lat="0" lon="0" rev="1080000"/>
+            </a:lightRig>
+          </a:scene3d>
+          <a:sp3d>
+            <a:bevelT w="38100" h="12700" prst="softRound"/>
+          </a:sp3d>
         </c:spPr>
         <c:marker>
           <c:symbol val="none"/>
@@ -6890,6 +7145,17 @@
             <a:noFill/>
           </a:ln>
           <a:effectLst/>
+          <a:scene3d>
+            <a:camera prst="orthographicFront">
+              <a:rot lat="0" lon="0" rev="0"/>
+            </a:camera>
+            <a:lightRig rig="balanced" dir="t">
+              <a:rot lat="0" lon="0" rev="1080000"/>
+            </a:lightRig>
+          </a:scene3d>
+          <a:sp3d>
+            <a:bevelT w="38100" h="12700" prst="softRound"/>
+          </a:sp3d>
         </c:spPr>
         <c:marker>
           <c:symbol val="none"/>
@@ -6946,6 +7212,17 @@
             <a:noFill/>
           </a:ln>
           <a:effectLst/>
+          <a:scene3d>
+            <a:camera prst="orthographicFront">
+              <a:rot lat="0" lon="0" rev="0"/>
+            </a:camera>
+            <a:lightRig rig="balanced" dir="t">
+              <a:rot lat="0" lon="0" rev="1080000"/>
+            </a:lightRig>
+          </a:scene3d>
+          <a:sp3d>
+            <a:bevelT w="38100" h="12700" prst="softRound"/>
+          </a:sp3d>
         </c:spPr>
         <c:marker>
           <c:symbol val="none"/>
@@ -7002,6 +7279,17 @@
             <a:noFill/>
           </a:ln>
           <a:effectLst/>
+          <a:scene3d>
+            <a:camera prst="orthographicFront">
+              <a:rot lat="0" lon="0" rev="0"/>
+            </a:camera>
+            <a:lightRig rig="balanced" dir="t">
+              <a:rot lat="0" lon="0" rev="1080000"/>
+            </a:lightRig>
+          </a:scene3d>
+          <a:sp3d>
+            <a:bevelT w="38100" h="12700" prst="softRound"/>
+          </a:sp3d>
         </c:spPr>
         <c:marker>
           <c:symbol val="none"/>
@@ -7058,6 +7346,17 @@
             <a:noFill/>
           </a:ln>
           <a:effectLst/>
+          <a:scene3d>
+            <a:camera prst="orthographicFront">
+              <a:rot lat="0" lon="0" rev="0"/>
+            </a:camera>
+            <a:lightRig rig="balanced" dir="t">
+              <a:rot lat="0" lon="0" rev="1080000"/>
+            </a:lightRig>
+          </a:scene3d>
+          <a:sp3d>
+            <a:bevelT w="38100" h="12700" prst="softRound"/>
+          </a:sp3d>
         </c:spPr>
         <c:marker>
           <c:symbol val="none"/>
@@ -7114,6 +7413,17 @@
             <a:noFill/>
           </a:ln>
           <a:effectLst/>
+          <a:scene3d>
+            <a:camera prst="orthographicFront">
+              <a:rot lat="0" lon="0" rev="0"/>
+            </a:camera>
+            <a:lightRig rig="balanced" dir="t">
+              <a:rot lat="0" lon="0" rev="1080000"/>
+            </a:lightRig>
+          </a:scene3d>
+          <a:sp3d>
+            <a:bevelT w="38100" h="12700" prst="softRound"/>
+          </a:sp3d>
         </c:spPr>
         <c:marker>
           <c:symbol val="none"/>
@@ -7170,6 +7480,17 @@
             <a:noFill/>
           </a:ln>
           <a:effectLst/>
+          <a:scene3d>
+            <a:camera prst="orthographicFront">
+              <a:rot lat="0" lon="0" rev="0"/>
+            </a:camera>
+            <a:lightRig rig="balanced" dir="t">
+              <a:rot lat="0" lon="0" rev="1080000"/>
+            </a:lightRig>
+          </a:scene3d>
+          <a:sp3d>
+            <a:bevelT w="38100" h="12700" prst="softRound"/>
+          </a:sp3d>
         </c:spPr>
         <c:marker>
           <c:symbol val="none"/>
@@ -7226,6 +7547,17 @@
             <a:noFill/>
           </a:ln>
           <a:effectLst/>
+          <a:scene3d>
+            <a:camera prst="orthographicFront">
+              <a:rot lat="0" lon="0" rev="0"/>
+            </a:camera>
+            <a:lightRig rig="balanced" dir="t">
+              <a:rot lat="0" lon="0" rev="1080000"/>
+            </a:lightRig>
+          </a:scene3d>
+          <a:sp3d>
+            <a:bevelT w="38100" h="12700" prst="softRound"/>
+          </a:sp3d>
         </c:spPr>
         <c:marker>
           <c:symbol val="none"/>
@@ -7282,6 +7614,17 @@
             <a:noFill/>
           </a:ln>
           <a:effectLst/>
+          <a:scene3d>
+            <a:camera prst="orthographicFront">
+              <a:rot lat="0" lon="0" rev="0"/>
+            </a:camera>
+            <a:lightRig rig="balanced" dir="t">
+              <a:rot lat="0" lon="0" rev="1080000"/>
+            </a:lightRig>
+          </a:scene3d>
+          <a:sp3d>
+            <a:bevelT w="38100" h="12700" prst="softRound"/>
+          </a:sp3d>
         </c:spPr>
         <c:marker>
           <c:symbol val="none"/>
@@ -7338,6 +7681,17 @@
             <a:noFill/>
           </a:ln>
           <a:effectLst/>
+          <a:scene3d>
+            <a:camera prst="orthographicFront">
+              <a:rot lat="0" lon="0" rev="0"/>
+            </a:camera>
+            <a:lightRig rig="balanced" dir="t">
+              <a:rot lat="0" lon="0" rev="1080000"/>
+            </a:lightRig>
+          </a:scene3d>
+          <a:sp3d>
+            <a:bevelT w="38100" h="12700" prst="softRound"/>
+          </a:sp3d>
         </c:spPr>
         <c:marker>
           <c:symbol val="none"/>
@@ -7394,6 +7748,17 @@
             <a:noFill/>
           </a:ln>
           <a:effectLst/>
+          <a:scene3d>
+            <a:camera prst="orthographicFront">
+              <a:rot lat="0" lon="0" rev="0"/>
+            </a:camera>
+            <a:lightRig rig="balanced" dir="t">
+              <a:rot lat="0" lon="0" rev="1080000"/>
+            </a:lightRig>
+          </a:scene3d>
+          <a:sp3d>
+            <a:bevelT w="38100" h="12700" prst="softRound"/>
+          </a:sp3d>
         </c:spPr>
         <c:marker>
           <c:symbol val="none"/>
@@ -7450,6 +7815,17 @@
             <a:noFill/>
           </a:ln>
           <a:effectLst/>
+          <a:scene3d>
+            <a:camera prst="orthographicFront">
+              <a:rot lat="0" lon="0" rev="0"/>
+            </a:camera>
+            <a:lightRig rig="balanced" dir="t">
+              <a:rot lat="0" lon="0" rev="1080000"/>
+            </a:lightRig>
+          </a:scene3d>
+          <a:sp3d>
+            <a:bevelT w="38100" h="12700" prst="softRound"/>
+          </a:sp3d>
         </c:spPr>
         <c:marker>
           <c:symbol val="none"/>
@@ -7506,6 +7882,17 @@
             <a:noFill/>
           </a:ln>
           <a:effectLst/>
+          <a:scene3d>
+            <a:camera prst="orthographicFront">
+              <a:rot lat="0" lon="0" rev="0"/>
+            </a:camera>
+            <a:lightRig rig="balanced" dir="t">
+              <a:rot lat="0" lon="0" rev="1080000"/>
+            </a:lightRig>
+          </a:scene3d>
+          <a:sp3d>
+            <a:bevelT w="38100" h="12700" prst="softRound"/>
+          </a:sp3d>
         </c:spPr>
         <c:marker>
           <c:symbol val="none"/>
@@ -7562,6 +7949,17 @@
             <a:noFill/>
           </a:ln>
           <a:effectLst/>
+          <a:scene3d>
+            <a:camera prst="orthographicFront">
+              <a:rot lat="0" lon="0" rev="0"/>
+            </a:camera>
+            <a:lightRig rig="balanced" dir="t">
+              <a:rot lat="0" lon="0" rev="1080000"/>
+            </a:lightRig>
+          </a:scene3d>
+          <a:sp3d>
+            <a:bevelT w="38100" h="12700" prst="softRound"/>
+          </a:sp3d>
         </c:spPr>
         <c:marker>
           <c:symbol val="none"/>
@@ -7618,6 +8016,17 @@
             <a:noFill/>
           </a:ln>
           <a:effectLst/>
+          <a:scene3d>
+            <a:camera prst="orthographicFront">
+              <a:rot lat="0" lon="0" rev="0"/>
+            </a:camera>
+            <a:lightRig rig="balanced" dir="t">
+              <a:rot lat="0" lon="0" rev="1080000"/>
+            </a:lightRig>
+          </a:scene3d>
+          <a:sp3d>
+            <a:bevelT w="38100" h="12700" prst="softRound"/>
+          </a:sp3d>
         </c:spPr>
         <c:marker>
           <c:symbol val="none"/>
@@ -7674,6 +8083,17 @@
             <a:noFill/>
           </a:ln>
           <a:effectLst/>
+          <a:scene3d>
+            <a:camera prst="orthographicFront">
+              <a:rot lat="0" lon="0" rev="0"/>
+            </a:camera>
+            <a:lightRig rig="balanced" dir="t">
+              <a:rot lat="0" lon="0" rev="1080000"/>
+            </a:lightRig>
+          </a:scene3d>
+          <a:sp3d>
+            <a:bevelT w="38100" h="12700" prst="softRound"/>
+          </a:sp3d>
         </c:spPr>
         <c:marker>
           <c:symbol val="none"/>
@@ -7730,6 +8150,17 @@
             <a:noFill/>
           </a:ln>
           <a:effectLst/>
+          <a:scene3d>
+            <a:camera prst="orthographicFront">
+              <a:rot lat="0" lon="0" rev="0"/>
+            </a:camera>
+            <a:lightRig rig="balanced" dir="t">
+              <a:rot lat="0" lon="0" rev="1080000"/>
+            </a:lightRig>
+          </a:scene3d>
+          <a:sp3d>
+            <a:bevelT w="38100" h="12700" prst="softRound"/>
+          </a:sp3d>
         </c:spPr>
         <c:marker>
           <c:symbol val="none"/>
@@ -7786,6 +8217,17 @@
             <a:noFill/>
           </a:ln>
           <a:effectLst/>
+          <a:scene3d>
+            <a:camera prst="orthographicFront">
+              <a:rot lat="0" lon="0" rev="0"/>
+            </a:camera>
+            <a:lightRig rig="balanced" dir="t">
+              <a:rot lat="0" lon="0" rev="1080000"/>
+            </a:lightRig>
+          </a:scene3d>
+          <a:sp3d>
+            <a:bevelT w="38100" h="12700" prst="softRound"/>
+          </a:sp3d>
         </c:spPr>
         <c:marker>
           <c:symbol val="none"/>
@@ -7854,13 +8296,53 @@
             </c:strRef>
           </c:tx>
           <c:spPr>
-            <a:solidFill>
-              <a:schemeClr val="accent1"/>
-            </a:solidFill>
+            <a:gradFill rotWithShape="1">
+              <a:gsLst>
+                <a:gs pos="0">
+                  <a:schemeClr val="accent1">
+                    <a:tint val="98000"/>
+                    <a:satMod val="110000"/>
+                    <a:lumMod val="104000"/>
+                  </a:schemeClr>
+                </a:gs>
+                <a:gs pos="69000">
+                  <a:schemeClr val="accent1">
+                    <a:shade val="88000"/>
+                    <a:satMod val="130000"/>
+                    <a:lumMod val="92000"/>
+                  </a:schemeClr>
+                </a:gs>
+                <a:gs pos="100000">
+                  <a:schemeClr val="accent1">
+                    <a:shade val="78000"/>
+                    <a:satMod val="130000"/>
+                    <a:lumMod val="92000"/>
+                  </a:schemeClr>
+                </a:gs>
+              </a:gsLst>
+              <a:lin ang="5400000" scaled="0"/>
+            </a:gradFill>
             <a:ln>
               <a:noFill/>
             </a:ln>
-            <a:effectLst/>
+            <a:effectLst>
+              <a:outerShdw blurRad="50800" dist="50800" dir="5400000" sx="96000" sy="96000" rotWithShape="0">
+                <a:srgbClr val="000000">
+                  <a:alpha val="48000"/>
+                </a:srgbClr>
+              </a:outerShdw>
+            </a:effectLst>
+            <a:scene3d>
+              <a:camera prst="orthographicFront">
+                <a:rot lat="0" lon="0" rev="0"/>
+              </a:camera>
+              <a:lightRig rig="balanced" dir="t">
+                <a:rot lat="0" lon="0" rev="1080000"/>
+              </a:lightRig>
+            </a:scene3d>
+            <a:sp3d>
+              <a:bevelT w="38100" h="12700" prst="softRound"/>
+            </a:sp3d>
           </c:spPr>
           <c:invertIfNegative val="0"/>
           <c:cat>
@@ -7967,7 +8449,24 @@
             <a:ln>
               <a:noFill/>
             </a:ln>
-            <a:effectLst/>
+            <a:effectLst>
+              <a:outerShdw blurRad="50800" dist="50800" dir="5400000" sx="96000" sy="96000" rotWithShape="0">
+                <a:srgbClr val="000000">
+                  <a:alpha val="48000"/>
+                </a:srgbClr>
+              </a:outerShdw>
+            </a:effectLst>
+            <a:scene3d>
+              <a:camera prst="orthographicFront">
+                <a:rot lat="0" lon="0" rev="0"/>
+              </a:camera>
+              <a:lightRig rig="balanced" dir="t">
+                <a:rot lat="0" lon="0" rev="1080000"/>
+              </a:lightRig>
+            </a:scene3d>
+            <a:sp3d>
+              <a:bevelT w="38100" h="12700" prst="softRound"/>
+            </a:sp3d>
           </c:spPr>
           <c:invertIfNegative val="0"/>
           <c:cat>
@@ -8061,8 +8560,8 @@
           <c:showPercent val="0"/>
           <c:showBubbleSize val="0"/>
         </c:dLbls>
-        <c:gapWidth val="219"/>
-        <c:overlap val="-27"/>
+        <c:gapWidth val="100"/>
+        <c:overlap val="-24"/>
         <c:axId val="931096159"/>
         <c:axId val="925453023"/>
       </c:barChart>
@@ -8079,11 +8578,11 @@
         <c:tickLblPos val="nextTo"/>
         <c:spPr>
           <a:noFill/>
-          <a:ln w="9525" cap="flat" cmpd="sng" algn="ctr">
+          <a:ln w="12700" cap="flat" cmpd="sng" algn="ctr">
             <a:solidFill>
-              <a:schemeClr val="tx1">
-                <a:lumMod val="15000"/>
-                <a:lumOff val="85000"/>
+              <a:schemeClr val="lt1">
+                <a:lumMod val="95000"/>
+                <a:alpha val="54000"/>
               </a:schemeClr>
             </a:solidFill>
             <a:round/>
@@ -8095,11 +8594,10 @@
           <a:lstStyle/>
           <a:p>
             <a:pPr>
-              <a:defRPr sz="900" b="0" i="0" u="none" strike="noStrike" kern="1200" baseline="0">
+              <a:defRPr sz="1197" b="0" i="0" u="none" strike="noStrike" kern="1200" baseline="0">
                 <a:solidFill>
-                  <a:schemeClr val="tx1">
-                    <a:lumMod val="65000"/>
-                    <a:lumOff val="35000"/>
+                  <a:schemeClr val="lt1">
+                    <a:lumMod val="85000"/>
                   </a:schemeClr>
                 </a:solidFill>
                 <a:latin typeface="+mn-lt"/>
@@ -8128,9 +8626,9 @@
           <c:spPr>
             <a:ln w="9525" cap="flat" cmpd="sng" algn="ctr">
               <a:solidFill>
-                <a:schemeClr val="tx1">
-                  <a:lumMod val="15000"/>
-                  <a:lumOff val="85000"/>
+                <a:schemeClr val="lt1">
+                  <a:lumMod val="95000"/>
+                  <a:alpha val="10000"/>
                 </a:schemeClr>
               </a:solidFill>
               <a:round/>
@@ -8154,11 +8652,10 @@
           <a:lstStyle/>
           <a:p>
             <a:pPr>
-              <a:defRPr sz="900" b="0" i="0" u="none" strike="noStrike" kern="1200" baseline="0">
+              <a:defRPr sz="1197" b="0" i="0" u="none" strike="noStrike" kern="1200" baseline="0">
                 <a:solidFill>
-                  <a:schemeClr val="tx1">
-                    <a:lumMod val="65000"/>
-                    <a:lumOff val="35000"/>
+                  <a:schemeClr val="lt1">
+                    <a:lumMod val="85000"/>
                   </a:schemeClr>
                 </a:solidFill>
                 <a:latin typeface="+mn-lt"/>
@@ -8196,11 +8693,10 @@
         <a:lstStyle/>
         <a:p>
           <a:pPr>
-            <a:defRPr sz="1200" b="0" i="0" u="none" strike="noStrike" kern="1200" baseline="0">
+            <a:defRPr sz="1197" b="0" i="0" u="none" strike="noStrike" kern="1200" baseline="0">
               <a:solidFill>
-                <a:schemeClr val="tx1">
-                  <a:lumMod val="65000"/>
-                  <a:lumOff val="35000"/>
+                <a:schemeClr val="lt1">
+                  <a:lumMod val="85000"/>
                 </a:schemeClr>
               </a:solidFill>
               <a:latin typeface="+mn-lt"/>
@@ -8224,7 +8720,26 @@
     <c:showDLblsOverMax val="0"/>
   </c:chart>
   <c:spPr>
-    <a:noFill/>
+    <a:gradFill flip="none" rotWithShape="1">
+      <a:gsLst>
+        <a:gs pos="0">
+          <a:schemeClr val="dk1">
+            <a:lumMod val="65000"/>
+            <a:lumOff val="35000"/>
+          </a:schemeClr>
+        </a:gs>
+        <a:gs pos="100000">
+          <a:schemeClr val="dk1">
+            <a:lumMod val="85000"/>
+            <a:lumOff val="15000"/>
+          </a:schemeClr>
+        </a:gs>
+      </a:gsLst>
+      <a:path path="circle">
+        <a:fillToRect l="50000" t="50000" r="50000" b="50000"/>
+      </a:path>
+      <a:tileRect/>
+    </a:gradFill>
     <a:ln>
       <a:noFill/>
     </a:ln>
@@ -18035,76 +18550,81 @@
 </file>
 
 <file path=ppt/charts/style3.xml><?xml version="1.0" encoding="utf-8"?>
-<cs:chartStyle xmlns:cs="http://schemas.microsoft.com/office/drawing/2012/chartStyle" xmlns:a="http://schemas.openxmlformats.org/drawingml/2006/main" id="201">
+<cs:chartStyle xmlns:cs="http://schemas.microsoft.com/office/drawing/2012/chartStyle" xmlns:a="http://schemas.openxmlformats.org/drawingml/2006/main" id="209">
   <cs:axisTitle>
     <cs:lnRef idx="0"/>
     <cs:fillRef idx="0"/>
     <cs:effectRef idx="0"/>
     <cs:fontRef idx="minor">
-      <a:schemeClr val="tx1">
-        <a:lumMod val="65000"/>
-        <a:lumOff val="35000"/>
+      <a:schemeClr val="lt1">
+        <a:lumMod val="85000"/>
       </a:schemeClr>
     </cs:fontRef>
-    <cs:defRPr sz="1000" kern="1200"/>
+    <cs:defRPr sz="1197" b="1" kern="1200" cap="all"/>
   </cs:axisTitle>
   <cs:categoryAxis>
     <cs:lnRef idx="0"/>
     <cs:fillRef idx="0"/>
     <cs:effectRef idx="0"/>
     <cs:fontRef idx="minor">
-      <a:schemeClr val="tx1">
-        <a:lumMod val="65000"/>
-        <a:lumOff val="35000"/>
+      <a:schemeClr val="lt1">
+        <a:lumMod val="85000"/>
       </a:schemeClr>
     </cs:fontRef>
     <cs:spPr>
-      <a:ln w="9525" cap="flat" cmpd="sng" algn="ctr">
+      <a:ln w="12700" cap="flat" cmpd="sng" algn="ctr">
         <a:solidFill>
-          <a:schemeClr val="tx1">
-            <a:lumMod val="15000"/>
-            <a:lumOff val="85000"/>
+          <a:schemeClr val="lt1">
+            <a:lumMod val="95000"/>
+            <a:alpha val="54000"/>
           </a:schemeClr>
         </a:solidFill>
         <a:round/>
       </a:ln>
     </cs:spPr>
-    <cs:defRPr sz="900" kern="1200"/>
+    <cs:defRPr sz="1197" kern="1200"/>
   </cs:categoryAxis>
-  <cs:chartArea mods="allowNoFillOverride allowNoLineOverride">
+  <cs:chartArea>
     <cs:lnRef idx="0"/>
     <cs:fillRef idx="0"/>
     <cs:effectRef idx="0"/>
     <cs:fontRef idx="minor">
-      <a:schemeClr val="tx1"/>
+      <a:schemeClr val="dk1"/>
     </cs:fontRef>
     <cs:spPr>
-      <a:solidFill>
-        <a:schemeClr val="bg1"/>
-      </a:solidFill>
-      <a:ln w="9525" cap="flat" cmpd="sng" algn="ctr">
-        <a:solidFill>
-          <a:schemeClr val="tx1">
-            <a:lumMod val="15000"/>
-            <a:lumOff val="85000"/>
-          </a:schemeClr>
-        </a:solidFill>
-        <a:round/>
-      </a:ln>
+      <a:gradFill flip="none" rotWithShape="1">
+        <a:gsLst>
+          <a:gs pos="0">
+            <a:schemeClr val="dk1">
+              <a:lumMod val="65000"/>
+              <a:lumOff val="35000"/>
+            </a:schemeClr>
+          </a:gs>
+          <a:gs pos="100000">
+            <a:schemeClr val="dk1">
+              <a:lumMod val="85000"/>
+              <a:lumOff val="15000"/>
+            </a:schemeClr>
+          </a:gs>
+        </a:gsLst>
+        <a:path path="circle">
+          <a:fillToRect l="50000" t="50000" r="50000" b="50000"/>
+        </a:path>
+        <a:tileRect/>
+      </a:gradFill>
     </cs:spPr>
-    <cs:defRPr sz="1000" kern="1200"/>
+    <cs:defRPr sz="1330" kern="1200"/>
   </cs:chartArea>
   <cs:dataLabel>
     <cs:lnRef idx="0"/>
     <cs:fillRef idx="0"/>
     <cs:effectRef idx="0"/>
     <cs:fontRef idx="minor">
-      <a:schemeClr val="tx1">
-        <a:lumMod val="75000"/>
-        <a:lumOff val="25000"/>
+      <a:schemeClr val="lt1">
+        <a:lumMod val="85000"/>
       </a:schemeClr>
     </cs:fontRef>
-    <cs:defRPr sz="900" kern="1200"/>
+    <cs:defRPr sz="1197" kern="1200"/>
   </cs:dataLabel>
   <cs:dataLabelCallout>
     <cs:lnRef idx="0"/>
@@ -18120,51 +18640,43 @@
       <a:solidFill>
         <a:schemeClr val="lt1"/>
       </a:solidFill>
-      <a:ln>
-        <a:solidFill>
-          <a:schemeClr val="dk1">
-            <a:lumMod val="25000"/>
-            <a:lumOff val="75000"/>
-          </a:schemeClr>
-        </a:solidFill>
-      </a:ln>
     </cs:spPr>
-    <cs:defRPr sz="900" kern="1200"/>
+    <cs:defRPr sz="1197" kern="1200"/>
     <cs:bodyPr rot="0" spcFirstLastPara="1" vertOverflow="clip" horzOverflow="clip" vert="horz" wrap="square" lIns="36576" tIns="18288" rIns="36576" bIns="18288" anchor="ctr" anchorCtr="1">
       <a:spAutoFit/>
     </cs:bodyPr>
   </cs:dataLabelCallout>
   <cs:dataPoint>
     <cs:lnRef idx="0"/>
-    <cs:fillRef idx="1">
+    <cs:fillRef idx="3">
       <cs:styleClr val="auto"/>
     </cs:fillRef>
-    <cs:effectRef idx="0"/>
+    <cs:effectRef idx="3"/>
     <cs:fontRef idx="minor">
-      <a:schemeClr val="tx1"/>
+      <a:schemeClr val="lt1"/>
     </cs:fontRef>
   </cs:dataPoint>
   <cs:dataPoint3D>
     <cs:lnRef idx="0"/>
-    <cs:fillRef idx="1">
+    <cs:fillRef idx="3">
       <cs:styleClr val="auto"/>
     </cs:fillRef>
-    <cs:effectRef idx="0"/>
+    <cs:effectRef idx="3"/>
     <cs:fontRef idx="minor">
-      <a:schemeClr val="tx1"/>
+      <a:schemeClr val="lt1"/>
     </cs:fontRef>
   </cs:dataPoint3D>
   <cs:dataPointLine>
     <cs:lnRef idx="0">
       <cs:styleClr val="auto"/>
     </cs:lnRef>
-    <cs:fillRef idx="1"/>
-    <cs:effectRef idx="0"/>
+    <cs:fillRef idx="3"/>
+    <cs:effectRef idx="3"/>
     <cs:fontRef idx="minor">
-      <a:schemeClr val="tx1"/>
+      <a:schemeClr val="lt1"/>
     </cs:fontRef>
     <cs:spPr>
-      <a:ln w="28575" cap="rnd">
+      <a:ln w="34925" cap="rnd">
         <a:solidFill>
           <a:schemeClr val="phClr"/>
         </a:solidFill>
@@ -18176,30 +18688,31 @@
     <cs:lnRef idx="0">
       <cs:styleClr val="auto"/>
     </cs:lnRef>
-    <cs:fillRef idx="1">
+    <cs:fillRef idx="3">
       <cs:styleClr val="auto"/>
     </cs:fillRef>
-    <cs:effectRef idx="0"/>
+    <cs:effectRef idx="3"/>
     <cs:fontRef idx="minor">
-      <a:schemeClr val="tx1"/>
+      <a:schemeClr val="lt1"/>
     </cs:fontRef>
     <cs:spPr>
       <a:ln w="9525">
         <a:solidFill>
           <a:schemeClr val="phClr"/>
         </a:solidFill>
+        <a:round/>
       </a:ln>
     </cs:spPr>
   </cs:dataPointMarker>
-  <cs:dataPointMarkerLayout symbol="circle" size="5"/>
+  <cs:dataPointMarkerLayout symbol="circle" size="6"/>
   <cs:dataPointWireframe>
     <cs:lnRef idx="0">
       <cs:styleClr val="auto"/>
     </cs:lnRef>
-    <cs:fillRef idx="1"/>
-    <cs:effectRef idx="0"/>
+    <cs:fillRef idx="3"/>
+    <cs:effectRef idx="3"/>
     <cs:fontRef idx="minor">
-      <a:schemeClr val="tx1"/>
+      <a:schemeClr val="lt1"/>
     </cs:fontRef>
     <cs:spPr>
       <a:ln w="9525" cap="rnd">
@@ -18215,44 +18728,41 @@
     <cs:fillRef idx="0"/>
     <cs:effectRef idx="0"/>
     <cs:fontRef idx="minor">
-      <a:schemeClr val="tx1">
-        <a:lumMod val="65000"/>
-        <a:lumOff val="35000"/>
+      <a:schemeClr val="lt1">
+        <a:lumMod val="85000"/>
       </a:schemeClr>
     </cs:fontRef>
     <cs:spPr>
-      <a:noFill/>
-      <a:ln w="9525" cap="flat" cmpd="sng" algn="ctr">
+      <a:ln w="9525">
         <a:solidFill>
-          <a:schemeClr val="tx1">
-            <a:lumMod val="15000"/>
-            <a:lumOff val="85000"/>
+          <a:schemeClr val="lt1">
+            <a:lumMod val="95000"/>
+            <a:alpha val="54000"/>
           </a:schemeClr>
         </a:solidFill>
-        <a:round/>
       </a:ln>
     </cs:spPr>
-    <cs:defRPr sz="900" kern="1200"/>
+    <cs:defRPr sz="1197" kern="1200"/>
   </cs:dataTable>
   <cs:downBar>
     <cs:lnRef idx="0"/>
     <cs:fillRef idx="0"/>
     <cs:effectRef idx="0"/>
     <cs:fontRef idx="minor">
-      <a:schemeClr val="dk1"/>
+      <a:schemeClr val="lt1"/>
     </cs:fontRef>
     <cs:spPr>
       <a:solidFill>
         <a:schemeClr val="dk1">
-          <a:lumMod val="65000"/>
-          <a:lumOff val="35000"/>
+          <a:lumMod val="75000"/>
+          <a:lumOff val="25000"/>
         </a:schemeClr>
       </a:solidFill>
       <a:ln w="9525">
         <a:solidFill>
-          <a:schemeClr val="tx1">
-            <a:lumMod val="65000"/>
-            <a:lumOff val="35000"/>
+          <a:schemeClr val="lt1">
+            <a:lumMod val="95000"/>
+            <a:alpha val="54000"/>
           </a:schemeClr>
         </a:solidFill>
       </a:ln>
@@ -18263,17 +18773,17 @@
     <cs:fillRef idx="0"/>
     <cs:effectRef idx="0"/>
     <cs:fontRef idx="minor">
-      <a:schemeClr val="tx1"/>
+      <a:schemeClr val="lt1"/>
     </cs:fontRef>
     <cs:spPr>
-      <a:ln w="9525" cap="flat" cmpd="sng" algn="ctr">
+      <a:ln w="9525">
         <a:solidFill>
-          <a:schemeClr val="tx1">
-            <a:lumMod val="35000"/>
-            <a:lumOff val="65000"/>
+          <a:schemeClr val="lt1">
+            <a:lumMod val="95000"/>
+            <a:alpha val="54000"/>
           </a:schemeClr>
         </a:solidFill>
-        <a:round/>
+        <a:prstDash val="dash"/>
       </a:ln>
     </cs:spPr>
   </cs:dropLine>
@@ -18282,14 +18792,13 @@
     <cs:fillRef idx="0"/>
     <cs:effectRef idx="0"/>
     <cs:fontRef idx="minor">
-      <a:schemeClr val="tx1"/>
+      <a:schemeClr val="lt1"/>
     </cs:fontRef>
     <cs:spPr>
       <a:ln w="9525" cap="flat" cmpd="sng" algn="ctr">
         <a:solidFill>
-          <a:schemeClr val="tx1">
-            <a:lumMod val="65000"/>
-            <a:lumOff val="35000"/>
+          <a:schemeClr val="lt1">
+            <a:lumMod val="95000"/>
           </a:schemeClr>
         </a:solidFill>
         <a:round/>
@@ -18301,28 +18810,22 @@
     <cs:fillRef idx="0"/>
     <cs:effectRef idx="0"/>
     <cs:fontRef idx="minor">
-      <a:schemeClr val="tx1"/>
+      <a:schemeClr val="lt1"/>
     </cs:fontRef>
-    <cs:spPr>
-      <a:noFill/>
-      <a:ln>
-        <a:noFill/>
-      </a:ln>
-    </cs:spPr>
   </cs:floor>
   <cs:gridlineMajor>
     <cs:lnRef idx="0"/>
     <cs:fillRef idx="0"/>
     <cs:effectRef idx="0"/>
     <cs:fontRef idx="minor">
-      <a:schemeClr val="tx1"/>
+      <a:schemeClr val="lt1"/>
     </cs:fontRef>
     <cs:spPr>
       <a:ln w="9525" cap="flat" cmpd="sng" algn="ctr">
         <a:solidFill>
-          <a:schemeClr val="tx1">
-            <a:lumMod val="15000"/>
-            <a:lumOff val="85000"/>
+          <a:schemeClr val="lt1">
+            <a:lumMod val="95000"/>
+            <a:alpha val="10000"/>
           </a:schemeClr>
         </a:solidFill>
         <a:round/>
@@ -18334,17 +18837,16 @@
     <cs:fillRef idx="0"/>
     <cs:effectRef idx="0"/>
     <cs:fontRef idx="minor">
-      <a:schemeClr val="tx1"/>
+      <a:schemeClr val="lt1"/>
     </cs:fontRef>
     <cs:spPr>
-      <a:ln w="9525" cap="flat" cmpd="sng" algn="ctr">
+      <a:ln>
         <a:solidFill>
-          <a:schemeClr val="tx1">
-            <a:lumMod val="5000"/>
-            <a:lumOff val="95000"/>
+          <a:schemeClr val="lt1">
+            <a:lumMod val="95000"/>
+            <a:alpha val="5000"/>
           </a:schemeClr>
         </a:solidFill>
-        <a:round/>
       </a:ln>
     </cs:spPr>
   </cs:gridlineMinor>
@@ -18353,17 +18855,17 @@
     <cs:fillRef idx="0"/>
     <cs:effectRef idx="0"/>
     <cs:fontRef idx="minor">
-      <a:schemeClr val="tx1"/>
+      <a:schemeClr val="lt1"/>
     </cs:fontRef>
     <cs:spPr>
-      <a:ln w="9525" cap="flat" cmpd="sng" algn="ctr">
+      <a:ln w="9525">
         <a:solidFill>
-          <a:schemeClr val="tx1">
-            <a:lumMod val="75000"/>
-            <a:lumOff val="25000"/>
+          <a:schemeClr val="lt1">
+            <a:lumMod val="95000"/>
+            <a:alpha val="54000"/>
           </a:schemeClr>
         </a:solidFill>
-        <a:round/>
+        <a:prstDash val="dash"/>
       </a:ln>
     </cs:spPr>
   </cs:hiLoLine>
@@ -18372,17 +18874,16 @@
     <cs:fillRef idx="0"/>
     <cs:effectRef idx="0"/>
     <cs:fontRef idx="minor">
-      <a:schemeClr val="tx1"/>
+      <a:schemeClr val="lt1"/>
     </cs:fontRef>
     <cs:spPr>
-      <a:ln w="9525" cap="flat" cmpd="sng" algn="ctr">
+      <a:ln w="9525">
         <a:solidFill>
-          <a:schemeClr val="tx1">
-            <a:lumMod val="35000"/>
-            <a:lumOff val="65000"/>
+          <a:schemeClr val="lt1">
+            <a:lumMod val="95000"/>
+            <a:alpha val="54000"/>
           </a:schemeClr>
         </a:solidFill>
-        <a:round/>
       </a:ln>
     </cs:spPr>
   </cs:leaderLine>
@@ -18391,27 +18892,26 @@
     <cs:fillRef idx="0"/>
     <cs:effectRef idx="0"/>
     <cs:fontRef idx="minor">
-      <a:schemeClr val="tx1">
-        <a:lumMod val="65000"/>
-        <a:lumOff val="35000"/>
+      <a:schemeClr val="lt1">
+        <a:lumMod val="85000"/>
       </a:schemeClr>
     </cs:fontRef>
-    <cs:defRPr sz="900" kern="1200"/>
+    <cs:defRPr sz="1197" kern="1200"/>
   </cs:legend>
-  <cs:plotArea mods="allowNoFillOverride allowNoLineOverride">
+  <cs:plotArea>
     <cs:lnRef idx="0"/>
     <cs:fillRef idx="0"/>
     <cs:effectRef idx="0"/>
     <cs:fontRef idx="minor">
-      <a:schemeClr val="tx1"/>
+      <a:schemeClr val="lt1"/>
     </cs:fontRef>
   </cs:plotArea>
-  <cs:plotArea3D mods="allowNoFillOverride allowNoLineOverride">
+  <cs:plotArea3D>
     <cs:lnRef idx="0"/>
     <cs:fillRef idx="0"/>
     <cs:effectRef idx="0"/>
     <cs:fontRef idx="minor">
-      <a:schemeClr val="tx1"/>
+      <a:schemeClr val="lt1"/>
     </cs:fontRef>
   </cs:plotArea3D>
   <cs:seriesAxis>
@@ -18419,26 +18919,36 @@
     <cs:fillRef idx="0"/>
     <cs:effectRef idx="0"/>
     <cs:fontRef idx="minor">
-      <a:schemeClr val="tx1">
-        <a:lumMod val="65000"/>
-        <a:lumOff val="35000"/>
+      <a:schemeClr val="lt1">
+        <a:lumMod val="85000"/>
       </a:schemeClr>
     </cs:fontRef>
-    <cs:defRPr sz="900" kern="1200"/>
+    <cs:spPr>
+      <a:ln w="12700" cap="flat" cmpd="sng" algn="ctr">
+        <a:solidFill>
+          <a:schemeClr val="lt1">
+            <a:lumMod val="95000"/>
+            <a:alpha val="54000"/>
+          </a:schemeClr>
+        </a:solidFill>
+        <a:round/>
+      </a:ln>
+    </cs:spPr>
+    <cs:defRPr sz="1197" kern="1200"/>
   </cs:seriesAxis>
   <cs:seriesLine>
     <cs:lnRef idx="0"/>
     <cs:fillRef idx="0"/>
     <cs:effectRef idx="0"/>
     <cs:fontRef idx="minor">
-      <a:schemeClr val="tx1"/>
+      <a:schemeClr val="lt1"/>
     </cs:fontRef>
     <cs:spPr>
       <a:ln w="9525" cap="flat" cmpd="sng" algn="ctr">
         <a:solidFill>
-          <a:schemeClr val="tx1">
-            <a:lumMod val="35000"/>
-            <a:lumOff val="65000"/>
+          <a:schemeClr val="lt1">
+            <a:lumMod val="95000"/>
+            <a:alpha val="54000"/>
           </a:schemeClr>
         </a:solidFill>
         <a:round/>
@@ -18450,12 +18960,19 @@
     <cs:fillRef idx="0"/>
     <cs:effectRef idx="0"/>
     <cs:fontRef idx="minor">
-      <a:schemeClr val="tx1">
-        <a:lumMod val="65000"/>
-        <a:lumOff val="35000"/>
+      <a:schemeClr val="lt1">
+        <a:lumMod val="95000"/>
       </a:schemeClr>
     </cs:fontRef>
-    <cs:defRPr sz="1400" b="0" kern="1200" spc="0" baseline="0"/>
+    <cs:defRPr sz="2128" b="1" kern="1200" spc="100" baseline="0">
+      <a:effectLst>
+        <a:outerShdw blurRad="50800" dist="38100" dir="5400000" algn="t" rotWithShape="0">
+          <a:prstClr val="black">
+            <a:alpha val="40000"/>
+          </a:prstClr>
+        </a:outerShdw>
+      </a:effectLst>
+    </cs:defRPr>
   </cs:title>
   <cs:trendline>
     <cs:lnRef idx="0">
@@ -18464,14 +18981,13 @@
     <cs:fillRef idx="0"/>
     <cs:effectRef idx="0"/>
     <cs:fontRef idx="minor">
-      <a:schemeClr val="tx1"/>
+      <a:schemeClr val="lt1"/>
     </cs:fontRef>
     <cs:spPr>
       <a:ln w="19050" cap="rnd">
         <a:solidFill>
           <a:schemeClr val="phClr"/>
         </a:solidFill>
-        <a:prstDash val="sysDot"/>
       </a:ln>
     </cs:spPr>
   </cs:trendline>
@@ -18480,19 +18996,18 @@
     <cs:fillRef idx="0"/>
     <cs:effectRef idx="0"/>
     <cs:fontRef idx="minor">
-      <a:schemeClr val="tx1">
-        <a:lumMod val="65000"/>
-        <a:lumOff val="35000"/>
+      <a:schemeClr val="lt1">
+        <a:lumMod val="85000"/>
       </a:schemeClr>
     </cs:fontRef>
-    <cs:defRPr sz="900" kern="1200"/>
+    <cs:defRPr sz="1197" kern="1200"/>
   </cs:trendlineLabel>
   <cs:upBar>
     <cs:lnRef idx="0"/>
     <cs:fillRef idx="0"/>
     <cs:effectRef idx="0"/>
     <cs:fontRef idx="minor">
-      <a:schemeClr val="dk1"/>
+      <a:schemeClr val="lt1"/>
     </cs:fontRef>
     <cs:spPr>
       <a:solidFill>
@@ -18500,9 +19015,9 @@
       </a:solidFill>
       <a:ln w="9525">
         <a:solidFill>
-          <a:schemeClr val="tx1">
-            <a:lumMod val="15000"/>
-            <a:lumOff val="85000"/>
+          <a:schemeClr val="lt1">
+            <a:lumMod val="95000"/>
+            <a:alpha val="54000"/>
           </a:schemeClr>
         </a:solidFill>
       </a:ln>
@@ -18513,101 +19028,99 @@
     <cs:fillRef idx="0"/>
     <cs:effectRef idx="0"/>
     <cs:fontRef idx="minor">
-      <a:schemeClr val="tx1">
-        <a:lumMod val="65000"/>
-        <a:lumOff val="35000"/>
+      <a:schemeClr val="lt1">
+        <a:lumMod val="85000"/>
       </a:schemeClr>
     </cs:fontRef>
-    <cs:defRPr sz="900" kern="1200"/>
+    <cs:defRPr sz="1197" kern="1200"/>
   </cs:valueAxis>
   <cs:wall>
     <cs:lnRef idx="0"/>
     <cs:fillRef idx="0"/>
     <cs:effectRef idx="0"/>
     <cs:fontRef idx="minor">
-      <a:schemeClr val="tx1"/>
+      <a:schemeClr val="lt1"/>
     </cs:fontRef>
-    <cs:spPr>
-      <a:noFill/>
-      <a:ln>
-        <a:noFill/>
-      </a:ln>
-    </cs:spPr>
   </cs:wall>
 </cs:chartStyle>
 </file>
 
 <file path=ppt/charts/style4.xml><?xml version="1.0" encoding="utf-8"?>
-<cs:chartStyle xmlns:cs="http://schemas.microsoft.com/office/drawing/2012/chartStyle" xmlns:a="http://schemas.openxmlformats.org/drawingml/2006/main" id="201">
+<cs:chartStyle xmlns:cs="http://schemas.microsoft.com/office/drawing/2012/chartStyle" xmlns:a="http://schemas.openxmlformats.org/drawingml/2006/main" id="209">
   <cs:axisTitle>
     <cs:lnRef idx="0"/>
     <cs:fillRef idx="0"/>
     <cs:effectRef idx="0"/>
     <cs:fontRef idx="minor">
-      <a:schemeClr val="tx1">
-        <a:lumMod val="65000"/>
-        <a:lumOff val="35000"/>
+      <a:schemeClr val="lt1">
+        <a:lumMod val="85000"/>
       </a:schemeClr>
     </cs:fontRef>
-    <cs:defRPr sz="1000" kern="1200"/>
+    <cs:defRPr sz="1197" b="1" kern="1200" cap="all"/>
   </cs:axisTitle>
   <cs:categoryAxis>
     <cs:lnRef idx="0"/>
     <cs:fillRef idx="0"/>
     <cs:effectRef idx="0"/>
     <cs:fontRef idx="minor">
-      <a:schemeClr val="tx1">
-        <a:lumMod val="65000"/>
-        <a:lumOff val="35000"/>
+      <a:schemeClr val="lt1">
+        <a:lumMod val="85000"/>
       </a:schemeClr>
     </cs:fontRef>
     <cs:spPr>
-      <a:ln w="9525" cap="flat" cmpd="sng" algn="ctr">
+      <a:ln w="12700" cap="flat" cmpd="sng" algn="ctr">
         <a:solidFill>
-          <a:schemeClr val="tx1">
-            <a:lumMod val="15000"/>
-            <a:lumOff val="85000"/>
+          <a:schemeClr val="lt1">
+            <a:lumMod val="95000"/>
+            <a:alpha val="54000"/>
           </a:schemeClr>
         </a:solidFill>
         <a:round/>
       </a:ln>
     </cs:spPr>
-    <cs:defRPr sz="900" kern="1200"/>
+    <cs:defRPr sz="1197" kern="1200"/>
   </cs:categoryAxis>
-  <cs:chartArea mods="allowNoFillOverride allowNoLineOverride">
+  <cs:chartArea>
     <cs:lnRef idx="0"/>
     <cs:fillRef idx="0"/>
     <cs:effectRef idx="0"/>
     <cs:fontRef idx="minor">
-      <a:schemeClr val="tx1"/>
+      <a:schemeClr val="dk1"/>
     </cs:fontRef>
     <cs:spPr>
-      <a:solidFill>
-        <a:schemeClr val="bg1"/>
-      </a:solidFill>
-      <a:ln w="9525" cap="flat" cmpd="sng" algn="ctr">
-        <a:solidFill>
-          <a:schemeClr val="tx1">
-            <a:lumMod val="15000"/>
-            <a:lumOff val="85000"/>
-          </a:schemeClr>
-        </a:solidFill>
-        <a:round/>
-      </a:ln>
+      <a:gradFill flip="none" rotWithShape="1">
+        <a:gsLst>
+          <a:gs pos="0">
+            <a:schemeClr val="dk1">
+              <a:lumMod val="65000"/>
+              <a:lumOff val="35000"/>
+            </a:schemeClr>
+          </a:gs>
+          <a:gs pos="100000">
+            <a:schemeClr val="dk1">
+              <a:lumMod val="85000"/>
+              <a:lumOff val="15000"/>
+            </a:schemeClr>
+          </a:gs>
+        </a:gsLst>
+        <a:path path="circle">
+          <a:fillToRect l="50000" t="50000" r="50000" b="50000"/>
+        </a:path>
+        <a:tileRect/>
+      </a:gradFill>
     </cs:spPr>
-    <cs:defRPr sz="1000" kern="1200"/>
+    <cs:defRPr sz="1330" kern="1200"/>
   </cs:chartArea>
   <cs:dataLabel>
     <cs:lnRef idx="0"/>
     <cs:fillRef idx="0"/>
     <cs:effectRef idx="0"/>
     <cs:fontRef idx="minor">
-      <a:schemeClr val="tx1">
-        <a:lumMod val="75000"/>
-        <a:lumOff val="25000"/>
+      <a:schemeClr val="lt1">
+        <a:lumMod val="85000"/>
       </a:schemeClr>
     </cs:fontRef>
-    <cs:defRPr sz="900" kern="1200"/>
+    <cs:defRPr sz="1197" kern="1200"/>
   </cs:dataLabel>
   <cs:dataLabelCallout>
     <cs:lnRef idx="0"/>
@@ -18623,51 +19136,43 @@
       <a:solidFill>
         <a:schemeClr val="lt1"/>
       </a:solidFill>
-      <a:ln>
-        <a:solidFill>
-          <a:schemeClr val="dk1">
-            <a:lumMod val="25000"/>
-            <a:lumOff val="75000"/>
-          </a:schemeClr>
-        </a:solidFill>
-      </a:ln>
     </cs:spPr>
-    <cs:defRPr sz="900" kern="1200"/>
+    <cs:defRPr sz="1197" kern="1200"/>
     <cs:bodyPr rot="0" spcFirstLastPara="1" vertOverflow="clip" horzOverflow="clip" vert="horz" wrap="square" lIns="36576" tIns="18288" rIns="36576" bIns="18288" anchor="ctr" anchorCtr="1">
       <a:spAutoFit/>
     </cs:bodyPr>
   </cs:dataLabelCallout>
   <cs:dataPoint>
     <cs:lnRef idx="0"/>
-    <cs:fillRef idx="1">
+    <cs:fillRef idx="3">
       <cs:styleClr val="auto"/>
     </cs:fillRef>
-    <cs:effectRef idx="0"/>
+    <cs:effectRef idx="3"/>
     <cs:fontRef idx="minor">
-      <a:schemeClr val="tx1"/>
+      <a:schemeClr val="lt1"/>
     </cs:fontRef>
   </cs:dataPoint>
   <cs:dataPoint3D>
     <cs:lnRef idx="0"/>
-    <cs:fillRef idx="1">
+    <cs:fillRef idx="3">
       <cs:styleClr val="auto"/>
     </cs:fillRef>
-    <cs:effectRef idx="0"/>
+    <cs:effectRef idx="3"/>
     <cs:fontRef idx="minor">
-      <a:schemeClr val="tx1"/>
+      <a:schemeClr val="lt1"/>
     </cs:fontRef>
   </cs:dataPoint3D>
   <cs:dataPointLine>
     <cs:lnRef idx="0">
       <cs:styleClr val="auto"/>
     </cs:lnRef>
-    <cs:fillRef idx="1"/>
-    <cs:effectRef idx="0"/>
+    <cs:fillRef idx="3"/>
+    <cs:effectRef idx="3"/>
     <cs:fontRef idx="minor">
-      <a:schemeClr val="tx1"/>
+      <a:schemeClr val="lt1"/>
     </cs:fontRef>
     <cs:spPr>
-      <a:ln w="28575" cap="rnd">
+      <a:ln w="34925" cap="rnd">
         <a:solidFill>
           <a:schemeClr val="phClr"/>
         </a:solidFill>
@@ -18679,30 +19184,31 @@
     <cs:lnRef idx="0">
       <cs:styleClr val="auto"/>
     </cs:lnRef>
-    <cs:fillRef idx="1">
+    <cs:fillRef idx="3">
       <cs:styleClr val="auto"/>
     </cs:fillRef>
-    <cs:effectRef idx="0"/>
+    <cs:effectRef idx="3"/>
     <cs:fontRef idx="minor">
-      <a:schemeClr val="tx1"/>
+      <a:schemeClr val="lt1"/>
     </cs:fontRef>
     <cs:spPr>
       <a:ln w="9525">
         <a:solidFill>
           <a:schemeClr val="phClr"/>
         </a:solidFill>
+        <a:round/>
       </a:ln>
     </cs:spPr>
   </cs:dataPointMarker>
-  <cs:dataPointMarkerLayout symbol="circle" size="5"/>
+  <cs:dataPointMarkerLayout symbol="circle" size="6"/>
   <cs:dataPointWireframe>
     <cs:lnRef idx="0">
       <cs:styleClr val="auto"/>
     </cs:lnRef>
-    <cs:fillRef idx="1"/>
-    <cs:effectRef idx="0"/>
+    <cs:fillRef idx="3"/>
+    <cs:effectRef idx="3"/>
     <cs:fontRef idx="minor">
-      <a:schemeClr val="tx1"/>
+      <a:schemeClr val="lt1"/>
     </cs:fontRef>
     <cs:spPr>
       <a:ln w="9525" cap="rnd">
@@ -18718,44 +19224,41 @@
     <cs:fillRef idx="0"/>
     <cs:effectRef idx="0"/>
     <cs:fontRef idx="minor">
-      <a:schemeClr val="tx1">
-        <a:lumMod val="65000"/>
-        <a:lumOff val="35000"/>
+      <a:schemeClr val="lt1">
+        <a:lumMod val="85000"/>
       </a:schemeClr>
     </cs:fontRef>
     <cs:spPr>
-      <a:noFill/>
-      <a:ln w="9525" cap="flat" cmpd="sng" algn="ctr">
+      <a:ln w="9525">
         <a:solidFill>
-          <a:schemeClr val="tx1">
-            <a:lumMod val="15000"/>
-            <a:lumOff val="85000"/>
+          <a:schemeClr val="lt1">
+            <a:lumMod val="95000"/>
+            <a:alpha val="54000"/>
           </a:schemeClr>
         </a:solidFill>
-        <a:round/>
       </a:ln>
     </cs:spPr>
-    <cs:defRPr sz="900" kern="1200"/>
+    <cs:defRPr sz="1197" kern="1200"/>
   </cs:dataTable>
   <cs:downBar>
     <cs:lnRef idx="0"/>
     <cs:fillRef idx="0"/>
     <cs:effectRef idx="0"/>
     <cs:fontRef idx="minor">
-      <a:schemeClr val="dk1"/>
+      <a:schemeClr val="lt1"/>
     </cs:fontRef>
     <cs:spPr>
       <a:solidFill>
         <a:schemeClr val="dk1">
-          <a:lumMod val="65000"/>
-          <a:lumOff val="35000"/>
+          <a:lumMod val="75000"/>
+          <a:lumOff val="25000"/>
         </a:schemeClr>
       </a:solidFill>
       <a:ln w="9525">
         <a:solidFill>
-          <a:schemeClr val="tx1">
-            <a:lumMod val="65000"/>
-            <a:lumOff val="35000"/>
+          <a:schemeClr val="lt1">
+            <a:lumMod val="95000"/>
+            <a:alpha val="54000"/>
           </a:schemeClr>
         </a:solidFill>
       </a:ln>
@@ -18766,17 +19269,17 @@
     <cs:fillRef idx="0"/>
     <cs:effectRef idx="0"/>
     <cs:fontRef idx="minor">
-      <a:schemeClr val="tx1"/>
+      <a:schemeClr val="lt1"/>
     </cs:fontRef>
     <cs:spPr>
-      <a:ln w="9525" cap="flat" cmpd="sng" algn="ctr">
+      <a:ln w="9525">
         <a:solidFill>
-          <a:schemeClr val="tx1">
-            <a:lumMod val="35000"/>
-            <a:lumOff val="65000"/>
+          <a:schemeClr val="lt1">
+            <a:lumMod val="95000"/>
+            <a:alpha val="54000"/>
           </a:schemeClr>
         </a:solidFill>
-        <a:round/>
+        <a:prstDash val="dash"/>
       </a:ln>
     </cs:spPr>
   </cs:dropLine>
@@ -18785,14 +19288,13 @@
     <cs:fillRef idx="0"/>
     <cs:effectRef idx="0"/>
     <cs:fontRef idx="minor">
-      <a:schemeClr val="tx1"/>
+      <a:schemeClr val="lt1"/>
     </cs:fontRef>
     <cs:spPr>
       <a:ln w="9525" cap="flat" cmpd="sng" algn="ctr">
         <a:solidFill>
-          <a:schemeClr val="tx1">
-            <a:lumMod val="65000"/>
-            <a:lumOff val="35000"/>
+          <a:schemeClr val="lt1">
+            <a:lumMod val="95000"/>
           </a:schemeClr>
         </a:solidFill>
         <a:round/>
@@ -18804,28 +19306,22 @@
     <cs:fillRef idx="0"/>
     <cs:effectRef idx="0"/>
     <cs:fontRef idx="minor">
-      <a:schemeClr val="tx1"/>
+      <a:schemeClr val="lt1"/>
     </cs:fontRef>
-    <cs:spPr>
-      <a:noFill/>
-      <a:ln>
-        <a:noFill/>
-      </a:ln>
-    </cs:spPr>
   </cs:floor>
   <cs:gridlineMajor>
     <cs:lnRef idx="0"/>
     <cs:fillRef idx="0"/>
     <cs:effectRef idx="0"/>
     <cs:fontRef idx="minor">
-      <a:schemeClr val="tx1"/>
+      <a:schemeClr val="lt1"/>
     </cs:fontRef>
     <cs:spPr>
       <a:ln w="9525" cap="flat" cmpd="sng" algn="ctr">
         <a:solidFill>
-          <a:schemeClr val="tx1">
-            <a:lumMod val="15000"/>
-            <a:lumOff val="85000"/>
+          <a:schemeClr val="lt1">
+            <a:lumMod val="95000"/>
+            <a:alpha val="10000"/>
           </a:schemeClr>
         </a:solidFill>
         <a:round/>
@@ -18837,17 +19333,16 @@
     <cs:fillRef idx="0"/>
     <cs:effectRef idx="0"/>
     <cs:fontRef idx="minor">
-      <a:schemeClr val="tx1"/>
+      <a:schemeClr val="lt1"/>
     </cs:fontRef>
     <cs:spPr>
-      <a:ln w="9525" cap="flat" cmpd="sng" algn="ctr">
+      <a:ln>
         <a:solidFill>
-          <a:schemeClr val="tx1">
-            <a:lumMod val="5000"/>
-            <a:lumOff val="95000"/>
+          <a:schemeClr val="lt1">
+            <a:lumMod val="95000"/>
+            <a:alpha val="5000"/>
           </a:schemeClr>
         </a:solidFill>
-        <a:round/>
       </a:ln>
     </cs:spPr>
   </cs:gridlineMinor>
@@ -18856,17 +19351,17 @@
     <cs:fillRef idx="0"/>
     <cs:effectRef idx="0"/>
     <cs:fontRef idx="minor">
-      <a:schemeClr val="tx1"/>
+      <a:schemeClr val="lt1"/>
     </cs:fontRef>
     <cs:spPr>
-      <a:ln w="9525" cap="flat" cmpd="sng" algn="ctr">
+      <a:ln w="9525">
         <a:solidFill>
-          <a:schemeClr val="tx1">
-            <a:lumMod val="75000"/>
-            <a:lumOff val="25000"/>
+          <a:schemeClr val="lt1">
+            <a:lumMod val="95000"/>
+            <a:alpha val="54000"/>
           </a:schemeClr>
         </a:solidFill>
-        <a:round/>
+        <a:prstDash val="dash"/>
       </a:ln>
     </cs:spPr>
   </cs:hiLoLine>
@@ -18875,17 +19370,16 @@
     <cs:fillRef idx="0"/>
     <cs:effectRef idx="0"/>
     <cs:fontRef idx="minor">
-      <a:schemeClr val="tx1"/>
+      <a:schemeClr val="lt1"/>
     </cs:fontRef>
     <cs:spPr>
-      <a:ln w="9525" cap="flat" cmpd="sng" algn="ctr">
+      <a:ln w="9525">
         <a:solidFill>
-          <a:schemeClr val="tx1">
-            <a:lumMod val="35000"/>
-            <a:lumOff val="65000"/>
+          <a:schemeClr val="lt1">
+            <a:lumMod val="95000"/>
+            <a:alpha val="54000"/>
           </a:schemeClr>
         </a:solidFill>
-        <a:round/>
       </a:ln>
     </cs:spPr>
   </cs:leaderLine>
@@ -18894,27 +19388,26 @@
     <cs:fillRef idx="0"/>
     <cs:effectRef idx="0"/>
     <cs:fontRef idx="minor">
-      <a:schemeClr val="tx1">
-        <a:lumMod val="65000"/>
-        <a:lumOff val="35000"/>
+      <a:schemeClr val="lt1">
+        <a:lumMod val="85000"/>
       </a:schemeClr>
     </cs:fontRef>
-    <cs:defRPr sz="900" kern="1200"/>
+    <cs:defRPr sz="1197" kern="1200"/>
   </cs:legend>
-  <cs:plotArea mods="allowNoFillOverride allowNoLineOverride">
+  <cs:plotArea>
     <cs:lnRef idx="0"/>
     <cs:fillRef idx="0"/>
     <cs:effectRef idx="0"/>
     <cs:fontRef idx="minor">
-      <a:schemeClr val="tx1"/>
+      <a:schemeClr val="lt1"/>
     </cs:fontRef>
   </cs:plotArea>
-  <cs:plotArea3D mods="allowNoFillOverride allowNoLineOverride">
+  <cs:plotArea3D>
     <cs:lnRef idx="0"/>
     <cs:fillRef idx="0"/>
     <cs:effectRef idx="0"/>
     <cs:fontRef idx="minor">
-      <a:schemeClr val="tx1"/>
+      <a:schemeClr val="lt1"/>
     </cs:fontRef>
   </cs:plotArea3D>
   <cs:seriesAxis>
@@ -18922,26 +19415,36 @@
     <cs:fillRef idx="0"/>
     <cs:effectRef idx="0"/>
     <cs:fontRef idx="minor">
-      <a:schemeClr val="tx1">
-        <a:lumMod val="65000"/>
-        <a:lumOff val="35000"/>
+      <a:schemeClr val="lt1">
+        <a:lumMod val="85000"/>
       </a:schemeClr>
     </cs:fontRef>
-    <cs:defRPr sz="900" kern="1200"/>
+    <cs:spPr>
+      <a:ln w="12700" cap="flat" cmpd="sng" algn="ctr">
+        <a:solidFill>
+          <a:schemeClr val="lt1">
+            <a:lumMod val="95000"/>
+            <a:alpha val="54000"/>
+          </a:schemeClr>
+        </a:solidFill>
+        <a:round/>
+      </a:ln>
+    </cs:spPr>
+    <cs:defRPr sz="1197" kern="1200"/>
   </cs:seriesAxis>
   <cs:seriesLine>
     <cs:lnRef idx="0"/>
     <cs:fillRef idx="0"/>
     <cs:effectRef idx="0"/>
     <cs:fontRef idx="minor">
-      <a:schemeClr val="tx1"/>
+      <a:schemeClr val="lt1"/>
     </cs:fontRef>
     <cs:spPr>
       <a:ln w="9525" cap="flat" cmpd="sng" algn="ctr">
         <a:solidFill>
-          <a:schemeClr val="tx1">
-            <a:lumMod val="35000"/>
-            <a:lumOff val="65000"/>
+          <a:schemeClr val="lt1">
+            <a:lumMod val="95000"/>
+            <a:alpha val="54000"/>
           </a:schemeClr>
         </a:solidFill>
         <a:round/>
@@ -18953,12 +19456,19 @@
     <cs:fillRef idx="0"/>
     <cs:effectRef idx="0"/>
     <cs:fontRef idx="minor">
-      <a:schemeClr val="tx1">
-        <a:lumMod val="65000"/>
-        <a:lumOff val="35000"/>
+      <a:schemeClr val="lt1">
+        <a:lumMod val="95000"/>
       </a:schemeClr>
     </cs:fontRef>
-    <cs:defRPr sz="1400" b="0" kern="1200" spc="0" baseline="0"/>
+    <cs:defRPr sz="2128" b="1" kern="1200" spc="100" baseline="0">
+      <a:effectLst>
+        <a:outerShdw blurRad="50800" dist="38100" dir="5400000" algn="t" rotWithShape="0">
+          <a:prstClr val="black">
+            <a:alpha val="40000"/>
+          </a:prstClr>
+        </a:outerShdw>
+      </a:effectLst>
+    </cs:defRPr>
   </cs:title>
   <cs:trendline>
     <cs:lnRef idx="0">
@@ -18967,14 +19477,13 @@
     <cs:fillRef idx="0"/>
     <cs:effectRef idx="0"/>
     <cs:fontRef idx="minor">
-      <a:schemeClr val="tx1"/>
+      <a:schemeClr val="lt1"/>
     </cs:fontRef>
     <cs:spPr>
       <a:ln w="19050" cap="rnd">
         <a:solidFill>
           <a:schemeClr val="phClr"/>
         </a:solidFill>
-        <a:prstDash val="sysDot"/>
       </a:ln>
     </cs:spPr>
   </cs:trendline>
@@ -18983,19 +19492,18 @@
     <cs:fillRef idx="0"/>
     <cs:effectRef idx="0"/>
     <cs:fontRef idx="minor">
-      <a:schemeClr val="tx1">
-        <a:lumMod val="65000"/>
-        <a:lumOff val="35000"/>
+      <a:schemeClr val="lt1">
+        <a:lumMod val="85000"/>
       </a:schemeClr>
     </cs:fontRef>
-    <cs:defRPr sz="900" kern="1200"/>
+    <cs:defRPr sz="1197" kern="1200"/>
   </cs:trendlineLabel>
   <cs:upBar>
     <cs:lnRef idx="0"/>
     <cs:fillRef idx="0"/>
     <cs:effectRef idx="0"/>
     <cs:fontRef idx="minor">
-      <a:schemeClr val="dk1"/>
+      <a:schemeClr val="lt1"/>
     </cs:fontRef>
     <cs:spPr>
       <a:solidFill>
@@ -19003,9 +19511,9 @@
       </a:solidFill>
       <a:ln w="9525">
         <a:solidFill>
-          <a:schemeClr val="tx1">
-            <a:lumMod val="15000"/>
-            <a:lumOff val="85000"/>
+          <a:schemeClr val="lt1">
+            <a:lumMod val="95000"/>
+            <a:alpha val="54000"/>
           </a:schemeClr>
         </a:solidFill>
       </a:ln>
@@ -19016,26 +19524,19 @@
     <cs:fillRef idx="0"/>
     <cs:effectRef idx="0"/>
     <cs:fontRef idx="minor">
-      <a:schemeClr val="tx1">
-        <a:lumMod val="65000"/>
-        <a:lumOff val="35000"/>
+      <a:schemeClr val="lt1">
+        <a:lumMod val="85000"/>
       </a:schemeClr>
     </cs:fontRef>
-    <cs:defRPr sz="900" kern="1200"/>
+    <cs:defRPr sz="1197" kern="1200"/>
   </cs:valueAxis>
   <cs:wall>
     <cs:lnRef idx="0"/>
     <cs:fillRef idx="0"/>
     <cs:effectRef idx="0"/>
     <cs:fontRef idx="minor">
-      <a:schemeClr val="tx1"/>
+      <a:schemeClr val="lt1"/>
     </cs:fontRef>
-    <cs:spPr>
-      <a:noFill/>
-      <a:ln>
-        <a:noFill/>
-      </a:ln>
-    </cs:spPr>
   </cs:wall>
 </cs:chartStyle>
 </file>
@@ -24627,7 +25128,7 @@
           <p:nvPr>
             <p:extLst>
               <p:ext uri="{D42A27DB-BD31-4B8C-83A1-F6EECF244321}">
-                <p14:modId xmlns:p14="http://schemas.microsoft.com/office/powerpoint/2010/main" val="2582276213"/>
+                <p14:modId xmlns:p14="http://schemas.microsoft.com/office/powerpoint/2010/main" val="1959290627"/>
               </p:ext>
             </p:extLst>
           </p:nvPr>
@@ -24726,7 +25227,7 @@
         </p:nvSpPr>
         <p:spPr>
           <a:xfrm>
-            <a:off x="1534696" y="545445"/>
+            <a:off x="1335921" y="359915"/>
             <a:ext cx="9520158" cy="1049235"/>
           </a:xfrm>
         </p:spPr>
@@ -24736,7 +25237,7 @@
           <a:p>
             <a:r>
               <a:rPr lang="es-MX" dirty="0"/>
-              <a:t>Promedio duración de batería por dispositivo</a:t>
+              <a:t>Total horas en casa y fuera de casa de cada mascota</a:t>
             </a:r>
             <a:endParaRPr lang="es-EC" dirty="0"/>
           </a:p>
@@ -24757,7 +25258,7 @@
           <p:nvPr>
             <p:extLst>
               <p:ext uri="{D42A27DB-BD31-4B8C-83A1-F6EECF244321}">
-                <p14:modId xmlns:p14="http://schemas.microsoft.com/office/powerpoint/2010/main" val="3783592526"/>
+                <p14:modId xmlns:p14="http://schemas.microsoft.com/office/powerpoint/2010/main" val="2673568564"/>
               </p:ext>
             </p:extLst>
           </p:nvPr>
@@ -24858,7 +25359,7 @@
         </p:blipFill>
         <p:spPr>
           <a:xfrm>
-            <a:off x="2053765" y="1775238"/>
+            <a:off x="1854990" y="1753723"/>
             <a:ext cx="8482019" cy="3870188"/>
           </a:xfrm>
           <a:prstGeom prst="rect">

</xml_diff>

<commit_message>
walks schedles data ready
</commit_message>
<xml_diff>
--- a/excel_reports/IPApresentacion.pptx
+++ b/excel_reports/IPApresentacion.pptx
@@ -24736,7 +24736,7 @@
           <a:p>
             <a:r>
               <a:rPr lang="es-MX" dirty="0"/>
-              <a:t>Velocidad promedio paseo por mascota (KM/H)</a:t>
+              <a:t>Velocidad promedio paseo por mascota</a:t>
             </a:r>
             <a:endParaRPr lang="es-EC" dirty="0"/>
           </a:p>
@@ -24772,6 +24772,42 @@
           </a:graphicData>
         </a:graphic>
       </p:graphicFrame>
+      <p:sp>
+        <p:nvSpPr>
+          <p:cNvPr id="4" name="TextBox 3">
+            <a:extLst>
+              <a:ext uri="{FF2B5EF4-FFF2-40B4-BE49-F238E27FC236}">
+                <a16:creationId xmlns:a16="http://schemas.microsoft.com/office/drawing/2014/main" id="{F6D1A0EA-7C55-CFF9-8178-3280C94EFE38}"/>
+              </a:ext>
+            </a:extLst>
+          </p:cNvPr>
+          <p:cNvSpPr txBox="1"/>
+          <p:nvPr/>
+        </p:nvSpPr>
+        <p:spPr>
+          <a:xfrm rot="16200000">
+            <a:off x="903269" y="3114675"/>
+            <a:ext cx="837089" cy="369332"/>
+          </a:xfrm>
+          <a:prstGeom prst="rect">
+            <a:avLst/>
+          </a:prstGeom>
+          <a:noFill/>
+        </p:spPr>
+        <p:txBody>
+          <a:bodyPr wrap="none" rtlCol="0">
+            <a:spAutoFit/>
+          </a:bodyPr>
+          <a:lstStyle/>
+          <a:p>
+            <a:r>
+              <a:rPr lang="es-MX" dirty="0"/>
+              <a:t>KM/H</a:t>
+            </a:r>
+            <a:endParaRPr lang="es-EC" dirty="0"/>
+          </a:p>
+        </p:txBody>
+      </p:sp>
     </p:spTree>
     <p:extLst>
       <p:ext uri="{BB962C8B-B14F-4D97-AF65-F5344CB8AC3E}">
@@ -24919,7 +24955,7 @@
           <a:p>
             <a:r>
               <a:rPr lang="es-MX" dirty="0"/>
-              <a:t>Total de alarmas activadas por dispositivo</a:t>
+              <a:t>Total de alarmas activadas por rastreador</a:t>
             </a:r>
             <a:endParaRPr lang="es-EC" dirty="0"/>
           </a:p>
@@ -25013,7 +25049,7 @@
           <a:p>
             <a:r>
               <a:rPr lang="es-MX" dirty="0"/>
-              <a:t>Tipos de alarmas activadas por dispositivo</a:t>
+              <a:t>Tipos de alarmas activadas por rastreador</a:t>
             </a:r>
             <a:endParaRPr lang="es-EC" dirty="0"/>
           </a:p>
@@ -25049,6 +25085,42 @@
           </a:graphicData>
         </a:graphic>
       </p:graphicFrame>
+      <p:sp>
+        <p:nvSpPr>
+          <p:cNvPr id="3" name="TextBox 2">
+            <a:extLst>
+              <a:ext uri="{FF2B5EF4-FFF2-40B4-BE49-F238E27FC236}">
+                <a16:creationId xmlns:a16="http://schemas.microsoft.com/office/drawing/2014/main" id="{8E78D541-0C40-242C-D792-B992EC2C9880}"/>
+              </a:ext>
+            </a:extLst>
+          </p:cNvPr>
+          <p:cNvSpPr txBox="1"/>
+          <p:nvPr/>
+        </p:nvSpPr>
+        <p:spPr>
+          <a:xfrm rot="16200000">
+            <a:off x="699247" y="3130475"/>
+            <a:ext cx="1138453" cy="369332"/>
+          </a:xfrm>
+          <a:prstGeom prst="rect">
+            <a:avLst/>
+          </a:prstGeom>
+          <a:noFill/>
+        </p:spPr>
+        <p:txBody>
+          <a:bodyPr wrap="none" rtlCol="0">
+            <a:spAutoFit/>
+          </a:bodyPr>
+          <a:lstStyle/>
+          <a:p>
+            <a:r>
+              <a:rPr lang="es-MX" dirty="0"/>
+              <a:t>Cantidad</a:t>
+            </a:r>
+            <a:endParaRPr lang="es-EC" dirty="0"/>
+          </a:p>
+        </p:txBody>
+      </p:sp>
     </p:spTree>
     <p:extLst>
       <p:ext uri="{BB962C8B-B14F-4D97-AF65-F5344CB8AC3E}">
@@ -25097,7 +25169,7 @@
         </p:nvSpPr>
         <p:spPr>
           <a:xfrm>
-            <a:off x="1733478" y="608444"/>
+            <a:off x="1765751" y="361018"/>
             <a:ext cx="9520158" cy="1049235"/>
           </a:xfrm>
         </p:spPr>
@@ -25107,7 +25179,7 @@
           <a:p>
             <a:r>
               <a:rPr lang="es-MX" dirty="0"/>
-              <a:t>Promedio duración de batería por dispositivo</a:t>
+              <a:t>Promedio duración de batería por rastreador</a:t>
             </a:r>
             <a:endParaRPr lang="es-EC" dirty="0"/>
           </a:p>
@@ -25227,7 +25299,7 @@
         </p:nvSpPr>
         <p:spPr>
           <a:xfrm>
-            <a:off x="1335921" y="359915"/>
+            <a:off x="1534696" y="338399"/>
             <a:ext cx="9520158" cy="1049235"/>
           </a:xfrm>
         </p:spPr>
@@ -25237,7 +25309,7 @@
           <a:p>
             <a:r>
               <a:rPr lang="es-MX" dirty="0"/>
-              <a:t>Total horas en casa y fuera de casa de cada mascota</a:t>
+              <a:t>Tiempo dentro y fuera de casa de cada mascota</a:t>
             </a:r>
             <a:endParaRPr lang="es-EC" dirty="0"/>
           </a:p>
@@ -25273,6 +25345,42 @@
           </a:graphicData>
         </a:graphic>
       </p:graphicFrame>
+      <p:sp>
+        <p:nvSpPr>
+          <p:cNvPr id="3" name="TextBox 2">
+            <a:extLst>
+              <a:ext uri="{FF2B5EF4-FFF2-40B4-BE49-F238E27FC236}">
+                <a16:creationId xmlns:a16="http://schemas.microsoft.com/office/drawing/2014/main" id="{C44624DF-F617-0261-8B43-6EA3B02A3D06}"/>
+              </a:ext>
+            </a:extLst>
+          </p:cNvPr>
+          <p:cNvSpPr txBox="1"/>
+          <p:nvPr/>
+        </p:nvSpPr>
+        <p:spPr>
+          <a:xfrm rot="16200000">
+            <a:off x="633102" y="2897687"/>
+            <a:ext cx="1023949" cy="369332"/>
+          </a:xfrm>
+          <a:prstGeom prst="rect">
+            <a:avLst/>
+          </a:prstGeom>
+          <a:noFill/>
+        </p:spPr>
+        <p:txBody>
+          <a:bodyPr wrap="square" rtlCol="0">
+            <a:spAutoFit/>
+          </a:bodyPr>
+          <a:lstStyle/>
+          <a:p>
+            <a:r>
+              <a:rPr lang="es-MX" dirty="0"/>
+              <a:t>HORAS</a:t>
+            </a:r>
+            <a:endParaRPr lang="es-EC" dirty="0"/>
+          </a:p>
+        </p:txBody>
+      </p:sp>
     </p:spTree>
     <p:extLst>
       <p:ext uri="{BB962C8B-B14F-4D97-AF65-F5344CB8AC3E}">
@@ -25331,7 +25439,7 @@
           <a:p>
             <a:r>
               <a:rPr lang="es-MX" dirty="0"/>
-              <a:t>Promedio tiempo encendido/apagado de todos los dispositivos</a:t>
+              <a:t>Promedio tiempo encendido/apagado de todos los rastreadores</a:t>
             </a:r>
             <a:endParaRPr lang="es-EC" dirty="0"/>
           </a:p>
@@ -25425,7 +25533,7 @@
           <a:p>
             <a:r>
               <a:rPr lang="es-MX" dirty="0"/>
-              <a:t>Total tiempo encendido/apagado de cada dispositivo</a:t>
+              <a:t>Total tiempo encendido/apagado de cada rastreador</a:t>
             </a:r>
             <a:endParaRPr lang="es-EC" dirty="0"/>
           </a:p>
@@ -25461,6 +25569,42 @@
           </a:graphicData>
         </a:graphic>
       </p:graphicFrame>
+      <p:sp>
+        <p:nvSpPr>
+          <p:cNvPr id="3" name="TextBox 2">
+            <a:extLst>
+              <a:ext uri="{FF2B5EF4-FFF2-40B4-BE49-F238E27FC236}">
+                <a16:creationId xmlns:a16="http://schemas.microsoft.com/office/drawing/2014/main" id="{738C938D-B6EA-C72D-E2AC-B75DC26B8280}"/>
+              </a:ext>
+            </a:extLst>
+          </p:cNvPr>
+          <p:cNvSpPr txBox="1"/>
+          <p:nvPr/>
+        </p:nvSpPr>
+        <p:spPr>
+          <a:xfrm rot="16200000">
+            <a:off x="739860" y="3244333"/>
+            <a:ext cx="1013419" cy="369332"/>
+          </a:xfrm>
+          <a:prstGeom prst="rect">
+            <a:avLst/>
+          </a:prstGeom>
+          <a:noFill/>
+        </p:spPr>
+        <p:txBody>
+          <a:bodyPr wrap="none" rtlCol="0">
+            <a:spAutoFit/>
+          </a:bodyPr>
+          <a:lstStyle/>
+          <a:p>
+            <a:r>
+              <a:rPr lang="es-MX" dirty="0"/>
+              <a:t>HORAS</a:t>
+            </a:r>
+            <a:endParaRPr lang="es-EC" dirty="0"/>
+          </a:p>
+        </p:txBody>
+      </p:sp>
     </p:spTree>
     <p:extLst>
       <p:ext uri="{BB962C8B-B14F-4D97-AF65-F5344CB8AC3E}">
@@ -25519,42 +25663,12 @@
           <a:p>
             <a:r>
               <a:rPr lang="es-MX" dirty="0"/>
-              <a:t>Horarios promedio de paseo</a:t>
+              <a:t>Horarios promedio de paseo por cada mascota</a:t>
             </a:r>
             <a:endParaRPr lang="es-EC" dirty="0"/>
           </a:p>
         </p:txBody>
       </p:sp>
-      <p:pic>
-        <p:nvPicPr>
-          <p:cNvPr id="5" name="Picture 4">
-            <a:extLst>
-              <a:ext uri="{FF2B5EF4-FFF2-40B4-BE49-F238E27FC236}">
-                <a16:creationId xmlns:a16="http://schemas.microsoft.com/office/drawing/2014/main" id="{C6F64743-477E-3803-7CED-22ED5907ABC2}"/>
-              </a:ext>
-            </a:extLst>
-          </p:cNvPr>
-          <p:cNvPicPr>
-            <a:picLocks noChangeAspect="1"/>
-          </p:cNvPicPr>
-          <p:nvPr/>
-        </p:nvPicPr>
-        <p:blipFill>
-          <a:blip r:embed="rId2"/>
-          <a:stretch>
-            <a:fillRect/>
-          </a:stretch>
-        </p:blipFill>
-        <p:spPr>
-          <a:xfrm>
-            <a:off x="1534696" y="1594680"/>
-            <a:ext cx="8931414" cy="4017612"/>
-          </a:xfrm>
-          <a:prstGeom prst="rect">
-            <a:avLst/>
-          </a:prstGeom>
-        </p:spPr>
-      </p:pic>
     </p:spTree>
     <p:extLst>
       <p:ext uri="{BB962C8B-B14F-4D97-AF65-F5344CB8AC3E}">
@@ -25641,7 +25755,7 @@
         </p:blipFill>
         <p:spPr>
           <a:xfrm>
-            <a:off x="1373145" y="1594680"/>
+            <a:off x="1253078" y="1594680"/>
             <a:ext cx="10037363" cy="4220107"/>
           </a:xfrm>
           <a:prstGeom prst="rect">
@@ -25649,6 +25763,42 @@
           </a:prstGeom>
         </p:spPr>
       </p:pic>
+      <p:sp>
+        <p:nvSpPr>
+          <p:cNvPr id="3" name="TextBox 2">
+            <a:extLst>
+              <a:ext uri="{FF2B5EF4-FFF2-40B4-BE49-F238E27FC236}">
+                <a16:creationId xmlns:a16="http://schemas.microsoft.com/office/drawing/2014/main" id="{822E3475-0DB3-1B27-549C-09B2AE518503}"/>
+              </a:ext>
+            </a:extLst>
+          </p:cNvPr>
+          <p:cNvSpPr txBox="1"/>
+          <p:nvPr/>
+        </p:nvSpPr>
+        <p:spPr>
+          <a:xfrm rot="16200000">
+            <a:off x="571501" y="3244333"/>
+            <a:ext cx="1029449" cy="369332"/>
+          </a:xfrm>
+          <a:prstGeom prst="rect">
+            <a:avLst/>
+          </a:prstGeom>
+          <a:noFill/>
+        </p:spPr>
+        <p:txBody>
+          <a:bodyPr wrap="none" rtlCol="0">
+            <a:spAutoFit/>
+          </a:bodyPr>
+          <a:lstStyle/>
+          <a:p>
+            <a:r>
+              <a:rPr lang="es-MX" dirty="0"/>
+              <a:t>minutos</a:t>
+            </a:r>
+            <a:endParaRPr lang="es-EC" dirty="0"/>
+          </a:p>
+        </p:txBody>
+      </p:sp>
     </p:spTree>
     <p:extLst>
       <p:ext uri="{BB962C8B-B14F-4D97-AF65-F5344CB8AC3E}">

</xml_diff>

<commit_message>
todo listo antes de la presentacion
</commit_message>
<xml_diff>
--- a/excel_reports/IPApresentacion.pptx
+++ b/excel_reports/IPApresentacion.pptx
@@ -15,6 +15,7 @@
     <p:sldId id="264" r:id="rId9"/>
     <p:sldId id="265" r:id="rId10"/>
     <p:sldId id="266" r:id="rId11"/>
+    <p:sldId id="267" r:id="rId12"/>
   </p:sldIdLst>
   <p:sldSz cx="12192000" cy="6858000"/>
   <p:notesSz cx="6858000" cy="9144000"/>
@@ -1583,6 +1584,574 @@
 </c:chartSpace>
 </file>
 
+<file path=ppt/charts/chart10.xml><?xml version="1.0" encoding="utf-8"?>
+<c:chartSpace xmlns:c="http://schemas.openxmlformats.org/drawingml/2006/chart" xmlns:a="http://schemas.openxmlformats.org/drawingml/2006/main" xmlns:r="http://schemas.openxmlformats.org/officeDocument/2006/relationships" xmlns:c16r2="http://schemas.microsoft.com/office/drawing/2015/06/chart">
+  <c:date1904 val="0"/>
+  <c:lang val="en-US"/>
+  <c:roundedCorners val="0"/>
+  <mc:AlternateContent xmlns:mc="http://schemas.openxmlformats.org/markup-compatibility/2006">
+    <mc:Choice xmlns:c14="http://schemas.microsoft.com/office/drawing/2007/8/2/chart" Requires="c14">
+      <c14:style val="102"/>
+    </mc:Choice>
+    <mc:Fallback>
+      <c:style val="2"/>
+    </mc:Fallback>
+  </mc:AlternateContent>
+  <c:pivotSource>
+    <c:name>[averageDistancesTraveled.xlsx]Sheet2!PivotTable2</c:name>
+    <c:fmtId val="3"/>
+  </c:pivotSource>
+  <c:chart>
+    <c:autoTitleDeleted val="1"/>
+    <c:pivotFmts>
+      <c:pivotFmt>
+        <c:idx val="0"/>
+        <c:spPr>
+          <a:solidFill>
+            <a:schemeClr val="accent1"/>
+          </a:solidFill>
+          <a:ln>
+            <a:noFill/>
+          </a:ln>
+          <a:effectLst/>
+          <a:scene3d>
+            <a:camera prst="orthographicFront">
+              <a:rot lat="0" lon="0" rev="0"/>
+            </a:camera>
+            <a:lightRig rig="balanced" dir="t">
+              <a:rot lat="0" lon="0" rev="1080000"/>
+            </a:lightRig>
+          </a:scene3d>
+          <a:sp3d>
+            <a:bevelT w="38100" h="12700" prst="softRound"/>
+          </a:sp3d>
+        </c:spPr>
+        <c:marker>
+          <c:symbol val="none"/>
+        </c:marker>
+        <c:dLbl>
+          <c:idx val="0"/>
+          <c:spPr>
+            <a:noFill/>
+            <a:ln>
+              <a:noFill/>
+            </a:ln>
+            <a:effectLst/>
+          </c:spPr>
+          <c:txPr>
+            <a:bodyPr rot="0" spcFirstLastPara="1" vertOverflow="ellipsis" vert="horz" wrap="square" lIns="38100" tIns="19050" rIns="38100" bIns="19050" anchor="ctr" anchorCtr="1">
+              <a:spAutoFit/>
+            </a:bodyPr>
+            <a:lstStyle/>
+            <a:p>
+              <a:pPr>
+                <a:defRPr sz="900" b="0" i="0" u="none" strike="noStrike" kern="1200" baseline="0">
+                  <a:solidFill>
+                    <a:schemeClr val="tx1">
+                      <a:lumMod val="75000"/>
+                      <a:lumOff val="25000"/>
+                    </a:schemeClr>
+                  </a:solidFill>
+                  <a:latin typeface="+mn-lt"/>
+                  <a:ea typeface="+mn-ea"/>
+                  <a:cs typeface="+mn-cs"/>
+                </a:defRPr>
+              </a:pPr>
+              <a:endParaRPr lang="es-EC"/>
+            </a:p>
+          </c:txPr>
+          <c:showLegendKey val="0"/>
+          <c:showVal val="0"/>
+          <c:showCatName val="0"/>
+          <c:showSerName val="0"/>
+          <c:showPercent val="0"/>
+          <c:showBubbleSize val="0"/>
+          <c:extLst>
+            <c:ext xmlns:c15="http://schemas.microsoft.com/office/drawing/2012/chart" uri="{CE6537A1-D6FC-4f65-9D91-7224C49458BB}"/>
+          </c:extLst>
+        </c:dLbl>
+      </c:pivotFmt>
+      <c:pivotFmt>
+        <c:idx val="1"/>
+        <c:spPr>
+          <a:solidFill>
+            <a:schemeClr val="accent1"/>
+          </a:solidFill>
+          <a:ln>
+            <a:noFill/>
+          </a:ln>
+          <a:effectLst/>
+          <a:scene3d>
+            <a:camera prst="orthographicFront">
+              <a:rot lat="0" lon="0" rev="0"/>
+            </a:camera>
+            <a:lightRig rig="balanced" dir="t">
+              <a:rot lat="0" lon="0" rev="1080000"/>
+            </a:lightRig>
+          </a:scene3d>
+          <a:sp3d>
+            <a:bevelT w="38100" h="12700" prst="softRound"/>
+          </a:sp3d>
+        </c:spPr>
+        <c:marker>
+          <c:symbol val="none"/>
+        </c:marker>
+        <c:dLbl>
+          <c:idx val="0"/>
+          <c:spPr>
+            <a:noFill/>
+            <a:ln>
+              <a:noFill/>
+            </a:ln>
+            <a:effectLst/>
+          </c:spPr>
+          <c:txPr>
+            <a:bodyPr rot="0" spcFirstLastPara="1" vertOverflow="ellipsis" vert="horz" wrap="square" lIns="38100" tIns="19050" rIns="38100" bIns="19050" anchor="ctr" anchorCtr="1">
+              <a:spAutoFit/>
+            </a:bodyPr>
+            <a:lstStyle/>
+            <a:p>
+              <a:pPr>
+                <a:defRPr sz="900" b="0" i="0" u="none" strike="noStrike" kern="1200" baseline="0">
+                  <a:solidFill>
+                    <a:schemeClr val="tx1">
+                      <a:lumMod val="75000"/>
+                      <a:lumOff val="25000"/>
+                    </a:schemeClr>
+                  </a:solidFill>
+                  <a:latin typeface="+mn-lt"/>
+                  <a:ea typeface="+mn-ea"/>
+                  <a:cs typeface="+mn-cs"/>
+                </a:defRPr>
+              </a:pPr>
+              <a:endParaRPr lang="es-EC"/>
+            </a:p>
+          </c:txPr>
+          <c:showLegendKey val="0"/>
+          <c:showVal val="0"/>
+          <c:showCatName val="0"/>
+          <c:showSerName val="0"/>
+          <c:showPercent val="0"/>
+          <c:showBubbleSize val="0"/>
+          <c:extLst>
+            <c:ext xmlns:c15="http://schemas.microsoft.com/office/drawing/2012/chart" uri="{CE6537A1-D6FC-4f65-9D91-7224C49458BB}"/>
+          </c:extLst>
+        </c:dLbl>
+      </c:pivotFmt>
+      <c:pivotFmt>
+        <c:idx val="2"/>
+        <c:spPr>
+          <a:solidFill>
+            <a:schemeClr val="accent1"/>
+          </a:solidFill>
+          <a:ln>
+            <a:noFill/>
+          </a:ln>
+          <a:effectLst/>
+          <a:scene3d>
+            <a:camera prst="orthographicFront">
+              <a:rot lat="0" lon="0" rev="0"/>
+            </a:camera>
+            <a:lightRig rig="balanced" dir="t">
+              <a:rot lat="0" lon="0" rev="1080000"/>
+            </a:lightRig>
+          </a:scene3d>
+          <a:sp3d>
+            <a:bevelT w="38100" h="12700" prst="softRound"/>
+          </a:sp3d>
+        </c:spPr>
+        <c:marker>
+          <c:symbol val="none"/>
+        </c:marker>
+        <c:dLbl>
+          <c:idx val="0"/>
+          <c:spPr>
+            <a:noFill/>
+            <a:ln>
+              <a:noFill/>
+            </a:ln>
+            <a:effectLst/>
+          </c:spPr>
+          <c:txPr>
+            <a:bodyPr rot="0" spcFirstLastPara="1" vertOverflow="ellipsis" vert="horz" wrap="square" lIns="38100" tIns="19050" rIns="38100" bIns="19050" anchor="ctr" anchorCtr="1">
+              <a:spAutoFit/>
+            </a:bodyPr>
+            <a:lstStyle/>
+            <a:p>
+              <a:pPr>
+                <a:defRPr sz="900" b="0" i="0" u="none" strike="noStrike" kern="1200" baseline="0">
+                  <a:solidFill>
+                    <a:schemeClr val="tx1">
+                      <a:lumMod val="75000"/>
+                      <a:lumOff val="25000"/>
+                    </a:schemeClr>
+                  </a:solidFill>
+                  <a:latin typeface="+mn-lt"/>
+                  <a:ea typeface="+mn-ea"/>
+                  <a:cs typeface="+mn-cs"/>
+                </a:defRPr>
+              </a:pPr>
+              <a:endParaRPr lang="es-EC"/>
+            </a:p>
+          </c:txPr>
+          <c:showLegendKey val="0"/>
+          <c:showVal val="0"/>
+          <c:showCatName val="0"/>
+          <c:showSerName val="0"/>
+          <c:showPercent val="0"/>
+          <c:showBubbleSize val="0"/>
+          <c:extLst>
+            <c:ext xmlns:c15="http://schemas.microsoft.com/office/drawing/2012/chart" uri="{CE6537A1-D6FC-4f65-9D91-7224C49458BB}"/>
+          </c:extLst>
+        </c:dLbl>
+      </c:pivotFmt>
+    </c:pivotFmts>
+    <c:plotArea>
+      <c:layout/>
+      <c:barChart>
+        <c:barDir val="col"/>
+        <c:grouping val="clustered"/>
+        <c:varyColors val="0"/>
+        <c:ser>
+          <c:idx val="0"/>
+          <c:order val="0"/>
+          <c:tx>
+            <c:strRef>
+              <c:f>Sheet2!$B$21</c:f>
+              <c:strCache>
+                <c:ptCount val="1"/>
+                <c:pt idx="0">
+                  <c:v>Total</c:v>
+                </c:pt>
+              </c:strCache>
+            </c:strRef>
+          </c:tx>
+          <c:spPr>
+            <a:gradFill rotWithShape="1">
+              <a:gsLst>
+                <a:gs pos="0">
+                  <a:schemeClr val="accent1">
+                    <a:tint val="98000"/>
+                    <a:satMod val="110000"/>
+                    <a:lumMod val="104000"/>
+                  </a:schemeClr>
+                </a:gs>
+                <a:gs pos="69000">
+                  <a:schemeClr val="accent1">
+                    <a:shade val="88000"/>
+                    <a:satMod val="130000"/>
+                    <a:lumMod val="92000"/>
+                  </a:schemeClr>
+                </a:gs>
+                <a:gs pos="100000">
+                  <a:schemeClr val="accent1">
+                    <a:shade val="78000"/>
+                    <a:satMod val="130000"/>
+                    <a:lumMod val="92000"/>
+                  </a:schemeClr>
+                </a:gs>
+              </a:gsLst>
+              <a:lin ang="5400000" scaled="0"/>
+            </a:gradFill>
+            <a:ln>
+              <a:noFill/>
+            </a:ln>
+            <a:effectLst>
+              <a:outerShdw blurRad="50800" dist="50800" dir="5400000" sx="96000" sy="96000" rotWithShape="0">
+                <a:srgbClr val="000000">
+                  <a:alpha val="48000"/>
+                </a:srgbClr>
+              </a:outerShdw>
+            </a:effectLst>
+            <a:scene3d>
+              <a:camera prst="orthographicFront">
+                <a:rot lat="0" lon="0" rev="0"/>
+              </a:camera>
+              <a:lightRig rig="balanced" dir="t">
+                <a:rot lat="0" lon="0" rev="1080000"/>
+              </a:lightRig>
+            </a:scene3d>
+            <a:sp3d>
+              <a:bevelT w="38100" h="12700" prst="softRound"/>
+            </a:sp3d>
+          </c:spPr>
+          <c:invertIfNegative val="0"/>
+          <c:cat>
+            <c:strRef>
+              <c:f>Sheet2!$A$22:$A$32</c:f>
+              <c:strCache>
+                <c:ptCount val="10"/>
+                <c:pt idx="0">
+                  <c:v>Amigo</c:v>
+                </c:pt>
+                <c:pt idx="1">
+                  <c:v>Chimu</c:v>
+                </c:pt>
+                <c:pt idx="2">
+                  <c:v>Lara</c:v>
+                </c:pt>
+                <c:pt idx="3">
+                  <c:v>Maddy</c:v>
+                </c:pt>
+                <c:pt idx="4">
+                  <c:v>Mora</c:v>
+                </c:pt>
+                <c:pt idx="5">
+                  <c:v>Neutron</c:v>
+                </c:pt>
+                <c:pt idx="6">
+                  <c:v>René</c:v>
+                </c:pt>
+                <c:pt idx="7">
+                  <c:v>Sambayón</c:v>
+                </c:pt>
+                <c:pt idx="8">
+                  <c:v>Sari</c:v>
+                </c:pt>
+                <c:pt idx="9">
+                  <c:v>Tiana</c:v>
+                </c:pt>
+              </c:strCache>
+            </c:strRef>
+          </c:cat>
+          <c:val>
+            <c:numRef>
+              <c:f>Sheet2!$B$22:$B$32</c:f>
+              <c:numCache>
+                <c:formatCode>General</c:formatCode>
+                <c:ptCount val="10"/>
+                <c:pt idx="0">
+                  <c:v>25.47</c:v>
+                </c:pt>
+                <c:pt idx="1">
+                  <c:v>20.87</c:v>
+                </c:pt>
+                <c:pt idx="2">
+                  <c:v>22.3</c:v>
+                </c:pt>
+                <c:pt idx="3">
+                  <c:v>59.74</c:v>
+                </c:pt>
+                <c:pt idx="4">
+                  <c:v>14.89</c:v>
+                </c:pt>
+                <c:pt idx="5">
+                  <c:v>11.1</c:v>
+                </c:pt>
+                <c:pt idx="6">
+                  <c:v>14.82</c:v>
+                </c:pt>
+                <c:pt idx="7">
+                  <c:v>21.15</c:v>
+                </c:pt>
+                <c:pt idx="8">
+                  <c:v>31.6</c:v>
+                </c:pt>
+                <c:pt idx="9">
+                  <c:v>52.87</c:v>
+                </c:pt>
+              </c:numCache>
+            </c:numRef>
+          </c:val>
+          <c:extLst>
+            <c:ext xmlns:c16="http://schemas.microsoft.com/office/drawing/2014/chart" uri="{C3380CC4-5D6E-409C-BE32-E72D297353CC}">
+              <c16:uniqueId val="{00000000-8953-45BA-B01F-A5E7F07BAACF}"/>
+            </c:ext>
+          </c:extLst>
+        </c:ser>
+        <c:dLbls>
+          <c:showLegendKey val="0"/>
+          <c:showVal val="0"/>
+          <c:showCatName val="0"/>
+          <c:showSerName val="0"/>
+          <c:showPercent val="0"/>
+          <c:showBubbleSize val="0"/>
+        </c:dLbls>
+        <c:gapWidth val="100"/>
+        <c:overlap val="-24"/>
+        <c:axId val="1595320512"/>
+        <c:axId val="2091930192"/>
+      </c:barChart>
+      <c:catAx>
+        <c:axId val="1595320512"/>
+        <c:scaling>
+          <c:orientation val="minMax"/>
+        </c:scaling>
+        <c:delete val="0"/>
+        <c:axPos val="b"/>
+        <c:numFmt formatCode="General" sourceLinked="1"/>
+        <c:majorTickMark val="none"/>
+        <c:minorTickMark val="none"/>
+        <c:tickLblPos val="nextTo"/>
+        <c:spPr>
+          <a:noFill/>
+          <a:ln w="12700" cap="flat" cmpd="sng" algn="ctr">
+            <a:solidFill>
+              <a:schemeClr val="lt1">
+                <a:lumMod val="95000"/>
+                <a:alpha val="54000"/>
+              </a:schemeClr>
+            </a:solidFill>
+            <a:round/>
+          </a:ln>
+          <a:effectLst/>
+        </c:spPr>
+        <c:txPr>
+          <a:bodyPr rot="-60000000" spcFirstLastPara="1" vertOverflow="ellipsis" vert="horz" wrap="square" anchor="ctr" anchorCtr="1"/>
+          <a:lstStyle/>
+          <a:p>
+            <a:pPr>
+              <a:defRPr sz="1197" b="0" i="0" u="none" strike="noStrike" kern="1200" baseline="0">
+                <a:solidFill>
+                  <a:schemeClr val="lt1">
+                    <a:lumMod val="85000"/>
+                  </a:schemeClr>
+                </a:solidFill>
+                <a:latin typeface="+mn-lt"/>
+                <a:ea typeface="+mn-ea"/>
+                <a:cs typeface="+mn-cs"/>
+              </a:defRPr>
+            </a:pPr>
+            <a:endParaRPr lang="es-EC"/>
+          </a:p>
+        </c:txPr>
+        <c:crossAx val="2091930192"/>
+        <c:crosses val="autoZero"/>
+        <c:auto val="1"/>
+        <c:lblAlgn val="ctr"/>
+        <c:lblOffset val="100"/>
+        <c:noMultiLvlLbl val="0"/>
+      </c:catAx>
+      <c:valAx>
+        <c:axId val="2091930192"/>
+        <c:scaling>
+          <c:orientation val="minMax"/>
+        </c:scaling>
+        <c:delete val="0"/>
+        <c:axPos val="l"/>
+        <c:majorGridlines>
+          <c:spPr>
+            <a:ln w="9525" cap="flat" cmpd="sng" algn="ctr">
+              <a:solidFill>
+                <a:schemeClr val="lt1">
+                  <a:lumMod val="95000"/>
+                  <a:alpha val="10000"/>
+                </a:schemeClr>
+              </a:solidFill>
+              <a:round/>
+            </a:ln>
+            <a:effectLst/>
+          </c:spPr>
+        </c:majorGridlines>
+        <c:numFmt formatCode="General" sourceLinked="1"/>
+        <c:majorTickMark val="none"/>
+        <c:minorTickMark val="none"/>
+        <c:tickLblPos val="nextTo"/>
+        <c:spPr>
+          <a:noFill/>
+          <a:ln>
+            <a:noFill/>
+          </a:ln>
+          <a:effectLst/>
+        </c:spPr>
+        <c:txPr>
+          <a:bodyPr rot="-60000000" spcFirstLastPara="1" vertOverflow="ellipsis" vert="horz" wrap="square" anchor="ctr" anchorCtr="1"/>
+          <a:lstStyle/>
+          <a:p>
+            <a:pPr>
+              <a:defRPr sz="1197" b="0" i="0" u="none" strike="noStrike" kern="1200" baseline="0">
+                <a:solidFill>
+                  <a:schemeClr val="lt1">
+                    <a:lumMod val="85000"/>
+                  </a:schemeClr>
+                </a:solidFill>
+                <a:latin typeface="+mn-lt"/>
+                <a:ea typeface="+mn-ea"/>
+                <a:cs typeface="+mn-cs"/>
+              </a:defRPr>
+            </a:pPr>
+            <a:endParaRPr lang="es-EC"/>
+          </a:p>
+        </c:txPr>
+        <c:crossAx val="1595320512"/>
+        <c:crosses val="autoZero"/>
+        <c:crossBetween val="between"/>
+      </c:valAx>
+      <c:spPr>
+        <a:noFill/>
+        <a:ln>
+          <a:noFill/>
+        </a:ln>
+        <a:effectLst/>
+      </c:spPr>
+    </c:plotArea>
+    <c:plotVisOnly val="1"/>
+    <c:dispBlanksAs val="gap"/>
+    <c:extLst>
+      <c:ext xmlns:c16r3="http://schemas.microsoft.com/office/drawing/2017/03/chart" uri="{56B9EC1D-385E-4148-901F-78D8002777C0}">
+        <c16r3:dataDisplayOptions16>
+          <c16r3:dispNaAsBlank val="1"/>
+        </c16r3:dataDisplayOptions16>
+      </c:ext>
+    </c:extLst>
+    <c:showDLblsOverMax val="0"/>
+  </c:chart>
+  <c:spPr>
+    <a:gradFill flip="none" rotWithShape="1">
+      <a:gsLst>
+        <a:gs pos="0">
+          <a:schemeClr val="dk1">
+            <a:lumMod val="65000"/>
+            <a:lumOff val="35000"/>
+          </a:schemeClr>
+        </a:gs>
+        <a:gs pos="100000">
+          <a:schemeClr val="dk1">
+            <a:lumMod val="85000"/>
+            <a:lumOff val="15000"/>
+          </a:schemeClr>
+        </a:gs>
+      </a:gsLst>
+      <a:path path="circle">
+        <a:fillToRect l="50000" t="50000" r="50000" b="50000"/>
+      </a:path>
+      <a:tileRect/>
+    </a:gradFill>
+    <a:ln>
+      <a:noFill/>
+    </a:ln>
+    <a:effectLst/>
+  </c:spPr>
+  <c:txPr>
+    <a:bodyPr/>
+    <a:lstStyle/>
+    <a:p>
+      <a:pPr>
+        <a:defRPr/>
+      </a:pPr>
+      <a:endParaRPr lang="es-EC"/>
+    </a:p>
+  </c:txPr>
+  <c:externalData r:id="rId3">
+    <c:autoUpdate val="0"/>
+  </c:externalData>
+  <c:extLst>
+    <c:ext xmlns:c14="http://schemas.microsoft.com/office/drawing/2007/8/2/chart" uri="{781A3756-C4B2-4CAC-9D66-4F8BD8637D16}">
+      <c14:pivotOptions>
+        <c14:dropZoneFilter val="1"/>
+        <c14:dropZoneCategories val="1"/>
+        <c14:dropZoneData val="1"/>
+      </c14:pivotOptions>
+    </c:ext>
+    <c:ext xmlns:c16="http://schemas.microsoft.com/office/drawing/2014/chart" uri="{E28EC0CA-F0BB-4C9C-879D-F8772B89E7AC}">
+      <c16:pivotOptions16>
+        <c16:showExpandCollapseFieldButtons val="1"/>
+      </c16:pivotOptions16>
+    </c:ext>
+  </c:extLst>
+</c:chartSpace>
+</file>
+
 <file path=ppt/charts/chart2.xml><?xml version="1.0" encoding="utf-8"?>
 <c:chartSpace xmlns:c="http://schemas.openxmlformats.org/drawingml/2006/chart" xmlns:a="http://schemas.openxmlformats.org/drawingml/2006/main" xmlns:r="http://schemas.openxmlformats.org/officeDocument/2006/relationships" xmlns:c16r2="http://schemas.microsoft.com/office/drawing/2015/06/chart">
   <c:date1904 val="0"/>
@@ -6660,7 +7229,7 @@
   </mc:AlternateContent>
   <c:pivotSource>
     <c:name>[time_in_and_out_home.xlsx]Sheet1!PivotTable1</c:name>
-    <c:fmtId val="3"/>
+    <c:fmtId val="6"/>
   </c:pivotSource>
   <c:chart>
     <c:autoTitleDeleted val="0"/>
@@ -8295,32 +8864,9 @@
             </c:strRef>
           </c:tx>
           <c:spPr>
-            <a:gradFill rotWithShape="1">
-              <a:gsLst>
-                <a:gs pos="0">
-                  <a:schemeClr val="accent1">
-                    <a:tint val="98000"/>
-                    <a:satMod val="110000"/>
-                    <a:lumMod val="104000"/>
-                  </a:schemeClr>
-                </a:gs>
-                <a:gs pos="69000">
-                  <a:schemeClr val="accent1">
-                    <a:shade val="88000"/>
-                    <a:satMod val="130000"/>
-                    <a:lumMod val="92000"/>
-                  </a:schemeClr>
-                </a:gs>
-                <a:gs pos="100000">
-                  <a:schemeClr val="accent1">
-                    <a:shade val="78000"/>
-                    <a:satMod val="130000"/>
-                    <a:lumMod val="92000"/>
-                  </a:schemeClr>
-                </a:gs>
-              </a:gsLst>
-              <a:lin ang="5400000" scaled="0"/>
-            </a:gradFill>
+            <a:solidFill>
+              <a:srgbClr val="00FF00"/>
+            </a:solidFill>
             <a:ln>
               <a:noFill/>
             </a:ln>
@@ -8389,41 +8935,41 @@
                 <c:formatCode>General</c:formatCode>
                 <c:ptCount val="10"/>
                 <c:pt idx="0">
-                  <c:v>240</c:v>
+                  <c:v>178.6727533333333</c:v>
                 </c:pt>
                 <c:pt idx="1">
-                  <c:v>195</c:v>
+                  <c:v>201.55052444444439</c:v>
                 </c:pt>
                 <c:pt idx="2">
-                  <c:v>130</c:v>
+                  <c:v>154.36643361111109</c:v>
                 </c:pt>
                 <c:pt idx="3">
-                  <c:v>223</c:v>
+                  <c:v>106.68880666666669</c:v>
                 </c:pt>
                 <c:pt idx="4">
-                  <c:v>206</c:v>
+                  <c:v>73.316273888888887</c:v>
                 </c:pt>
                 <c:pt idx="5">
-                  <c:v>132</c:v>
+                  <c:v>117.35232999999999</c:v>
                 </c:pt>
                 <c:pt idx="6">
-                  <c:v>189</c:v>
+                  <c:v>42.655658611111107</c:v>
                 </c:pt>
                 <c:pt idx="7">
-                  <c:v>279</c:v>
+                  <c:v>183.83810361111111</c:v>
                 </c:pt>
                 <c:pt idx="8">
-                  <c:v>282</c:v>
+                  <c:v>212.19067861111111</c:v>
                 </c:pt>
                 <c:pt idx="9">
-                  <c:v>144</c:v>
+                  <c:v>127.88500500000001</c:v>
                 </c:pt>
               </c:numCache>
             </c:numRef>
           </c:val>
           <c:extLst>
             <c:ext xmlns:c16="http://schemas.microsoft.com/office/drawing/2014/chart" uri="{C3380CC4-5D6E-409C-BE32-E72D297353CC}">
-              <c16:uniqueId val="{00000000-7091-48A8-8EFE-0BBA73E1E4CA}"/>
+              <c16:uniqueId val="{00000000-7E2B-4F81-AEF2-BA7FCD470B9A}"/>
             </c:ext>
           </c:extLst>
         </c:ser>
@@ -8513,41 +9059,41 @@
                 <c:formatCode>General</c:formatCode>
                 <c:ptCount val="10"/>
                 <c:pt idx="0">
-                  <c:v>0</c:v>
+                  <c:v>2.8337616666666672</c:v>
                 </c:pt>
                 <c:pt idx="1">
-                  <c:v>1</c:v>
+                  <c:v>8.144715555555555</c:v>
                 </c:pt>
                 <c:pt idx="2">
-                  <c:v>158</c:v>
+                  <c:v>3.3185705555555551</c:v>
                 </c:pt>
                 <c:pt idx="3">
-                  <c:v>0</c:v>
+                  <c:v>17.479679444444439</c:v>
                 </c:pt>
                 <c:pt idx="4">
-                  <c:v>2</c:v>
+                  <c:v>4.1962247222222224</c:v>
                 </c:pt>
                 <c:pt idx="5">
-                  <c:v>5</c:v>
+                  <c:v>2.2162852777777782</c:v>
                 </c:pt>
                 <c:pt idx="6">
-                  <c:v>19</c:v>
+                  <c:v>7.5203888888888876E-2</c:v>
                 </c:pt>
                 <c:pt idx="7">
-                  <c:v>4</c:v>
+                  <c:v>1.331275</c:v>
                 </c:pt>
                 <c:pt idx="8">
-                  <c:v>0</c:v>
+                  <c:v>0.42446</c:v>
                 </c:pt>
                 <c:pt idx="9">
-                  <c:v>140</c:v>
+                  <c:v>7.6480355555555546</c:v>
                 </c:pt>
               </c:numCache>
             </c:numRef>
           </c:val>
           <c:extLst>
             <c:ext xmlns:c16="http://schemas.microsoft.com/office/drawing/2014/chart" uri="{C3380CC4-5D6E-409C-BE32-E72D297353CC}">
-              <c16:uniqueId val="{00000001-7091-48A8-8EFE-0BBA73E1E4CA}"/>
+              <c16:uniqueId val="{00000001-7E2B-4F81-AEF2-BA7FCD470B9A}"/>
             </c:ext>
           </c:extLst>
         </c:ser>
@@ -8805,6 +9351,17 @@
             <a:noFill/>
           </a:ln>
           <a:effectLst/>
+          <a:scene3d>
+            <a:camera prst="orthographicFront">
+              <a:rot lat="0" lon="0" rev="0"/>
+            </a:camera>
+            <a:lightRig rig="balanced" dir="t">
+              <a:rot lat="0" lon="0" rev="1080000"/>
+            </a:lightRig>
+          </a:scene3d>
+          <a:sp3d>
+            <a:bevelT w="38100" h="12700" prst="softRound"/>
+          </a:sp3d>
         </c:spPr>
         <c:marker>
           <c:symbol val="none"/>
@@ -8861,6 +9418,17 @@
             <a:noFill/>
           </a:ln>
           <a:effectLst/>
+          <a:scene3d>
+            <a:camera prst="orthographicFront">
+              <a:rot lat="0" lon="0" rev="0"/>
+            </a:camera>
+            <a:lightRig rig="balanced" dir="t">
+              <a:rot lat="0" lon="0" rev="1080000"/>
+            </a:lightRig>
+          </a:scene3d>
+          <a:sp3d>
+            <a:bevelT w="38100" h="12700" prst="softRound"/>
+          </a:sp3d>
         </c:spPr>
         <c:marker>
           <c:symbol val="none"/>
@@ -8917,6 +9485,17 @@
             <a:noFill/>
           </a:ln>
           <a:effectLst/>
+          <a:scene3d>
+            <a:camera prst="orthographicFront">
+              <a:rot lat="0" lon="0" rev="0"/>
+            </a:camera>
+            <a:lightRig rig="balanced" dir="t">
+              <a:rot lat="0" lon="0" rev="1080000"/>
+            </a:lightRig>
+          </a:scene3d>
+          <a:sp3d>
+            <a:bevelT w="38100" h="12700" prst="softRound"/>
+          </a:sp3d>
         </c:spPr>
         <c:marker>
           <c:symbol val="none"/>
@@ -8973,6 +9552,17 @@
             <a:noFill/>
           </a:ln>
           <a:effectLst/>
+          <a:scene3d>
+            <a:camera prst="orthographicFront">
+              <a:rot lat="0" lon="0" rev="0"/>
+            </a:camera>
+            <a:lightRig rig="balanced" dir="t">
+              <a:rot lat="0" lon="0" rev="1080000"/>
+            </a:lightRig>
+          </a:scene3d>
+          <a:sp3d>
+            <a:bevelT w="38100" h="12700" prst="softRound"/>
+          </a:sp3d>
         </c:spPr>
         <c:marker>
           <c:symbol val="none"/>
@@ -9029,6 +9619,17 @@
             <a:noFill/>
           </a:ln>
           <a:effectLst/>
+          <a:scene3d>
+            <a:camera prst="orthographicFront">
+              <a:rot lat="0" lon="0" rev="0"/>
+            </a:camera>
+            <a:lightRig rig="balanced" dir="t">
+              <a:rot lat="0" lon="0" rev="1080000"/>
+            </a:lightRig>
+          </a:scene3d>
+          <a:sp3d>
+            <a:bevelT w="38100" h="12700" prst="softRound"/>
+          </a:sp3d>
         </c:spPr>
         <c:marker>
           <c:symbol val="none"/>
@@ -9085,6 +9686,17 @@
             <a:noFill/>
           </a:ln>
           <a:effectLst/>
+          <a:scene3d>
+            <a:camera prst="orthographicFront">
+              <a:rot lat="0" lon="0" rev="0"/>
+            </a:camera>
+            <a:lightRig rig="balanced" dir="t">
+              <a:rot lat="0" lon="0" rev="1080000"/>
+            </a:lightRig>
+          </a:scene3d>
+          <a:sp3d>
+            <a:bevelT w="38100" h="12700" prst="softRound"/>
+          </a:sp3d>
         </c:spPr>
         <c:marker>
           <c:symbol val="none"/>
@@ -9141,6 +9753,17 @@
             <a:noFill/>
           </a:ln>
           <a:effectLst/>
+          <a:scene3d>
+            <a:camera prst="orthographicFront">
+              <a:rot lat="0" lon="0" rev="0"/>
+            </a:camera>
+            <a:lightRig rig="balanced" dir="t">
+              <a:rot lat="0" lon="0" rev="1080000"/>
+            </a:lightRig>
+          </a:scene3d>
+          <a:sp3d>
+            <a:bevelT w="38100" h="12700" prst="softRound"/>
+          </a:sp3d>
         </c:spPr>
         <c:marker>
           <c:symbol val="none"/>
@@ -9197,6 +9820,17 @@
             <a:noFill/>
           </a:ln>
           <a:effectLst/>
+          <a:scene3d>
+            <a:camera prst="orthographicFront">
+              <a:rot lat="0" lon="0" rev="0"/>
+            </a:camera>
+            <a:lightRig rig="balanced" dir="t">
+              <a:rot lat="0" lon="0" rev="1080000"/>
+            </a:lightRig>
+          </a:scene3d>
+          <a:sp3d>
+            <a:bevelT w="38100" h="12700" prst="softRound"/>
+          </a:sp3d>
         </c:spPr>
         <c:marker>
           <c:symbol val="none"/>
@@ -9253,6 +9887,17 @@
             <a:noFill/>
           </a:ln>
           <a:effectLst/>
+          <a:scene3d>
+            <a:camera prst="orthographicFront">
+              <a:rot lat="0" lon="0" rev="0"/>
+            </a:camera>
+            <a:lightRig rig="balanced" dir="t">
+              <a:rot lat="0" lon="0" rev="1080000"/>
+            </a:lightRig>
+          </a:scene3d>
+          <a:sp3d>
+            <a:bevelT w="38100" h="12700" prst="softRound"/>
+          </a:sp3d>
         </c:spPr>
         <c:marker>
           <c:symbol val="none"/>
@@ -9309,6 +9954,17 @@
             <a:noFill/>
           </a:ln>
           <a:effectLst/>
+          <a:scene3d>
+            <a:camera prst="orthographicFront">
+              <a:rot lat="0" lon="0" rev="0"/>
+            </a:camera>
+            <a:lightRig rig="balanced" dir="t">
+              <a:rot lat="0" lon="0" rev="1080000"/>
+            </a:lightRig>
+          </a:scene3d>
+          <a:sp3d>
+            <a:bevelT w="38100" h="12700" prst="softRound"/>
+          </a:sp3d>
         </c:spPr>
         <c:marker>
           <c:symbol val="none"/>
@@ -9365,6 +10021,17 @@
             <a:noFill/>
           </a:ln>
           <a:effectLst/>
+          <a:scene3d>
+            <a:camera prst="orthographicFront">
+              <a:rot lat="0" lon="0" rev="0"/>
+            </a:camera>
+            <a:lightRig rig="balanced" dir="t">
+              <a:rot lat="0" lon="0" rev="1080000"/>
+            </a:lightRig>
+          </a:scene3d>
+          <a:sp3d>
+            <a:bevelT w="38100" h="12700" prst="softRound"/>
+          </a:sp3d>
         </c:spPr>
         <c:marker>
           <c:symbol val="none"/>
@@ -9392,6 +10059,17 @@
             <a:noFill/>
           </a:ln>
           <a:effectLst/>
+          <a:scene3d>
+            <a:camera prst="orthographicFront">
+              <a:rot lat="0" lon="0" rev="0"/>
+            </a:camera>
+            <a:lightRig rig="balanced" dir="t">
+              <a:rot lat="0" lon="0" rev="1080000"/>
+            </a:lightRig>
+          </a:scene3d>
+          <a:sp3d>
+            <a:bevelT w="38100" h="12700" prst="softRound"/>
+          </a:sp3d>
         </c:spPr>
         <c:marker>
           <c:symbol val="none"/>
@@ -9448,6 +10126,17 @@
             <a:noFill/>
           </a:ln>
           <a:effectLst/>
+          <a:scene3d>
+            <a:camera prst="orthographicFront">
+              <a:rot lat="0" lon="0" rev="0"/>
+            </a:camera>
+            <a:lightRig rig="balanced" dir="t">
+              <a:rot lat="0" lon="0" rev="1080000"/>
+            </a:lightRig>
+          </a:scene3d>
+          <a:sp3d>
+            <a:bevelT w="38100" h="12700" prst="softRound"/>
+          </a:sp3d>
         </c:spPr>
         <c:marker>
           <c:symbol val="none"/>
@@ -9504,6 +10193,17 @@
             <a:noFill/>
           </a:ln>
           <a:effectLst/>
+          <a:scene3d>
+            <a:camera prst="orthographicFront">
+              <a:rot lat="0" lon="0" rev="0"/>
+            </a:camera>
+            <a:lightRig rig="balanced" dir="t">
+              <a:rot lat="0" lon="0" rev="1080000"/>
+            </a:lightRig>
+          </a:scene3d>
+          <a:sp3d>
+            <a:bevelT w="38100" h="12700" prst="softRound"/>
+          </a:sp3d>
         </c:spPr>
         <c:marker>
           <c:symbol val="none"/>
@@ -9560,6 +10260,17 @@
             <a:noFill/>
           </a:ln>
           <a:effectLst/>
+          <a:scene3d>
+            <a:camera prst="orthographicFront">
+              <a:rot lat="0" lon="0" rev="0"/>
+            </a:camera>
+            <a:lightRig rig="balanced" dir="t">
+              <a:rot lat="0" lon="0" rev="1080000"/>
+            </a:lightRig>
+          </a:scene3d>
+          <a:sp3d>
+            <a:bevelT w="38100" h="12700" prst="softRound"/>
+          </a:sp3d>
         </c:spPr>
         <c:marker>
           <c:symbol val="none"/>
@@ -9616,6 +10327,17 @@
             <a:noFill/>
           </a:ln>
           <a:effectLst/>
+          <a:scene3d>
+            <a:camera prst="orthographicFront">
+              <a:rot lat="0" lon="0" rev="0"/>
+            </a:camera>
+            <a:lightRig rig="balanced" dir="t">
+              <a:rot lat="0" lon="0" rev="1080000"/>
+            </a:lightRig>
+          </a:scene3d>
+          <a:sp3d>
+            <a:bevelT w="38100" h="12700" prst="softRound"/>
+          </a:sp3d>
         </c:spPr>
         <c:marker>
           <c:symbol val="none"/>
@@ -9672,6 +10394,17 @@
             <a:noFill/>
           </a:ln>
           <a:effectLst/>
+          <a:scene3d>
+            <a:camera prst="orthographicFront">
+              <a:rot lat="0" lon="0" rev="0"/>
+            </a:camera>
+            <a:lightRig rig="balanced" dir="t">
+              <a:rot lat="0" lon="0" rev="1080000"/>
+            </a:lightRig>
+          </a:scene3d>
+          <a:sp3d>
+            <a:bevelT w="38100" h="12700" prst="softRound"/>
+          </a:sp3d>
         </c:spPr>
         <c:marker>
           <c:symbol val="none"/>
@@ -9728,6 +10461,17 @@
             <a:noFill/>
           </a:ln>
           <a:effectLst/>
+          <a:scene3d>
+            <a:camera prst="orthographicFront">
+              <a:rot lat="0" lon="0" rev="0"/>
+            </a:camera>
+            <a:lightRig rig="balanced" dir="t">
+              <a:rot lat="0" lon="0" rev="1080000"/>
+            </a:lightRig>
+          </a:scene3d>
+          <a:sp3d>
+            <a:bevelT w="38100" h="12700" prst="softRound"/>
+          </a:sp3d>
         </c:spPr>
         <c:marker>
           <c:symbol val="none"/>
@@ -9784,6 +10528,17 @@
             <a:noFill/>
           </a:ln>
           <a:effectLst/>
+          <a:scene3d>
+            <a:camera prst="orthographicFront">
+              <a:rot lat="0" lon="0" rev="0"/>
+            </a:camera>
+            <a:lightRig rig="balanced" dir="t">
+              <a:rot lat="0" lon="0" rev="1080000"/>
+            </a:lightRig>
+          </a:scene3d>
+          <a:sp3d>
+            <a:bevelT w="38100" h="12700" prst="softRound"/>
+          </a:sp3d>
         </c:spPr>
         <c:marker>
           <c:symbol val="none"/>
@@ -9840,6 +10595,17 @@
             <a:noFill/>
           </a:ln>
           <a:effectLst/>
+          <a:scene3d>
+            <a:camera prst="orthographicFront">
+              <a:rot lat="0" lon="0" rev="0"/>
+            </a:camera>
+            <a:lightRig rig="balanced" dir="t">
+              <a:rot lat="0" lon="0" rev="1080000"/>
+            </a:lightRig>
+          </a:scene3d>
+          <a:sp3d>
+            <a:bevelT w="38100" h="12700" prst="softRound"/>
+          </a:sp3d>
         </c:spPr>
         <c:marker>
           <c:symbol val="none"/>
@@ -9896,6 +10662,17 @@
             <a:noFill/>
           </a:ln>
           <a:effectLst/>
+          <a:scene3d>
+            <a:camera prst="orthographicFront">
+              <a:rot lat="0" lon="0" rev="0"/>
+            </a:camera>
+            <a:lightRig rig="balanced" dir="t">
+              <a:rot lat="0" lon="0" rev="1080000"/>
+            </a:lightRig>
+          </a:scene3d>
+          <a:sp3d>
+            <a:bevelT w="38100" h="12700" prst="softRound"/>
+          </a:sp3d>
         </c:spPr>
         <c:marker>
           <c:symbol val="none"/>
@@ -9952,6 +10729,17 @@
             <a:noFill/>
           </a:ln>
           <a:effectLst/>
+          <a:scene3d>
+            <a:camera prst="orthographicFront">
+              <a:rot lat="0" lon="0" rev="0"/>
+            </a:camera>
+            <a:lightRig rig="balanced" dir="t">
+              <a:rot lat="0" lon="0" rev="1080000"/>
+            </a:lightRig>
+          </a:scene3d>
+          <a:sp3d>
+            <a:bevelT w="38100" h="12700" prst="softRound"/>
+          </a:sp3d>
         </c:spPr>
         <c:marker>
           <c:symbol val="none"/>
@@ -10008,6 +10796,17 @@
             <a:noFill/>
           </a:ln>
           <a:effectLst/>
+          <a:scene3d>
+            <a:camera prst="orthographicFront">
+              <a:rot lat="0" lon="0" rev="0"/>
+            </a:camera>
+            <a:lightRig rig="balanced" dir="t">
+              <a:rot lat="0" lon="0" rev="1080000"/>
+            </a:lightRig>
+          </a:scene3d>
+          <a:sp3d>
+            <a:bevelT w="38100" h="12700" prst="softRound"/>
+          </a:sp3d>
         </c:spPr>
         <c:marker>
           <c:symbol val="none"/>
@@ -10064,6 +10863,17 @@
             <a:noFill/>
           </a:ln>
           <a:effectLst/>
+          <a:scene3d>
+            <a:camera prst="orthographicFront">
+              <a:rot lat="0" lon="0" rev="0"/>
+            </a:camera>
+            <a:lightRig rig="balanced" dir="t">
+              <a:rot lat="0" lon="0" rev="1080000"/>
+            </a:lightRig>
+          </a:scene3d>
+          <a:sp3d>
+            <a:bevelT w="38100" h="12700" prst="softRound"/>
+          </a:sp3d>
         </c:spPr>
         <c:marker>
           <c:symbol val="none"/>
@@ -10120,6 +10930,17 @@
             <a:noFill/>
           </a:ln>
           <a:effectLst/>
+          <a:scene3d>
+            <a:camera prst="orthographicFront">
+              <a:rot lat="0" lon="0" rev="0"/>
+            </a:camera>
+            <a:lightRig rig="balanced" dir="t">
+              <a:rot lat="0" lon="0" rev="1080000"/>
+            </a:lightRig>
+          </a:scene3d>
+          <a:sp3d>
+            <a:bevelT w="38100" h="12700" prst="softRound"/>
+          </a:sp3d>
         </c:spPr>
         <c:marker>
           <c:symbol val="none"/>
@@ -10176,6 +10997,17 @@
             <a:noFill/>
           </a:ln>
           <a:effectLst/>
+          <a:scene3d>
+            <a:camera prst="orthographicFront">
+              <a:rot lat="0" lon="0" rev="0"/>
+            </a:camera>
+            <a:lightRig rig="balanced" dir="t">
+              <a:rot lat="0" lon="0" rev="1080000"/>
+            </a:lightRig>
+          </a:scene3d>
+          <a:sp3d>
+            <a:bevelT w="38100" h="12700" prst="softRound"/>
+          </a:sp3d>
         </c:spPr>
         <c:marker>
           <c:symbol val="none"/>
@@ -10232,6 +11064,17 @@
             <a:noFill/>
           </a:ln>
           <a:effectLst/>
+          <a:scene3d>
+            <a:camera prst="orthographicFront">
+              <a:rot lat="0" lon="0" rev="0"/>
+            </a:camera>
+            <a:lightRig rig="balanced" dir="t">
+              <a:rot lat="0" lon="0" rev="1080000"/>
+            </a:lightRig>
+          </a:scene3d>
+          <a:sp3d>
+            <a:bevelT w="38100" h="12700" prst="softRound"/>
+          </a:sp3d>
         </c:spPr>
         <c:marker>
           <c:symbol val="none"/>
@@ -10306,7 +11149,24 @@
             <a:ln>
               <a:noFill/>
             </a:ln>
-            <a:effectLst/>
+            <a:effectLst>
+              <a:outerShdw blurRad="50800" dist="50800" dir="5400000" sx="96000" sy="96000" rotWithShape="0">
+                <a:srgbClr val="000000">
+                  <a:alpha val="48000"/>
+                </a:srgbClr>
+              </a:outerShdw>
+            </a:effectLst>
+            <a:scene3d>
+              <a:camera prst="orthographicFront">
+                <a:rot lat="0" lon="0" rev="0"/>
+              </a:camera>
+              <a:lightRig rig="balanced" dir="t">
+                <a:rot lat="0" lon="0" rev="1080000"/>
+              </a:lightRig>
+            </a:scene3d>
+            <a:sp3d>
+              <a:bevelT w="38100" h="12700" prst="softRound"/>
+            </a:sp3d>
           </c:spPr>
           <c:invertIfNegative val="0"/>
           <c:cat>
@@ -10413,7 +11273,24 @@
             <a:ln>
               <a:noFill/>
             </a:ln>
-            <a:effectLst/>
+            <a:effectLst>
+              <a:outerShdw blurRad="50800" dist="50800" dir="5400000" sx="96000" sy="96000" rotWithShape="0">
+                <a:srgbClr val="000000">
+                  <a:alpha val="48000"/>
+                </a:srgbClr>
+              </a:outerShdw>
+            </a:effectLst>
+            <a:scene3d>
+              <a:camera prst="orthographicFront">
+                <a:rot lat="0" lon="0" rev="0"/>
+              </a:camera>
+              <a:lightRig rig="balanced" dir="t">
+                <a:rot lat="0" lon="0" rev="1080000"/>
+              </a:lightRig>
+            </a:scene3d>
+            <a:sp3d>
+              <a:bevelT w="38100" h="12700" prst="softRound"/>
+            </a:sp3d>
           </c:spPr>
           <c:invertIfNegative val="0"/>
           <c:cat>
@@ -10507,8 +11384,8 @@
           <c:showPercent val="0"/>
           <c:showBubbleSize val="0"/>
         </c:dLbls>
-        <c:gapWidth val="219"/>
-        <c:overlap val="-27"/>
+        <c:gapWidth val="100"/>
+        <c:overlap val="-24"/>
         <c:axId val="2076362687"/>
         <c:axId val="1960157855"/>
       </c:barChart>
@@ -10525,11 +11402,11 @@
         <c:tickLblPos val="nextTo"/>
         <c:spPr>
           <a:noFill/>
-          <a:ln w="9525" cap="flat" cmpd="sng" algn="ctr">
+          <a:ln w="12700" cap="flat" cmpd="sng" algn="ctr">
             <a:solidFill>
-              <a:schemeClr val="tx1">
-                <a:lumMod val="15000"/>
-                <a:lumOff val="85000"/>
+              <a:schemeClr val="lt1">
+                <a:lumMod val="95000"/>
+                <a:alpha val="54000"/>
               </a:schemeClr>
             </a:solidFill>
             <a:round/>
@@ -10541,11 +11418,10 @@
           <a:lstStyle/>
           <a:p>
             <a:pPr>
-              <a:defRPr sz="1100" b="0" i="0" u="none" strike="noStrike" kern="1200" baseline="0">
+              <a:defRPr sz="1197" b="0" i="0" u="none" strike="noStrike" kern="1200" baseline="0">
                 <a:solidFill>
-                  <a:schemeClr val="tx1">
-                    <a:lumMod val="65000"/>
-                    <a:lumOff val="35000"/>
+                  <a:schemeClr val="lt1">
+                    <a:lumMod val="85000"/>
                   </a:schemeClr>
                 </a:solidFill>
                 <a:latin typeface="+mn-lt"/>
@@ -10574,9 +11450,9 @@
           <c:spPr>
             <a:ln w="9525" cap="flat" cmpd="sng" algn="ctr">
               <a:solidFill>
-                <a:schemeClr val="tx1">
-                  <a:lumMod val="15000"/>
-                  <a:lumOff val="85000"/>
+                <a:schemeClr val="lt1">
+                  <a:lumMod val="95000"/>
+                  <a:alpha val="10000"/>
                 </a:schemeClr>
               </a:solidFill>
               <a:round/>
@@ -10600,11 +11476,10 @@
           <a:lstStyle/>
           <a:p>
             <a:pPr>
-              <a:defRPr sz="900" b="0" i="0" u="none" strike="noStrike" kern="1200" baseline="0">
+              <a:defRPr sz="1197" b="0" i="0" u="none" strike="noStrike" kern="1200" baseline="0">
                 <a:solidFill>
-                  <a:schemeClr val="tx1">
-                    <a:lumMod val="65000"/>
-                    <a:lumOff val="35000"/>
+                  <a:schemeClr val="lt1">
+                    <a:lumMod val="85000"/>
                   </a:schemeClr>
                 </a:solidFill>
                 <a:latin typeface="+mn-lt"/>
@@ -10642,11 +11517,10 @@
         <a:lstStyle/>
         <a:p>
           <a:pPr>
-            <a:defRPr sz="1200" b="0" i="0" u="none" strike="noStrike" kern="1200" baseline="0">
+            <a:defRPr sz="1197" b="0" i="0" u="none" strike="noStrike" kern="1200" baseline="0">
               <a:solidFill>
-                <a:schemeClr val="tx1">
-                  <a:lumMod val="65000"/>
-                  <a:lumOff val="35000"/>
+                <a:schemeClr val="lt1">
+                  <a:lumMod val="85000"/>
                 </a:schemeClr>
               </a:solidFill>
               <a:latin typeface="+mn-lt"/>
@@ -10670,7 +11544,26 @@
     <c:showDLblsOverMax val="0"/>
   </c:chart>
   <c:spPr>
-    <a:noFill/>
+    <a:gradFill flip="none" rotWithShape="1">
+      <a:gsLst>
+        <a:gs pos="0">
+          <a:schemeClr val="dk1">
+            <a:lumMod val="65000"/>
+            <a:lumOff val="35000"/>
+          </a:schemeClr>
+        </a:gs>
+        <a:gs pos="100000">
+          <a:schemeClr val="dk1">
+            <a:lumMod val="85000"/>
+            <a:lumOff val="15000"/>
+          </a:schemeClr>
+        </a:gs>
+      </a:gsLst>
+      <a:path path="circle">
+        <a:fillToRect l="50000" t="50000" r="50000" b="50000"/>
+      </a:path>
+      <a:tileRect/>
+    </a:gradFill>
     <a:ln>
       <a:noFill/>
     </a:ln>
@@ -20747,22 +21640,33 @@
     </mc:Fallback>
   </mc:AlternateContent>
   <c:pivotSource>
-    <c:name>[averageDistancesTraveled.xlsx]Sheet1!PivotTable1</c:name>
+    <c:name>[averageDistancesTraveled.xlsx]Sheet2!PivotTable1</c:name>
     <c:fmtId val="3"/>
   </c:pivotSource>
   <c:chart>
-    <c:autoTitleDeleted val="0"/>
+    <c:autoTitleDeleted val="1"/>
     <c:pivotFmts>
       <c:pivotFmt>
         <c:idx val="0"/>
         <c:spPr>
           <a:solidFill>
-            <a:srgbClr val="00B050"/>
+            <a:schemeClr val="accent1"/>
           </a:solidFill>
           <a:ln>
             <a:noFill/>
           </a:ln>
           <a:effectLst/>
+          <a:scene3d>
+            <a:camera prst="orthographicFront">
+              <a:rot lat="0" lon="0" rev="0"/>
+            </a:camera>
+            <a:lightRig rig="balanced" dir="t">
+              <a:rot lat="0" lon="0" rev="1080000"/>
+            </a:lightRig>
+          </a:scene3d>
+          <a:sp3d>
+            <a:bevelT w="38100" h="12700" prst="softRound"/>
+          </a:sp3d>
         </c:spPr>
         <c:marker>
           <c:symbol val="none"/>
@@ -20819,6 +21723,17 @@
             <a:noFill/>
           </a:ln>
           <a:effectLst/>
+          <a:scene3d>
+            <a:camera prst="orthographicFront">
+              <a:rot lat="0" lon="0" rev="0"/>
+            </a:camera>
+            <a:lightRig rig="balanced" dir="t">
+              <a:rot lat="0" lon="0" rev="1080000"/>
+            </a:lightRig>
+          </a:scene3d>
+          <a:sp3d>
+            <a:bevelT w="38100" h="12700" prst="softRound"/>
+          </a:sp3d>
         </c:spPr>
         <c:marker>
           <c:symbol val="none"/>
@@ -20875,292 +21790,17 @@
             <a:noFill/>
           </a:ln>
           <a:effectLst/>
-        </c:spPr>
-        <c:marker>
-          <c:symbol val="none"/>
-        </c:marker>
-        <c:dLbl>
-          <c:idx val="0"/>
-          <c:spPr>
-            <a:noFill/>
-            <a:ln>
-              <a:noFill/>
-            </a:ln>
-            <a:effectLst/>
-          </c:spPr>
-          <c:txPr>
-            <a:bodyPr rot="0" spcFirstLastPara="1" vertOverflow="ellipsis" vert="horz" wrap="square" lIns="38100" tIns="19050" rIns="38100" bIns="19050" anchor="ctr" anchorCtr="1">
-              <a:spAutoFit/>
-            </a:bodyPr>
-            <a:lstStyle/>
-            <a:p>
-              <a:pPr>
-                <a:defRPr sz="900" b="0" i="0" u="none" strike="noStrike" kern="1200" baseline="0">
-                  <a:solidFill>
-                    <a:schemeClr val="tx1">
-                      <a:lumMod val="75000"/>
-                      <a:lumOff val="25000"/>
-                    </a:schemeClr>
-                  </a:solidFill>
-                  <a:latin typeface="+mn-lt"/>
-                  <a:ea typeface="+mn-ea"/>
-                  <a:cs typeface="+mn-cs"/>
-                </a:defRPr>
-              </a:pPr>
-              <a:endParaRPr lang="es-EC"/>
-            </a:p>
-          </c:txPr>
-          <c:showLegendKey val="0"/>
-          <c:showVal val="0"/>
-          <c:showCatName val="0"/>
-          <c:showSerName val="0"/>
-          <c:showPercent val="0"/>
-          <c:showBubbleSize val="0"/>
-          <c:extLst>
-            <c:ext xmlns:c15="http://schemas.microsoft.com/office/drawing/2012/chart" uri="{CE6537A1-D6FC-4f65-9D91-7224C49458BB}"/>
-          </c:extLst>
-        </c:dLbl>
-      </c:pivotFmt>
-      <c:pivotFmt>
-        <c:idx val="3"/>
-        <c:spPr>
-          <a:solidFill>
-            <a:schemeClr val="accent1">
-              <a:lumMod val="75000"/>
-            </a:schemeClr>
-          </a:solidFill>
-          <a:ln>
-            <a:noFill/>
-          </a:ln>
-          <a:effectLst/>
-        </c:spPr>
-        <c:marker>
-          <c:symbol val="none"/>
-        </c:marker>
-        <c:dLbl>
-          <c:idx val="0"/>
-          <c:spPr>
-            <a:noFill/>
-            <a:ln>
-              <a:noFill/>
-            </a:ln>
-            <a:effectLst/>
-          </c:spPr>
-          <c:txPr>
-            <a:bodyPr rot="0" spcFirstLastPara="1" vertOverflow="ellipsis" vert="horz" wrap="square" lIns="38100" tIns="19050" rIns="38100" bIns="19050" anchor="ctr" anchorCtr="1">
-              <a:spAutoFit/>
-            </a:bodyPr>
-            <a:lstStyle/>
-            <a:p>
-              <a:pPr>
-                <a:defRPr sz="900" b="0" i="0" u="none" strike="noStrike" kern="1200" baseline="0">
-                  <a:solidFill>
-                    <a:schemeClr val="tx1">
-                      <a:lumMod val="75000"/>
-                      <a:lumOff val="25000"/>
-                    </a:schemeClr>
-                  </a:solidFill>
-                  <a:latin typeface="+mn-lt"/>
-                  <a:ea typeface="+mn-ea"/>
-                  <a:cs typeface="+mn-cs"/>
-                </a:defRPr>
-              </a:pPr>
-              <a:endParaRPr lang="es-EC"/>
-            </a:p>
-          </c:txPr>
-          <c:showLegendKey val="0"/>
-          <c:showVal val="0"/>
-          <c:showCatName val="0"/>
-          <c:showSerName val="0"/>
-          <c:showPercent val="0"/>
-          <c:showBubbleSize val="0"/>
-          <c:extLst>
-            <c:ext xmlns:c15="http://schemas.microsoft.com/office/drawing/2012/chart" uri="{CE6537A1-D6FC-4f65-9D91-7224C49458BB}"/>
-          </c:extLst>
-        </c:dLbl>
-      </c:pivotFmt>
-      <c:pivotFmt>
-        <c:idx val="4"/>
-        <c:spPr>
-          <a:solidFill>
-            <a:srgbClr val="00B050"/>
-          </a:solidFill>
-          <a:ln>
-            <a:noFill/>
-          </a:ln>
-          <a:effectLst/>
-        </c:spPr>
-        <c:marker>
-          <c:symbol val="none"/>
-        </c:marker>
-        <c:dLbl>
-          <c:idx val="0"/>
-          <c:spPr>
-            <a:noFill/>
-            <a:ln>
-              <a:noFill/>
-            </a:ln>
-            <a:effectLst/>
-          </c:spPr>
-          <c:txPr>
-            <a:bodyPr rot="0" spcFirstLastPara="1" vertOverflow="ellipsis" vert="horz" wrap="square" lIns="38100" tIns="19050" rIns="38100" bIns="19050" anchor="ctr" anchorCtr="1">
-              <a:spAutoFit/>
-            </a:bodyPr>
-            <a:lstStyle/>
-            <a:p>
-              <a:pPr>
-                <a:defRPr sz="900" b="0" i="0" u="none" strike="noStrike" kern="1200" baseline="0">
-                  <a:solidFill>
-                    <a:schemeClr val="tx1">
-                      <a:lumMod val="75000"/>
-                      <a:lumOff val="25000"/>
-                    </a:schemeClr>
-                  </a:solidFill>
-                  <a:latin typeface="+mn-lt"/>
-                  <a:ea typeface="+mn-ea"/>
-                  <a:cs typeface="+mn-cs"/>
-                </a:defRPr>
-              </a:pPr>
-              <a:endParaRPr lang="es-EC"/>
-            </a:p>
-          </c:txPr>
-          <c:showLegendKey val="0"/>
-          <c:showVal val="0"/>
-          <c:showCatName val="0"/>
-          <c:showSerName val="0"/>
-          <c:showPercent val="0"/>
-          <c:showBubbleSize val="0"/>
-          <c:extLst>
-            <c:ext xmlns:c15="http://schemas.microsoft.com/office/drawing/2012/chart" uri="{CE6537A1-D6FC-4f65-9D91-7224C49458BB}"/>
-          </c:extLst>
-        </c:dLbl>
-      </c:pivotFmt>
-      <c:pivotFmt>
-        <c:idx val="5"/>
-        <c:spPr>
-          <a:solidFill>
-            <a:schemeClr val="accent1">
-              <a:lumMod val="75000"/>
-            </a:schemeClr>
-          </a:solidFill>
-          <a:ln>
-            <a:noFill/>
-          </a:ln>
-          <a:effectLst/>
-        </c:spPr>
-        <c:marker>
-          <c:symbol val="none"/>
-        </c:marker>
-        <c:dLbl>
-          <c:idx val="0"/>
-          <c:spPr>
-            <a:noFill/>
-            <a:ln>
-              <a:noFill/>
-            </a:ln>
-            <a:effectLst/>
-          </c:spPr>
-          <c:txPr>
-            <a:bodyPr rot="0" spcFirstLastPara="1" vertOverflow="ellipsis" vert="horz" wrap="square" lIns="38100" tIns="19050" rIns="38100" bIns="19050" anchor="ctr" anchorCtr="1">
-              <a:spAutoFit/>
-            </a:bodyPr>
-            <a:lstStyle/>
-            <a:p>
-              <a:pPr>
-                <a:defRPr sz="900" b="0" i="0" u="none" strike="noStrike" kern="1200" baseline="0">
-                  <a:solidFill>
-                    <a:schemeClr val="tx1">
-                      <a:lumMod val="75000"/>
-                      <a:lumOff val="25000"/>
-                    </a:schemeClr>
-                  </a:solidFill>
-                  <a:latin typeface="+mn-lt"/>
-                  <a:ea typeface="+mn-ea"/>
-                  <a:cs typeface="+mn-cs"/>
-                </a:defRPr>
-              </a:pPr>
-              <a:endParaRPr lang="es-EC"/>
-            </a:p>
-          </c:txPr>
-          <c:showLegendKey val="0"/>
-          <c:showVal val="0"/>
-          <c:showCatName val="0"/>
-          <c:showSerName val="0"/>
-          <c:showPercent val="0"/>
-          <c:showBubbleSize val="0"/>
-          <c:extLst>
-            <c:ext xmlns:c15="http://schemas.microsoft.com/office/drawing/2012/chart" uri="{CE6537A1-D6FC-4f65-9D91-7224C49458BB}"/>
-          </c:extLst>
-        </c:dLbl>
-      </c:pivotFmt>
-      <c:pivotFmt>
-        <c:idx val="6"/>
-        <c:spPr>
-          <a:solidFill>
-            <a:srgbClr val="00B050"/>
-          </a:solidFill>
-          <a:ln>
-            <a:noFill/>
-          </a:ln>
-          <a:effectLst/>
-        </c:spPr>
-        <c:marker>
-          <c:symbol val="none"/>
-        </c:marker>
-        <c:dLbl>
-          <c:idx val="0"/>
-          <c:spPr>
-            <a:noFill/>
-            <a:ln>
-              <a:noFill/>
-            </a:ln>
-            <a:effectLst/>
-          </c:spPr>
-          <c:txPr>
-            <a:bodyPr rot="0" spcFirstLastPara="1" vertOverflow="ellipsis" vert="horz" wrap="square" lIns="38100" tIns="19050" rIns="38100" bIns="19050" anchor="ctr" anchorCtr="1">
-              <a:spAutoFit/>
-            </a:bodyPr>
-            <a:lstStyle/>
-            <a:p>
-              <a:pPr>
-                <a:defRPr sz="900" b="0" i="0" u="none" strike="noStrike" kern="1200" baseline="0">
-                  <a:solidFill>
-                    <a:schemeClr val="tx1">
-                      <a:lumMod val="75000"/>
-                      <a:lumOff val="25000"/>
-                    </a:schemeClr>
-                  </a:solidFill>
-                  <a:latin typeface="+mn-lt"/>
-                  <a:ea typeface="+mn-ea"/>
-                  <a:cs typeface="+mn-cs"/>
-                </a:defRPr>
-              </a:pPr>
-              <a:endParaRPr lang="es-EC"/>
-            </a:p>
-          </c:txPr>
-          <c:showLegendKey val="0"/>
-          <c:showVal val="0"/>
-          <c:showCatName val="0"/>
-          <c:showSerName val="0"/>
-          <c:showPercent val="0"/>
-          <c:showBubbleSize val="0"/>
-          <c:extLst>
-            <c:ext xmlns:c15="http://schemas.microsoft.com/office/drawing/2012/chart" uri="{CE6537A1-D6FC-4f65-9D91-7224C49458BB}"/>
-          </c:extLst>
-        </c:dLbl>
-      </c:pivotFmt>
-      <c:pivotFmt>
-        <c:idx val="7"/>
-        <c:spPr>
-          <a:solidFill>
-            <a:schemeClr val="accent1">
-              <a:lumMod val="75000"/>
-            </a:schemeClr>
-          </a:solidFill>
-          <a:ln>
-            <a:noFill/>
-          </a:ln>
-          <a:effectLst/>
+          <a:scene3d>
+            <a:camera prst="orthographicFront">
+              <a:rot lat="0" lon="0" rev="0"/>
+            </a:camera>
+            <a:lightRig rig="balanced" dir="t">
+              <a:rot lat="0" lon="0" rev="1080000"/>
+            </a:lightRig>
+          </a:scene3d>
+          <a:sp3d>
+            <a:bevelT w="38100" h="12700" prst="softRound"/>
+          </a:sp3d>
         </c:spPr>
         <c:marker>
           <c:symbol val="none"/>
@@ -21219,30 +21859,68 @@
           <c:order val="0"/>
           <c:tx>
             <c:strRef>
-              <c:f>Sheet1!$K$1</c:f>
+              <c:f>Sheet2!$B$1</c:f>
               <c:strCache>
                 <c:ptCount val="1"/>
                 <c:pt idx="0">
-                  <c:v>Recorrido Total (Kilometros)</c:v>
+                  <c:v>Total</c:v>
                 </c:pt>
               </c:strCache>
             </c:strRef>
           </c:tx>
           <c:spPr>
-            <a:solidFill>
-              <a:schemeClr val="accent5">
-                <a:lumMod val="75000"/>
-              </a:schemeClr>
-            </a:solidFill>
+            <a:gradFill rotWithShape="1">
+              <a:gsLst>
+                <a:gs pos="0">
+                  <a:schemeClr val="accent1">
+                    <a:tint val="98000"/>
+                    <a:satMod val="110000"/>
+                    <a:lumMod val="104000"/>
+                  </a:schemeClr>
+                </a:gs>
+                <a:gs pos="69000">
+                  <a:schemeClr val="accent1">
+                    <a:shade val="88000"/>
+                    <a:satMod val="130000"/>
+                    <a:lumMod val="92000"/>
+                  </a:schemeClr>
+                </a:gs>
+                <a:gs pos="100000">
+                  <a:schemeClr val="accent1">
+                    <a:shade val="78000"/>
+                    <a:satMod val="130000"/>
+                    <a:lumMod val="92000"/>
+                  </a:schemeClr>
+                </a:gs>
+              </a:gsLst>
+              <a:lin ang="5400000" scaled="0"/>
+            </a:gradFill>
             <a:ln>
               <a:noFill/>
             </a:ln>
-            <a:effectLst/>
+            <a:effectLst>
+              <a:outerShdw blurRad="50800" dist="50800" dir="5400000" sx="96000" sy="96000" rotWithShape="0">
+                <a:srgbClr val="000000">
+                  <a:alpha val="48000"/>
+                </a:srgbClr>
+              </a:outerShdw>
+            </a:effectLst>
+            <a:scene3d>
+              <a:camera prst="orthographicFront">
+                <a:rot lat="0" lon="0" rev="0"/>
+              </a:camera>
+              <a:lightRig rig="balanced" dir="t">
+                <a:rot lat="0" lon="0" rev="1080000"/>
+              </a:lightRig>
+            </a:scene3d>
+            <a:sp3d>
+              <a:bevelT w="38100" h="12700" prst="softRound"/>
+            </a:sp3d>
           </c:spPr>
           <c:invertIfNegative val="0"/>
           <c:cat>
             <c:strRef>
-              <c:f>Sheet1!$J$2:$J$12</c:f>
+              <c:f>Sheet2!$A$2:$A$12</c:f>
               <c:strCache>
                 <c:ptCount val="10"/>
                 <c:pt idx="0">
@@ -21280,155 +21958,46 @@
           </c:cat>
           <c:val>
             <c:numRef>
-              <c:f>Sheet1!$K$2:$K$12</c:f>
+              <c:f>Sheet2!$B$2:$B$12</c:f>
               <c:numCache>
                 <c:formatCode>General</c:formatCode>
                 <c:ptCount val="10"/>
                 <c:pt idx="0">
-                  <c:v>25.47</c:v>
+                  <c:v>5.0939999999999994</c:v>
                 </c:pt>
                 <c:pt idx="1">
-                  <c:v>20.87</c:v>
+                  <c:v>5.2175000000000002</c:v>
                 </c:pt>
                 <c:pt idx="2">
-                  <c:v>22.3</c:v>
+                  <c:v>2.7875000000000001</c:v>
                 </c:pt>
                 <c:pt idx="3">
-                  <c:v>59.74</c:v>
+                  <c:v>11.948</c:v>
                 </c:pt>
                 <c:pt idx="4">
-                  <c:v>14.89</c:v>
+                  <c:v>3.7225000000000001</c:v>
                 </c:pt>
                 <c:pt idx="5">
-                  <c:v>11.1</c:v>
+                  <c:v>1.5857142857142861</c:v>
                 </c:pt>
                 <c:pt idx="6">
-                  <c:v>14.82</c:v>
+                  <c:v>3.7050000000000001</c:v>
                 </c:pt>
                 <c:pt idx="7">
-                  <c:v>21.15</c:v>
+                  <c:v>2.6437499999999998</c:v>
                 </c:pt>
                 <c:pt idx="8">
-                  <c:v>31.6</c:v>
+                  <c:v>3.16</c:v>
                 </c:pt>
                 <c:pt idx="9">
-                  <c:v>52.87</c:v>
+                  <c:v>10.574</c:v>
                 </c:pt>
               </c:numCache>
             </c:numRef>
           </c:val>
           <c:extLst>
             <c:ext xmlns:c16="http://schemas.microsoft.com/office/drawing/2014/chart" uri="{C3380CC4-5D6E-409C-BE32-E72D297353CC}">
-              <c16:uniqueId val="{00000000-C1A6-4516-B0AF-8253526DBD45}"/>
-            </c:ext>
-          </c:extLst>
-        </c:ser>
-        <c:ser>
-          <c:idx val="1"/>
-          <c:order val="1"/>
-          <c:tx>
-            <c:strRef>
-              <c:f>Sheet1!$L$1</c:f>
-              <c:strCache>
-                <c:ptCount val="1"/>
-                <c:pt idx="0">
-                  <c:v>Promedio de la mascota (Kilometros)</c:v>
-                </c:pt>
-              </c:strCache>
-            </c:strRef>
-          </c:tx>
-          <c:spPr>
-            <a:solidFill>
-              <a:schemeClr val="accent2">
-                <a:lumMod val="75000"/>
-              </a:schemeClr>
-            </a:solidFill>
-            <a:ln>
-              <a:noFill/>
-            </a:ln>
-            <a:effectLst/>
-          </c:spPr>
-          <c:invertIfNegative val="0"/>
-          <c:cat>
-            <c:strRef>
-              <c:f>Sheet1!$J$2:$J$12</c:f>
-              <c:strCache>
-                <c:ptCount val="10"/>
-                <c:pt idx="0">
-                  <c:v>Amigo</c:v>
-                </c:pt>
-                <c:pt idx="1">
-                  <c:v>Chimu</c:v>
-                </c:pt>
-                <c:pt idx="2">
-                  <c:v>Lara</c:v>
-                </c:pt>
-                <c:pt idx="3">
-                  <c:v>Maddy</c:v>
-                </c:pt>
-                <c:pt idx="4">
-                  <c:v>Mora</c:v>
-                </c:pt>
-                <c:pt idx="5">
-                  <c:v>Neutron</c:v>
-                </c:pt>
-                <c:pt idx="6">
-                  <c:v>René</c:v>
-                </c:pt>
-                <c:pt idx="7">
-                  <c:v>Sambayón</c:v>
-                </c:pt>
-                <c:pt idx="8">
-                  <c:v>Sari</c:v>
-                </c:pt>
-                <c:pt idx="9">
-                  <c:v>Tiana</c:v>
-                </c:pt>
-              </c:strCache>
-            </c:strRef>
-          </c:cat>
-          <c:val>
-            <c:numRef>
-              <c:f>Sheet1!$L$2:$L$12</c:f>
-              <c:numCache>
-                <c:formatCode>General</c:formatCode>
-                <c:ptCount val="10"/>
-                <c:pt idx="0">
-                  <c:v>5.0939999999999994</c:v>
-                </c:pt>
-                <c:pt idx="1">
-                  <c:v>5.2175000000000002</c:v>
-                </c:pt>
-                <c:pt idx="2">
-                  <c:v>2.7875000000000001</c:v>
-                </c:pt>
-                <c:pt idx="3">
-                  <c:v>11.948</c:v>
-                </c:pt>
-                <c:pt idx="4">
-                  <c:v>3.7225000000000001</c:v>
-                </c:pt>
-                <c:pt idx="5">
-                  <c:v>1.5857142857142861</c:v>
-                </c:pt>
-                <c:pt idx="6">
-                  <c:v>3.7050000000000001</c:v>
-                </c:pt>
-                <c:pt idx="7">
-                  <c:v>2.6437499999999998</c:v>
-                </c:pt>
-                <c:pt idx="8">
-                  <c:v>3.16</c:v>
-                </c:pt>
-                <c:pt idx="9">
-                  <c:v>10.574</c:v>
-                </c:pt>
-              </c:numCache>
-            </c:numRef>
-          </c:val>
-          <c:extLst>
-            <c:ext xmlns:c16="http://schemas.microsoft.com/office/drawing/2014/chart" uri="{C3380CC4-5D6E-409C-BE32-E72D297353CC}">
-              <c16:uniqueId val="{00000001-C1A6-4516-B0AF-8253526DBD45}"/>
+              <c16:uniqueId val="{00000000-9646-4759-AC70-14FDC4FE6A87}"/>
             </c:ext>
           </c:extLst>
         </c:ser>
@@ -21440,13 +22009,13 @@
           <c:showPercent val="0"/>
           <c:showBubbleSize val="0"/>
         </c:dLbls>
-        <c:gapWidth val="219"/>
-        <c:overlap val="-27"/>
-        <c:axId val="1957422255"/>
-        <c:axId val="1953309487"/>
+        <c:gapWidth val="100"/>
+        <c:overlap val="-24"/>
+        <c:axId val="1595322912"/>
+        <c:axId val="2091934656"/>
       </c:barChart>
       <c:catAx>
-        <c:axId val="1957422255"/>
+        <c:axId val="1595322912"/>
         <c:scaling>
           <c:orientation val="minMax"/>
         </c:scaling>
@@ -21458,11 +22027,11 @@
         <c:tickLblPos val="nextTo"/>
         <c:spPr>
           <a:noFill/>
-          <a:ln w="9525" cap="flat" cmpd="sng" algn="ctr">
+          <a:ln w="12700" cap="flat" cmpd="sng" algn="ctr">
             <a:solidFill>
-              <a:schemeClr val="tx1">
-                <a:lumMod val="15000"/>
-                <a:lumOff val="85000"/>
+              <a:schemeClr val="lt1">
+                <a:lumMod val="95000"/>
+                <a:alpha val="54000"/>
               </a:schemeClr>
             </a:solidFill>
             <a:round/>
@@ -21474,11 +22043,10 @@
           <a:lstStyle/>
           <a:p>
             <a:pPr>
-              <a:defRPr sz="1100" b="0" i="0" u="none" strike="noStrike" kern="1200" baseline="0">
+              <a:defRPr sz="1197" b="0" i="0" u="none" strike="noStrike" kern="1200" baseline="0">
                 <a:solidFill>
-                  <a:schemeClr val="tx1">
-                    <a:lumMod val="65000"/>
-                    <a:lumOff val="35000"/>
+                  <a:schemeClr val="lt1">
+                    <a:lumMod val="85000"/>
                   </a:schemeClr>
                 </a:solidFill>
                 <a:latin typeface="+mn-lt"/>
@@ -21489,7 +22057,7 @@
             <a:endParaRPr lang="es-EC"/>
           </a:p>
         </c:txPr>
-        <c:crossAx val="1953309487"/>
+        <c:crossAx val="2091934656"/>
         <c:crosses val="autoZero"/>
         <c:auto val="1"/>
         <c:lblAlgn val="ctr"/>
@@ -21497,7 +22065,7 @@
         <c:noMultiLvlLbl val="0"/>
       </c:catAx>
       <c:valAx>
-        <c:axId val="1953309487"/>
+        <c:axId val="2091934656"/>
         <c:scaling>
           <c:orientation val="minMax"/>
         </c:scaling>
@@ -21507,9 +22075,9 @@
           <c:spPr>
             <a:ln w="9525" cap="flat" cmpd="sng" algn="ctr">
               <a:solidFill>
-                <a:schemeClr val="tx1">
-                  <a:lumMod val="15000"/>
-                  <a:lumOff val="85000"/>
+                <a:schemeClr val="lt1">
+                  <a:lumMod val="95000"/>
+                  <a:alpha val="10000"/>
                 </a:schemeClr>
               </a:solidFill>
               <a:round/>
@@ -21533,11 +22101,10 @@
           <a:lstStyle/>
           <a:p>
             <a:pPr>
-              <a:defRPr sz="900" b="0" i="0" u="none" strike="noStrike" kern="1200" baseline="0">
+              <a:defRPr sz="1197" b="0" i="0" u="none" strike="noStrike" kern="1200" baseline="0">
                 <a:solidFill>
-                  <a:schemeClr val="tx1">
-                    <a:lumMod val="65000"/>
-                    <a:lumOff val="35000"/>
+                  <a:schemeClr val="lt1">
+                    <a:lumMod val="85000"/>
                   </a:schemeClr>
                 </a:solidFill>
                 <a:latin typeface="+mn-lt"/>
@@ -21548,7 +22115,7 @@
             <a:endParaRPr lang="es-EC"/>
           </a:p>
         </c:txPr>
-        <c:crossAx val="1957422255"/>
+        <c:crossAx val="1595322912"/>
         <c:crosses val="autoZero"/>
         <c:crossBetween val="between"/>
       </c:valAx>
@@ -21560,37 +22127,6 @@
         <a:effectLst/>
       </c:spPr>
     </c:plotArea>
-    <c:legend>
-      <c:legendPos val="r"/>
-      <c:overlay val="0"/>
-      <c:spPr>
-        <a:noFill/>
-        <a:ln>
-          <a:noFill/>
-        </a:ln>
-        <a:effectLst/>
-      </c:spPr>
-      <c:txPr>
-        <a:bodyPr rot="0" spcFirstLastPara="1" vertOverflow="ellipsis" vert="horz" wrap="square" anchor="ctr" anchorCtr="1"/>
-        <a:lstStyle/>
-        <a:p>
-          <a:pPr>
-            <a:defRPr sz="1000" b="0" i="0" u="none" strike="noStrike" kern="1200" baseline="0">
-              <a:solidFill>
-                <a:schemeClr val="tx1">
-                  <a:lumMod val="65000"/>
-                  <a:lumOff val="35000"/>
-                </a:schemeClr>
-              </a:solidFill>
-              <a:latin typeface="+mn-lt"/>
-              <a:ea typeface="+mn-ea"/>
-              <a:cs typeface="+mn-cs"/>
-            </a:defRPr>
-          </a:pPr>
-          <a:endParaRPr lang="es-EC"/>
-        </a:p>
-      </c:txPr>
-    </c:legend>
     <c:plotVisOnly val="1"/>
     <c:dispBlanksAs val="gap"/>
     <c:extLst>
@@ -21603,7 +22139,26 @@
     <c:showDLblsOverMax val="0"/>
   </c:chart>
   <c:spPr>
-    <a:noFill/>
+    <a:gradFill flip="none" rotWithShape="1">
+      <a:gsLst>
+        <a:gs pos="0">
+          <a:schemeClr val="dk1">
+            <a:lumMod val="65000"/>
+            <a:lumOff val="35000"/>
+          </a:schemeClr>
+        </a:gs>
+        <a:gs pos="100000">
+          <a:schemeClr val="dk1">
+            <a:lumMod val="85000"/>
+            <a:lumOff val="15000"/>
+          </a:schemeClr>
+        </a:gs>
+      </a:gsLst>
+      <a:path path="circle">
+        <a:fillToRect l="50000" t="50000" r="50000" b="50000"/>
+      </a:path>
+      <a:tileRect/>
+    </a:gradFill>
     <a:ln>
       <a:noFill/>
     </a:ln>
@@ -21628,7 +22183,6 @@
         <c14:dropZoneFilter val="1"/>
         <c14:dropZoneCategories val="1"/>
         <c14:dropZoneData val="1"/>
-        <c14:dropZoneSeries val="1"/>
       </c14:pivotOptions>
     </c:ext>
     <c:ext xmlns:c16="http://schemas.microsoft.com/office/drawing/2014/chart" uri="{E28EC0CA-F0BB-4C9C-879D-F8772B89E7AC}">
@@ -21641,6 +22195,46 @@
 </file>
 
 <file path=ppt/charts/colors1.xml><?xml version="1.0" encoding="utf-8"?>
+<cs:colorStyle xmlns:cs="http://schemas.microsoft.com/office/drawing/2012/chartStyle" xmlns:a="http://schemas.openxmlformats.org/drawingml/2006/main" meth="cycle" id="10">
+  <a:schemeClr val="accent1"/>
+  <a:schemeClr val="accent2"/>
+  <a:schemeClr val="accent3"/>
+  <a:schemeClr val="accent4"/>
+  <a:schemeClr val="accent5"/>
+  <a:schemeClr val="accent6"/>
+  <cs:variation/>
+  <cs:variation>
+    <a:lumMod val="60000"/>
+  </cs:variation>
+  <cs:variation>
+    <a:lumMod val="80000"/>
+    <a:lumOff val="20000"/>
+  </cs:variation>
+  <cs:variation>
+    <a:lumMod val="80000"/>
+  </cs:variation>
+  <cs:variation>
+    <a:lumMod val="60000"/>
+    <a:lumOff val="40000"/>
+  </cs:variation>
+  <cs:variation>
+    <a:lumMod val="50000"/>
+  </cs:variation>
+  <cs:variation>
+    <a:lumMod val="70000"/>
+    <a:lumOff val="30000"/>
+  </cs:variation>
+  <cs:variation>
+    <a:lumMod val="70000"/>
+  </cs:variation>
+  <cs:variation>
+    <a:lumMod val="50000"/>
+    <a:lumOff val="50000"/>
+  </cs:variation>
+</cs:colorStyle>
+</file>
+
+<file path=ppt/charts/colors10.xml><?xml version="1.0" encoding="utf-8"?>
 <cs:colorStyle xmlns:cs="http://schemas.microsoft.com/office/drawing/2012/chartStyle" xmlns:a="http://schemas.openxmlformats.org/drawingml/2006/main" meth="cycle" id="10">
   <a:schemeClr val="accent1"/>
   <a:schemeClr val="accent2"/>
@@ -22454,6 +23048,502 @@
     <cs:effectRef idx="0"/>
     <cs:fontRef idx="minor">
       <a:schemeClr val="tx1"/>
+    </cs:fontRef>
+  </cs:wall>
+</cs:chartStyle>
+</file>
+
+<file path=ppt/charts/style10.xml><?xml version="1.0" encoding="utf-8"?>
+<cs:chartStyle xmlns:cs="http://schemas.microsoft.com/office/drawing/2012/chartStyle" xmlns:a="http://schemas.openxmlformats.org/drawingml/2006/main" id="209">
+  <cs:axisTitle>
+    <cs:lnRef idx="0"/>
+    <cs:fillRef idx="0"/>
+    <cs:effectRef idx="0"/>
+    <cs:fontRef idx="minor">
+      <a:schemeClr val="lt1">
+        <a:lumMod val="85000"/>
+      </a:schemeClr>
+    </cs:fontRef>
+    <cs:defRPr sz="1197" b="1" kern="1200" cap="all"/>
+  </cs:axisTitle>
+  <cs:categoryAxis>
+    <cs:lnRef idx="0"/>
+    <cs:fillRef idx="0"/>
+    <cs:effectRef idx="0"/>
+    <cs:fontRef idx="minor">
+      <a:schemeClr val="lt1">
+        <a:lumMod val="85000"/>
+      </a:schemeClr>
+    </cs:fontRef>
+    <cs:spPr>
+      <a:ln w="12700" cap="flat" cmpd="sng" algn="ctr">
+        <a:solidFill>
+          <a:schemeClr val="lt1">
+            <a:lumMod val="95000"/>
+            <a:alpha val="54000"/>
+          </a:schemeClr>
+        </a:solidFill>
+        <a:round/>
+      </a:ln>
+    </cs:spPr>
+    <cs:defRPr sz="1197" kern="1200"/>
+  </cs:categoryAxis>
+  <cs:chartArea>
+    <cs:lnRef idx="0"/>
+    <cs:fillRef idx="0"/>
+    <cs:effectRef idx="0"/>
+    <cs:fontRef idx="minor">
+      <a:schemeClr val="dk1"/>
+    </cs:fontRef>
+    <cs:spPr>
+      <a:gradFill flip="none" rotWithShape="1">
+        <a:gsLst>
+          <a:gs pos="0">
+            <a:schemeClr val="dk1">
+              <a:lumMod val="65000"/>
+              <a:lumOff val="35000"/>
+            </a:schemeClr>
+          </a:gs>
+          <a:gs pos="100000">
+            <a:schemeClr val="dk1">
+              <a:lumMod val="85000"/>
+              <a:lumOff val="15000"/>
+            </a:schemeClr>
+          </a:gs>
+        </a:gsLst>
+        <a:path path="circle">
+          <a:fillToRect l="50000" t="50000" r="50000" b="50000"/>
+        </a:path>
+        <a:tileRect/>
+      </a:gradFill>
+    </cs:spPr>
+    <cs:defRPr sz="1330" kern="1200"/>
+  </cs:chartArea>
+  <cs:dataLabel>
+    <cs:lnRef idx="0"/>
+    <cs:fillRef idx="0"/>
+    <cs:effectRef idx="0"/>
+    <cs:fontRef idx="minor">
+      <a:schemeClr val="lt1">
+        <a:lumMod val="85000"/>
+      </a:schemeClr>
+    </cs:fontRef>
+    <cs:defRPr sz="1197" kern="1200"/>
+  </cs:dataLabel>
+  <cs:dataLabelCallout>
+    <cs:lnRef idx="0"/>
+    <cs:fillRef idx="0"/>
+    <cs:effectRef idx="0"/>
+    <cs:fontRef idx="minor">
+      <a:schemeClr val="dk1">
+        <a:lumMod val="65000"/>
+        <a:lumOff val="35000"/>
+      </a:schemeClr>
+    </cs:fontRef>
+    <cs:spPr>
+      <a:solidFill>
+        <a:schemeClr val="lt1"/>
+      </a:solidFill>
+    </cs:spPr>
+    <cs:defRPr sz="1197" kern="1200"/>
+    <cs:bodyPr rot="0" spcFirstLastPara="1" vertOverflow="clip" horzOverflow="clip" vert="horz" wrap="square" lIns="36576" tIns="18288" rIns="36576" bIns="18288" anchor="ctr" anchorCtr="1">
+      <a:spAutoFit/>
+    </cs:bodyPr>
+  </cs:dataLabelCallout>
+  <cs:dataPoint>
+    <cs:lnRef idx="0"/>
+    <cs:fillRef idx="3">
+      <cs:styleClr val="auto"/>
+    </cs:fillRef>
+    <cs:effectRef idx="3"/>
+    <cs:fontRef idx="minor">
+      <a:schemeClr val="lt1"/>
+    </cs:fontRef>
+  </cs:dataPoint>
+  <cs:dataPoint3D>
+    <cs:lnRef idx="0"/>
+    <cs:fillRef idx="3">
+      <cs:styleClr val="auto"/>
+    </cs:fillRef>
+    <cs:effectRef idx="3"/>
+    <cs:fontRef idx="minor">
+      <a:schemeClr val="lt1"/>
+    </cs:fontRef>
+  </cs:dataPoint3D>
+  <cs:dataPointLine>
+    <cs:lnRef idx="0">
+      <cs:styleClr val="auto"/>
+    </cs:lnRef>
+    <cs:fillRef idx="3"/>
+    <cs:effectRef idx="3"/>
+    <cs:fontRef idx="minor">
+      <a:schemeClr val="lt1"/>
+    </cs:fontRef>
+    <cs:spPr>
+      <a:ln w="34925" cap="rnd">
+        <a:solidFill>
+          <a:schemeClr val="phClr"/>
+        </a:solidFill>
+        <a:round/>
+      </a:ln>
+    </cs:spPr>
+  </cs:dataPointLine>
+  <cs:dataPointMarker>
+    <cs:lnRef idx="0">
+      <cs:styleClr val="auto"/>
+    </cs:lnRef>
+    <cs:fillRef idx="3">
+      <cs:styleClr val="auto"/>
+    </cs:fillRef>
+    <cs:effectRef idx="3"/>
+    <cs:fontRef idx="minor">
+      <a:schemeClr val="lt1"/>
+    </cs:fontRef>
+    <cs:spPr>
+      <a:ln w="9525">
+        <a:solidFill>
+          <a:schemeClr val="phClr"/>
+        </a:solidFill>
+        <a:round/>
+      </a:ln>
+    </cs:spPr>
+  </cs:dataPointMarker>
+  <cs:dataPointMarkerLayout symbol="circle" size="6"/>
+  <cs:dataPointWireframe>
+    <cs:lnRef idx="0">
+      <cs:styleClr val="auto"/>
+    </cs:lnRef>
+    <cs:fillRef idx="3"/>
+    <cs:effectRef idx="3"/>
+    <cs:fontRef idx="minor">
+      <a:schemeClr val="lt1"/>
+    </cs:fontRef>
+    <cs:spPr>
+      <a:ln w="9525" cap="rnd">
+        <a:solidFill>
+          <a:schemeClr val="phClr"/>
+        </a:solidFill>
+        <a:round/>
+      </a:ln>
+    </cs:spPr>
+  </cs:dataPointWireframe>
+  <cs:dataTable>
+    <cs:lnRef idx="0"/>
+    <cs:fillRef idx="0"/>
+    <cs:effectRef idx="0"/>
+    <cs:fontRef idx="minor">
+      <a:schemeClr val="lt1">
+        <a:lumMod val="85000"/>
+      </a:schemeClr>
+    </cs:fontRef>
+    <cs:spPr>
+      <a:ln w="9525">
+        <a:solidFill>
+          <a:schemeClr val="lt1">
+            <a:lumMod val="95000"/>
+            <a:alpha val="54000"/>
+          </a:schemeClr>
+        </a:solidFill>
+      </a:ln>
+    </cs:spPr>
+    <cs:defRPr sz="1197" kern="1200"/>
+  </cs:dataTable>
+  <cs:downBar>
+    <cs:lnRef idx="0"/>
+    <cs:fillRef idx="0"/>
+    <cs:effectRef idx="0"/>
+    <cs:fontRef idx="minor">
+      <a:schemeClr val="lt1"/>
+    </cs:fontRef>
+    <cs:spPr>
+      <a:solidFill>
+        <a:schemeClr val="dk1">
+          <a:lumMod val="75000"/>
+          <a:lumOff val="25000"/>
+        </a:schemeClr>
+      </a:solidFill>
+      <a:ln w="9525">
+        <a:solidFill>
+          <a:schemeClr val="lt1">
+            <a:lumMod val="95000"/>
+            <a:alpha val="54000"/>
+          </a:schemeClr>
+        </a:solidFill>
+      </a:ln>
+    </cs:spPr>
+  </cs:downBar>
+  <cs:dropLine>
+    <cs:lnRef idx="0"/>
+    <cs:fillRef idx="0"/>
+    <cs:effectRef idx="0"/>
+    <cs:fontRef idx="minor">
+      <a:schemeClr val="lt1"/>
+    </cs:fontRef>
+    <cs:spPr>
+      <a:ln w="9525">
+        <a:solidFill>
+          <a:schemeClr val="lt1">
+            <a:lumMod val="95000"/>
+            <a:alpha val="54000"/>
+          </a:schemeClr>
+        </a:solidFill>
+        <a:prstDash val="dash"/>
+      </a:ln>
+    </cs:spPr>
+  </cs:dropLine>
+  <cs:errorBar>
+    <cs:lnRef idx="0"/>
+    <cs:fillRef idx="0"/>
+    <cs:effectRef idx="0"/>
+    <cs:fontRef idx="minor">
+      <a:schemeClr val="lt1"/>
+    </cs:fontRef>
+    <cs:spPr>
+      <a:ln w="9525" cap="flat" cmpd="sng" algn="ctr">
+        <a:solidFill>
+          <a:schemeClr val="lt1">
+            <a:lumMod val="95000"/>
+          </a:schemeClr>
+        </a:solidFill>
+        <a:round/>
+      </a:ln>
+    </cs:spPr>
+  </cs:errorBar>
+  <cs:floor>
+    <cs:lnRef idx="0"/>
+    <cs:fillRef idx="0"/>
+    <cs:effectRef idx="0"/>
+    <cs:fontRef idx="minor">
+      <a:schemeClr val="lt1"/>
+    </cs:fontRef>
+  </cs:floor>
+  <cs:gridlineMajor>
+    <cs:lnRef idx="0"/>
+    <cs:fillRef idx="0"/>
+    <cs:effectRef idx="0"/>
+    <cs:fontRef idx="minor">
+      <a:schemeClr val="lt1"/>
+    </cs:fontRef>
+    <cs:spPr>
+      <a:ln w="9525" cap="flat" cmpd="sng" algn="ctr">
+        <a:solidFill>
+          <a:schemeClr val="lt1">
+            <a:lumMod val="95000"/>
+            <a:alpha val="10000"/>
+          </a:schemeClr>
+        </a:solidFill>
+        <a:round/>
+      </a:ln>
+    </cs:spPr>
+  </cs:gridlineMajor>
+  <cs:gridlineMinor>
+    <cs:lnRef idx="0"/>
+    <cs:fillRef idx="0"/>
+    <cs:effectRef idx="0"/>
+    <cs:fontRef idx="minor">
+      <a:schemeClr val="lt1"/>
+    </cs:fontRef>
+    <cs:spPr>
+      <a:ln>
+        <a:solidFill>
+          <a:schemeClr val="lt1">
+            <a:lumMod val="95000"/>
+            <a:alpha val="5000"/>
+          </a:schemeClr>
+        </a:solidFill>
+      </a:ln>
+    </cs:spPr>
+  </cs:gridlineMinor>
+  <cs:hiLoLine>
+    <cs:lnRef idx="0"/>
+    <cs:fillRef idx="0"/>
+    <cs:effectRef idx="0"/>
+    <cs:fontRef idx="minor">
+      <a:schemeClr val="lt1"/>
+    </cs:fontRef>
+    <cs:spPr>
+      <a:ln w="9525">
+        <a:solidFill>
+          <a:schemeClr val="lt1">
+            <a:lumMod val="95000"/>
+            <a:alpha val="54000"/>
+          </a:schemeClr>
+        </a:solidFill>
+        <a:prstDash val="dash"/>
+      </a:ln>
+    </cs:spPr>
+  </cs:hiLoLine>
+  <cs:leaderLine>
+    <cs:lnRef idx="0"/>
+    <cs:fillRef idx="0"/>
+    <cs:effectRef idx="0"/>
+    <cs:fontRef idx="minor">
+      <a:schemeClr val="lt1"/>
+    </cs:fontRef>
+    <cs:spPr>
+      <a:ln w="9525">
+        <a:solidFill>
+          <a:schemeClr val="lt1">
+            <a:lumMod val="95000"/>
+            <a:alpha val="54000"/>
+          </a:schemeClr>
+        </a:solidFill>
+      </a:ln>
+    </cs:spPr>
+  </cs:leaderLine>
+  <cs:legend>
+    <cs:lnRef idx="0"/>
+    <cs:fillRef idx="0"/>
+    <cs:effectRef idx="0"/>
+    <cs:fontRef idx="minor">
+      <a:schemeClr val="lt1">
+        <a:lumMod val="85000"/>
+      </a:schemeClr>
+    </cs:fontRef>
+    <cs:defRPr sz="1197" kern="1200"/>
+  </cs:legend>
+  <cs:plotArea>
+    <cs:lnRef idx="0"/>
+    <cs:fillRef idx="0"/>
+    <cs:effectRef idx="0"/>
+    <cs:fontRef idx="minor">
+      <a:schemeClr val="lt1"/>
+    </cs:fontRef>
+  </cs:plotArea>
+  <cs:plotArea3D>
+    <cs:lnRef idx="0"/>
+    <cs:fillRef idx="0"/>
+    <cs:effectRef idx="0"/>
+    <cs:fontRef idx="minor">
+      <a:schemeClr val="lt1"/>
+    </cs:fontRef>
+  </cs:plotArea3D>
+  <cs:seriesAxis>
+    <cs:lnRef idx="0"/>
+    <cs:fillRef idx="0"/>
+    <cs:effectRef idx="0"/>
+    <cs:fontRef idx="minor">
+      <a:schemeClr val="lt1">
+        <a:lumMod val="85000"/>
+      </a:schemeClr>
+    </cs:fontRef>
+    <cs:spPr>
+      <a:ln w="12700" cap="flat" cmpd="sng" algn="ctr">
+        <a:solidFill>
+          <a:schemeClr val="lt1">
+            <a:lumMod val="95000"/>
+            <a:alpha val="54000"/>
+          </a:schemeClr>
+        </a:solidFill>
+        <a:round/>
+      </a:ln>
+    </cs:spPr>
+    <cs:defRPr sz="1197" kern="1200"/>
+  </cs:seriesAxis>
+  <cs:seriesLine>
+    <cs:lnRef idx="0"/>
+    <cs:fillRef idx="0"/>
+    <cs:effectRef idx="0"/>
+    <cs:fontRef idx="minor">
+      <a:schemeClr val="lt1"/>
+    </cs:fontRef>
+    <cs:spPr>
+      <a:ln w="9525" cap="flat" cmpd="sng" algn="ctr">
+        <a:solidFill>
+          <a:schemeClr val="lt1">
+            <a:lumMod val="95000"/>
+            <a:alpha val="54000"/>
+          </a:schemeClr>
+        </a:solidFill>
+        <a:round/>
+      </a:ln>
+    </cs:spPr>
+  </cs:seriesLine>
+  <cs:title>
+    <cs:lnRef idx="0"/>
+    <cs:fillRef idx="0"/>
+    <cs:effectRef idx="0"/>
+    <cs:fontRef idx="minor">
+      <a:schemeClr val="lt1">
+        <a:lumMod val="95000"/>
+      </a:schemeClr>
+    </cs:fontRef>
+    <cs:defRPr sz="2128" b="1" kern="1200" spc="100" baseline="0">
+      <a:effectLst>
+        <a:outerShdw blurRad="50800" dist="38100" dir="5400000" algn="t" rotWithShape="0">
+          <a:prstClr val="black">
+            <a:alpha val="40000"/>
+          </a:prstClr>
+        </a:outerShdw>
+      </a:effectLst>
+    </cs:defRPr>
+  </cs:title>
+  <cs:trendline>
+    <cs:lnRef idx="0">
+      <cs:styleClr val="auto"/>
+    </cs:lnRef>
+    <cs:fillRef idx="0"/>
+    <cs:effectRef idx="0"/>
+    <cs:fontRef idx="minor">
+      <a:schemeClr val="lt1"/>
+    </cs:fontRef>
+    <cs:spPr>
+      <a:ln w="19050" cap="rnd">
+        <a:solidFill>
+          <a:schemeClr val="phClr"/>
+        </a:solidFill>
+      </a:ln>
+    </cs:spPr>
+  </cs:trendline>
+  <cs:trendlineLabel>
+    <cs:lnRef idx="0"/>
+    <cs:fillRef idx="0"/>
+    <cs:effectRef idx="0"/>
+    <cs:fontRef idx="minor">
+      <a:schemeClr val="lt1">
+        <a:lumMod val="85000"/>
+      </a:schemeClr>
+    </cs:fontRef>
+    <cs:defRPr sz="1197" kern="1200"/>
+  </cs:trendlineLabel>
+  <cs:upBar>
+    <cs:lnRef idx="0"/>
+    <cs:fillRef idx="0"/>
+    <cs:effectRef idx="0"/>
+    <cs:fontRef idx="minor">
+      <a:schemeClr val="lt1"/>
+    </cs:fontRef>
+    <cs:spPr>
+      <a:solidFill>
+        <a:schemeClr val="lt1"/>
+      </a:solidFill>
+      <a:ln w="9525">
+        <a:solidFill>
+          <a:schemeClr val="lt1">
+            <a:lumMod val="95000"/>
+            <a:alpha val="54000"/>
+          </a:schemeClr>
+        </a:solidFill>
+      </a:ln>
+    </cs:spPr>
+  </cs:upBar>
+  <cs:valueAxis>
+    <cs:lnRef idx="0"/>
+    <cs:fillRef idx="0"/>
+    <cs:effectRef idx="0"/>
+    <cs:fontRef idx="minor">
+      <a:schemeClr val="lt1">
+        <a:lumMod val="85000"/>
+      </a:schemeClr>
+    </cs:fontRef>
+    <cs:defRPr sz="1197" kern="1200"/>
+  </cs:valueAxis>
+  <cs:wall>
+    <cs:lnRef idx="0"/>
+    <cs:fillRef idx="0"/>
+    <cs:effectRef idx="0"/>
+    <cs:fontRef idx="minor">
+      <a:schemeClr val="lt1"/>
     </cs:fontRef>
   </cs:wall>
 </cs:chartStyle>
@@ -23948,76 +25038,81 @@
 </file>
 
 <file path=ppt/charts/style5.xml><?xml version="1.0" encoding="utf-8"?>
-<cs:chartStyle xmlns:cs="http://schemas.microsoft.com/office/drawing/2012/chartStyle" xmlns:a="http://schemas.openxmlformats.org/drawingml/2006/main" id="201">
+<cs:chartStyle xmlns:cs="http://schemas.microsoft.com/office/drawing/2012/chartStyle" xmlns:a="http://schemas.openxmlformats.org/drawingml/2006/main" id="209">
   <cs:axisTitle>
     <cs:lnRef idx="0"/>
     <cs:fillRef idx="0"/>
     <cs:effectRef idx="0"/>
     <cs:fontRef idx="minor">
-      <a:schemeClr val="tx1">
-        <a:lumMod val="65000"/>
-        <a:lumOff val="35000"/>
+      <a:schemeClr val="lt1">
+        <a:lumMod val="85000"/>
       </a:schemeClr>
     </cs:fontRef>
-    <cs:defRPr sz="1000" kern="1200"/>
+    <cs:defRPr sz="1197" b="1" kern="1200" cap="all"/>
   </cs:axisTitle>
   <cs:categoryAxis>
     <cs:lnRef idx="0"/>
     <cs:fillRef idx="0"/>
     <cs:effectRef idx="0"/>
     <cs:fontRef idx="minor">
-      <a:schemeClr val="tx1">
-        <a:lumMod val="65000"/>
-        <a:lumOff val="35000"/>
+      <a:schemeClr val="lt1">
+        <a:lumMod val="85000"/>
       </a:schemeClr>
     </cs:fontRef>
     <cs:spPr>
-      <a:ln w="9525" cap="flat" cmpd="sng" algn="ctr">
+      <a:ln w="12700" cap="flat" cmpd="sng" algn="ctr">
         <a:solidFill>
-          <a:schemeClr val="tx1">
-            <a:lumMod val="15000"/>
-            <a:lumOff val="85000"/>
+          <a:schemeClr val="lt1">
+            <a:lumMod val="95000"/>
+            <a:alpha val="54000"/>
           </a:schemeClr>
         </a:solidFill>
         <a:round/>
       </a:ln>
     </cs:spPr>
-    <cs:defRPr sz="900" kern="1200"/>
+    <cs:defRPr sz="1197" kern="1200"/>
   </cs:categoryAxis>
-  <cs:chartArea mods="allowNoFillOverride allowNoLineOverride">
+  <cs:chartArea>
     <cs:lnRef idx="0"/>
     <cs:fillRef idx="0"/>
     <cs:effectRef idx="0"/>
     <cs:fontRef idx="minor">
-      <a:schemeClr val="tx1"/>
+      <a:schemeClr val="dk1"/>
     </cs:fontRef>
     <cs:spPr>
-      <a:solidFill>
-        <a:schemeClr val="bg1"/>
-      </a:solidFill>
-      <a:ln w="9525" cap="flat" cmpd="sng" algn="ctr">
-        <a:solidFill>
-          <a:schemeClr val="tx1">
-            <a:lumMod val="15000"/>
-            <a:lumOff val="85000"/>
-          </a:schemeClr>
-        </a:solidFill>
-        <a:round/>
-      </a:ln>
+      <a:gradFill flip="none" rotWithShape="1">
+        <a:gsLst>
+          <a:gs pos="0">
+            <a:schemeClr val="dk1">
+              <a:lumMod val="65000"/>
+              <a:lumOff val="35000"/>
+            </a:schemeClr>
+          </a:gs>
+          <a:gs pos="100000">
+            <a:schemeClr val="dk1">
+              <a:lumMod val="85000"/>
+              <a:lumOff val="15000"/>
+            </a:schemeClr>
+          </a:gs>
+        </a:gsLst>
+        <a:path path="circle">
+          <a:fillToRect l="50000" t="50000" r="50000" b="50000"/>
+        </a:path>
+        <a:tileRect/>
+      </a:gradFill>
     </cs:spPr>
-    <cs:defRPr sz="1000" kern="1200"/>
+    <cs:defRPr sz="1330" kern="1200"/>
   </cs:chartArea>
   <cs:dataLabel>
     <cs:lnRef idx="0"/>
     <cs:fillRef idx="0"/>
     <cs:effectRef idx="0"/>
     <cs:fontRef idx="minor">
-      <a:schemeClr val="tx1">
-        <a:lumMod val="75000"/>
-        <a:lumOff val="25000"/>
+      <a:schemeClr val="lt1">
+        <a:lumMod val="85000"/>
       </a:schemeClr>
     </cs:fontRef>
-    <cs:defRPr sz="900" kern="1200"/>
+    <cs:defRPr sz="1197" kern="1200"/>
   </cs:dataLabel>
   <cs:dataLabelCallout>
     <cs:lnRef idx="0"/>
@@ -24033,51 +25128,43 @@
       <a:solidFill>
         <a:schemeClr val="lt1"/>
       </a:solidFill>
-      <a:ln>
-        <a:solidFill>
-          <a:schemeClr val="dk1">
-            <a:lumMod val="25000"/>
-            <a:lumOff val="75000"/>
-          </a:schemeClr>
-        </a:solidFill>
-      </a:ln>
     </cs:spPr>
-    <cs:defRPr sz="900" kern="1200"/>
+    <cs:defRPr sz="1197" kern="1200"/>
     <cs:bodyPr rot="0" spcFirstLastPara="1" vertOverflow="clip" horzOverflow="clip" vert="horz" wrap="square" lIns="36576" tIns="18288" rIns="36576" bIns="18288" anchor="ctr" anchorCtr="1">
       <a:spAutoFit/>
     </cs:bodyPr>
   </cs:dataLabelCallout>
   <cs:dataPoint>
     <cs:lnRef idx="0"/>
-    <cs:fillRef idx="1">
+    <cs:fillRef idx="3">
       <cs:styleClr val="auto"/>
     </cs:fillRef>
-    <cs:effectRef idx="0"/>
+    <cs:effectRef idx="3"/>
     <cs:fontRef idx="minor">
-      <a:schemeClr val="tx1"/>
+      <a:schemeClr val="lt1"/>
     </cs:fontRef>
   </cs:dataPoint>
   <cs:dataPoint3D>
     <cs:lnRef idx="0"/>
-    <cs:fillRef idx="1">
+    <cs:fillRef idx="3">
       <cs:styleClr val="auto"/>
     </cs:fillRef>
-    <cs:effectRef idx="0"/>
+    <cs:effectRef idx="3"/>
     <cs:fontRef idx="minor">
-      <a:schemeClr val="tx1"/>
+      <a:schemeClr val="lt1"/>
     </cs:fontRef>
   </cs:dataPoint3D>
   <cs:dataPointLine>
     <cs:lnRef idx="0">
       <cs:styleClr val="auto"/>
     </cs:lnRef>
-    <cs:fillRef idx="1"/>
-    <cs:effectRef idx="0"/>
+    <cs:fillRef idx="3"/>
+    <cs:effectRef idx="3"/>
     <cs:fontRef idx="minor">
-      <a:schemeClr val="tx1"/>
+      <a:schemeClr val="lt1"/>
     </cs:fontRef>
     <cs:spPr>
-      <a:ln w="28575" cap="rnd">
+      <a:ln w="34925" cap="rnd">
         <a:solidFill>
           <a:schemeClr val="phClr"/>
         </a:solidFill>
@@ -24089,30 +25176,31 @@
     <cs:lnRef idx="0">
       <cs:styleClr val="auto"/>
     </cs:lnRef>
-    <cs:fillRef idx="1">
+    <cs:fillRef idx="3">
       <cs:styleClr val="auto"/>
     </cs:fillRef>
-    <cs:effectRef idx="0"/>
+    <cs:effectRef idx="3"/>
     <cs:fontRef idx="minor">
-      <a:schemeClr val="tx1"/>
+      <a:schemeClr val="lt1"/>
     </cs:fontRef>
     <cs:spPr>
       <a:ln w="9525">
         <a:solidFill>
           <a:schemeClr val="phClr"/>
         </a:solidFill>
+        <a:round/>
       </a:ln>
     </cs:spPr>
   </cs:dataPointMarker>
-  <cs:dataPointMarkerLayout symbol="circle" size="5"/>
+  <cs:dataPointMarkerLayout symbol="circle" size="6"/>
   <cs:dataPointWireframe>
     <cs:lnRef idx="0">
       <cs:styleClr val="auto"/>
     </cs:lnRef>
-    <cs:fillRef idx="1"/>
-    <cs:effectRef idx="0"/>
+    <cs:fillRef idx="3"/>
+    <cs:effectRef idx="3"/>
     <cs:fontRef idx="minor">
-      <a:schemeClr val="tx1"/>
+      <a:schemeClr val="lt1"/>
     </cs:fontRef>
     <cs:spPr>
       <a:ln w="9525" cap="rnd">
@@ -24128,44 +25216,41 @@
     <cs:fillRef idx="0"/>
     <cs:effectRef idx="0"/>
     <cs:fontRef idx="minor">
-      <a:schemeClr val="tx1">
-        <a:lumMod val="65000"/>
-        <a:lumOff val="35000"/>
+      <a:schemeClr val="lt1">
+        <a:lumMod val="85000"/>
       </a:schemeClr>
     </cs:fontRef>
     <cs:spPr>
-      <a:noFill/>
-      <a:ln w="9525" cap="flat" cmpd="sng" algn="ctr">
+      <a:ln w="9525">
         <a:solidFill>
-          <a:schemeClr val="tx1">
-            <a:lumMod val="15000"/>
-            <a:lumOff val="85000"/>
+          <a:schemeClr val="lt1">
+            <a:lumMod val="95000"/>
+            <a:alpha val="54000"/>
           </a:schemeClr>
         </a:solidFill>
-        <a:round/>
       </a:ln>
     </cs:spPr>
-    <cs:defRPr sz="900" kern="1200"/>
+    <cs:defRPr sz="1197" kern="1200"/>
   </cs:dataTable>
   <cs:downBar>
     <cs:lnRef idx="0"/>
     <cs:fillRef idx="0"/>
     <cs:effectRef idx="0"/>
     <cs:fontRef idx="minor">
-      <a:schemeClr val="dk1"/>
+      <a:schemeClr val="lt1"/>
     </cs:fontRef>
     <cs:spPr>
       <a:solidFill>
         <a:schemeClr val="dk1">
-          <a:lumMod val="65000"/>
-          <a:lumOff val="35000"/>
+          <a:lumMod val="75000"/>
+          <a:lumOff val="25000"/>
         </a:schemeClr>
       </a:solidFill>
       <a:ln w="9525">
         <a:solidFill>
-          <a:schemeClr val="tx1">
-            <a:lumMod val="65000"/>
-            <a:lumOff val="35000"/>
+          <a:schemeClr val="lt1">
+            <a:lumMod val="95000"/>
+            <a:alpha val="54000"/>
           </a:schemeClr>
         </a:solidFill>
       </a:ln>
@@ -24176,17 +25261,17 @@
     <cs:fillRef idx="0"/>
     <cs:effectRef idx="0"/>
     <cs:fontRef idx="minor">
-      <a:schemeClr val="tx1"/>
+      <a:schemeClr val="lt1"/>
     </cs:fontRef>
     <cs:spPr>
-      <a:ln w="9525" cap="flat" cmpd="sng" algn="ctr">
+      <a:ln w="9525">
         <a:solidFill>
-          <a:schemeClr val="tx1">
-            <a:lumMod val="35000"/>
-            <a:lumOff val="65000"/>
+          <a:schemeClr val="lt1">
+            <a:lumMod val="95000"/>
+            <a:alpha val="54000"/>
           </a:schemeClr>
         </a:solidFill>
-        <a:round/>
+        <a:prstDash val="dash"/>
       </a:ln>
     </cs:spPr>
   </cs:dropLine>
@@ -24195,14 +25280,13 @@
     <cs:fillRef idx="0"/>
     <cs:effectRef idx="0"/>
     <cs:fontRef idx="minor">
-      <a:schemeClr val="tx1"/>
+      <a:schemeClr val="lt1"/>
     </cs:fontRef>
     <cs:spPr>
       <a:ln w="9525" cap="flat" cmpd="sng" algn="ctr">
         <a:solidFill>
-          <a:schemeClr val="tx1">
-            <a:lumMod val="65000"/>
-            <a:lumOff val="35000"/>
+          <a:schemeClr val="lt1">
+            <a:lumMod val="95000"/>
           </a:schemeClr>
         </a:solidFill>
         <a:round/>
@@ -24214,28 +25298,22 @@
     <cs:fillRef idx="0"/>
     <cs:effectRef idx="0"/>
     <cs:fontRef idx="minor">
-      <a:schemeClr val="tx1"/>
+      <a:schemeClr val="lt1"/>
     </cs:fontRef>
-    <cs:spPr>
-      <a:noFill/>
-      <a:ln>
-        <a:noFill/>
-      </a:ln>
-    </cs:spPr>
   </cs:floor>
   <cs:gridlineMajor>
     <cs:lnRef idx="0"/>
     <cs:fillRef idx="0"/>
     <cs:effectRef idx="0"/>
     <cs:fontRef idx="minor">
-      <a:schemeClr val="tx1"/>
+      <a:schemeClr val="lt1"/>
     </cs:fontRef>
     <cs:spPr>
       <a:ln w="9525" cap="flat" cmpd="sng" algn="ctr">
         <a:solidFill>
-          <a:schemeClr val="tx1">
-            <a:lumMod val="15000"/>
-            <a:lumOff val="85000"/>
+          <a:schemeClr val="lt1">
+            <a:lumMod val="95000"/>
+            <a:alpha val="10000"/>
           </a:schemeClr>
         </a:solidFill>
         <a:round/>
@@ -24247,17 +25325,16 @@
     <cs:fillRef idx="0"/>
     <cs:effectRef idx="0"/>
     <cs:fontRef idx="minor">
-      <a:schemeClr val="tx1"/>
+      <a:schemeClr val="lt1"/>
     </cs:fontRef>
     <cs:spPr>
-      <a:ln w="9525" cap="flat" cmpd="sng" algn="ctr">
+      <a:ln>
         <a:solidFill>
-          <a:schemeClr val="tx1">
-            <a:lumMod val="5000"/>
-            <a:lumOff val="95000"/>
+          <a:schemeClr val="lt1">
+            <a:lumMod val="95000"/>
+            <a:alpha val="5000"/>
           </a:schemeClr>
         </a:solidFill>
-        <a:round/>
       </a:ln>
     </cs:spPr>
   </cs:gridlineMinor>
@@ -24266,17 +25343,17 @@
     <cs:fillRef idx="0"/>
     <cs:effectRef idx="0"/>
     <cs:fontRef idx="minor">
-      <a:schemeClr val="tx1"/>
+      <a:schemeClr val="lt1"/>
     </cs:fontRef>
     <cs:spPr>
-      <a:ln w="9525" cap="flat" cmpd="sng" algn="ctr">
+      <a:ln w="9525">
         <a:solidFill>
-          <a:schemeClr val="tx1">
-            <a:lumMod val="75000"/>
-            <a:lumOff val="25000"/>
+          <a:schemeClr val="lt1">
+            <a:lumMod val="95000"/>
+            <a:alpha val="54000"/>
           </a:schemeClr>
         </a:solidFill>
-        <a:round/>
+        <a:prstDash val="dash"/>
       </a:ln>
     </cs:spPr>
   </cs:hiLoLine>
@@ -24285,17 +25362,16 @@
     <cs:fillRef idx="0"/>
     <cs:effectRef idx="0"/>
     <cs:fontRef idx="minor">
-      <a:schemeClr val="tx1"/>
+      <a:schemeClr val="lt1"/>
     </cs:fontRef>
     <cs:spPr>
-      <a:ln w="9525" cap="flat" cmpd="sng" algn="ctr">
+      <a:ln w="9525">
         <a:solidFill>
-          <a:schemeClr val="tx1">
-            <a:lumMod val="35000"/>
-            <a:lumOff val="65000"/>
+          <a:schemeClr val="lt1">
+            <a:lumMod val="95000"/>
+            <a:alpha val="54000"/>
           </a:schemeClr>
         </a:solidFill>
-        <a:round/>
       </a:ln>
     </cs:spPr>
   </cs:leaderLine>
@@ -24304,27 +25380,26 @@
     <cs:fillRef idx="0"/>
     <cs:effectRef idx="0"/>
     <cs:fontRef idx="minor">
-      <a:schemeClr val="tx1">
-        <a:lumMod val="65000"/>
-        <a:lumOff val="35000"/>
+      <a:schemeClr val="lt1">
+        <a:lumMod val="85000"/>
       </a:schemeClr>
     </cs:fontRef>
-    <cs:defRPr sz="900" kern="1200"/>
+    <cs:defRPr sz="1197" kern="1200"/>
   </cs:legend>
-  <cs:plotArea mods="allowNoFillOverride allowNoLineOverride">
+  <cs:plotArea>
     <cs:lnRef idx="0"/>
     <cs:fillRef idx="0"/>
     <cs:effectRef idx="0"/>
     <cs:fontRef idx="minor">
-      <a:schemeClr val="tx1"/>
+      <a:schemeClr val="lt1"/>
     </cs:fontRef>
   </cs:plotArea>
-  <cs:plotArea3D mods="allowNoFillOverride allowNoLineOverride">
+  <cs:plotArea3D>
     <cs:lnRef idx="0"/>
     <cs:fillRef idx="0"/>
     <cs:effectRef idx="0"/>
     <cs:fontRef idx="minor">
-      <a:schemeClr val="tx1"/>
+      <a:schemeClr val="lt1"/>
     </cs:fontRef>
   </cs:plotArea3D>
   <cs:seriesAxis>
@@ -24332,26 +25407,36 @@
     <cs:fillRef idx="0"/>
     <cs:effectRef idx="0"/>
     <cs:fontRef idx="minor">
-      <a:schemeClr val="tx1">
-        <a:lumMod val="65000"/>
-        <a:lumOff val="35000"/>
+      <a:schemeClr val="lt1">
+        <a:lumMod val="85000"/>
       </a:schemeClr>
     </cs:fontRef>
-    <cs:defRPr sz="900" kern="1200"/>
+    <cs:spPr>
+      <a:ln w="12700" cap="flat" cmpd="sng" algn="ctr">
+        <a:solidFill>
+          <a:schemeClr val="lt1">
+            <a:lumMod val="95000"/>
+            <a:alpha val="54000"/>
+          </a:schemeClr>
+        </a:solidFill>
+        <a:round/>
+      </a:ln>
+    </cs:spPr>
+    <cs:defRPr sz="1197" kern="1200"/>
   </cs:seriesAxis>
   <cs:seriesLine>
     <cs:lnRef idx="0"/>
     <cs:fillRef idx="0"/>
     <cs:effectRef idx="0"/>
     <cs:fontRef idx="minor">
-      <a:schemeClr val="tx1"/>
+      <a:schemeClr val="lt1"/>
     </cs:fontRef>
     <cs:spPr>
       <a:ln w="9525" cap="flat" cmpd="sng" algn="ctr">
         <a:solidFill>
-          <a:schemeClr val="tx1">
-            <a:lumMod val="35000"/>
-            <a:lumOff val="65000"/>
+          <a:schemeClr val="lt1">
+            <a:lumMod val="95000"/>
+            <a:alpha val="54000"/>
           </a:schemeClr>
         </a:solidFill>
         <a:round/>
@@ -24363,12 +25448,19 @@
     <cs:fillRef idx="0"/>
     <cs:effectRef idx="0"/>
     <cs:fontRef idx="minor">
-      <a:schemeClr val="tx1">
-        <a:lumMod val="65000"/>
-        <a:lumOff val="35000"/>
+      <a:schemeClr val="lt1">
+        <a:lumMod val="95000"/>
       </a:schemeClr>
     </cs:fontRef>
-    <cs:defRPr sz="1400" b="0" kern="1200" spc="0" baseline="0"/>
+    <cs:defRPr sz="2128" b="1" kern="1200" spc="100" baseline="0">
+      <a:effectLst>
+        <a:outerShdw blurRad="50800" dist="38100" dir="5400000" algn="t" rotWithShape="0">
+          <a:prstClr val="black">
+            <a:alpha val="40000"/>
+          </a:prstClr>
+        </a:outerShdw>
+      </a:effectLst>
+    </cs:defRPr>
   </cs:title>
   <cs:trendline>
     <cs:lnRef idx="0">
@@ -24377,14 +25469,13 @@
     <cs:fillRef idx="0"/>
     <cs:effectRef idx="0"/>
     <cs:fontRef idx="minor">
-      <a:schemeClr val="tx1"/>
+      <a:schemeClr val="lt1"/>
     </cs:fontRef>
     <cs:spPr>
       <a:ln w="19050" cap="rnd">
         <a:solidFill>
           <a:schemeClr val="phClr"/>
         </a:solidFill>
-        <a:prstDash val="sysDot"/>
       </a:ln>
     </cs:spPr>
   </cs:trendline>
@@ -24393,19 +25484,18 @@
     <cs:fillRef idx="0"/>
     <cs:effectRef idx="0"/>
     <cs:fontRef idx="minor">
-      <a:schemeClr val="tx1">
-        <a:lumMod val="65000"/>
-        <a:lumOff val="35000"/>
+      <a:schemeClr val="lt1">
+        <a:lumMod val="85000"/>
       </a:schemeClr>
     </cs:fontRef>
-    <cs:defRPr sz="900" kern="1200"/>
+    <cs:defRPr sz="1197" kern="1200"/>
   </cs:trendlineLabel>
   <cs:upBar>
     <cs:lnRef idx="0"/>
     <cs:fillRef idx="0"/>
     <cs:effectRef idx="0"/>
     <cs:fontRef idx="minor">
-      <a:schemeClr val="dk1"/>
+      <a:schemeClr val="lt1"/>
     </cs:fontRef>
     <cs:spPr>
       <a:solidFill>
@@ -24413,9 +25503,9 @@
       </a:solidFill>
       <a:ln w="9525">
         <a:solidFill>
-          <a:schemeClr val="tx1">
-            <a:lumMod val="15000"/>
-            <a:lumOff val="85000"/>
+          <a:schemeClr val="lt1">
+            <a:lumMod val="95000"/>
+            <a:alpha val="54000"/>
           </a:schemeClr>
         </a:solidFill>
       </a:ln>
@@ -24426,26 +25516,19 @@
     <cs:fillRef idx="0"/>
     <cs:effectRef idx="0"/>
     <cs:fontRef idx="minor">
-      <a:schemeClr val="tx1">
-        <a:lumMod val="65000"/>
-        <a:lumOff val="35000"/>
+      <a:schemeClr val="lt1">
+        <a:lumMod val="85000"/>
       </a:schemeClr>
     </cs:fontRef>
-    <cs:defRPr sz="900" kern="1200"/>
+    <cs:defRPr sz="1197" kern="1200"/>
   </cs:valueAxis>
   <cs:wall>
     <cs:lnRef idx="0"/>
     <cs:fillRef idx="0"/>
     <cs:effectRef idx="0"/>
     <cs:fontRef idx="minor">
-      <a:schemeClr val="tx1"/>
+      <a:schemeClr val="lt1"/>
     </cs:fontRef>
-    <cs:spPr>
-      <a:noFill/>
-      <a:ln>
-        <a:noFill/>
-      </a:ln>
-    </cs:spPr>
   </cs:wall>
 </cs:chartStyle>
 </file>
@@ -25919,76 +27002,81 @@
 </file>
 
 <file path=ppt/charts/style9.xml><?xml version="1.0" encoding="utf-8"?>
-<cs:chartStyle xmlns:cs="http://schemas.microsoft.com/office/drawing/2012/chartStyle" xmlns:a="http://schemas.openxmlformats.org/drawingml/2006/main" id="201">
+<cs:chartStyle xmlns:cs="http://schemas.microsoft.com/office/drawing/2012/chartStyle" xmlns:a="http://schemas.openxmlformats.org/drawingml/2006/main" id="209">
   <cs:axisTitle>
     <cs:lnRef idx="0"/>
     <cs:fillRef idx="0"/>
     <cs:effectRef idx="0"/>
     <cs:fontRef idx="minor">
-      <a:schemeClr val="tx1">
-        <a:lumMod val="65000"/>
-        <a:lumOff val="35000"/>
+      <a:schemeClr val="lt1">
+        <a:lumMod val="85000"/>
       </a:schemeClr>
     </cs:fontRef>
-    <cs:defRPr sz="1000" kern="1200"/>
+    <cs:defRPr sz="1197" b="1" kern="1200" cap="all"/>
   </cs:axisTitle>
   <cs:categoryAxis>
     <cs:lnRef idx="0"/>
     <cs:fillRef idx="0"/>
     <cs:effectRef idx="0"/>
     <cs:fontRef idx="minor">
-      <a:schemeClr val="tx1">
-        <a:lumMod val="65000"/>
-        <a:lumOff val="35000"/>
+      <a:schemeClr val="lt1">
+        <a:lumMod val="85000"/>
       </a:schemeClr>
     </cs:fontRef>
     <cs:spPr>
-      <a:ln w="9525" cap="flat" cmpd="sng" algn="ctr">
+      <a:ln w="12700" cap="flat" cmpd="sng" algn="ctr">
         <a:solidFill>
-          <a:schemeClr val="tx1">
-            <a:lumMod val="15000"/>
-            <a:lumOff val="85000"/>
+          <a:schemeClr val="lt1">
+            <a:lumMod val="95000"/>
+            <a:alpha val="54000"/>
           </a:schemeClr>
         </a:solidFill>
         <a:round/>
       </a:ln>
     </cs:spPr>
-    <cs:defRPr sz="900" kern="1200"/>
+    <cs:defRPr sz="1197" kern="1200"/>
   </cs:categoryAxis>
-  <cs:chartArea mods="allowNoFillOverride allowNoLineOverride">
+  <cs:chartArea>
     <cs:lnRef idx="0"/>
     <cs:fillRef idx="0"/>
     <cs:effectRef idx="0"/>
     <cs:fontRef idx="minor">
-      <a:schemeClr val="tx1"/>
+      <a:schemeClr val="dk1"/>
     </cs:fontRef>
     <cs:spPr>
-      <a:solidFill>
-        <a:schemeClr val="bg1"/>
-      </a:solidFill>
-      <a:ln w="9525" cap="flat" cmpd="sng" algn="ctr">
-        <a:solidFill>
-          <a:schemeClr val="tx1">
-            <a:lumMod val="15000"/>
-            <a:lumOff val="85000"/>
-          </a:schemeClr>
-        </a:solidFill>
-        <a:round/>
-      </a:ln>
+      <a:gradFill flip="none" rotWithShape="1">
+        <a:gsLst>
+          <a:gs pos="0">
+            <a:schemeClr val="dk1">
+              <a:lumMod val="65000"/>
+              <a:lumOff val="35000"/>
+            </a:schemeClr>
+          </a:gs>
+          <a:gs pos="100000">
+            <a:schemeClr val="dk1">
+              <a:lumMod val="85000"/>
+              <a:lumOff val="15000"/>
+            </a:schemeClr>
+          </a:gs>
+        </a:gsLst>
+        <a:path path="circle">
+          <a:fillToRect l="50000" t="50000" r="50000" b="50000"/>
+        </a:path>
+        <a:tileRect/>
+      </a:gradFill>
     </cs:spPr>
-    <cs:defRPr sz="1000" kern="1200"/>
+    <cs:defRPr sz="1330" kern="1200"/>
   </cs:chartArea>
   <cs:dataLabel>
     <cs:lnRef idx="0"/>
     <cs:fillRef idx="0"/>
     <cs:effectRef idx="0"/>
     <cs:fontRef idx="minor">
-      <a:schemeClr val="tx1">
-        <a:lumMod val="75000"/>
-        <a:lumOff val="25000"/>
+      <a:schemeClr val="lt1">
+        <a:lumMod val="85000"/>
       </a:schemeClr>
     </cs:fontRef>
-    <cs:defRPr sz="900" kern="1200"/>
+    <cs:defRPr sz="1197" kern="1200"/>
   </cs:dataLabel>
   <cs:dataLabelCallout>
     <cs:lnRef idx="0"/>
@@ -26004,51 +27092,43 @@
       <a:solidFill>
         <a:schemeClr val="lt1"/>
       </a:solidFill>
-      <a:ln>
-        <a:solidFill>
-          <a:schemeClr val="dk1">
-            <a:lumMod val="25000"/>
-            <a:lumOff val="75000"/>
-          </a:schemeClr>
-        </a:solidFill>
-      </a:ln>
     </cs:spPr>
-    <cs:defRPr sz="900" kern="1200"/>
+    <cs:defRPr sz="1197" kern="1200"/>
     <cs:bodyPr rot="0" spcFirstLastPara="1" vertOverflow="clip" horzOverflow="clip" vert="horz" wrap="square" lIns="36576" tIns="18288" rIns="36576" bIns="18288" anchor="ctr" anchorCtr="1">
       <a:spAutoFit/>
     </cs:bodyPr>
   </cs:dataLabelCallout>
   <cs:dataPoint>
     <cs:lnRef idx="0"/>
-    <cs:fillRef idx="1">
+    <cs:fillRef idx="3">
       <cs:styleClr val="auto"/>
     </cs:fillRef>
-    <cs:effectRef idx="0"/>
+    <cs:effectRef idx="3"/>
     <cs:fontRef idx="minor">
-      <a:schemeClr val="tx1"/>
+      <a:schemeClr val="lt1"/>
     </cs:fontRef>
   </cs:dataPoint>
   <cs:dataPoint3D>
     <cs:lnRef idx="0"/>
-    <cs:fillRef idx="1">
+    <cs:fillRef idx="3">
       <cs:styleClr val="auto"/>
     </cs:fillRef>
-    <cs:effectRef idx="0"/>
+    <cs:effectRef idx="3"/>
     <cs:fontRef idx="minor">
-      <a:schemeClr val="tx1"/>
+      <a:schemeClr val="lt1"/>
     </cs:fontRef>
   </cs:dataPoint3D>
   <cs:dataPointLine>
     <cs:lnRef idx="0">
       <cs:styleClr val="auto"/>
     </cs:lnRef>
-    <cs:fillRef idx="1"/>
-    <cs:effectRef idx="0"/>
+    <cs:fillRef idx="3"/>
+    <cs:effectRef idx="3"/>
     <cs:fontRef idx="minor">
-      <a:schemeClr val="tx1"/>
+      <a:schemeClr val="lt1"/>
     </cs:fontRef>
     <cs:spPr>
-      <a:ln w="28575" cap="rnd">
+      <a:ln w="34925" cap="rnd">
         <a:solidFill>
           <a:schemeClr val="phClr"/>
         </a:solidFill>
@@ -26060,30 +27140,31 @@
     <cs:lnRef idx="0">
       <cs:styleClr val="auto"/>
     </cs:lnRef>
-    <cs:fillRef idx="1">
+    <cs:fillRef idx="3">
       <cs:styleClr val="auto"/>
     </cs:fillRef>
-    <cs:effectRef idx="0"/>
+    <cs:effectRef idx="3"/>
     <cs:fontRef idx="minor">
-      <a:schemeClr val="tx1"/>
+      <a:schemeClr val="lt1"/>
     </cs:fontRef>
     <cs:spPr>
       <a:ln w="9525">
         <a:solidFill>
           <a:schemeClr val="phClr"/>
         </a:solidFill>
+        <a:round/>
       </a:ln>
     </cs:spPr>
   </cs:dataPointMarker>
-  <cs:dataPointMarkerLayout symbol="circle" size="5"/>
+  <cs:dataPointMarkerLayout symbol="circle" size="6"/>
   <cs:dataPointWireframe>
     <cs:lnRef idx="0">
       <cs:styleClr val="auto"/>
     </cs:lnRef>
-    <cs:fillRef idx="1"/>
-    <cs:effectRef idx="0"/>
+    <cs:fillRef idx="3"/>
+    <cs:effectRef idx="3"/>
     <cs:fontRef idx="minor">
-      <a:schemeClr val="tx1"/>
+      <a:schemeClr val="lt1"/>
     </cs:fontRef>
     <cs:spPr>
       <a:ln w="9525" cap="rnd">
@@ -26099,44 +27180,41 @@
     <cs:fillRef idx="0"/>
     <cs:effectRef idx="0"/>
     <cs:fontRef idx="minor">
-      <a:schemeClr val="tx1">
-        <a:lumMod val="65000"/>
-        <a:lumOff val="35000"/>
+      <a:schemeClr val="lt1">
+        <a:lumMod val="85000"/>
       </a:schemeClr>
     </cs:fontRef>
     <cs:spPr>
-      <a:noFill/>
-      <a:ln w="9525" cap="flat" cmpd="sng" algn="ctr">
+      <a:ln w="9525">
         <a:solidFill>
-          <a:schemeClr val="tx1">
-            <a:lumMod val="15000"/>
-            <a:lumOff val="85000"/>
+          <a:schemeClr val="lt1">
+            <a:lumMod val="95000"/>
+            <a:alpha val="54000"/>
           </a:schemeClr>
         </a:solidFill>
-        <a:round/>
       </a:ln>
     </cs:spPr>
-    <cs:defRPr sz="900" kern="1200"/>
+    <cs:defRPr sz="1197" kern="1200"/>
   </cs:dataTable>
   <cs:downBar>
     <cs:lnRef idx="0"/>
     <cs:fillRef idx="0"/>
     <cs:effectRef idx="0"/>
     <cs:fontRef idx="minor">
-      <a:schemeClr val="dk1"/>
+      <a:schemeClr val="lt1"/>
     </cs:fontRef>
     <cs:spPr>
       <a:solidFill>
         <a:schemeClr val="dk1">
-          <a:lumMod val="65000"/>
-          <a:lumOff val="35000"/>
+          <a:lumMod val="75000"/>
+          <a:lumOff val="25000"/>
         </a:schemeClr>
       </a:solidFill>
       <a:ln w="9525">
         <a:solidFill>
-          <a:schemeClr val="tx1">
-            <a:lumMod val="65000"/>
-            <a:lumOff val="35000"/>
+          <a:schemeClr val="lt1">
+            <a:lumMod val="95000"/>
+            <a:alpha val="54000"/>
           </a:schemeClr>
         </a:solidFill>
       </a:ln>
@@ -26147,17 +27225,17 @@
     <cs:fillRef idx="0"/>
     <cs:effectRef idx="0"/>
     <cs:fontRef idx="minor">
-      <a:schemeClr val="tx1"/>
+      <a:schemeClr val="lt1"/>
     </cs:fontRef>
     <cs:spPr>
-      <a:ln w="9525" cap="flat" cmpd="sng" algn="ctr">
+      <a:ln w="9525">
         <a:solidFill>
-          <a:schemeClr val="tx1">
-            <a:lumMod val="35000"/>
-            <a:lumOff val="65000"/>
+          <a:schemeClr val="lt1">
+            <a:lumMod val="95000"/>
+            <a:alpha val="54000"/>
           </a:schemeClr>
         </a:solidFill>
-        <a:round/>
+        <a:prstDash val="dash"/>
       </a:ln>
     </cs:spPr>
   </cs:dropLine>
@@ -26166,14 +27244,13 @@
     <cs:fillRef idx="0"/>
     <cs:effectRef idx="0"/>
     <cs:fontRef idx="minor">
-      <a:schemeClr val="tx1"/>
+      <a:schemeClr val="lt1"/>
     </cs:fontRef>
     <cs:spPr>
       <a:ln w="9525" cap="flat" cmpd="sng" algn="ctr">
         <a:solidFill>
-          <a:schemeClr val="tx1">
-            <a:lumMod val="65000"/>
-            <a:lumOff val="35000"/>
+          <a:schemeClr val="lt1">
+            <a:lumMod val="95000"/>
           </a:schemeClr>
         </a:solidFill>
         <a:round/>
@@ -26185,28 +27262,22 @@
     <cs:fillRef idx="0"/>
     <cs:effectRef idx="0"/>
     <cs:fontRef idx="minor">
-      <a:schemeClr val="tx1"/>
+      <a:schemeClr val="lt1"/>
     </cs:fontRef>
-    <cs:spPr>
-      <a:noFill/>
-      <a:ln>
-        <a:noFill/>
-      </a:ln>
-    </cs:spPr>
   </cs:floor>
   <cs:gridlineMajor>
     <cs:lnRef idx="0"/>
     <cs:fillRef idx="0"/>
     <cs:effectRef idx="0"/>
     <cs:fontRef idx="minor">
-      <a:schemeClr val="tx1"/>
+      <a:schemeClr val="lt1"/>
     </cs:fontRef>
     <cs:spPr>
       <a:ln w="9525" cap="flat" cmpd="sng" algn="ctr">
         <a:solidFill>
-          <a:schemeClr val="tx1">
-            <a:lumMod val="15000"/>
-            <a:lumOff val="85000"/>
+          <a:schemeClr val="lt1">
+            <a:lumMod val="95000"/>
+            <a:alpha val="10000"/>
           </a:schemeClr>
         </a:solidFill>
         <a:round/>
@@ -26218,17 +27289,16 @@
     <cs:fillRef idx="0"/>
     <cs:effectRef idx="0"/>
     <cs:fontRef idx="minor">
-      <a:schemeClr val="tx1"/>
+      <a:schemeClr val="lt1"/>
     </cs:fontRef>
     <cs:spPr>
-      <a:ln w="9525" cap="flat" cmpd="sng" algn="ctr">
+      <a:ln>
         <a:solidFill>
-          <a:schemeClr val="tx1">
-            <a:lumMod val="5000"/>
-            <a:lumOff val="95000"/>
+          <a:schemeClr val="lt1">
+            <a:lumMod val="95000"/>
+            <a:alpha val="5000"/>
           </a:schemeClr>
         </a:solidFill>
-        <a:round/>
       </a:ln>
     </cs:spPr>
   </cs:gridlineMinor>
@@ -26237,17 +27307,17 @@
     <cs:fillRef idx="0"/>
     <cs:effectRef idx="0"/>
     <cs:fontRef idx="minor">
-      <a:schemeClr val="tx1"/>
+      <a:schemeClr val="lt1"/>
     </cs:fontRef>
     <cs:spPr>
-      <a:ln w="9525" cap="flat" cmpd="sng" algn="ctr">
+      <a:ln w="9525">
         <a:solidFill>
-          <a:schemeClr val="tx1">
-            <a:lumMod val="75000"/>
-            <a:lumOff val="25000"/>
+          <a:schemeClr val="lt1">
+            <a:lumMod val="95000"/>
+            <a:alpha val="54000"/>
           </a:schemeClr>
         </a:solidFill>
-        <a:round/>
+        <a:prstDash val="dash"/>
       </a:ln>
     </cs:spPr>
   </cs:hiLoLine>
@@ -26256,17 +27326,16 @@
     <cs:fillRef idx="0"/>
     <cs:effectRef idx="0"/>
     <cs:fontRef idx="minor">
-      <a:schemeClr val="tx1"/>
+      <a:schemeClr val="lt1"/>
     </cs:fontRef>
     <cs:spPr>
-      <a:ln w="9525" cap="flat" cmpd="sng" algn="ctr">
+      <a:ln w="9525">
         <a:solidFill>
-          <a:schemeClr val="tx1">
-            <a:lumMod val="35000"/>
-            <a:lumOff val="65000"/>
+          <a:schemeClr val="lt1">
+            <a:lumMod val="95000"/>
+            <a:alpha val="54000"/>
           </a:schemeClr>
         </a:solidFill>
-        <a:round/>
       </a:ln>
     </cs:spPr>
   </cs:leaderLine>
@@ -26275,27 +27344,26 @@
     <cs:fillRef idx="0"/>
     <cs:effectRef idx="0"/>
     <cs:fontRef idx="minor">
-      <a:schemeClr val="tx1">
-        <a:lumMod val="65000"/>
-        <a:lumOff val="35000"/>
+      <a:schemeClr val="lt1">
+        <a:lumMod val="85000"/>
       </a:schemeClr>
     </cs:fontRef>
-    <cs:defRPr sz="900" kern="1200"/>
+    <cs:defRPr sz="1197" kern="1200"/>
   </cs:legend>
-  <cs:plotArea mods="allowNoFillOverride allowNoLineOverride">
+  <cs:plotArea>
     <cs:lnRef idx="0"/>
     <cs:fillRef idx="0"/>
     <cs:effectRef idx="0"/>
     <cs:fontRef idx="minor">
-      <a:schemeClr val="tx1"/>
+      <a:schemeClr val="lt1"/>
     </cs:fontRef>
   </cs:plotArea>
-  <cs:plotArea3D mods="allowNoFillOverride allowNoLineOverride">
+  <cs:plotArea3D>
     <cs:lnRef idx="0"/>
     <cs:fillRef idx="0"/>
     <cs:effectRef idx="0"/>
     <cs:fontRef idx="minor">
-      <a:schemeClr val="tx1"/>
+      <a:schemeClr val="lt1"/>
     </cs:fontRef>
   </cs:plotArea3D>
   <cs:seriesAxis>
@@ -26303,26 +27371,36 @@
     <cs:fillRef idx="0"/>
     <cs:effectRef idx="0"/>
     <cs:fontRef idx="minor">
-      <a:schemeClr val="tx1">
-        <a:lumMod val="65000"/>
-        <a:lumOff val="35000"/>
+      <a:schemeClr val="lt1">
+        <a:lumMod val="85000"/>
       </a:schemeClr>
     </cs:fontRef>
-    <cs:defRPr sz="900" kern="1200"/>
+    <cs:spPr>
+      <a:ln w="12700" cap="flat" cmpd="sng" algn="ctr">
+        <a:solidFill>
+          <a:schemeClr val="lt1">
+            <a:lumMod val="95000"/>
+            <a:alpha val="54000"/>
+          </a:schemeClr>
+        </a:solidFill>
+        <a:round/>
+      </a:ln>
+    </cs:spPr>
+    <cs:defRPr sz="1197" kern="1200"/>
   </cs:seriesAxis>
   <cs:seriesLine>
     <cs:lnRef idx="0"/>
     <cs:fillRef idx="0"/>
     <cs:effectRef idx="0"/>
     <cs:fontRef idx="minor">
-      <a:schemeClr val="tx1"/>
+      <a:schemeClr val="lt1"/>
     </cs:fontRef>
     <cs:spPr>
       <a:ln w="9525" cap="flat" cmpd="sng" algn="ctr">
         <a:solidFill>
-          <a:schemeClr val="tx1">
-            <a:lumMod val="35000"/>
-            <a:lumOff val="65000"/>
+          <a:schemeClr val="lt1">
+            <a:lumMod val="95000"/>
+            <a:alpha val="54000"/>
           </a:schemeClr>
         </a:solidFill>
         <a:round/>
@@ -26334,12 +27412,19 @@
     <cs:fillRef idx="0"/>
     <cs:effectRef idx="0"/>
     <cs:fontRef idx="minor">
-      <a:schemeClr val="tx1">
-        <a:lumMod val="65000"/>
-        <a:lumOff val="35000"/>
+      <a:schemeClr val="lt1">
+        <a:lumMod val="95000"/>
       </a:schemeClr>
     </cs:fontRef>
-    <cs:defRPr sz="1400" b="0" kern="1200" spc="0" baseline="0"/>
+    <cs:defRPr sz="2128" b="1" kern="1200" spc="100" baseline="0">
+      <a:effectLst>
+        <a:outerShdw blurRad="50800" dist="38100" dir="5400000" algn="t" rotWithShape="0">
+          <a:prstClr val="black">
+            <a:alpha val="40000"/>
+          </a:prstClr>
+        </a:outerShdw>
+      </a:effectLst>
+    </cs:defRPr>
   </cs:title>
   <cs:trendline>
     <cs:lnRef idx="0">
@@ -26348,14 +27433,13 @@
     <cs:fillRef idx="0"/>
     <cs:effectRef idx="0"/>
     <cs:fontRef idx="minor">
-      <a:schemeClr val="tx1"/>
+      <a:schemeClr val="lt1"/>
     </cs:fontRef>
     <cs:spPr>
       <a:ln w="19050" cap="rnd">
         <a:solidFill>
           <a:schemeClr val="phClr"/>
         </a:solidFill>
-        <a:prstDash val="sysDot"/>
       </a:ln>
     </cs:spPr>
   </cs:trendline>
@@ -26364,19 +27448,18 @@
     <cs:fillRef idx="0"/>
     <cs:effectRef idx="0"/>
     <cs:fontRef idx="minor">
-      <a:schemeClr val="tx1">
-        <a:lumMod val="65000"/>
-        <a:lumOff val="35000"/>
+      <a:schemeClr val="lt1">
+        <a:lumMod val="85000"/>
       </a:schemeClr>
     </cs:fontRef>
-    <cs:defRPr sz="900" kern="1200"/>
+    <cs:defRPr sz="1197" kern="1200"/>
   </cs:trendlineLabel>
   <cs:upBar>
     <cs:lnRef idx="0"/>
     <cs:fillRef idx="0"/>
     <cs:effectRef idx="0"/>
     <cs:fontRef idx="minor">
-      <a:schemeClr val="dk1"/>
+      <a:schemeClr val="lt1"/>
     </cs:fontRef>
     <cs:spPr>
       <a:solidFill>
@@ -26384,9 +27467,9 @@
       </a:solidFill>
       <a:ln w="9525">
         <a:solidFill>
-          <a:schemeClr val="tx1">
-            <a:lumMod val="15000"/>
-            <a:lumOff val="85000"/>
+          <a:schemeClr val="lt1">
+            <a:lumMod val="95000"/>
+            <a:alpha val="54000"/>
           </a:schemeClr>
         </a:solidFill>
       </a:ln>
@@ -26397,26 +27480,19 @@
     <cs:fillRef idx="0"/>
     <cs:effectRef idx="0"/>
     <cs:fontRef idx="minor">
-      <a:schemeClr val="tx1">
-        <a:lumMod val="65000"/>
-        <a:lumOff val="35000"/>
+      <a:schemeClr val="lt1">
+        <a:lumMod val="85000"/>
       </a:schemeClr>
     </cs:fontRef>
-    <cs:defRPr sz="900" kern="1200"/>
+    <cs:defRPr sz="1197" kern="1200"/>
   </cs:valueAxis>
   <cs:wall>
     <cs:lnRef idx="0"/>
     <cs:fillRef idx="0"/>
     <cs:effectRef idx="0"/>
     <cs:fontRef idx="minor">
-      <a:schemeClr val="tx1"/>
+      <a:schemeClr val="lt1"/>
     </cs:fontRef>
-    <cs:spPr>
-      <a:noFill/>
-      <a:ln>
-        <a:noFill/>
-      </a:ln>
-    </cs:spPr>
   </cs:wall>
 </cs:chartStyle>
 </file>
@@ -30007,7 +31083,7 @@
             <a:pPr algn="r"/>
             <a:r>
               <a:rPr lang="es-MX" dirty="0"/>
-              <a:t>Del 29/09/2023 al 11/10/2023</a:t>
+              <a:t>Del 29/09/2023 al 12/10/2023</a:t>
             </a:r>
             <a:endParaRPr lang="es-EC" dirty="0"/>
           </a:p>
@@ -30107,42 +31183,12 @@
           <a:p>
             <a:r>
               <a:rPr lang="es-MX" dirty="0"/>
-              <a:t>Distancias recorridas por mascota</a:t>
+              <a:t>Promedio distancias recorridas por mascota/día</a:t>
             </a:r>
             <a:endParaRPr lang="es-EC" dirty="0"/>
           </a:p>
         </p:txBody>
       </p:sp>
-      <p:graphicFrame>
-        <p:nvGraphicFramePr>
-          <p:cNvPr id="3" name="Chart 2">
-            <a:extLst>
-              <a:ext uri="{FF2B5EF4-FFF2-40B4-BE49-F238E27FC236}">
-                <a16:creationId xmlns:a16="http://schemas.microsoft.com/office/drawing/2014/main" id="{CCA8E225-8BC7-5BEE-20F1-38681CE5BF81}"/>
-              </a:ext>
-            </a:extLst>
-          </p:cNvPr>
-          <p:cNvGraphicFramePr>
-            <a:graphicFrameLocks/>
-          </p:cNvGraphicFramePr>
-          <p:nvPr>
-            <p:extLst>
-              <p:ext uri="{D42A27DB-BD31-4B8C-83A1-F6EECF244321}">
-                <p14:modId xmlns:p14="http://schemas.microsoft.com/office/powerpoint/2010/main" val="1747281334"/>
-              </p:ext>
-            </p:extLst>
-          </p:nvPr>
-        </p:nvGraphicFramePr>
-        <p:xfrm>
-          <a:off x="1554984" y="1319592"/>
-          <a:ext cx="9082032" cy="4652318"/>
-        </p:xfrm>
-        <a:graphic>
-          <a:graphicData uri="http://schemas.openxmlformats.org/drawingml/2006/chart">
-            <c:chart xmlns:c="http://schemas.openxmlformats.org/drawingml/2006/chart" xmlns:r="http://schemas.openxmlformats.org/officeDocument/2006/relationships" r:id="rId2"/>
-          </a:graphicData>
-        </a:graphic>
-      </p:graphicFrame>
       <p:sp>
         <p:nvSpPr>
           <p:cNvPr id="4" name="TextBox 3">
@@ -30179,10 +31225,170 @@
           </a:p>
         </p:txBody>
       </p:sp>
+      <p:graphicFrame>
+        <p:nvGraphicFramePr>
+          <p:cNvPr id="5" name="Chart 4">
+            <a:extLst>
+              <a:ext uri="{FF2B5EF4-FFF2-40B4-BE49-F238E27FC236}">
+                <a16:creationId xmlns:a16="http://schemas.microsoft.com/office/drawing/2014/main" id="{BF5DC743-B68E-6929-7C07-809B98EE9529}"/>
+              </a:ext>
+            </a:extLst>
+          </p:cNvPr>
+          <p:cNvGraphicFramePr>
+            <a:graphicFrameLocks/>
+          </p:cNvGraphicFramePr>
+          <p:nvPr>
+            <p:extLst>
+              <p:ext uri="{D42A27DB-BD31-4B8C-83A1-F6EECF244321}">
+                <p14:modId xmlns:p14="http://schemas.microsoft.com/office/powerpoint/2010/main" val="1943498277"/>
+              </p:ext>
+            </p:extLst>
+          </p:nvPr>
+        </p:nvGraphicFramePr>
+        <p:xfrm>
+          <a:off x="1645918" y="1127158"/>
+          <a:ext cx="8885817" cy="4649697"/>
+        </p:xfrm>
+        <a:graphic>
+          <a:graphicData uri="http://schemas.openxmlformats.org/drawingml/2006/chart">
+            <c:chart xmlns:c="http://schemas.openxmlformats.org/drawingml/2006/chart" xmlns:r="http://schemas.openxmlformats.org/officeDocument/2006/relationships" r:id="rId2"/>
+          </a:graphicData>
+        </a:graphic>
+      </p:graphicFrame>
     </p:spTree>
     <p:extLst>
       <p:ext uri="{BB962C8B-B14F-4D97-AF65-F5344CB8AC3E}">
         <p14:creationId xmlns:p14="http://schemas.microsoft.com/office/powerpoint/2010/main" val="51784365"/>
+      </p:ext>
+    </p:extLst>
+  </p:cSld>
+  <p:clrMapOvr>
+    <a:masterClrMapping/>
+  </p:clrMapOvr>
+</p:sld>
+</file>
+
+<file path=ppt/slides/slide11.xml><?xml version="1.0" encoding="utf-8"?>
+<p:sld xmlns:a="http://schemas.openxmlformats.org/drawingml/2006/main" xmlns:r="http://schemas.openxmlformats.org/officeDocument/2006/relationships" xmlns:p="http://schemas.openxmlformats.org/presentationml/2006/main">
+  <p:cSld>
+    <p:spTree>
+      <p:nvGrpSpPr>
+        <p:cNvPr id="1" name=""/>
+        <p:cNvGrpSpPr/>
+        <p:nvPr/>
+      </p:nvGrpSpPr>
+      <p:grpSpPr>
+        <a:xfrm>
+          <a:off x="0" y="0"/>
+          <a:ext cx="0" cy="0"/>
+          <a:chOff x="0" y="0"/>
+          <a:chExt cx="0" cy="0"/>
+        </a:xfrm>
+      </p:grpSpPr>
+      <p:sp useBgFill="1">
+        <p:nvSpPr>
+          <p:cNvPr id="2" name="Title 1">
+            <a:extLst>
+              <a:ext uri="{FF2B5EF4-FFF2-40B4-BE49-F238E27FC236}">
+                <a16:creationId xmlns:a16="http://schemas.microsoft.com/office/drawing/2014/main" id="{DCFD4099-6CAA-382F-302C-E5C977DA00FA}"/>
+              </a:ext>
+            </a:extLst>
+          </p:cNvPr>
+          <p:cNvSpPr>
+            <a:spLocks noGrp="1"/>
+          </p:cNvSpPr>
+          <p:nvPr>
+            <p:ph type="title"/>
+          </p:nvPr>
+        </p:nvSpPr>
+        <p:spPr>
+          <a:xfrm>
+            <a:off x="1430767" y="0"/>
+            <a:ext cx="9520158" cy="1049235"/>
+          </a:xfrm>
+        </p:spPr>
+        <p:txBody>
+          <a:bodyPr/>
+          <a:lstStyle/>
+          <a:p>
+            <a:r>
+              <a:rPr lang="es-MX" dirty="0"/>
+              <a:t>Total distancia recorrida por mascota</a:t>
+            </a:r>
+            <a:endParaRPr lang="es-EC" dirty="0"/>
+          </a:p>
+        </p:txBody>
+      </p:sp>
+      <p:sp>
+        <p:nvSpPr>
+          <p:cNvPr id="4" name="TextBox 3">
+            <a:extLst>
+              <a:ext uri="{FF2B5EF4-FFF2-40B4-BE49-F238E27FC236}">
+                <a16:creationId xmlns:a16="http://schemas.microsoft.com/office/drawing/2014/main" id="{D2545401-FE75-B16D-38AC-C84E9022156F}"/>
+              </a:ext>
+            </a:extLst>
+          </p:cNvPr>
+          <p:cNvSpPr txBox="1"/>
+          <p:nvPr/>
+        </p:nvSpPr>
+        <p:spPr>
+          <a:xfrm rot="16200000">
+            <a:off x="899692" y="2897925"/>
+            <a:ext cx="692818" cy="369332"/>
+          </a:xfrm>
+          <a:prstGeom prst="rect">
+            <a:avLst/>
+          </a:prstGeom>
+          <a:noFill/>
+        </p:spPr>
+        <p:txBody>
+          <a:bodyPr wrap="none" rtlCol="0">
+            <a:spAutoFit/>
+          </a:bodyPr>
+          <a:lstStyle/>
+          <a:p>
+            <a:r>
+              <a:rPr lang="es-MX" dirty="0"/>
+              <a:t>KMS</a:t>
+            </a:r>
+            <a:endParaRPr lang="es-EC" dirty="0"/>
+          </a:p>
+        </p:txBody>
+      </p:sp>
+      <p:graphicFrame>
+        <p:nvGraphicFramePr>
+          <p:cNvPr id="3" name="Chart 2">
+            <a:extLst>
+              <a:ext uri="{FF2B5EF4-FFF2-40B4-BE49-F238E27FC236}">
+                <a16:creationId xmlns:a16="http://schemas.microsoft.com/office/drawing/2014/main" id="{A64C82B9-FE2D-DED9-D5EC-394BDCF96F27}"/>
+              </a:ext>
+            </a:extLst>
+          </p:cNvPr>
+          <p:cNvGraphicFramePr>
+            <a:graphicFrameLocks/>
+          </p:cNvGraphicFramePr>
+          <p:nvPr>
+            <p:extLst>
+              <p:ext uri="{D42A27DB-BD31-4B8C-83A1-F6EECF244321}">
+                <p14:modId xmlns:p14="http://schemas.microsoft.com/office/powerpoint/2010/main" val="2239976104"/>
+              </p:ext>
+            </p:extLst>
+          </p:nvPr>
+        </p:nvGraphicFramePr>
+        <p:xfrm>
+          <a:off x="1513242" y="1235488"/>
+          <a:ext cx="8889402" cy="4121820"/>
+        </p:xfrm>
+        <a:graphic>
+          <a:graphicData uri="http://schemas.openxmlformats.org/drawingml/2006/chart">
+            <c:chart xmlns:c="http://schemas.openxmlformats.org/drawingml/2006/chart" xmlns:r="http://schemas.openxmlformats.org/officeDocument/2006/relationships" r:id="rId2"/>
+          </a:graphicData>
+        </a:graphic>
+      </p:graphicFrame>
+    </p:spTree>
+    <p:extLst>
+      <p:ext uri="{BB962C8B-B14F-4D97-AF65-F5344CB8AC3E}">
+        <p14:creationId xmlns:p14="http://schemas.microsoft.com/office/powerpoint/2010/main" val="93059344"/>
       </p:ext>
     </p:extLst>
   </p:cSld>
@@ -30592,36 +31798,6 @@
           </a:p>
         </p:txBody>
       </p:sp>
-      <p:graphicFrame>
-        <p:nvGraphicFramePr>
-          <p:cNvPr id="5" name="Chart 4">
-            <a:extLst>
-              <a:ext uri="{FF2B5EF4-FFF2-40B4-BE49-F238E27FC236}">
-                <a16:creationId xmlns:a16="http://schemas.microsoft.com/office/drawing/2014/main" id="{CB0D670D-1950-4276-8D95-482E2F14FF17}"/>
-              </a:ext>
-            </a:extLst>
-          </p:cNvPr>
-          <p:cNvGraphicFramePr>
-            <a:graphicFrameLocks/>
-          </p:cNvGraphicFramePr>
-          <p:nvPr>
-            <p:extLst>
-              <p:ext uri="{D42A27DB-BD31-4B8C-83A1-F6EECF244321}">
-                <p14:modId xmlns:p14="http://schemas.microsoft.com/office/powerpoint/2010/main" val="2673568564"/>
-              </p:ext>
-            </p:extLst>
-          </p:nvPr>
-        </p:nvGraphicFramePr>
-        <p:xfrm>
-          <a:off x="1534696" y="1594680"/>
-          <a:ext cx="8840673" cy="3999296"/>
-        </p:xfrm>
-        <a:graphic>
-          <a:graphicData uri="http://schemas.openxmlformats.org/drawingml/2006/chart">
-            <c:chart xmlns:c="http://schemas.openxmlformats.org/drawingml/2006/chart" xmlns:r="http://schemas.openxmlformats.org/officeDocument/2006/relationships" r:id="rId2"/>
-          </a:graphicData>
-        </a:graphic>
-      </p:graphicFrame>
       <p:sp>
         <p:nvSpPr>
           <p:cNvPr id="3" name="TextBox 2">
@@ -30658,6 +31834,36 @@
           </a:p>
         </p:txBody>
       </p:sp>
+      <p:graphicFrame>
+        <p:nvGraphicFramePr>
+          <p:cNvPr id="4" name="Chart 3">
+            <a:extLst>
+              <a:ext uri="{FF2B5EF4-FFF2-40B4-BE49-F238E27FC236}">
+                <a16:creationId xmlns:a16="http://schemas.microsoft.com/office/drawing/2014/main" id="{CB0D670D-1950-4276-8D95-482E2F14FF17}"/>
+              </a:ext>
+            </a:extLst>
+          </p:cNvPr>
+          <p:cNvGraphicFramePr>
+            <a:graphicFrameLocks/>
+          </p:cNvGraphicFramePr>
+          <p:nvPr>
+            <p:extLst>
+              <p:ext uri="{D42A27DB-BD31-4B8C-83A1-F6EECF244321}">
+                <p14:modId xmlns:p14="http://schemas.microsoft.com/office/powerpoint/2010/main" val="340002358"/>
+              </p:ext>
+            </p:extLst>
+          </p:nvPr>
+        </p:nvGraphicFramePr>
+        <p:xfrm>
+          <a:off x="1534696" y="1387634"/>
+          <a:ext cx="9520158" cy="4013706"/>
+        </p:xfrm>
+        <a:graphic>
+          <a:graphicData uri="http://schemas.openxmlformats.org/drawingml/2006/chart">
+            <c:chart xmlns:c="http://schemas.openxmlformats.org/drawingml/2006/chart" xmlns:r="http://schemas.openxmlformats.org/officeDocument/2006/relationships" r:id="rId2"/>
+          </a:graphicData>
+        </a:graphic>
+      </p:graphicFrame>
     </p:spTree>
     <p:extLst>
       <p:ext uri="{BB962C8B-B14F-4D97-AF65-F5344CB8AC3E}">
@@ -30737,7 +31943,7 @@
           <p:nvPr>
             <p:extLst>
               <p:ext uri="{D42A27DB-BD31-4B8C-83A1-F6EECF244321}">
-                <p14:modId xmlns:p14="http://schemas.microsoft.com/office/powerpoint/2010/main" val="1381512633"/>
+                <p14:modId xmlns:p14="http://schemas.microsoft.com/office/powerpoint/2010/main" val="3451567477"/>
               </p:ext>
             </p:extLst>
           </p:nvPr>

</xml_diff>